<commit_message>
Changing diagram and presentation
</commit_message>
<xml_diff>
--- a/extraFiles/Iron Man.pptx
+++ b/extraFiles/Iron Man.pptx
@@ -113,10 +113,25 @@
   </p:defaultTextStyle>
   <p:extLst>
     <p:ext uri="{EFAFB233-063F-42B5-8137-9DF3F51BA10A}">
-      <p15:sldGuideLst xmlns:p15="http://schemas.microsoft.com/office/powerpoint/2012/main" xmlns=""/>
+      <p15:sldGuideLst xmlns:p15="http://schemas.microsoft.com/office/powerpoint/2012/main">
+        <p15:guide id="1" orient="horz" pos="2160">
+          <p15:clr>
+            <a:srgbClr val="A4A3A4"/>
+          </p15:clr>
+        </p15:guide>
+        <p15:guide id="2" pos="3840">
+          <p15:clr>
+            <a:srgbClr val="A4A3A4"/>
+          </p15:clr>
+        </p15:guide>
+      </p15:sldGuideLst>
     </p:ext>
   </p:extLst>
 </p:presentation>
+</file>
+
+<file path=ppt/revisionInfo.xml><?xml version="1.0" encoding="utf-8"?>
+<p1510:revInfo xmlns:a="http://schemas.openxmlformats.org/drawingml/2006/main" xmlns:r="http://schemas.openxmlformats.org/officeDocument/2006/relationships" xmlns:p1510="http://schemas.microsoft.com/office/powerpoint/2015/10/main"/>
 </file>
 
 <file path=ppt/diagrams/colors1.xml><?xml version="1.0" encoding="utf-8"?>
@@ -2466,7 +2481,7 @@
 </file>
 
 <file path=ppt/diagrams/colors4.xml><?xml version="1.0" encoding="utf-8"?>
-<dgm:colorsDef xmlns:dgm="http://schemas.openxmlformats.org/drawingml/2006/diagram" xmlns:a="http://schemas.openxmlformats.org/drawingml/2006/main" uniqueId="urn:microsoft.com/office/officeart/2005/8/colors/colorful1">
+<dgm:colorsDef xmlns:dgm="http://schemas.openxmlformats.org/drawingml/2006/diagram" xmlns:a="http://schemas.openxmlformats.org/drawingml/2006/main" uniqueId="urn:microsoft.com/office/officeart/2005/8/colors/colorful1#1">
   <dgm:title val=""/>
   <dgm:desc val=""/>
   <dgm:catLst>
@@ -3412,10 +3427,9 @@
         <a:lstStyle/>
         <a:p>
           <a:r>
-            <a:rPr lang="en-US" dirty="0" smtClean="0"/>
+            <a:rPr lang="en-US" dirty="0"/>
             <a:t>Iron Man</a:t>
           </a:r>
-          <a:endParaRPr lang="en-US" dirty="0"/>
         </a:p>
       </dgm:t>
     </dgm:pt>
@@ -3455,10 +3469,9 @@
         <a:lstStyle/>
         <a:p>
           <a:r>
-            <a:rPr lang="en-US" dirty="0" smtClean="0"/>
+            <a:rPr lang="en-US" dirty="0"/>
             <a:t>Hulk</a:t>
           </a:r>
-          <a:endParaRPr lang="en-US" dirty="0"/>
         </a:p>
       </dgm:t>
     </dgm:pt>
@@ -3498,10 +3511,9 @@
         <a:lstStyle/>
         <a:p>
           <a:r>
-            <a:rPr lang="en-US" dirty="0" smtClean="0"/>
+            <a:rPr lang="en-US" dirty="0"/>
             <a:t>Experiment</a:t>
           </a:r>
-          <a:endParaRPr lang="en-US" dirty="0"/>
         </a:p>
       </dgm:t>
     </dgm:pt>
@@ -3541,10 +3553,9 @@
         <a:lstStyle/>
         <a:p>
           <a:r>
-            <a:rPr lang="en-US" dirty="0" smtClean="0"/>
+            <a:rPr lang="en-US" dirty="0"/>
             <a:t>Clones</a:t>
           </a:r>
-          <a:endParaRPr lang="en-US" dirty="0"/>
         </a:p>
       </dgm:t>
     </dgm:pt>
@@ -3584,10 +3595,9 @@
         <a:lstStyle/>
         <a:p>
           <a:r>
-            <a:rPr lang="en-US" dirty="0" smtClean="0"/>
+            <a:rPr lang="en-US" dirty="0"/>
             <a:t>Idea!</a:t>
           </a:r>
-          <a:endParaRPr lang="en-US" dirty="0"/>
         </a:p>
       </dgm:t>
     </dgm:pt>
@@ -3680,17 +3690,17 @@
     </dgm:pt>
   </dgm:ptLst>
   <dgm:cxnLst>
+    <dgm:cxn modelId="{55E84625-7FB2-4935-9D54-48008995CCBE}" type="presOf" srcId="{B94EC4D3-4F69-49FD-9AA7-7A24C1E59AA8}" destId="{2899E9D8-A345-4E63-BB25-81DFDD213FC6}" srcOrd="0" destOrd="0" presId="urn:microsoft.com/office/officeart/2005/8/layout/default"/>
+    <dgm:cxn modelId="{E9189D29-B5D1-485B-8E9A-F82CEF6B9B37}" srcId="{4838D118-DFA9-45A3-9AEF-E53336BAC455}" destId="{61089649-69E8-4E32-A642-8F049B40B91D}" srcOrd="2" destOrd="0" parTransId="{B51773A4-7752-46EC-9504-5878BBD79948}" sibTransId="{AD11AB4C-BF7A-434D-A420-2B803B4FB242}"/>
+    <dgm:cxn modelId="{49A3E22B-DCBC-4028-80C5-30AD8517F068}" type="presOf" srcId="{61089649-69E8-4E32-A642-8F049B40B91D}" destId="{E1D69571-F28C-4D88-BBD8-3BA067F78DAE}" srcOrd="0" destOrd="0" presId="urn:microsoft.com/office/officeart/2005/8/layout/default"/>
+    <dgm:cxn modelId="{829A3F31-15B5-4FCC-AD7A-16FB323501F7}" type="presOf" srcId="{1FEB91B5-E9C2-43F7-8726-0B790C17FA6C}" destId="{6FC73968-3102-4219-9158-81F292187B41}" srcOrd="0" destOrd="0" presId="urn:microsoft.com/office/officeart/2005/8/layout/default"/>
+    <dgm:cxn modelId="{DB68003D-2FA3-4C96-A488-625B50BC217C}" srcId="{4838D118-DFA9-45A3-9AEF-E53336BAC455}" destId="{B94EC4D3-4F69-49FD-9AA7-7A24C1E59AA8}" srcOrd="4" destOrd="0" parTransId="{C5A4A8F5-533E-47DC-BB13-77A8C7560C39}" sibTransId="{30FD44A5-2541-4E68-B92B-BAFF86DBA7CF}"/>
     <dgm:cxn modelId="{5D0A075D-AFC9-4FBE-B3C9-234CF761078B}" srcId="{4838D118-DFA9-45A3-9AEF-E53336BAC455}" destId="{1FEB91B5-E9C2-43F7-8726-0B790C17FA6C}" srcOrd="3" destOrd="0" parTransId="{CC0FBB4A-6BAB-4610-9016-632406458C3D}" sibTransId="{9643A849-CEEF-4D4B-A5E6-6807006DE0F4}"/>
+    <dgm:cxn modelId="{88C1BD47-599E-4CCD-A103-892ABD579663}" type="presOf" srcId="{4838D118-DFA9-45A3-9AEF-E53336BAC455}" destId="{510F1B5E-F128-4DA8-A091-EFFEEBB8130A}" srcOrd="0" destOrd="0" presId="urn:microsoft.com/office/officeart/2005/8/layout/default"/>
+    <dgm:cxn modelId="{8578D068-A00F-47F6-9E52-9DDC453D1C49}" type="presOf" srcId="{4B95026E-0311-4DC9-88F2-CC3F00FF11EC}" destId="{4A22D9F1-06ED-45D2-B36F-D5663718682C}" srcOrd="0" destOrd="0" presId="urn:microsoft.com/office/officeart/2005/8/layout/default"/>
+    <dgm:cxn modelId="{A4F5AC98-1492-4271-BB84-E4AEDE00CDE3}" type="presOf" srcId="{A630582B-7959-4962-9E4F-1B6C930748D8}" destId="{FB956AC2-C00B-410D-B5D5-36ACF71E2158}" srcOrd="0" destOrd="0" presId="urn:microsoft.com/office/officeart/2005/8/layout/default"/>
+    <dgm:cxn modelId="{DCC719E4-3699-4A33-8F1A-010E8845C7D5}" srcId="{4838D118-DFA9-45A3-9AEF-E53336BAC455}" destId="{4B95026E-0311-4DC9-88F2-CC3F00FF11EC}" srcOrd="0" destOrd="0" parTransId="{D25C6AB9-FAE6-4DC7-89D2-C6890CB0A002}" sibTransId="{C7BF6EFA-83E9-4DEB-B907-FF256A8F3FF5}"/>
     <dgm:cxn modelId="{E66B16EE-4A31-48AB-8DE6-A2C9EBF5C9F4}" srcId="{4838D118-DFA9-45A3-9AEF-E53336BAC455}" destId="{A630582B-7959-4962-9E4F-1B6C930748D8}" srcOrd="1" destOrd="0" parTransId="{75505BEA-80B8-4297-B7D5-559DA03691F2}" sibTransId="{2000C6E9-A9D0-45BA-A727-CC03C2B66273}"/>
-    <dgm:cxn modelId="{E9189D29-B5D1-485B-8E9A-F82CEF6B9B37}" srcId="{4838D118-DFA9-45A3-9AEF-E53336BAC455}" destId="{61089649-69E8-4E32-A642-8F049B40B91D}" srcOrd="2" destOrd="0" parTransId="{B51773A4-7752-46EC-9504-5878BBD79948}" sibTransId="{AD11AB4C-BF7A-434D-A420-2B803B4FB242}"/>
-    <dgm:cxn modelId="{829A3F31-15B5-4FCC-AD7A-16FB323501F7}" type="presOf" srcId="{1FEB91B5-E9C2-43F7-8726-0B790C17FA6C}" destId="{6FC73968-3102-4219-9158-81F292187B41}" srcOrd="0" destOrd="0" presId="urn:microsoft.com/office/officeart/2005/8/layout/default"/>
-    <dgm:cxn modelId="{DCC719E4-3699-4A33-8F1A-010E8845C7D5}" srcId="{4838D118-DFA9-45A3-9AEF-E53336BAC455}" destId="{4B95026E-0311-4DC9-88F2-CC3F00FF11EC}" srcOrd="0" destOrd="0" parTransId="{D25C6AB9-FAE6-4DC7-89D2-C6890CB0A002}" sibTransId="{C7BF6EFA-83E9-4DEB-B907-FF256A8F3FF5}"/>
-    <dgm:cxn modelId="{55E84625-7FB2-4935-9D54-48008995CCBE}" type="presOf" srcId="{B94EC4D3-4F69-49FD-9AA7-7A24C1E59AA8}" destId="{2899E9D8-A345-4E63-BB25-81DFDD213FC6}" srcOrd="0" destOrd="0" presId="urn:microsoft.com/office/officeart/2005/8/layout/default"/>
-    <dgm:cxn modelId="{DB68003D-2FA3-4C96-A488-625B50BC217C}" srcId="{4838D118-DFA9-45A3-9AEF-E53336BAC455}" destId="{B94EC4D3-4F69-49FD-9AA7-7A24C1E59AA8}" srcOrd="4" destOrd="0" parTransId="{C5A4A8F5-533E-47DC-BB13-77A8C7560C39}" sibTransId="{30FD44A5-2541-4E68-B92B-BAFF86DBA7CF}"/>
-    <dgm:cxn modelId="{A4F5AC98-1492-4271-BB84-E4AEDE00CDE3}" type="presOf" srcId="{A630582B-7959-4962-9E4F-1B6C930748D8}" destId="{FB956AC2-C00B-410D-B5D5-36ACF71E2158}" srcOrd="0" destOrd="0" presId="urn:microsoft.com/office/officeart/2005/8/layout/default"/>
-    <dgm:cxn modelId="{8578D068-A00F-47F6-9E52-9DDC453D1C49}" type="presOf" srcId="{4B95026E-0311-4DC9-88F2-CC3F00FF11EC}" destId="{4A22D9F1-06ED-45D2-B36F-D5663718682C}" srcOrd="0" destOrd="0" presId="urn:microsoft.com/office/officeart/2005/8/layout/default"/>
-    <dgm:cxn modelId="{49A3E22B-DCBC-4028-80C5-30AD8517F068}" type="presOf" srcId="{61089649-69E8-4E32-A642-8F049B40B91D}" destId="{E1D69571-F28C-4D88-BBD8-3BA067F78DAE}" srcOrd="0" destOrd="0" presId="urn:microsoft.com/office/officeart/2005/8/layout/default"/>
-    <dgm:cxn modelId="{88C1BD47-599E-4CCD-A103-892ABD579663}" type="presOf" srcId="{4838D118-DFA9-45A3-9AEF-E53336BAC455}" destId="{510F1B5E-F128-4DA8-A091-EFFEEBB8130A}" srcOrd="0" destOrd="0" presId="urn:microsoft.com/office/officeart/2005/8/layout/default"/>
     <dgm:cxn modelId="{E231626C-D873-4901-8C0C-C194D7D60627}" type="presParOf" srcId="{510F1B5E-F128-4DA8-A091-EFFEEBB8130A}" destId="{4A22D9F1-06ED-45D2-B36F-D5663718682C}" srcOrd="0" destOrd="0" presId="urn:microsoft.com/office/officeart/2005/8/layout/default"/>
     <dgm:cxn modelId="{2B161967-FA29-465E-B2CB-98BD684252A9}" type="presParOf" srcId="{510F1B5E-F128-4DA8-A091-EFFEEBB8130A}" destId="{0F00868D-D668-4279-AD69-5682BBD60BFF}" srcOrd="1" destOrd="0" presId="urn:microsoft.com/office/officeart/2005/8/layout/default"/>
     <dgm:cxn modelId="{D931CCE8-CB56-475D-AEE3-70D7DBB42883}" type="presParOf" srcId="{510F1B5E-F128-4DA8-A091-EFFEEBB8130A}" destId="{FB956AC2-C00B-410D-B5D5-36ACF71E2158}" srcOrd="2" destOrd="0" presId="urn:microsoft.com/office/officeart/2005/8/layout/default"/>
@@ -3703,6 +3713,11 @@
   </dgm:cxnLst>
   <dgm:bg/>
   <dgm:whole/>
+  <dgm:extLst>
+    <a:ext uri="http://schemas.microsoft.com/office/drawing/2008/diagram">
+      <dsp:dataModelExt xmlns:dsp="http://schemas.microsoft.com/office/drawing/2008/diagram" relId="rId7" minVer="http://schemas.openxmlformats.org/drawingml/2006/diagram"/>
+    </a:ext>
+  </dgm:extLst>
 </dgm:dataModel>
 </file>
 
@@ -3734,10 +3749,9 @@
         <a:lstStyle/>
         <a:p>
           <a:r>
-            <a:rPr lang="en-US" dirty="0" smtClean="0"/>
+            <a:rPr lang="en-US" dirty="0"/>
             <a:t>Race?</a:t>
           </a:r>
-          <a:endParaRPr lang="en-US" dirty="0"/>
         </a:p>
       </dgm:t>
     </dgm:pt>
@@ -3777,10 +3791,9 @@
         <a:lstStyle/>
         <a:p>
           <a:r>
-            <a:rPr lang="en-US" dirty="0" smtClean="0"/>
+            <a:rPr lang="en-US" dirty="0"/>
             <a:t>Obstacles</a:t>
           </a:r>
-          <a:endParaRPr lang="en-US" dirty="0"/>
         </a:p>
       </dgm:t>
     </dgm:pt>
@@ -3820,10 +3833,9 @@
         <a:lstStyle/>
         <a:p>
           <a:r>
-            <a:rPr lang="en-US" dirty="0" smtClean="0"/>
+            <a:rPr lang="en-US" dirty="0"/>
             <a:t>Enemies</a:t>
           </a:r>
-          <a:endParaRPr lang="en-US" dirty="0"/>
         </a:p>
       </dgm:t>
     </dgm:pt>
@@ -3863,11 +3875,11 @@
         <a:lstStyle/>
         <a:p>
           <a:r>
-            <a:rPr lang="en-US" dirty="0" smtClean="0"/>
+            <a:rPr lang="en-US" dirty="0"/>
             <a:t>Side-</a:t>
           </a:r>
           <a:r>
-            <a:rPr lang="en-US" dirty="0" err="1" smtClean="0"/>
+            <a:rPr lang="en-US" dirty="0" err="1"/>
             <a:t>scroller</a:t>
           </a:r>
           <a:endParaRPr lang="en-US" dirty="0"/>
@@ -3912,13 +3924,6 @@
         </dgm:presLayoutVars>
       </dgm:prSet>
       <dgm:spPr/>
-      <dgm:t>
-        <a:bodyPr/>
-        <a:lstStyle/>
-        <a:p>
-          <a:endParaRPr lang="en-US"/>
-        </a:p>
-      </dgm:t>
     </dgm:pt>
     <dgm:pt modelId="{0F00868D-D668-4279-AD69-5682BBD60BFF}" type="pres">
       <dgm:prSet presAssocID="{C7BF6EFA-83E9-4DEB-B907-FF256A8F3FF5}" presName="sibTrans" presStyleCnt="0"/>
@@ -3943,13 +3948,6 @@
         </dgm:presLayoutVars>
       </dgm:prSet>
       <dgm:spPr/>
-      <dgm:t>
-        <a:bodyPr/>
-        <a:lstStyle/>
-        <a:p>
-          <a:endParaRPr lang="en-US"/>
-        </a:p>
-      </dgm:t>
     </dgm:pt>
     <dgm:pt modelId="{969429E5-B34D-46EC-818C-E94889CB5707}" type="pres">
       <dgm:prSet presAssocID="{30FD44A5-2541-4E68-B92B-BAFF86DBA7CF}" presName="sibTrans" presStyleCnt="0"/>
@@ -3965,15 +3963,15 @@
     </dgm:pt>
   </dgm:ptLst>
   <dgm:cxnLst>
+    <dgm:cxn modelId="{2504F133-884D-42FE-B25D-E78BB97D3E76}" type="presOf" srcId="{B94EC4D3-4F69-49FD-9AA7-7A24C1E59AA8}" destId="{2899E9D8-A345-4E63-BB25-81DFDD213FC6}" srcOrd="0" destOrd="0" presId="urn:microsoft.com/office/officeart/2005/8/layout/default"/>
+    <dgm:cxn modelId="{760E3C34-FDE7-406A-ACFE-B5B2DF78EF43}" type="presOf" srcId="{1FEB91B5-E9C2-43F7-8726-0B790C17FA6C}" destId="{6FC73968-3102-4219-9158-81F292187B41}" srcOrd="0" destOrd="0" presId="urn:microsoft.com/office/officeart/2005/8/layout/default"/>
+    <dgm:cxn modelId="{DB68003D-2FA3-4C96-A488-625B50BC217C}" srcId="{4838D118-DFA9-45A3-9AEF-E53336BAC455}" destId="{B94EC4D3-4F69-49FD-9AA7-7A24C1E59AA8}" srcOrd="2" destOrd="0" parTransId="{C5A4A8F5-533E-47DC-BB13-77A8C7560C39}" sibTransId="{30FD44A5-2541-4E68-B92B-BAFF86DBA7CF}"/>
     <dgm:cxn modelId="{5D0A075D-AFC9-4FBE-B3C9-234CF761078B}" srcId="{4838D118-DFA9-45A3-9AEF-E53336BAC455}" destId="{1FEB91B5-E9C2-43F7-8726-0B790C17FA6C}" srcOrd="1" destOrd="0" parTransId="{CC0FBB4A-6BAB-4610-9016-632406458C3D}" sibTransId="{9643A849-CEEF-4D4B-A5E6-6807006DE0F4}"/>
-    <dgm:cxn modelId="{760E3C34-FDE7-406A-ACFE-B5B2DF78EF43}" type="presOf" srcId="{1FEB91B5-E9C2-43F7-8726-0B790C17FA6C}" destId="{6FC73968-3102-4219-9158-81F292187B41}" srcOrd="0" destOrd="0" presId="urn:microsoft.com/office/officeart/2005/8/layout/default"/>
+    <dgm:cxn modelId="{22E7F04C-4845-4790-B994-EB1AA8868B22}" type="presOf" srcId="{4838D118-DFA9-45A3-9AEF-E53336BAC455}" destId="{510F1B5E-F128-4DA8-A091-EFFEEBB8130A}" srcOrd="0" destOrd="0" presId="urn:microsoft.com/office/officeart/2005/8/layout/default"/>
+    <dgm:cxn modelId="{AE3DF14C-C325-472A-95E1-910EEA19C6B2}" type="presOf" srcId="{4E12D5BF-A231-4360-B793-3200C653EA28}" destId="{3BBD22DF-2AB1-40F3-AB6B-072706149C6F}" srcOrd="0" destOrd="0" presId="urn:microsoft.com/office/officeart/2005/8/layout/default"/>
+    <dgm:cxn modelId="{80C5E3AC-F0D9-4345-BE20-18820852A6D5}" type="presOf" srcId="{4B95026E-0311-4DC9-88F2-CC3F00FF11EC}" destId="{4A22D9F1-06ED-45D2-B36F-D5663718682C}" srcOrd="0" destOrd="0" presId="urn:microsoft.com/office/officeart/2005/8/layout/default"/>
     <dgm:cxn modelId="{DCC719E4-3699-4A33-8F1A-010E8845C7D5}" srcId="{4838D118-DFA9-45A3-9AEF-E53336BAC455}" destId="{4B95026E-0311-4DC9-88F2-CC3F00FF11EC}" srcOrd="0" destOrd="0" parTransId="{D25C6AB9-FAE6-4DC7-89D2-C6890CB0A002}" sibTransId="{C7BF6EFA-83E9-4DEB-B907-FF256A8F3FF5}"/>
     <dgm:cxn modelId="{E8C5C2F6-DE2E-47DE-BA0E-389485BBE514}" srcId="{4838D118-DFA9-45A3-9AEF-E53336BAC455}" destId="{4E12D5BF-A231-4360-B793-3200C653EA28}" srcOrd="3" destOrd="0" parTransId="{3B38D731-430F-4D03-A3B8-4A699D8388A1}" sibTransId="{808D8B2D-0323-48EE-B796-3850ABE413FF}"/>
-    <dgm:cxn modelId="{80C5E3AC-F0D9-4345-BE20-18820852A6D5}" type="presOf" srcId="{4B95026E-0311-4DC9-88F2-CC3F00FF11EC}" destId="{4A22D9F1-06ED-45D2-B36F-D5663718682C}" srcOrd="0" destOrd="0" presId="urn:microsoft.com/office/officeart/2005/8/layout/default"/>
-    <dgm:cxn modelId="{DB68003D-2FA3-4C96-A488-625B50BC217C}" srcId="{4838D118-DFA9-45A3-9AEF-E53336BAC455}" destId="{B94EC4D3-4F69-49FD-9AA7-7A24C1E59AA8}" srcOrd="2" destOrd="0" parTransId="{C5A4A8F5-533E-47DC-BB13-77A8C7560C39}" sibTransId="{30FD44A5-2541-4E68-B92B-BAFF86DBA7CF}"/>
-    <dgm:cxn modelId="{2504F133-884D-42FE-B25D-E78BB97D3E76}" type="presOf" srcId="{B94EC4D3-4F69-49FD-9AA7-7A24C1E59AA8}" destId="{2899E9D8-A345-4E63-BB25-81DFDD213FC6}" srcOrd="0" destOrd="0" presId="urn:microsoft.com/office/officeart/2005/8/layout/default"/>
-    <dgm:cxn modelId="{AE3DF14C-C325-472A-95E1-910EEA19C6B2}" type="presOf" srcId="{4E12D5BF-A231-4360-B793-3200C653EA28}" destId="{3BBD22DF-2AB1-40F3-AB6B-072706149C6F}" srcOrd="0" destOrd="0" presId="urn:microsoft.com/office/officeart/2005/8/layout/default"/>
-    <dgm:cxn modelId="{22E7F04C-4845-4790-B994-EB1AA8868B22}" type="presOf" srcId="{4838D118-DFA9-45A3-9AEF-E53336BAC455}" destId="{510F1B5E-F128-4DA8-A091-EFFEEBB8130A}" srcOrd="0" destOrd="0" presId="urn:microsoft.com/office/officeart/2005/8/layout/default"/>
     <dgm:cxn modelId="{3D8377B9-27C1-4FC6-892E-B94BA4D2B19F}" type="presParOf" srcId="{510F1B5E-F128-4DA8-A091-EFFEEBB8130A}" destId="{4A22D9F1-06ED-45D2-B36F-D5663718682C}" srcOrd="0" destOrd="0" presId="urn:microsoft.com/office/officeart/2005/8/layout/default"/>
     <dgm:cxn modelId="{290359FD-7C3B-4634-A90A-082FAE01E87B}" type="presParOf" srcId="{510F1B5E-F128-4DA8-A091-EFFEEBB8130A}" destId="{0F00868D-D668-4279-AD69-5682BBD60BFF}" srcOrd="1" destOrd="0" presId="urn:microsoft.com/office/officeart/2005/8/layout/default"/>
     <dgm:cxn modelId="{00237755-0C44-427B-A49D-900F0221FA52}" type="presParOf" srcId="{510F1B5E-F128-4DA8-A091-EFFEEBB8130A}" destId="{6FC73968-3102-4219-9158-81F292187B41}" srcOrd="2" destOrd="0" presId="urn:microsoft.com/office/officeart/2005/8/layout/default"/>
@@ -3984,6 +3982,11 @@
   </dgm:cxnLst>
   <dgm:bg/>
   <dgm:whole/>
+  <dgm:extLst>
+    <a:ext uri="http://schemas.microsoft.com/office/drawing/2008/diagram">
+      <dsp:dataModelExt xmlns:dsp="http://schemas.microsoft.com/office/drawing/2008/diagram" relId="rId7" minVer="http://schemas.openxmlformats.org/drawingml/2006/diagram"/>
+    </a:ext>
+  </dgm:extLst>
 </dgm:dataModel>
 </file>
 
@@ -4015,10 +4018,9 @@
         <a:lstStyle/>
         <a:p>
           <a:r>
-            <a:rPr lang="en-US" dirty="0" smtClean="0"/>
+            <a:rPr lang="en-US" dirty="0"/>
             <a:t>How to start? </a:t>
           </a:r>
-          <a:endParaRPr lang="en-US" dirty="0"/>
         </a:p>
       </dgm:t>
     </dgm:pt>
@@ -4058,10 +4060,9 @@
         <a:lstStyle/>
         <a:p>
           <a:r>
-            <a:rPr lang="en-US" dirty="0" smtClean="0"/>
+            <a:rPr lang="en-US" dirty="0"/>
             <a:t>JSON Files</a:t>
           </a:r>
-          <a:endParaRPr lang="en-US" dirty="0"/>
         </a:p>
       </dgm:t>
     </dgm:pt>
@@ -4101,10 +4102,9 @@
         <a:lstStyle/>
         <a:p>
           <a:r>
-            <a:rPr lang="en-US" dirty="0" smtClean="0"/>
+            <a:rPr lang="en-US" dirty="0"/>
             <a:t>Resources (Sprites, images, sounds)</a:t>
           </a:r>
-          <a:endParaRPr lang="en-US" dirty="0"/>
         </a:p>
       </dgm:t>
     </dgm:pt>
@@ -4156,13 +4156,6 @@
         </dgm:presLayoutVars>
       </dgm:prSet>
       <dgm:spPr/>
-      <dgm:t>
-        <a:bodyPr/>
-        <a:lstStyle/>
-        <a:p>
-          <a:endParaRPr lang="en-US"/>
-        </a:p>
-      </dgm:t>
     </dgm:pt>
     <dgm:pt modelId="{A70888BB-DF4E-458B-B287-A5DD3E54029E}" type="pres">
       <dgm:prSet presAssocID="{9580F775-5243-4138-8696-9BC2C93A5E3A}" presName="negativeSpace" presStyleCnt="0"/>
@@ -4202,13 +4195,6 @@
         </dgm:presLayoutVars>
       </dgm:prSet>
       <dgm:spPr/>
-      <dgm:t>
-        <a:bodyPr/>
-        <a:lstStyle/>
-        <a:p>
-          <a:endParaRPr lang="en-US"/>
-        </a:p>
-      </dgm:t>
     </dgm:pt>
     <dgm:pt modelId="{81E7D675-41CD-4243-A287-08749FC0A81B}" type="pres">
       <dgm:prSet presAssocID="{C33C15F0-45A3-441C-B2F4-B7ACE3AFF5F0}" presName="negativeSpace" presStyleCnt="0"/>
@@ -4248,13 +4234,6 @@
         </dgm:presLayoutVars>
       </dgm:prSet>
       <dgm:spPr/>
-      <dgm:t>
-        <a:bodyPr/>
-        <a:lstStyle/>
-        <a:p>
-          <a:endParaRPr lang="en-US"/>
-        </a:p>
-      </dgm:t>
     </dgm:pt>
     <dgm:pt modelId="{11A9D96D-9780-4C44-96C4-7B4180CE3B35}" type="pres">
       <dgm:prSet presAssocID="{3D0ABD15-6189-4749-BCC3-B22262EB8BD7}" presName="negativeSpace" presStyleCnt="0"/>
@@ -4276,16 +4255,16 @@
     </dgm:pt>
   </dgm:ptLst>
   <dgm:cxnLst>
+    <dgm:cxn modelId="{B9E75911-6449-41EB-8DCC-8CE76AF46FD2}" srcId="{4EA03A46-243F-4F79-93CB-057737295B21}" destId="{C33C15F0-45A3-441C-B2F4-B7ACE3AFF5F0}" srcOrd="1" destOrd="0" parTransId="{38A943B5-ED3B-4418-8F8E-CA207FAC45B8}" sibTransId="{2B7564EB-AE3C-4E38-92D6-F1EECCDE0C5C}"/>
     <dgm:cxn modelId="{5BC9DF22-AD9D-4EE3-8136-D22870BF255D}" type="presOf" srcId="{C33C15F0-45A3-441C-B2F4-B7ACE3AFF5F0}" destId="{029EFD16-BA97-4E89-9F83-D5ED5DF06B1F}" srcOrd="0" destOrd="0" presId="urn:microsoft.com/office/officeart/2005/8/layout/list1"/>
-    <dgm:cxn modelId="{C0E22ED5-0AEB-468E-938E-7E09380A4AD2}" type="presOf" srcId="{3D0ABD15-6189-4749-BCC3-B22262EB8BD7}" destId="{FF34CD1C-866B-4233-B300-71F7E7E1F1E0}" srcOrd="1" destOrd="0" presId="urn:microsoft.com/office/officeart/2005/8/layout/list1"/>
+    <dgm:cxn modelId="{3FBA3162-3874-481D-A556-072359CE1E3D}" type="presOf" srcId="{9580F775-5243-4138-8696-9BC2C93A5E3A}" destId="{A39C335C-0C0A-4796-9D9D-EDD97330DF75}" srcOrd="0" destOrd="0" presId="urn:microsoft.com/office/officeart/2005/8/layout/list1"/>
     <dgm:cxn modelId="{5A377C6E-69AF-40A3-8843-B732DF3F9D39}" type="presOf" srcId="{3D0ABD15-6189-4749-BCC3-B22262EB8BD7}" destId="{F16FFF1C-279A-4A07-B10A-8D6DEDAC2E1A}" srcOrd="0" destOrd="0" presId="urn:microsoft.com/office/officeart/2005/8/layout/list1"/>
     <dgm:cxn modelId="{BF25A94F-47D1-4919-92A1-FC6D83A0A5F0}" srcId="{4EA03A46-243F-4F79-93CB-057737295B21}" destId="{3D0ABD15-6189-4749-BCC3-B22262EB8BD7}" srcOrd="2" destOrd="0" parTransId="{868DC92F-E8CB-4DB1-AF42-4BB28AE99A17}" sibTransId="{F73077B2-34FA-470D-8051-C4996254B32B}"/>
-    <dgm:cxn modelId="{80994EE6-8893-4A1E-9642-F837408CEEA9}" type="presOf" srcId="{C33C15F0-45A3-441C-B2F4-B7ACE3AFF5F0}" destId="{AAC5A5F6-59EF-46F8-985F-599DC653C187}" srcOrd="1" destOrd="0" presId="urn:microsoft.com/office/officeart/2005/8/layout/list1"/>
     <dgm:cxn modelId="{EC9BA5A4-EB40-4048-A6F4-3A485B377FA9}" srcId="{4EA03A46-243F-4F79-93CB-057737295B21}" destId="{9580F775-5243-4138-8696-9BC2C93A5E3A}" srcOrd="0" destOrd="0" parTransId="{7B336BB4-3915-4F03-902E-AD72EAE96684}" sibTransId="{6E7ED894-35D9-4424-8D77-3F319650C719}"/>
-    <dgm:cxn modelId="{3FBA3162-3874-481D-A556-072359CE1E3D}" type="presOf" srcId="{9580F775-5243-4138-8696-9BC2C93A5E3A}" destId="{A39C335C-0C0A-4796-9D9D-EDD97330DF75}" srcOrd="0" destOrd="0" presId="urn:microsoft.com/office/officeart/2005/8/layout/list1"/>
     <dgm:cxn modelId="{BA53F6AE-40FF-4E43-B723-1A9D92C38FB7}" type="presOf" srcId="{4EA03A46-243F-4F79-93CB-057737295B21}" destId="{AA44D900-B1D6-44C2-8261-D53F730E0038}" srcOrd="0" destOrd="0" presId="urn:microsoft.com/office/officeart/2005/8/layout/list1"/>
     <dgm:cxn modelId="{876822CF-FC11-4E8B-8B93-4D9A4066D599}" type="presOf" srcId="{9580F775-5243-4138-8696-9BC2C93A5E3A}" destId="{ECBE56C2-BDA7-44FA-963A-81F985FC3C1C}" srcOrd="1" destOrd="0" presId="urn:microsoft.com/office/officeart/2005/8/layout/list1"/>
-    <dgm:cxn modelId="{B9E75911-6449-41EB-8DCC-8CE76AF46FD2}" srcId="{4EA03A46-243F-4F79-93CB-057737295B21}" destId="{C33C15F0-45A3-441C-B2F4-B7ACE3AFF5F0}" srcOrd="1" destOrd="0" parTransId="{38A943B5-ED3B-4418-8F8E-CA207FAC45B8}" sibTransId="{2B7564EB-AE3C-4E38-92D6-F1EECCDE0C5C}"/>
+    <dgm:cxn modelId="{C0E22ED5-0AEB-468E-938E-7E09380A4AD2}" type="presOf" srcId="{3D0ABD15-6189-4749-BCC3-B22262EB8BD7}" destId="{FF34CD1C-866B-4233-B300-71F7E7E1F1E0}" srcOrd="1" destOrd="0" presId="urn:microsoft.com/office/officeart/2005/8/layout/list1"/>
+    <dgm:cxn modelId="{80994EE6-8893-4A1E-9642-F837408CEEA9}" type="presOf" srcId="{C33C15F0-45A3-441C-B2F4-B7ACE3AFF5F0}" destId="{AAC5A5F6-59EF-46F8-985F-599DC653C187}" srcOrd="1" destOrd="0" presId="urn:microsoft.com/office/officeart/2005/8/layout/list1"/>
     <dgm:cxn modelId="{95EFB18F-996E-48BC-B7B9-163DE669D862}" type="presParOf" srcId="{AA44D900-B1D6-44C2-8261-D53F730E0038}" destId="{927C4992-BC71-4F98-A062-35DDC25FE135}" srcOrd="0" destOrd="0" presId="urn:microsoft.com/office/officeart/2005/8/layout/list1"/>
     <dgm:cxn modelId="{8B3D616F-DEC2-4F1D-A793-842331B6FDCE}" type="presParOf" srcId="{927C4992-BC71-4F98-A062-35DDC25FE135}" destId="{A39C335C-0C0A-4796-9D9D-EDD97330DF75}" srcOrd="0" destOrd="0" presId="urn:microsoft.com/office/officeart/2005/8/layout/list1"/>
     <dgm:cxn modelId="{B022911D-93B1-46BD-9ACD-71FD1FBA5604}" type="presParOf" srcId="{927C4992-BC71-4F98-A062-35DDC25FE135}" destId="{ECBE56C2-BDA7-44FA-963A-81F985FC3C1C}" srcOrd="1" destOrd="0" presId="urn:microsoft.com/office/officeart/2005/8/layout/list1"/>
@@ -4306,6 +4285,11 @@
   </dgm:cxnLst>
   <dgm:bg/>
   <dgm:whole/>
+  <dgm:extLst>
+    <a:ext uri="http://schemas.microsoft.com/office/drawing/2008/diagram">
+      <dsp:dataModelExt xmlns:dsp="http://schemas.microsoft.com/office/drawing/2008/diagram" relId="rId7" minVer="http://schemas.openxmlformats.org/drawingml/2006/diagram"/>
+    </a:ext>
+  </dgm:extLst>
 </dgm:dataModel>
 </file>
 
@@ -4313,7 +4297,7 @@
 <dgm:dataModel xmlns:dgm="http://schemas.openxmlformats.org/drawingml/2006/diagram" xmlns:a="http://schemas.openxmlformats.org/drawingml/2006/main">
   <dgm:ptLst>
     <dgm:pt modelId="{8317B98D-9ADF-4C4D-AF44-7281E09E2C9F}" type="doc">
-      <dgm:prSet loTypeId="urn:microsoft.com/office/officeart/2005/8/layout/list1" loCatId="list" qsTypeId="urn:microsoft.com/office/officeart/2005/8/quickstyle/simple1" qsCatId="simple" csTypeId="urn:microsoft.com/office/officeart/2005/8/colors/colorful1" csCatId="colorful" phldr="1"/>
+      <dgm:prSet loTypeId="urn:microsoft.com/office/officeart/2005/8/layout/list1" loCatId="list" qsTypeId="urn:microsoft.com/office/officeart/2005/8/quickstyle/simple1" qsCatId="simple" csTypeId="urn:microsoft.com/office/officeart/2005/8/colors/colorful1#1" csCatId="colorful" phldr="1"/>
       <dgm:spPr/>
       <dgm:t>
         <a:bodyPr/>
@@ -4337,10 +4321,9 @@
         <a:lstStyle/>
         <a:p>
           <a:r>
-            <a:rPr lang="en-US" dirty="0" smtClean="0"/>
+            <a:rPr lang="en-US" dirty="0"/>
             <a:t>Final Boss – War Machine/Dr. Doom</a:t>
           </a:r>
-          <a:endParaRPr lang="en-US" dirty="0"/>
         </a:p>
       </dgm:t>
     </dgm:pt>
@@ -4380,10 +4363,9 @@
         <a:lstStyle/>
         <a:p>
           <a:r>
-            <a:rPr lang="en-US" dirty="0" smtClean="0"/>
+            <a:rPr lang="en-US" dirty="0"/>
             <a:t>Power-ups – Unlimited Energy</a:t>
           </a:r>
-          <a:endParaRPr lang="en-US" dirty="0"/>
         </a:p>
       </dgm:t>
     </dgm:pt>
@@ -4423,10 +4405,9 @@
         <a:lstStyle/>
         <a:p>
           <a:r>
-            <a:rPr lang="en-US" dirty="0" smtClean="0"/>
+            <a:rPr lang="en-US" dirty="0"/>
             <a:t>Thugs – Enemies</a:t>
           </a:r>
-          <a:endParaRPr lang="en-US" dirty="0"/>
         </a:p>
       </dgm:t>
     </dgm:pt>
@@ -4466,10 +4447,9 @@
         <a:lstStyle/>
         <a:p>
           <a:r>
-            <a:rPr lang="en-US" dirty="0" smtClean="0"/>
+            <a:rPr lang="en-US" dirty="0"/>
             <a:t>New level - City</a:t>
           </a:r>
-          <a:endParaRPr lang="en-US" dirty="0"/>
         </a:p>
       </dgm:t>
     </dgm:pt>
@@ -4521,13 +4501,6 @@
         </dgm:presLayoutVars>
       </dgm:prSet>
       <dgm:spPr/>
-      <dgm:t>
-        <a:bodyPr/>
-        <a:lstStyle/>
-        <a:p>
-          <a:endParaRPr lang="en-US"/>
-        </a:p>
-      </dgm:t>
     </dgm:pt>
     <dgm:pt modelId="{0DDE4CD1-537B-49FB-9251-919D01A025BC}" type="pres">
       <dgm:prSet presAssocID="{07096CD6-1BFB-437A-BE2A-232DAD74803A}" presName="negativeSpace" presStyleCnt="0"/>
@@ -4567,13 +4540,6 @@
         </dgm:presLayoutVars>
       </dgm:prSet>
       <dgm:spPr/>
-      <dgm:t>
-        <a:bodyPr/>
-        <a:lstStyle/>
-        <a:p>
-          <a:endParaRPr lang="en-US"/>
-        </a:p>
-      </dgm:t>
     </dgm:pt>
     <dgm:pt modelId="{CE1D0FF5-EA26-4137-B74A-7606D32609AE}" type="pres">
       <dgm:prSet presAssocID="{3CC81DFF-6D29-42C2-904F-EBD975D34615}" presName="negativeSpace" presStyleCnt="0"/>
@@ -4613,13 +4579,6 @@
         </dgm:presLayoutVars>
       </dgm:prSet>
       <dgm:spPr/>
-      <dgm:t>
-        <a:bodyPr/>
-        <a:lstStyle/>
-        <a:p>
-          <a:endParaRPr lang="en-US"/>
-        </a:p>
-      </dgm:t>
     </dgm:pt>
     <dgm:pt modelId="{048F884E-3C56-4220-947C-5DDEB889350B}" type="pres">
       <dgm:prSet presAssocID="{F61A2CC2-2B9D-4AD6-BC4F-EF692198D6AF}" presName="negativeSpace" presStyleCnt="0"/>
@@ -4680,19 +4639,19 @@
     </dgm:pt>
   </dgm:ptLst>
   <dgm:cxnLst>
+    <dgm:cxn modelId="{D0FBBF0C-FBAB-475D-ACDB-898C3FE86EB7}" type="presOf" srcId="{07096CD6-1BFB-437A-BE2A-232DAD74803A}" destId="{0728AE48-7EA0-482A-8589-C535826A2550}" srcOrd="0" destOrd="0" presId="urn:microsoft.com/office/officeart/2005/8/layout/list1"/>
     <dgm:cxn modelId="{25FAC921-062F-42AB-A487-5E92849E51D9}" type="presOf" srcId="{904E8351-EA07-4250-984E-0D5EF85F4CA6}" destId="{190D72B2-AE0C-4D19-B44B-DD343338AF45}" srcOrd="1" destOrd="0" presId="urn:microsoft.com/office/officeart/2005/8/layout/list1"/>
+    <dgm:cxn modelId="{C1464226-BE52-4DE7-A5C6-CF4975D1F2A4}" srcId="{8317B98D-9ADF-4C4D-AF44-7281E09E2C9F}" destId="{07096CD6-1BFB-437A-BE2A-232DAD74803A}" srcOrd="0" destOrd="0" parTransId="{A85086A2-BA37-4626-AB1C-1EE3062A2FE6}" sibTransId="{C9D5AD7A-80C5-4FA2-AD8C-159032D37801}"/>
+    <dgm:cxn modelId="{D9FFE533-94FE-47D1-A908-1CFA24831E7E}" type="presOf" srcId="{3CC81DFF-6D29-42C2-904F-EBD975D34615}" destId="{9050D716-67FA-437E-A12D-C5A947FF2EDA}" srcOrd="0" destOrd="0" presId="urn:microsoft.com/office/officeart/2005/8/layout/list1"/>
+    <dgm:cxn modelId="{C9D35560-3E2F-4CBD-A50F-CFE7C2DF1C98}" type="presOf" srcId="{F61A2CC2-2B9D-4AD6-BC4F-EF692198D6AF}" destId="{76C80044-CD79-482F-AA6D-45C7237915B0}" srcOrd="1" destOrd="0" presId="urn:microsoft.com/office/officeart/2005/8/layout/list1"/>
+    <dgm:cxn modelId="{2A792C66-891A-489E-A7CA-C9EBD105899D}" type="presOf" srcId="{07096CD6-1BFB-437A-BE2A-232DAD74803A}" destId="{F6D1E2F6-C80C-490E-94BE-59C60EDBED25}" srcOrd="1" destOrd="0" presId="urn:microsoft.com/office/officeart/2005/8/layout/list1"/>
+    <dgm:cxn modelId="{301F9073-02F4-48AC-9899-A84003E7002D}" type="presOf" srcId="{8317B98D-9ADF-4C4D-AF44-7281E09E2C9F}" destId="{D8229B00-BE2B-4C99-AEA0-1472ECBF087B}" srcOrd="0" destOrd="0" presId="urn:microsoft.com/office/officeart/2005/8/layout/list1"/>
+    <dgm:cxn modelId="{2C773277-1805-4633-9C3C-DC1DD25E4469}" type="presOf" srcId="{3CC81DFF-6D29-42C2-904F-EBD975D34615}" destId="{686D5D2F-E5A0-48C9-A654-6D7D39ADBBC4}" srcOrd="1" destOrd="0" presId="urn:microsoft.com/office/officeart/2005/8/layout/list1"/>
+    <dgm:cxn modelId="{70172084-874F-45FA-86CE-2EC6BC301C92}" srcId="{8317B98D-9ADF-4C4D-AF44-7281E09E2C9F}" destId="{904E8351-EA07-4250-984E-0D5EF85F4CA6}" srcOrd="3" destOrd="0" parTransId="{C5472050-BE89-4315-A388-B5C15D1937B8}" sibTransId="{BC31E4C2-B03F-4E73-BC9D-9B4F0EE89DB5}"/>
+    <dgm:cxn modelId="{D1C060AA-DBA6-46A9-A4FA-670055625E8A}" srcId="{8317B98D-9ADF-4C4D-AF44-7281E09E2C9F}" destId="{F61A2CC2-2B9D-4AD6-BC4F-EF692198D6AF}" srcOrd="2" destOrd="0" parTransId="{AC98E7B4-027A-49AD-96FC-0E5C2C1C9618}" sibTransId="{4CCABB5D-7E11-4B20-9ED4-A29DCAED232A}"/>
+    <dgm:cxn modelId="{C4DF00AC-FB74-40CB-B276-7176C1823773}" type="presOf" srcId="{904E8351-EA07-4250-984E-0D5EF85F4CA6}" destId="{E644D76F-8C8D-4EBD-A532-67A84E42C0B7}" srcOrd="0" destOrd="0" presId="urn:microsoft.com/office/officeart/2005/8/layout/list1"/>
     <dgm:cxn modelId="{FA2901AE-9878-440F-8BBA-FD0FFA67AEBC}" type="presOf" srcId="{F61A2CC2-2B9D-4AD6-BC4F-EF692198D6AF}" destId="{500F7BD0-43C1-4E6E-ADBA-7658D064982E}" srcOrd="0" destOrd="0" presId="urn:microsoft.com/office/officeart/2005/8/layout/list1"/>
-    <dgm:cxn modelId="{C1464226-BE52-4DE7-A5C6-CF4975D1F2A4}" srcId="{8317B98D-9ADF-4C4D-AF44-7281E09E2C9F}" destId="{07096CD6-1BFB-437A-BE2A-232DAD74803A}" srcOrd="0" destOrd="0" parTransId="{A85086A2-BA37-4626-AB1C-1EE3062A2FE6}" sibTransId="{C9D5AD7A-80C5-4FA2-AD8C-159032D37801}"/>
-    <dgm:cxn modelId="{C9D35560-3E2F-4CBD-A50F-CFE7C2DF1C98}" type="presOf" srcId="{F61A2CC2-2B9D-4AD6-BC4F-EF692198D6AF}" destId="{76C80044-CD79-482F-AA6D-45C7237915B0}" srcOrd="1" destOrd="0" presId="urn:microsoft.com/office/officeart/2005/8/layout/list1"/>
-    <dgm:cxn modelId="{D0FBBF0C-FBAB-475D-ACDB-898C3FE86EB7}" type="presOf" srcId="{07096CD6-1BFB-437A-BE2A-232DAD74803A}" destId="{0728AE48-7EA0-482A-8589-C535826A2550}" srcOrd="0" destOrd="0" presId="urn:microsoft.com/office/officeart/2005/8/layout/list1"/>
-    <dgm:cxn modelId="{301F9073-02F4-48AC-9899-A84003E7002D}" type="presOf" srcId="{8317B98D-9ADF-4C4D-AF44-7281E09E2C9F}" destId="{D8229B00-BE2B-4C99-AEA0-1472ECBF087B}" srcOrd="0" destOrd="0" presId="urn:microsoft.com/office/officeart/2005/8/layout/list1"/>
     <dgm:cxn modelId="{37C984B6-DB2E-43E3-81AD-F832498D642D}" srcId="{8317B98D-9ADF-4C4D-AF44-7281E09E2C9F}" destId="{3CC81DFF-6D29-42C2-904F-EBD975D34615}" srcOrd="1" destOrd="0" parTransId="{ADE4A5EC-93D2-4063-B447-03B189AC39FE}" sibTransId="{87781EC4-5610-41DF-B893-5259831890EC}"/>
-    <dgm:cxn modelId="{D1C060AA-DBA6-46A9-A4FA-670055625E8A}" srcId="{8317B98D-9ADF-4C4D-AF44-7281E09E2C9F}" destId="{F61A2CC2-2B9D-4AD6-BC4F-EF692198D6AF}" srcOrd="2" destOrd="0" parTransId="{AC98E7B4-027A-49AD-96FC-0E5C2C1C9618}" sibTransId="{4CCABB5D-7E11-4B20-9ED4-A29DCAED232A}"/>
-    <dgm:cxn modelId="{2C773277-1805-4633-9C3C-DC1DD25E4469}" type="presOf" srcId="{3CC81DFF-6D29-42C2-904F-EBD975D34615}" destId="{686D5D2F-E5A0-48C9-A654-6D7D39ADBBC4}" srcOrd="1" destOrd="0" presId="urn:microsoft.com/office/officeart/2005/8/layout/list1"/>
-    <dgm:cxn modelId="{C4DF00AC-FB74-40CB-B276-7176C1823773}" type="presOf" srcId="{904E8351-EA07-4250-984E-0D5EF85F4CA6}" destId="{E644D76F-8C8D-4EBD-A532-67A84E42C0B7}" srcOrd="0" destOrd="0" presId="urn:microsoft.com/office/officeart/2005/8/layout/list1"/>
-    <dgm:cxn modelId="{D9FFE533-94FE-47D1-A908-1CFA24831E7E}" type="presOf" srcId="{3CC81DFF-6D29-42C2-904F-EBD975D34615}" destId="{9050D716-67FA-437E-A12D-C5A947FF2EDA}" srcOrd="0" destOrd="0" presId="urn:microsoft.com/office/officeart/2005/8/layout/list1"/>
-    <dgm:cxn modelId="{2A792C66-891A-489E-A7CA-C9EBD105899D}" type="presOf" srcId="{07096CD6-1BFB-437A-BE2A-232DAD74803A}" destId="{F6D1E2F6-C80C-490E-94BE-59C60EDBED25}" srcOrd="1" destOrd="0" presId="urn:microsoft.com/office/officeart/2005/8/layout/list1"/>
-    <dgm:cxn modelId="{70172084-874F-45FA-86CE-2EC6BC301C92}" srcId="{8317B98D-9ADF-4C4D-AF44-7281E09E2C9F}" destId="{904E8351-EA07-4250-984E-0D5EF85F4CA6}" srcOrd="3" destOrd="0" parTransId="{C5472050-BE89-4315-A388-B5C15D1937B8}" sibTransId="{BC31E4C2-B03F-4E73-BC9D-9B4F0EE89DB5}"/>
     <dgm:cxn modelId="{678C8471-67D9-4530-976B-63CED688D665}" type="presParOf" srcId="{D8229B00-BE2B-4C99-AEA0-1472ECBF087B}" destId="{2193EE82-C4BA-4C72-90B3-6D639EE8B8C4}" srcOrd="0" destOrd="0" presId="urn:microsoft.com/office/officeart/2005/8/layout/list1"/>
     <dgm:cxn modelId="{E51F6279-1A7B-4E36-BB02-B633A02F35F0}" type="presParOf" srcId="{2193EE82-C4BA-4C72-90B3-6D639EE8B8C4}" destId="{0728AE48-7EA0-482A-8589-C535826A2550}" srcOrd="0" destOrd="0" presId="urn:microsoft.com/office/officeart/2005/8/layout/list1"/>
     <dgm:cxn modelId="{EE6EEF42-DBBF-4FCB-8AE2-3448C1FE2F7F}" type="presParOf" srcId="{2193EE82-C4BA-4C72-90B3-6D639EE8B8C4}" destId="{F6D1E2F6-C80C-490E-94BE-59C60EDBED25}" srcOrd="1" destOrd="0" presId="urn:microsoft.com/office/officeart/2005/8/layout/list1"/>
@@ -4719,7 +4678,1541 @@
   </dgm:cxnLst>
   <dgm:bg/>
   <dgm:whole/>
+  <dgm:extLst>
+    <a:ext uri="http://schemas.microsoft.com/office/drawing/2008/diagram">
+      <dsp:dataModelExt xmlns:dsp="http://schemas.microsoft.com/office/drawing/2008/diagram" relId="rId7" minVer="http://schemas.openxmlformats.org/drawingml/2006/diagram"/>
+    </a:ext>
+  </dgm:extLst>
 </dgm:dataModel>
+</file>
+
+<file path=ppt/diagrams/drawing1.xml><?xml version="1.0" encoding="utf-8"?>
+<dsp:drawing xmlns:dgm="http://schemas.openxmlformats.org/drawingml/2006/diagram" xmlns:dsp="http://schemas.microsoft.com/office/drawing/2008/diagram" xmlns:a="http://schemas.openxmlformats.org/drawingml/2006/main">
+  <dsp:spTree>
+    <dsp:nvGrpSpPr>
+      <dsp:cNvPr id="0" name=""/>
+      <dsp:cNvGrpSpPr/>
+    </dsp:nvGrpSpPr>
+    <dsp:grpSpPr/>
+    <dsp:sp modelId="{4A22D9F1-06ED-45D2-B36F-D5663718682C}">
+      <dsp:nvSpPr>
+        <dsp:cNvPr id="0" name=""/>
+        <dsp:cNvSpPr/>
+      </dsp:nvSpPr>
+      <dsp:spPr>
+        <a:xfrm>
+          <a:off x="0" y="666511"/>
+          <a:ext cx="3142802" cy="1885681"/>
+        </a:xfrm>
+        <a:prstGeom prst="rect">
+          <a:avLst/>
+        </a:prstGeom>
+        <a:solidFill>
+          <a:schemeClr val="accent3">
+            <a:hueOff val="0"/>
+            <a:satOff val="0"/>
+            <a:lumOff val="0"/>
+            <a:alphaOff val="0"/>
+          </a:schemeClr>
+        </a:solidFill>
+        <a:ln w="12700" cap="flat" cmpd="sng" algn="ctr">
+          <a:solidFill>
+            <a:schemeClr val="tx1"/>
+          </a:solidFill>
+          <a:prstDash val="solid"/>
+          <a:miter lim="800000"/>
+        </a:ln>
+        <a:effectLst/>
+      </dsp:spPr>
+      <dsp:style>
+        <a:lnRef idx="2">
+          <a:scrgbClr r="0" g="0" b="0"/>
+        </a:lnRef>
+        <a:fillRef idx="1">
+          <a:scrgbClr r="0" g="0" b="0"/>
+        </a:fillRef>
+        <a:effectRef idx="0">
+          <a:scrgbClr r="0" g="0" b="0"/>
+        </a:effectRef>
+        <a:fontRef idx="minor">
+          <a:schemeClr val="lt1"/>
+        </a:fontRef>
+      </dsp:style>
+      <dsp:txBody>
+        <a:bodyPr spcFirstLastPara="0" vert="horz" wrap="square" lIns="175260" tIns="175260" rIns="175260" bIns="175260" numCol="1" spcCol="1270" anchor="ctr" anchorCtr="0">
+          <a:noAutofit/>
+        </a:bodyPr>
+        <a:lstStyle/>
+        <a:p>
+          <a:pPr marL="0" lvl="0" indent="0" algn="ctr" defTabSz="2044700">
+            <a:lnSpc>
+              <a:spcPct val="90000"/>
+            </a:lnSpc>
+            <a:spcBef>
+              <a:spcPct val="0"/>
+            </a:spcBef>
+            <a:spcAft>
+              <a:spcPct val="35000"/>
+            </a:spcAft>
+            <a:buNone/>
+          </a:pPr>
+          <a:r>
+            <a:rPr lang="en-US" sz="4600" kern="1200" dirty="0"/>
+            <a:t>Iron Man</a:t>
+          </a:r>
+        </a:p>
+      </dsp:txBody>
+      <dsp:txXfrm>
+        <a:off x="0" y="666511"/>
+        <a:ext cx="3142802" cy="1885681"/>
+      </dsp:txXfrm>
+    </dsp:sp>
+    <dsp:sp modelId="{FB956AC2-C00B-410D-B5D5-36ACF71E2158}">
+      <dsp:nvSpPr>
+        <dsp:cNvPr id="0" name=""/>
+        <dsp:cNvSpPr/>
+      </dsp:nvSpPr>
+      <dsp:spPr>
+        <a:xfrm>
+          <a:off x="3457083" y="666511"/>
+          <a:ext cx="3142802" cy="1885681"/>
+        </a:xfrm>
+        <a:prstGeom prst="rect">
+          <a:avLst/>
+        </a:prstGeom>
+        <a:solidFill>
+          <a:schemeClr val="accent3">
+            <a:hueOff val="677650"/>
+            <a:satOff val="25000"/>
+            <a:lumOff val="-3676"/>
+            <a:alphaOff val="0"/>
+          </a:schemeClr>
+        </a:solidFill>
+        <a:ln w="12700" cap="flat" cmpd="sng" algn="ctr">
+          <a:solidFill>
+            <a:schemeClr val="tx1"/>
+          </a:solidFill>
+          <a:prstDash val="solid"/>
+          <a:miter lim="800000"/>
+        </a:ln>
+        <a:effectLst/>
+      </dsp:spPr>
+      <dsp:style>
+        <a:lnRef idx="2">
+          <a:scrgbClr r="0" g="0" b="0"/>
+        </a:lnRef>
+        <a:fillRef idx="1">
+          <a:scrgbClr r="0" g="0" b="0"/>
+        </a:fillRef>
+        <a:effectRef idx="0">
+          <a:scrgbClr r="0" g="0" b="0"/>
+        </a:effectRef>
+        <a:fontRef idx="minor">
+          <a:schemeClr val="lt1"/>
+        </a:fontRef>
+      </dsp:style>
+      <dsp:txBody>
+        <a:bodyPr spcFirstLastPara="0" vert="horz" wrap="square" lIns="175260" tIns="175260" rIns="175260" bIns="175260" numCol="1" spcCol="1270" anchor="ctr" anchorCtr="0">
+          <a:noAutofit/>
+        </a:bodyPr>
+        <a:lstStyle/>
+        <a:p>
+          <a:pPr marL="0" lvl="0" indent="0" algn="ctr" defTabSz="2044700">
+            <a:lnSpc>
+              <a:spcPct val="90000"/>
+            </a:lnSpc>
+            <a:spcBef>
+              <a:spcPct val="0"/>
+            </a:spcBef>
+            <a:spcAft>
+              <a:spcPct val="35000"/>
+            </a:spcAft>
+            <a:buNone/>
+          </a:pPr>
+          <a:r>
+            <a:rPr lang="en-US" sz="4600" kern="1200" dirty="0"/>
+            <a:t>Hulk</a:t>
+          </a:r>
+        </a:p>
+      </dsp:txBody>
+      <dsp:txXfrm>
+        <a:off x="3457083" y="666511"/>
+        <a:ext cx="3142802" cy="1885681"/>
+      </dsp:txXfrm>
+    </dsp:sp>
+    <dsp:sp modelId="{E1D69571-F28C-4D88-BBD8-3BA067F78DAE}">
+      <dsp:nvSpPr>
+        <dsp:cNvPr id="0" name=""/>
+        <dsp:cNvSpPr/>
+      </dsp:nvSpPr>
+      <dsp:spPr>
+        <a:xfrm>
+          <a:off x="6914166" y="666511"/>
+          <a:ext cx="3142802" cy="1885681"/>
+        </a:xfrm>
+        <a:prstGeom prst="rect">
+          <a:avLst/>
+        </a:prstGeom>
+        <a:solidFill>
+          <a:schemeClr val="accent3">
+            <a:hueOff val="1355300"/>
+            <a:satOff val="50000"/>
+            <a:lumOff val="-7353"/>
+            <a:alphaOff val="0"/>
+          </a:schemeClr>
+        </a:solidFill>
+        <a:ln w="12700" cap="flat" cmpd="sng" algn="ctr">
+          <a:solidFill>
+            <a:schemeClr val="tx1"/>
+          </a:solidFill>
+          <a:prstDash val="solid"/>
+          <a:miter lim="800000"/>
+        </a:ln>
+        <a:effectLst/>
+      </dsp:spPr>
+      <dsp:style>
+        <a:lnRef idx="2">
+          <a:scrgbClr r="0" g="0" b="0"/>
+        </a:lnRef>
+        <a:fillRef idx="1">
+          <a:scrgbClr r="0" g="0" b="0"/>
+        </a:fillRef>
+        <a:effectRef idx="0">
+          <a:scrgbClr r="0" g="0" b="0"/>
+        </a:effectRef>
+        <a:fontRef idx="minor">
+          <a:schemeClr val="lt1"/>
+        </a:fontRef>
+      </dsp:style>
+      <dsp:txBody>
+        <a:bodyPr spcFirstLastPara="0" vert="horz" wrap="square" lIns="175260" tIns="175260" rIns="175260" bIns="175260" numCol="1" spcCol="1270" anchor="ctr" anchorCtr="0">
+          <a:noAutofit/>
+        </a:bodyPr>
+        <a:lstStyle/>
+        <a:p>
+          <a:pPr marL="0" lvl="0" indent="0" algn="ctr" defTabSz="2044700">
+            <a:lnSpc>
+              <a:spcPct val="90000"/>
+            </a:lnSpc>
+            <a:spcBef>
+              <a:spcPct val="0"/>
+            </a:spcBef>
+            <a:spcAft>
+              <a:spcPct val="35000"/>
+            </a:spcAft>
+            <a:buNone/>
+          </a:pPr>
+          <a:r>
+            <a:rPr lang="en-US" sz="4600" kern="1200" dirty="0"/>
+            <a:t>Experiment</a:t>
+          </a:r>
+        </a:p>
+      </dsp:txBody>
+      <dsp:txXfrm>
+        <a:off x="6914166" y="666511"/>
+        <a:ext cx="3142802" cy="1885681"/>
+      </dsp:txXfrm>
+    </dsp:sp>
+    <dsp:sp modelId="{6FC73968-3102-4219-9158-81F292187B41}">
+      <dsp:nvSpPr>
+        <dsp:cNvPr id="0" name=""/>
+        <dsp:cNvSpPr/>
+      </dsp:nvSpPr>
+      <dsp:spPr>
+        <a:xfrm>
+          <a:off x="1728541" y="2866473"/>
+          <a:ext cx="3142802" cy="1885681"/>
+        </a:xfrm>
+        <a:prstGeom prst="rect">
+          <a:avLst/>
+        </a:prstGeom>
+        <a:solidFill>
+          <a:schemeClr val="accent3">
+            <a:hueOff val="2032949"/>
+            <a:satOff val="75000"/>
+            <a:lumOff val="-11029"/>
+            <a:alphaOff val="0"/>
+          </a:schemeClr>
+        </a:solidFill>
+        <a:ln w="12700" cap="flat" cmpd="sng" algn="ctr">
+          <a:solidFill>
+            <a:schemeClr val="tx1"/>
+          </a:solidFill>
+          <a:prstDash val="solid"/>
+          <a:miter lim="800000"/>
+        </a:ln>
+        <a:effectLst/>
+      </dsp:spPr>
+      <dsp:style>
+        <a:lnRef idx="2">
+          <a:scrgbClr r="0" g="0" b="0"/>
+        </a:lnRef>
+        <a:fillRef idx="1">
+          <a:scrgbClr r="0" g="0" b="0"/>
+        </a:fillRef>
+        <a:effectRef idx="0">
+          <a:scrgbClr r="0" g="0" b="0"/>
+        </a:effectRef>
+        <a:fontRef idx="minor">
+          <a:schemeClr val="lt1"/>
+        </a:fontRef>
+      </dsp:style>
+      <dsp:txBody>
+        <a:bodyPr spcFirstLastPara="0" vert="horz" wrap="square" lIns="175260" tIns="175260" rIns="175260" bIns="175260" numCol="1" spcCol="1270" anchor="ctr" anchorCtr="0">
+          <a:noAutofit/>
+        </a:bodyPr>
+        <a:lstStyle/>
+        <a:p>
+          <a:pPr marL="0" lvl="0" indent="0" algn="ctr" defTabSz="2044700">
+            <a:lnSpc>
+              <a:spcPct val="90000"/>
+            </a:lnSpc>
+            <a:spcBef>
+              <a:spcPct val="0"/>
+            </a:spcBef>
+            <a:spcAft>
+              <a:spcPct val="35000"/>
+            </a:spcAft>
+            <a:buNone/>
+          </a:pPr>
+          <a:r>
+            <a:rPr lang="en-US" sz="4600" kern="1200" dirty="0"/>
+            <a:t>Clones</a:t>
+          </a:r>
+        </a:p>
+      </dsp:txBody>
+      <dsp:txXfrm>
+        <a:off x="1728541" y="2866473"/>
+        <a:ext cx="3142802" cy="1885681"/>
+      </dsp:txXfrm>
+    </dsp:sp>
+    <dsp:sp modelId="{2899E9D8-A345-4E63-BB25-81DFDD213FC6}">
+      <dsp:nvSpPr>
+        <dsp:cNvPr id="0" name=""/>
+        <dsp:cNvSpPr/>
+      </dsp:nvSpPr>
+      <dsp:spPr>
+        <a:xfrm>
+          <a:off x="5185624" y="2866473"/>
+          <a:ext cx="3142802" cy="1885681"/>
+        </a:xfrm>
+        <a:prstGeom prst="rect">
+          <a:avLst/>
+        </a:prstGeom>
+        <a:solidFill>
+          <a:schemeClr val="accent3">
+            <a:hueOff val="2710599"/>
+            <a:satOff val="100000"/>
+            <a:lumOff val="-14706"/>
+            <a:alphaOff val="0"/>
+          </a:schemeClr>
+        </a:solidFill>
+        <a:ln w="12700" cap="flat" cmpd="sng" algn="ctr">
+          <a:solidFill>
+            <a:schemeClr val="tx1"/>
+          </a:solidFill>
+          <a:prstDash val="solid"/>
+          <a:miter lim="800000"/>
+        </a:ln>
+        <a:effectLst/>
+      </dsp:spPr>
+      <dsp:style>
+        <a:lnRef idx="2">
+          <a:scrgbClr r="0" g="0" b="0"/>
+        </a:lnRef>
+        <a:fillRef idx="1">
+          <a:scrgbClr r="0" g="0" b="0"/>
+        </a:fillRef>
+        <a:effectRef idx="0">
+          <a:scrgbClr r="0" g="0" b="0"/>
+        </a:effectRef>
+        <a:fontRef idx="minor">
+          <a:schemeClr val="lt1"/>
+        </a:fontRef>
+      </dsp:style>
+      <dsp:txBody>
+        <a:bodyPr spcFirstLastPara="0" vert="horz" wrap="square" lIns="175260" tIns="175260" rIns="175260" bIns="175260" numCol="1" spcCol="1270" anchor="ctr" anchorCtr="0">
+          <a:noAutofit/>
+        </a:bodyPr>
+        <a:lstStyle/>
+        <a:p>
+          <a:pPr marL="0" lvl="0" indent="0" algn="ctr" defTabSz="2044700">
+            <a:lnSpc>
+              <a:spcPct val="90000"/>
+            </a:lnSpc>
+            <a:spcBef>
+              <a:spcPct val="0"/>
+            </a:spcBef>
+            <a:spcAft>
+              <a:spcPct val="35000"/>
+            </a:spcAft>
+            <a:buNone/>
+          </a:pPr>
+          <a:r>
+            <a:rPr lang="en-US" sz="4600" kern="1200" dirty="0"/>
+            <a:t>Idea!</a:t>
+          </a:r>
+        </a:p>
+      </dsp:txBody>
+      <dsp:txXfrm>
+        <a:off x="5185624" y="2866473"/>
+        <a:ext cx="3142802" cy="1885681"/>
+      </dsp:txXfrm>
+    </dsp:sp>
+  </dsp:spTree>
+</dsp:drawing>
+</file>
+
+<file path=ppt/diagrams/drawing2.xml><?xml version="1.0" encoding="utf-8"?>
+<dsp:drawing xmlns:dgm="http://schemas.openxmlformats.org/drawingml/2006/diagram" xmlns:dsp="http://schemas.microsoft.com/office/drawing/2008/diagram" xmlns:a="http://schemas.openxmlformats.org/drawingml/2006/main">
+  <dsp:spTree>
+    <dsp:nvGrpSpPr>
+      <dsp:cNvPr id="0" name=""/>
+      <dsp:cNvGrpSpPr/>
+    </dsp:nvGrpSpPr>
+    <dsp:grpSpPr/>
+    <dsp:sp modelId="{4A22D9F1-06ED-45D2-B36F-D5663718682C}">
+      <dsp:nvSpPr>
+        <dsp:cNvPr id="0" name=""/>
+        <dsp:cNvSpPr/>
+      </dsp:nvSpPr>
+      <dsp:spPr>
+        <a:xfrm>
+          <a:off x="939844" y="1669"/>
+          <a:ext cx="3669513" cy="2201708"/>
+        </a:xfrm>
+        <a:prstGeom prst="rect">
+          <a:avLst/>
+        </a:prstGeom>
+        <a:solidFill>
+          <a:schemeClr val="accent3">
+            <a:hueOff val="0"/>
+            <a:satOff val="0"/>
+            <a:lumOff val="0"/>
+            <a:alphaOff val="0"/>
+          </a:schemeClr>
+        </a:solidFill>
+        <a:ln w="12700" cap="flat" cmpd="sng" algn="ctr">
+          <a:solidFill>
+            <a:schemeClr val="tx1"/>
+          </a:solidFill>
+          <a:prstDash val="solid"/>
+          <a:miter lim="800000"/>
+        </a:ln>
+        <a:effectLst/>
+      </dsp:spPr>
+      <dsp:style>
+        <a:lnRef idx="2">
+          <a:scrgbClr r="0" g="0" b="0"/>
+        </a:lnRef>
+        <a:fillRef idx="1">
+          <a:scrgbClr r="0" g="0" b="0"/>
+        </a:fillRef>
+        <a:effectRef idx="0">
+          <a:scrgbClr r="0" g="0" b="0"/>
+        </a:effectRef>
+        <a:fontRef idx="minor">
+          <a:schemeClr val="lt1"/>
+        </a:fontRef>
+      </dsp:style>
+      <dsp:txBody>
+        <a:bodyPr spcFirstLastPara="0" vert="horz" wrap="square" lIns="232410" tIns="232410" rIns="232410" bIns="232410" numCol="1" spcCol="1270" anchor="ctr" anchorCtr="0">
+          <a:noAutofit/>
+        </a:bodyPr>
+        <a:lstStyle/>
+        <a:p>
+          <a:pPr marL="0" lvl="0" indent="0" algn="ctr" defTabSz="2711450">
+            <a:lnSpc>
+              <a:spcPct val="90000"/>
+            </a:lnSpc>
+            <a:spcBef>
+              <a:spcPct val="0"/>
+            </a:spcBef>
+            <a:spcAft>
+              <a:spcPct val="35000"/>
+            </a:spcAft>
+            <a:buNone/>
+          </a:pPr>
+          <a:r>
+            <a:rPr lang="en-US" sz="6100" kern="1200" dirty="0"/>
+            <a:t>Race?</a:t>
+          </a:r>
+        </a:p>
+      </dsp:txBody>
+      <dsp:txXfrm>
+        <a:off x="939844" y="1669"/>
+        <a:ext cx="3669513" cy="2201708"/>
+      </dsp:txXfrm>
+    </dsp:sp>
+    <dsp:sp modelId="{6FC73968-3102-4219-9158-81F292187B41}">
+      <dsp:nvSpPr>
+        <dsp:cNvPr id="0" name=""/>
+        <dsp:cNvSpPr/>
+      </dsp:nvSpPr>
+      <dsp:spPr>
+        <a:xfrm>
+          <a:off x="4976309" y="1669"/>
+          <a:ext cx="3669513" cy="2201708"/>
+        </a:xfrm>
+        <a:prstGeom prst="rect">
+          <a:avLst/>
+        </a:prstGeom>
+        <a:solidFill>
+          <a:schemeClr val="accent3">
+            <a:hueOff val="903533"/>
+            <a:satOff val="33333"/>
+            <a:lumOff val="-4902"/>
+            <a:alphaOff val="0"/>
+          </a:schemeClr>
+        </a:solidFill>
+        <a:ln w="12700" cap="flat" cmpd="sng" algn="ctr">
+          <a:solidFill>
+            <a:schemeClr val="tx1"/>
+          </a:solidFill>
+          <a:prstDash val="solid"/>
+          <a:miter lim="800000"/>
+        </a:ln>
+        <a:effectLst/>
+      </dsp:spPr>
+      <dsp:style>
+        <a:lnRef idx="2">
+          <a:scrgbClr r="0" g="0" b="0"/>
+        </a:lnRef>
+        <a:fillRef idx="1">
+          <a:scrgbClr r="0" g="0" b="0"/>
+        </a:fillRef>
+        <a:effectRef idx="0">
+          <a:scrgbClr r="0" g="0" b="0"/>
+        </a:effectRef>
+        <a:fontRef idx="minor">
+          <a:schemeClr val="lt1"/>
+        </a:fontRef>
+      </dsp:style>
+      <dsp:txBody>
+        <a:bodyPr spcFirstLastPara="0" vert="horz" wrap="square" lIns="232410" tIns="232410" rIns="232410" bIns="232410" numCol="1" spcCol="1270" anchor="ctr" anchorCtr="0">
+          <a:noAutofit/>
+        </a:bodyPr>
+        <a:lstStyle/>
+        <a:p>
+          <a:pPr marL="0" lvl="0" indent="0" algn="ctr" defTabSz="2711450">
+            <a:lnSpc>
+              <a:spcPct val="90000"/>
+            </a:lnSpc>
+            <a:spcBef>
+              <a:spcPct val="0"/>
+            </a:spcBef>
+            <a:spcAft>
+              <a:spcPct val="35000"/>
+            </a:spcAft>
+            <a:buNone/>
+          </a:pPr>
+          <a:r>
+            <a:rPr lang="en-US" sz="6100" kern="1200" dirty="0"/>
+            <a:t>Obstacles</a:t>
+          </a:r>
+        </a:p>
+      </dsp:txBody>
+      <dsp:txXfrm>
+        <a:off x="4976309" y="1669"/>
+        <a:ext cx="3669513" cy="2201708"/>
+      </dsp:txXfrm>
+    </dsp:sp>
+    <dsp:sp modelId="{2899E9D8-A345-4E63-BB25-81DFDD213FC6}">
+      <dsp:nvSpPr>
+        <dsp:cNvPr id="0" name=""/>
+        <dsp:cNvSpPr/>
+      </dsp:nvSpPr>
+      <dsp:spPr>
+        <a:xfrm>
+          <a:off x="939844" y="2570328"/>
+          <a:ext cx="3669513" cy="2201708"/>
+        </a:xfrm>
+        <a:prstGeom prst="rect">
+          <a:avLst/>
+        </a:prstGeom>
+        <a:solidFill>
+          <a:schemeClr val="accent3">
+            <a:hueOff val="1807066"/>
+            <a:satOff val="66667"/>
+            <a:lumOff val="-9804"/>
+            <a:alphaOff val="0"/>
+          </a:schemeClr>
+        </a:solidFill>
+        <a:ln w="12700" cap="flat" cmpd="sng" algn="ctr">
+          <a:solidFill>
+            <a:schemeClr val="tx1"/>
+          </a:solidFill>
+          <a:prstDash val="solid"/>
+          <a:miter lim="800000"/>
+        </a:ln>
+        <a:effectLst/>
+      </dsp:spPr>
+      <dsp:style>
+        <a:lnRef idx="2">
+          <a:scrgbClr r="0" g="0" b="0"/>
+        </a:lnRef>
+        <a:fillRef idx="1">
+          <a:scrgbClr r="0" g="0" b="0"/>
+        </a:fillRef>
+        <a:effectRef idx="0">
+          <a:scrgbClr r="0" g="0" b="0"/>
+        </a:effectRef>
+        <a:fontRef idx="minor">
+          <a:schemeClr val="lt1"/>
+        </a:fontRef>
+      </dsp:style>
+      <dsp:txBody>
+        <a:bodyPr spcFirstLastPara="0" vert="horz" wrap="square" lIns="232410" tIns="232410" rIns="232410" bIns="232410" numCol="1" spcCol="1270" anchor="ctr" anchorCtr="0">
+          <a:noAutofit/>
+        </a:bodyPr>
+        <a:lstStyle/>
+        <a:p>
+          <a:pPr marL="0" lvl="0" indent="0" algn="ctr" defTabSz="2711450">
+            <a:lnSpc>
+              <a:spcPct val="90000"/>
+            </a:lnSpc>
+            <a:spcBef>
+              <a:spcPct val="0"/>
+            </a:spcBef>
+            <a:spcAft>
+              <a:spcPct val="35000"/>
+            </a:spcAft>
+            <a:buNone/>
+          </a:pPr>
+          <a:r>
+            <a:rPr lang="en-US" sz="6100" kern="1200" dirty="0"/>
+            <a:t>Enemies</a:t>
+          </a:r>
+        </a:p>
+      </dsp:txBody>
+      <dsp:txXfrm>
+        <a:off x="939844" y="2570328"/>
+        <a:ext cx="3669513" cy="2201708"/>
+      </dsp:txXfrm>
+    </dsp:sp>
+    <dsp:sp modelId="{3BBD22DF-2AB1-40F3-AB6B-072706149C6F}">
+      <dsp:nvSpPr>
+        <dsp:cNvPr id="0" name=""/>
+        <dsp:cNvSpPr/>
+      </dsp:nvSpPr>
+      <dsp:spPr>
+        <a:xfrm>
+          <a:off x="4976309" y="2570328"/>
+          <a:ext cx="3669513" cy="2201708"/>
+        </a:xfrm>
+        <a:prstGeom prst="rect">
+          <a:avLst/>
+        </a:prstGeom>
+        <a:solidFill>
+          <a:schemeClr val="accent3">
+            <a:hueOff val="2710599"/>
+            <a:satOff val="100000"/>
+            <a:lumOff val="-14706"/>
+            <a:alphaOff val="0"/>
+          </a:schemeClr>
+        </a:solidFill>
+        <a:ln w="12700" cap="flat" cmpd="sng" algn="ctr">
+          <a:solidFill>
+            <a:schemeClr val="tx1"/>
+          </a:solidFill>
+          <a:prstDash val="solid"/>
+          <a:miter lim="800000"/>
+        </a:ln>
+        <a:effectLst/>
+      </dsp:spPr>
+      <dsp:style>
+        <a:lnRef idx="2">
+          <a:scrgbClr r="0" g="0" b="0"/>
+        </a:lnRef>
+        <a:fillRef idx="1">
+          <a:scrgbClr r="0" g="0" b="0"/>
+        </a:fillRef>
+        <a:effectRef idx="0">
+          <a:scrgbClr r="0" g="0" b="0"/>
+        </a:effectRef>
+        <a:fontRef idx="minor">
+          <a:schemeClr val="lt1"/>
+        </a:fontRef>
+      </dsp:style>
+      <dsp:txBody>
+        <a:bodyPr spcFirstLastPara="0" vert="horz" wrap="square" lIns="232410" tIns="232410" rIns="232410" bIns="232410" numCol="1" spcCol="1270" anchor="ctr" anchorCtr="0">
+          <a:noAutofit/>
+        </a:bodyPr>
+        <a:lstStyle/>
+        <a:p>
+          <a:pPr marL="0" lvl="0" indent="0" algn="ctr" defTabSz="2711450">
+            <a:lnSpc>
+              <a:spcPct val="90000"/>
+            </a:lnSpc>
+            <a:spcBef>
+              <a:spcPct val="0"/>
+            </a:spcBef>
+            <a:spcAft>
+              <a:spcPct val="35000"/>
+            </a:spcAft>
+            <a:buNone/>
+          </a:pPr>
+          <a:r>
+            <a:rPr lang="en-US" sz="6100" kern="1200" dirty="0"/>
+            <a:t>Side-</a:t>
+          </a:r>
+          <a:r>
+            <a:rPr lang="en-US" sz="6100" kern="1200" dirty="0" err="1"/>
+            <a:t>scroller</a:t>
+          </a:r>
+          <a:endParaRPr lang="en-US" sz="6100" kern="1200" dirty="0"/>
+        </a:p>
+      </dsp:txBody>
+      <dsp:txXfrm>
+        <a:off x="4976309" y="2570328"/>
+        <a:ext cx="3669513" cy="2201708"/>
+      </dsp:txXfrm>
+    </dsp:sp>
+  </dsp:spTree>
+</dsp:drawing>
+</file>
+
+<file path=ppt/diagrams/drawing3.xml><?xml version="1.0" encoding="utf-8"?>
+<dsp:drawing xmlns:dgm="http://schemas.openxmlformats.org/drawingml/2006/diagram" xmlns:dsp="http://schemas.microsoft.com/office/drawing/2008/diagram" xmlns:a="http://schemas.openxmlformats.org/drawingml/2006/main">
+  <dsp:spTree>
+    <dsp:nvGrpSpPr>
+      <dsp:cNvPr id="0" name=""/>
+      <dsp:cNvGrpSpPr/>
+    </dsp:nvGrpSpPr>
+    <dsp:grpSpPr/>
+    <dsp:sp modelId="{56CBB7EB-7EDB-470B-8C52-F6FFBA3A1230}">
+      <dsp:nvSpPr>
+        <dsp:cNvPr id="0" name=""/>
+        <dsp:cNvSpPr/>
+      </dsp:nvSpPr>
+      <dsp:spPr>
+        <a:xfrm>
+          <a:off x="0" y="737590"/>
+          <a:ext cx="7781701" cy="680400"/>
+        </a:xfrm>
+        <a:prstGeom prst="rect">
+          <a:avLst/>
+        </a:prstGeom>
+        <a:solidFill>
+          <a:schemeClr val="lt1">
+            <a:alpha val="90000"/>
+            <a:hueOff val="0"/>
+            <a:satOff val="0"/>
+            <a:lumOff val="0"/>
+            <a:alphaOff val="0"/>
+          </a:schemeClr>
+        </a:solidFill>
+        <a:ln w="12700" cap="flat" cmpd="sng" algn="ctr">
+          <a:solidFill>
+            <a:schemeClr val="tx1"/>
+          </a:solidFill>
+          <a:prstDash val="solid"/>
+          <a:miter lim="800000"/>
+        </a:ln>
+        <a:effectLst/>
+      </dsp:spPr>
+      <dsp:style>
+        <a:lnRef idx="2">
+          <a:scrgbClr r="0" g="0" b="0"/>
+        </a:lnRef>
+        <a:fillRef idx="1">
+          <a:scrgbClr r="0" g="0" b="0"/>
+        </a:fillRef>
+        <a:effectRef idx="0">
+          <a:scrgbClr r="0" g="0" b="0"/>
+        </a:effectRef>
+        <a:fontRef idx="minor"/>
+      </dsp:style>
+    </dsp:sp>
+    <dsp:sp modelId="{ECBE56C2-BDA7-44FA-963A-81F985FC3C1C}">
+      <dsp:nvSpPr>
+        <dsp:cNvPr id="0" name=""/>
+        <dsp:cNvSpPr/>
+      </dsp:nvSpPr>
+      <dsp:spPr>
+        <a:xfrm>
+          <a:off x="389085" y="339070"/>
+          <a:ext cx="5447190" cy="797040"/>
+        </a:xfrm>
+        <a:prstGeom prst="roundRect">
+          <a:avLst/>
+        </a:prstGeom>
+        <a:solidFill>
+          <a:schemeClr val="accent5">
+            <a:hueOff val="0"/>
+            <a:satOff val="0"/>
+            <a:lumOff val="0"/>
+            <a:alphaOff val="0"/>
+          </a:schemeClr>
+        </a:solidFill>
+        <a:ln w="12700" cap="flat" cmpd="sng" algn="ctr">
+          <a:solidFill>
+            <a:schemeClr val="tx1"/>
+          </a:solidFill>
+          <a:prstDash val="solid"/>
+          <a:miter lim="800000"/>
+        </a:ln>
+        <a:effectLst/>
+      </dsp:spPr>
+      <dsp:style>
+        <a:lnRef idx="2">
+          <a:scrgbClr r="0" g="0" b="0"/>
+        </a:lnRef>
+        <a:fillRef idx="1">
+          <a:scrgbClr r="0" g="0" b="0"/>
+        </a:fillRef>
+        <a:effectRef idx="0">
+          <a:scrgbClr r="0" g="0" b="0"/>
+        </a:effectRef>
+        <a:fontRef idx="minor">
+          <a:schemeClr val="lt1"/>
+        </a:fontRef>
+      </dsp:style>
+      <dsp:txBody>
+        <a:bodyPr spcFirstLastPara="0" vert="horz" wrap="square" lIns="205891" tIns="0" rIns="205891" bIns="0" numCol="1" spcCol="1270" anchor="ctr" anchorCtr="0">
+          <a:noAutofit/>
+        </a:bodyPr>
+        <a:lstStyle/>
+        <a:p>
+          <a:pPr marL="0" lvl="0" indent="0" algn="l" defTabSz="1200150">
+            <a:lnSpc>
+              <a:spcPct val="90000"/>
+            </a:lnSpc>
+            <a:spcBef>
+              <a:spcPct val="0"/>
+            </a:spcBef>
+            <a:spcAft>
+              <a:spcPct val="35000"/>
+            </a:spcAft>
+            <a:buNone/>
+          </a:pPr>
+          <a:r>
+            <a:rPr lang="en-US" sz="2700" kern="1200" dirty="0"/>
+            <a:t>How to start? </a:t>
+          </a:r>
+        </a:p>
+      </dsp:txBody>
+      <dsp:txXfrm>
+        <a:off x="427993" y="377978"/>
+        <a:ext cx="5369374" cy="719224"/>
+      </dsp:txXfrm>
+    </dsp:sp>
+    <dsp:sp modelId="{C144130C-3589-4C6C-8D87-9B63BE3F4EEE}">
+      <dsp:nvSpPr>
+        <dsp:cNvPr id="0" name=""/>
+        <dsp:cNvSpPr/>
+      </dsp:nvSpPr>
+      <dsp:spPr>
+        <a:xfrm>
+          <a:off x="0" y="1962310"/>
+          <a:ext cx="7781701" cy="680400"/>
+        </a:xfrm>
+        <a:prstGeom prst="rect">
+          <a:avLst/>
+        </a:prstGeom>
+        <a:solidFill>
+          <a:schemeClr val="lt1">
+            <a:alpha val="90000"/>
+            <a:hueOff val="0"/>
+            <a:satOff val="0"/>
+            <a:lumOff val="0"/>
+            <a:alphaOff val="0"/>
+          </a:schemeClr>
+        </a:solidFill>
+        <a:ln w="12700" cap="flat" cmpd="sng" algn="ctr">
+          <a:solidFill>
+            <a:schemeClr val="tx1"/>
+          </a:solidFill>
+          <a:prstDash val="solid"/>
+          <a:miter lim="800000"/>
+        </a:ln>
+        <a:effectLst/>
+      </dsp:spPr>
+      <dsp:style>
+        <a:lnRef idx="2">
+          <a:scrgbClr r="0" g="0" b="0"/>
+        </a:lnRef>
+        <a:fillRef idx="1">
+          <a:scrgbClr r="0" g="0" b="0"/>
+        </a:fillRef>
+        <a:effectRef idx="0">
+          <a:scrgbClr r="0" g="0" b="0"/>
+        </a:effectRef>
+        <a:fontRef idx="minor"/>
+      </dsp:style>
+    </dsp:sp>
+    <dsp:sp modelId="{AAC5A5F6-59EF-46F8-985F-599DC653C187}">
+      <dsp:nvSpPr>
+        <dsp:cNvPr id="0" name=""/>
+        <dsp:cNvSpPr/>
+      </dsp:nvSpPr>
+      <dsp:spPr>
+        <a:xfrm>
+          <a:off x="389085" y="1563790"/>
+          <a:ext cx="5447190" cy="797040"/>
+        </a:xfrm>
+        <a:prstGeom prst="roundRect">
+          <a:avLst/>
+        </a:prstGeom>
+        <a:solidFill>
+          <a:schemeClr val="accent5">
+            <a:hueOff val="-3379271"/>
+            <a:satOff val="-8710"/>
+            <a:lumOff val="-5883"/>
+            <a:alphaOff val="0"/>
+          </a:schemeClr>
+        </a:solidFill>
+        <a:ln w="12700" cap="flat" cmpd="sng" algn="ctr">
+          <a:solidFill>
+            <a:schemeClr val="tx1"/>
+          </a:solidFill>
+          <a:prstDash val="solid"/>
+          <a:miter lim="800000"/>
+        </a:ln>
+        <a:effectLst/>
+      </dsp:spPr>
+      <dsp:style>
+        <a:lnRef idx="2">
+          <a:scrgbClr r="0" g="0" b="0"/>
+        </a:lnRef>
+        <a:fillRef idx="1">
+          <a:scrgbClr r="0" g="0" b="0"/>
+        </a:fillRef>
+        <a:effectRef idx="0">
+          <a:scrgbClr r="0" g="0" b="0"/>
+        </a:effectRef>
+        <a:fontRef idx="minor">
+          <a:schemeClr val="lt1"/>
+        </a:fontRef>
+      </dsp:style>
+      <dsp:txBody>
+        <a:bodyPr spcFirstLastPara="0" vert="horz" wrap="square" lIns="205891" tIns="0" rIns="205891" bIns="0" numCol="1" spcCol="1270" anchor="ctr" anchorCtr="0">
+          <a:noAutofit/>
+        </a:bodyPr>
+        <a:lstStyle/>
+        <a:p>
+          <a:pPr marL="0" lvl="0" indent="0" algn="l" defTabSz="1200150">
+            <a:lnSpc>
+              <a:spcPct val="90000"/>
+            </a:lnSpc>
+            <a:spcBef>
+              <a:spcPct val="0"/>
+            </a:spcBef>
+            <a:spcAft>
+              <a:spcPct val="35000"/>
+            </a:spcAft>
+            <a:buNone/>
+          </a:pPr>
+          <a:r>
+            <a:rPr lang="en-US" sz="2700" kern="1200" dirty="0"/>
+            <a:t>JSON Files</a:t>
+          </a:r>
+        </a:p>
+      </dsp:txBody>
+      <dsp:txXfrm>
+        <a:off x="427993" y="1602698"/>
+        <a:ext cx="5369374" cy="719224"/>
+      </dsp:txXfrm>
+    </dsp:sp>
+    <dsp:sp modelId="{460DFAB1-8348-453A-9C8D-E105DDAD22BE}">
+      <dsp:nvSpPr>
+        <dsp:cNvPr id="0" name=""/>
+        <dsp:cNvSpPr/>
+      </dsp:nvSpPr>
+      <dsp:spPr>
+        <a:xfrm>
+          <a:off x="0" y="3187031"/>
+          <a:ext cx="7781701" cy="680400"/>
+        </a:xfrm>
+        <a:prstGeom prst="rect">
+          <a:avLst/>
+        </a:prstGeom>
+        <a:solidFill>
+          <a:schemeClr val="lt1">
+            <a:alpha val="90000"/>
+            <a:hueOff val="0"/>
+            <a:satOff val="0"/>
+            <a:lumOff val="0"/>
+            <a:alphaOff val="0"/>
+          </a:schemeClr>
+        </a:solidFill>
+        <a:ln w="12700" cap="flat" cmpd="sng" algn="ctr">
+          <a:solidFill>
+            <a:schemeClr val="tx1"/>
+          </a:solidFill>
+          <a:prstDash val="solid"/>
+          <a:miter lim="800000"/>
+        </a:ln>
+        <a:effectLst/>
+      </dsp:spPr>
+      <dsp:style>
+        <a:lnRef idx="2">
+          <a:scrgbClr r="0" g="0" b="0"/>
+        </a:lnRef>
+        <a:fillRef idx="1">
+          <a:scrgbClr r="0" g="0" b="0"/>
+        </a:fillRef>
+        <a:effectRef idx="0">
+          <a:scrgbClr r="0" g="0" b="0"/>
+        </a:effectRef>
+        <a:fontRef idx="minor"/>
+      </dsp:style>
+    </dsp:sp>
+    <dsp:sp modelId="{FF34CD1C-866B-4233-B300-71F7E7E1F1E0}">
+      <dsp:nvSpPr>
+        <dsp:cNvPr id="0" name=""/>
+        <dsp:cNvSpPr/>
+      </dsp:nvSpPr>
+      <dsp:spPr>
+        <a:xfrm>
+          <a:off x="389085" y="2788511"/>
+          <a:ext cx="5447190" cy="797040"/>
+        </a:xfrm>
+        <a:prstGeom prst="roundRect">
+          <a:avLst/>
+        </a:prstGeom>
+        <a:solidFill>
+          <a:schemeClr val="accent5">
+            <a:hueOff val="-6758543"/>
+            <a:satOff val="-17419"/>
+            <a:lumOff val="-11765"/>
+            <a:alphaOff val="0"/>
+          </a:schemeClr>
+        </a:solidFill>
+        <a:ln w="12700" cap="flat" cmpd="sng" algn="ctr">
+          <a:solidFill>
+            <a:schemeClr val="tx1"/>
+          </a:solidFill>
+          <a:prstDash val="solid"/>
+          <a:miter lim="800000"/>
+        </a:ln>
+        <a:effectLst/>
+      </dsp:spPr>
+      <dsp:style>
+        <a:lnRef idx="2">
+          <a:scrgbClr r="0" g="0" b="0"/>
+        </a:lnRef>
+        <a:fillRef idx="1">
+          <a:scrgbClr r="0" g="0" b="0"/>
+        </a:fillRef>
+        <a:effectRef idx="0">
+          <a:scrgbClr r="0" g="0" b="0"/>
+        </a:effectRef>
+        <a:fontRef idx="minor">
+          <a:schemeClr val="lt1"/>
+        </a:fontRef>
+      </dsp:style>
+      <dsp:txBody>
+        <a:bodyPr spcFirstLastPara="0" vert="horz" wrap="square" lIns="205891" tIns="0" rIns="205891" bIns="0" numCol="1" spcCol="1270" anchor="ctr" anchorCtr="0">
+          <a:noAutofit/>
+        </a:bodyPr>
+        <a:lstStyle/>
+        <a:p>
+          <a:pPr marL="0" lvl="0" indent="0" algn="l" defTabSz="1200150">
+            <a:lnSpc>
+              <a:spcPct val="90000"/>
+            </a:lnSpc>
+            <a:spcBef>
+              <a:spcPct val="0"/>
+            </a:spcBef>
+            <a:spcAft>
+              <a:spcPct val="35000"/>
+            </a:spcAft>
+            <a:buNone/>
+          </a:pPr>
+          <a:r>
+            <a:rPr lang="en-US" sz="2700" kern="1200" dirty="0"/>
+            <a:t>Resources (Sprites, images, sounds)</a:t>
+          </a:r>
+        </a:p>
+      </dsp:txBody>
+      <dsp:txXfrm>
+        <a:off x="427993" y="2827419"/>
+        <a:ext cx="5369374" cy="719224"/>
+      </dsp:txXfrm>
+    </dsp:sp>
+  </dsp:spTree>
+</dsp:drawing>
+</file>
+
+<file path=ppt/diagrams/drawing4.xml><?xml version="1.0" encoding="utf-8"?>
+<dsp:drawing xmlns:dgm="http://schemas.openxmlformats.org/drawingml/2006/diagram" xmlns:dsp="http://schemas.microsoft.com/office/drawing/2008/diagram" xmlns:a="http://schemas.openxmlformats.org/drawingml/2006/main">
+  <dsp:spTree>
+    <dsp:nvGrpSpPr>
+      <dsp:cNvPr id="0" name=""/>
+      <dsp:cNvGrpSpPr/>
+    </dsp:nvGrpSpPr>
+    <dsp:grpSpPr/>
+    <dsp:sp modelId="{F1FAE10A-04A4-4D54-8C55-E77F4D381E35}">
+      <dsp:nvSpPr>
+        <dsp:cNvPr id="0" name=""/>
+        <dsp:cNvSpPr/>
+      </dsp:nvSpPr>
+      <dsp:spPr>
+        <a:xfrm>
+          <a:off x="0" y="731313"/>
+          <a:ext cx="8128000" cy="680400"/>
+        </a:xfrm>
+        <a:prstGeom prst="rect">
+          <a:avLst/>
+        </a:prstGeom>
+        <a:solidFill>
+          <a:schemeClr val="lt1">
+            <a:alpha val="90000"/>
+            <a:hueOff val="0"/>
+            <a:satOff val="0"/>
+            <a:lumOff val="0"/>
+            <a:alphaOff val="0"/>
+          </a:schemeClr>
+        </a:solidFill>
+        <a:ln w="12700" cap="flat" cmpd="sng" algn="ctr">
+          <a:solidFill>
+            <a:schemeClr val="tx1"/>
+          </a:solidFill>
+          <a:prstDash val="solid"/>
+          <a:miter lim="800000"/>
+        </a:ln>
+        <a:effectLst/>
+      </dsp:spPr>
+      <dsp:style>
+        <a:lnRef idx="2">
+          <a:scrgbClr r="0" g="0" b="0"/>
+        </a:lnRef>
+        <a:fillRef idx="1">
+          <a:scrgbClr r="0" g="0" b="0"/>
+        </a:fillRef>
+        <a:effectRef idx="0">
+          <a:scrgbClr r="0" g="0" b="0"/>
+        </a:effectRef>
+        <a:fontRef idx="minor"/>
+      </dsp:style>
+    </dsp:sp>
+    <dsp:sp modelId="{F6D1E2F6-C80C-490E-94BE-59C60EDBED25}">
+      <dsp:nvSpPr>
+        <dsp:cNvPr id="0" name=""/>
+        <dsp:cNvSpPr/>
+      </dsp:nvSpPr>
+      <dsp:spPr>
+        <a:xfrm>
+          <a:off x="406400" y="332793"/>
+          <a:ext cx="5689600" cy="797040"/>
+        </a:xfrm>
+        <a:prstGeom prst="roundRect">
+          <a:avLst/>
+        </a:prstGeom>
+        <a:solidFill>
+          <a:schemeClr val="accent2">
+            <a:hueOff val="0"/>
+            <a:satOff val="0"/>
+            <a:lumOff val="0"/>
+            <a:alphaOff val="0"/>
+          </a:schemeClr>
+        </a:solidFill>
+        <a:ln w="12700" cap="flat" cmpd="sng" algn="ctr">
+          <a:solidFill>
+            <a:schemeClr val="tx1"/>
+          </a:solidFill>
+          <a:prstDash val="solid"/>
+          <a:miter lim="800000"/>
+        </a:ln>
+        <a:effectLst/>
+      </dsp:spPr>
+      <dsp:style>
+        <a:lnRef idx="2">
+          <a:scrgbClr r="0" g="0" b="0"/>
+        </a:lnRef>
+        <a:fillRef idx="1">
+          <a:scrgbClr r="0" g="0" b="0"/>
+        </a:fillRef>
+        <a:effectRef idx="0">
+          <a:scrgbClr r="0" g="0" b="0"/>
+        </a:effectRef>
+        <a:fontRef idx="minor">
+          <a:schemeClr val="lt1"/>
+        </a:fontRef>
+      </dsp:style>
+      <dsp:txBody>
+        <a:bodyPr spcFirstLastPara="0" vert="horz" wrap="square" lIns="215053" tIns="0" rIns="215053" bIns="0" numCol="1" spcCol="1270" anchor="ctr" anchorCtr="0">
+          <a:noAutofit/>
+        </a:bodyPr>
+        <a:lstStyle/>
+        <a:p>
+          <a:pPr marL="0" lvl="0" indent="0" algn="l" defTabSz="1200150">
+            <a:lnSpc>
+              <a:spcPct val="90000"/>
+            </a:lnSpc>
+            <a:spcBef>
+              <a:spcPct val="0"/>
+            </a:spcBef>
+            <a:spcAft>
+              <a:spcPct val="35000"/>
+            </a:spcAft>
+            <a:buNone/>
+          </a:pPr>
+          <a:r>
+            <a:rPr lang="en-US" sz="2700" kern="1200" dirty="0"/>
+            <a:t>Final Boss – War Machine/Dr. Doom</a:t>
+          </a:r>
+        </a:p>
+      </dsp:txBody>
+      <dsp:txXfrm>
+        <a:off x="445308" y="371701"/>
+        <a:ext cx="5611784" cy="719224"/>
+      </dsp:txXfrm>
+    </dsp:sp>
+    <dsp:sp modelId="{A306B62B-8D45-4FD8-95CC-156C2460EAFE}">
+      <dsp:nvSpPr>
+        <dsp:cNvPr id="0" name=""/>
+        <dsp:cNvSpPr/>
+      </dsp:nvSpPr>
+      <dsp:spPr>
+        <a:xfrm>
+          <a:off x="0" y="1956033"/>
+          <a:ext cx="8128000" cy="680400"/>
+        </a:xfrm>
+        <a:prstGeom prst="rect">
+          <a:avLst/>
+        </a:prstGeom>
+        <a:solidFill>
+          <a:schemeClr val="lt1">
+            <a:alpha val="90000"/>
+            <a:hueOff val="0"/>
+            <a:satOff val="0"/>
+            <a:lumOff val="0"/>
+            <a:alphaOff val="0"/>
+          </a:schemeClr>
+        </a:solidFill>
+        <a:ln w="12700" cap="flat" cmpd="sng" algn="ctr">
+          <a:solidFill>
+            <a:schemeClr val="tx1"/>
+          </a:solidFill>
+          <a:prstDash val="solid"/>
+          <a:miter lim="800000"/>
+        </a:ln>
+        <a:effectLst/>
+      </dsp:spPr>
+      <dsp:style>
+        <a:lnRef idx="2">
+          <a:scrgbClr r="0" g="0" b="0"/>
+        </a:lnRef>
+        <a:fillRef idx="1">
+          <a:scrgbClr r="0" g="0" b="0"/>
+        </a:fillRef>
+        <a:effectRef idx="0">
+          <a:scrgbClr r="0" g="0" b="0"/>
+        </a:effectRef>
+        <a:fontRef idx="minor"/>
+      </dsp:style>
+    </dsp:sp>
+    <dsp:sp modelId="{686D5D2F-E5A0-48C9-A654-6D7D39ADBBC4}">
+      <dsp:nvSpPr>
+        <dsp:cNvPr id="0" name=""/>
+        <dsp:cNvSpPr/>
+      </dsp:nvSpPr>
+      <dsp:spPr>
+        <a:xfrm>
+          <a:off x="406400" y="1557513"/>
+          <a:ext cx="5689600" cy="797040"/>
+        </a:xfrm>
+        <a:prstGeom prst="roundRect">
+          <a:avLst/>
+        </a:prstGeom>
+        <a:solidFill>
+          <a:schemeClr val="accent3">
+            <a:hueOff val="0"/>
+            <a:satOff val="0"/>
+            <a:lumOff val="0"/>
+            <a:alphaOff val="0"/>
+          </a:schemeClr>
+        </a:solidFill>
+        <a:ln w="12700" cap="flat" cmpd="sng" algn="ctr">
+          <a:solidFill>
+            <a:schemeClr val="tx1"/>
+          </a:solidFill>
+          <a:prstDash val="solid"/>
+          <a:miter lim="800000"/>
+        </a:ln>
+        <a:effectLst/>
+      </dsp:spPr>
+      <dsp:style>
+        <a:lnRef idx="2">
+          <a:scrgbClr r="0" g="0" b="0"/>
+        </a:lnRef>
+        <a:fillRef idx="1">
+          <a:scrgbClr r="0" g="0" b="0"/>
+        </a:fillRef>
+        <a:effectRef idx="0">
+          <a:scrgbClr r="0" g="0" b="0"/>
+        </a:effectRef>
+        <a:fontRef idx="minor">
+          <a:schemeClr val="lt1"/>
+        </a:fontRef>
+      </dsp:style>
+      <dsp:txBody>
+        <a:bodyPr spcFirstLastPara="0" vert="horz" wrap="square" lIns="215053" tIns="0" rIns="215053" bIns="0" numCol="1" spcCol="1270" anchor="ctr" anchorCtr="0">
+          <a:noAutofit/>
+        </a:bodyPr>
+        <a:lstStyle/>
+        <a:p>
+          <a:pPr marL="0" lvl="0" indent="0" algn="l" defTabSz="1200150">
+            <a:lnSpc>
+              <a:spcPct val="90000"/>
+            </a:lnSpc>
+            <a:spcBef>
+              <a:spcPct val="0"/>
+            </a:spcBef>
+            <a:spcAft>
+              <a:spcPct val="35000"/>
+            </a:spcAft>
+            <a:buNone/>
+          </a:pPr>
+          <a:r>
+            <a:rPr lang="en-US" sz="2700" kern="1200" dirty="0"/>
+            <a:t>Power-ups – Unlimited Energy</a:t>
+          </a:r>
+        </a:p>
+      </dsp:txBody>
+      <dsp:txXfrm>
+        <a:off x="445308" y="1596421"/>
+        <a:ext cx="5611784" cy="719224"/>
+      </dsp:txXfrm>
+    </dsp:sp>
+    <dsp:sp modelId="{5A1BC2DE-7F05-47D7-90C8-C045D3FE9D51}">
+      <dsp:nvSpPr>
+        <dsp:cNvPr id="0" name=""/>
+        <dsp:cNvSpPr/>
+      </dsp:nvSpPr>
+      <dsp:spPr>
+        <a:xfrm>
+          <a:off x="0" y="3180753"/>
+          <a:ext cx="8128000" cy="680400"/>
+        </a:xfrm>
+        <a:prstGeom prst="rect">
+          <a:avLst/>
+        </a:prstGeom>
+        <a:solidFill>
+          <a:schemeClr val="lt1">
+            <a:alpha val="90000"/>
+            <a:hueOff val="0"/>
+            <a:satOff val="0"/>
+            <a:lumOff val="0"/>
+            <a:alphaOff val="0"/>
+          </a:schemeClr>
+        </a:solidFill>
+        <a:ln w="12700" cap="flat" cmpd="sng" algn="ctr">
+          <a:solidFill>
+            <a:schemeClr val="tx1"/>
+          </a:solidFill>
+          <a:prstDash val="solid"/>
+          <a:miter lim="800000"/>
+        </a:ln>
+        <a:effectLst/>
+      </dsp:spPr>
+      <dsp:style>
+        <a:lnRef idx="2">
+          <a:scrgbClr r="0" g="0" b="0"/>
+        </a:lnRef>
+        <a:fillRef idx="1">
+          <a:scrgbClr r="0" g="0" b="0"/>
+        </a:fillRef>
+        <a:effectRef idx="0">
+          <a:scrgbClr r="0" g="0" b="0"/>
+        </a:effectRef>
+        <a:fontRef idx="minor"/>
+      </dsp:style>
+    </dsp:sp>
+    <dsp:sp modelId="{76C80044-CD79-482F-AA6D-45C7237915B0}">
+      <dsp:nvSpPr>
+        <dsp:cNvPr id="0" name=""/>
+        <dsp:cNvSpPr/>
+      </dsp:nvSpPr>
+      <dsp:spPr>
+        <a:xfrm>
+          <a:off x="406400" y="2782233"/>
+          <a:ext cx="5689600" cy="797040"/>
+        </a:xfrm>
+        <a:prstGeom prst="roundRect">
+          <a:avLst/>
+        </a:prstGeom>
+        <a:solidFill>
+          <a:schemeClr val="accent4">
+            <a:hueOff val="0"/>
+            <a:satOff val="0"/>
+            <a:lumOff val="0"/>
+            <a:alphaOff val="0"/>
+          </a:schemeClr>
+        </a:solidFill>
+        <a:ln w="12700" cap="flat" cmpd="sng" algn="ctr">
+          <a:solidFill>
+            <a:schemeClr val="tx1"/>
+          </a:solidFill>
+          <a:prstDash val="solid"/>
+          <a:miter lim="800000"/>
+        </a:ln>
+        <a:effectLst/>
+      </dsp:spPr>
+      <dsp:style>
+        <a:lnRef idx="2">
+          <a:scrgbClr r="0" g="0" b="0"/>
+        </a:lnRef>
+        <a:fillRef idx="1">
+          <a:scrgbClr r="0" g="0" b="0"/>
+        </a:fillRef>
+        <a:effectRef idx="0">
+          <a:scrgbClr r="0" g="0" b="0"/>
+        </a:effectRef>
+        <a:fontRef idx="minor">
+          <a:schemeClr val="lt1"/>
+        </a:fontRef>
+      </dsp:style>
+      <dsp:txBody>
+        <a:bodyPr spcFirstLastPara="0" vert="horz" wrap="square" lIns="215053" tIns="0" rIns="215053" bIns="0" numCol="1" spcCol="1270" anchor="ctr" anchorCtr="0">
+          <a:noAutofit/>
+        </a:bodyPr>
+        <a:lstStyle/>
+        <a:p>
+          <a:pPr marL="0" lvl="0" indent="0" algn="l" defTabSz="1200150">
+            <a:lnSpc>
+              <a:spcPct val="90000"/>
+            </a:lnSpc>
+            <a:spcBef>
+              <a:spcPct val="0"/>
+            </a:spcBef>
+            <a:spcAft>
+              <a:spcPct val="35000"/>
+            </a:spcAft>
+            <a:buNone/>
+          </a:pPr>
+          <a:r>
+            <a:rPr lang="en-US" sz="2700" kern="1200" dirty="0"/>
+            <a:t>Thugs – Enemies</a:t>
+          </a:r>
+        </a:p>
+      </dsp:txBody>
+      <dsp:txXfrm>
+        <a:off x="445308" y="2821141"/>
+        <a:ext cx="5611784" cy="719224"/>
+      </dsp:txXfrm>
+    </dsp:sp>
+    <dsp:sp modelId="{3979CBF3-6E2B-40E0-A784-89159AA22284}">
+      <dsp:nvSpPr>
+        <dsp:cNvPr id="0" name=""/>
+        <dsp:cNvSpPr/>
+      </dsp:nvSpPr>
+      <dsp:spPr>
+        <a:xfrm>
+          <a:off x="0" y="4405473"/>
+          <a:ext cx="8128000" cy="680400"/>
+        </a:xfrm>
+        <a:prstGeom prst="rect">
+          <a:avLst/>
+        </a:prstGeom>
+        <a:solidFill>
+          <a:schemeClr val="lt1">
+            <a:alpha val="90000"/>
+            <a:hueOff val="0"/>
+            <a:satOff val="0"/>
+            <a:lumOff val="0"/>
+            <a:alphaOff val="0"/>
+          </a:schemeClr>
+        </a:solidFill>
+        <a:ln w="12700" cap="flat" cmpd="sng" algn="ctr">
+          <a:solidFill>
+            <a:schemeClr val="tx1"/>
+          </a:solidFill>
+          <a:prstDash val="solid"/>
+          <a:miter lim="800000"/>
+        </a:ln>
+        <a:effectLst/>
+      </dsp:spPr>
+      <dsp:style>
+        <a:lnRef idx="2">
+          <a:scrgbClr r="0" g="0" b="0"/>
+        </a:lnRef>
+        <a:fillRef idx="1">
+          <a:scrgbClr r="0" g="0" b="0"/>
+        </a:fillRef>
+        <a:effectRef idx="0">
+          <a:scrgbClr r="0" g="0" b="0"/>
+        </a:effectRef>
+        <a:fontRef idx="minor"/>
+      </dsp:style>
+    </dsp:sp>
+    <dsp:sp modelId="{190D72B2-AE0C-4D19-B44B-DD343338AF45}">
+      <dsp:nvSpPr>
+        <dsp:cNvPr id="0" name=""/>
+        <dsp:cNvSpPr/>
+      </dsp:nvSpPr>
+      <dsp:spPr>
+        <a:xfrm>
+          <a:off x="406400" y="4006953"/>
+          <a:ext cx="5689600" cy="797040"/>
+        </a:xfrm>
+        <a:prstGeom prst="roundRect">
+          <a:avLst/>
+        </a:prstGeom>
+        <a:solidFill>
+          <a:schemeClr val="accent5">
+            <a:hueOff val="0"/>
+            <a:satOff val="0"/>
+            <a:lumOff val="0"/>
+            <a:alphaOff val="0"/>
+          </a:schemeClr>
+        </a:solidFill>
+        <a:ln w="12700" cap="flat" cmpd="sng" algn="ctr">
+          <a:solidFill>
+            <a:schemeClr val="tx1"/>
+          </a:solidFill>
+          <a:prstDash val="solid"/>
+          <a:miter lim="800000"/>
+        </a:ln>
+        <a:effectLst/>
+      </dsp:spPr>
+      <dsp:style>
+        <a:lnRef idx="2">
+          <a:scrgbClr r="0" g="0" b="0"/>
+        </a:lnRef>
+        <a:fillRef idx="1">
+          <a:scrgbClr r="0" g="0" b="0"/>
+        </a:fillRef>
+        <a:effectRef idx="0">
+          <a:scrgbClr r="0" g="0" b="0"/>
+        </a:effectRef>
+        <a:fontRef idx="minor">
+          <a:schemeClr val="lt1"/>
+        </a:fontRef>
+      </dsp:style>
+      <dsp:txBody>
+        <a:bodyPr spcFirstLastPara="0" vert="horz" wrap="square" lIns="215053" tIns="0" rIns="215053" bIns="0" numCol="1" spcCol="1270" anchor="ctr" anchorCtr="0">
+          <a:noAutofit/>
+        </a:bodyPr>
+        <a:lstStyle/>
+        <a:p>
+          <a:pPr marL="0" lvl="0" indent="0" algn="l" defTabSz="1200150">
+            <a:lnSpc>
+              <a:spcPct val="90000"/>
+            </a:lnSpc>
+            <a:spcBef>
+              <a:spcPct val="0"/>
+            </a:spcBef>
+            <a:spcAft>
+              <a:spcPct val="35000"/>
+            </a:spcAft>
+            <a:buNone/>
+          </a:pPr>
+          <a:r>
+            <a:rPr lang="en-US" sz="2700" kern="1200" dirty="0"/>
+            <a:t>New level - City</a:t>
+          </a:r>
+        </a:p>
+      </dsp:txBody>
+      <dsp:txXfrm>
+        <a:off x="445308" y="4045861"/>
+        <a:ext cx="5611784" cy="719224"/>
+      </dsp:txXfrm>
+    </dsp:sp>
+  </dsp:spTree>
+</dsp:drawing>
 </file>
 
 <file path=ppt/diagrams/layout1.xml><?xml version="1.0" encoding="utf-8"?>
@@ -4727,7 +6220,7 @@
   <dgm:title val=""/>
   <dgm:desc val=""/>
   <dgm:catLst>
-    <dgm:cat type="list" pri="1000"/>
+    <dgm:cat type="list" pri="400"/>
   </dgm:catLst>
   <dgm:sampData>
     <dgm:dataModel>
@@ -4874,7 +6367,7 @@
   <dgm:title val=""/>
   <dgm:desc val=""/>
   <dgm:catLst>
-    <dgm:cat type="list" pri="1000"/>
+    <dgm:cat type="list" pri="400"/>
   </dgm:catLst>
   <dgm:sampData>
     <dgm:dataModel>
@@ -9624,7 +11117,7 @@
           <p:cNvPr id="2" name="Title 1">
             <a:extLst>
               <a:ext uri="{FF2B5EF4-FFF2-40B4-BE49-F238E27FC236}">
-                <a16:creationId xmlns:a16="http://schemas.microsoft.com/office/drawing/2014/main" xmlns="" id="{16BF7AE4-C0B3-4010-BFC1-CEF34BAE0428}"/>
+                <a16:creationId xmlns:a16="http://schemas.microsoft.com/office/drawing/2014/main" id="{16BF7AE4-C0B3-4010-BFC1-CEF34BAE0428}"/>
               </a:ext>
             </a:extLst>
           </p:cNvPr>
@@ -9661,7 +11154,7 @@
           <p:cNvPr id="3" name="Subtitle 2">
             <a:extLst>
               <a:ext uri="{FF2B5EF4-FFF2-40B4-BE49-F238E27FC236}">
-                <a16:creationId xmlns:a16="http://schemas.microsoft.com/office/drawing/2014/main" xmlns="" id="{B9209BB6-DD6F-4588-A372-B994E11D23FE}"/>
+                <a16:creationId xmlns:a16="http://schemas.microsoft.com/office/drawing/2014/main" id="{B9209BB6-DD6F-4588-A372-B994E11D23FE}"/>
               </a:ext>
             </a:extLst>
           </p:cNvPr>
@@ -9731,7 +11224,7 @@
           <p:cNvPr id="4" name="Date Placeholder 3">
             <a:extLst>
               <a:ext uri="{FF2B5EF4-FFF2-40B4-BE49-F238E27FC236}">
-                <a16:creationId xmlns:a16="http://schemas.microsoft.com/office/drawing/2014/main" xmlns="" id="{6B9759D3-2AF2-4EC6-921A-D1F5F79F9299}"/>
+                <a16:creationId xmlns:a16="http://schemas.microsoft.com/office/drawing/2014/main" id="{6B9759D3-2AF2-4EC6-921A-D1F5F79F9299}"/>
               </a:ext>
             </a:extLst>
           </p:cNvPr>
@@ -9750,7 +11243,7 @@
             <a:fld id="{E6D4E603-4EE0-40E2-B7C9-83790A703516}" type="datetimeFigureOut">
               <a:rPr lang="en-US" smtClean="0"/>
               <a:pPr/>
-              <a:t>8/17/2017</a:t>
+              <a:t>8/18/2017</a:t>
             </a:fld>
             <a:endParaRPr lang="en-US"/>
           </a:p>
@@ -9761,7 +11254,7 @@
           <p:cNvPr id="5" name="Footer Placeholder 4">
             <a:extLst>
               <a:ext uri="{FF2B5EF4-FFF2-40B4-BE49-F238E27FC236}">
-                <a16:creationId xmlns:a16="http://schemas.microsoft.com/office/drawing/2014/main" xmlns="" id="{ECDD070B-BC2D-49AC-B3E7-53C722813DE5}"/>
+                <a16:creationId xmlns:a16="http://schemas.microsoft.com/office/drawing/2014/main" id="{ECDD070B-BC2D-49AC-B3E7-53C722813DE5}"/>
               </a:ext>
             </a:extLst>
           </p:cNvPr>
@@ -9786,7 +11279,7 @@
           <p:cNvPr id="6" name="Slide Number Placeholder 5">
             <a:extLst>
               <a:ext uri="{FF2B5EF4-FFF2-40B4-BE49-F238E27FC236}">
-                <a16:creationId xmlns:a16="http://schemas.microsoft.com/office/drawing/2014/main" xmlns="" id="{1064CA4E-1442-483B-851C-CA672F0A3398}"/>
+                <a16:creationId xmlns:a16="http://schemas.microsoft.com/office/drawing/2014/main" id="{1064CA4E-1442-483B-851C-CA672F0A3398}"/>
               </a:ext>
             </a:extLst>
           </p:cNvPr>
@@ -9814,7 +11307,7 @@
     </p:spTree>
     <p:extLst>
       <p:ext uri="{BB962C8B-B14F-4D97-AF65-F5344CB8AC3E}">
-        <p14:creationId xmlns:p14="http://schemas.microsoft.com/office/powerpoint/2010/main" xmlns="" val="2690942046"/>
+        <p14:creationId xmlns:p14="http://schemas.microsoft.com/office/powerpoint/2010/main" val="2690942046"/>
       </p:ext>
     </p:extLst>
   </p:cSld>
@@ -9846,7 +11339,7 @@
           <p:cNvPr id="2" name="Title 1">
             <a:extLst>
               <a:ext uri="{FF2B5EF4-FFF2-40B4-BE49-F238E27FC236}">
-                <a16:creationId xmlns:a16="http://schemas.microsoft.com/office/drawing/2014/main" xmlns="" id="{AD3F4A32-5115-40C6-AF9B-700C28DFC92B}"/>
+                <a16:creationId xmlns:a16="http://schemas.microsoft.com/office/drawing/2014/main" id="{AD3F4A32-5115-40C6-AF9B-700C28DFC92B}"/>
               </a:ext>
             </a:extLst>
           </p:cNvPr>
@@ -9874,7 +11367,7 @@
           <p:cNvPr id="3" name="Vertical Text Placeholder 2">
             <a:extLst>
               <a:ext uri="{FF2B5EF4-FFF2-40B4-BE49-F238E27FC236}">
-                <a16:creationId xmlns:a16="http://schemas.microsoft.com/office/drawing/2014/main" xmlns="" id="{E9F790D3-3AD6-4079-9C79-8D042919F458}"/>
+                <a16:creationId xmlns:a16="http://schemas.microsoft.com/office/drawing/2014/main" id="{E9F790D3-3AD6-4079-9C79-8D042919F458}"/>
               </a:ext>
             </a:extLst>
           </p:cNvPr>
@@ -9931,7 +11424,7 @@
           <p:cNvPr id="4" name="Date Placeholder 3">
             <a:extLst>
               <a:ext uri="{FF2B5EF4-FFF2-40B4-BE49-F238E27FC236}">
-                <a16:creationId xmlns:a16="http://schemas.microsoft.com/office/drawing/2014/main" xmlns="" id="{E5026EDD-70D0-44B8-A1BA-6ED9FD111E70}"/>
+                <a16:creationId xmlns:a16="http://schemas.microsoft.com/office/drawing/2014/main" id="{E5026EDD-70D0-44B8-A1BA-6ED9FD111E70}"/>
               </a:ext>
             </a:extLst>
           </p:cNvPr>
@@ -9950,7 +11443,7 @@
             <a:fld id="{E6D4E603-4EE0-40E2-B7C9-83790A703516}" type="datetimeFigureOut">
               <a:rPr lang="en-US" smtClean="0"/>
               <a:pPr/>
-              <a:t>8/17/2017</a:t>
+              <a:t>8/18/2017</a:t>
             </a:fld>
             <a:endParaRPr lang="en-US"/>
           </a:p>
@@ -9961,7 +11454,7 @@
           <p:cNvPr id="5" name="Footer Placeholder 4">
             <a:extLst>
               <a:ext uri="{FF2B5EF4-FFF2-40B4-BE49-F238E27FC236}">
-                <a16:creationId xmlns:a16="http://schemas.microsoft.com/office/drawing/2014/main" xmlns="" id="{A37DDB79-51FF-42D2-98B7-8C92F16664B0}"/>
+                <a16:creationId xmlns:a16="http://schemas.microsoft.com/office/drawing/2014/main" id="{A37DDB79-51FF-42D2-98B7-8C92F16664B0}"/>
               </a:ext>
             </a:extLst>
           </p:cNvPr>
@@ -9986,7 +11479,7 @@
           <p:cNvPr id="6" name="Slide Number Placeholder 5">
             <a:extLst>
               <a:ext uri="{FF2B5EF4-FFF2-40B4-BE49-F238E27FC236}">
-                <a16:creationId xmlns:a16="http://schemas.microsoft.com/office/drawing/2014/main" xmlns="" id="{0A86D4A6-3E61-4550-B96A-020302FCC623}"/>
+                <a16:creationId xmlns:a16="http://schemas.microsoft.com/office/drawing/2014/main" id="{0A86D4A6-3E61-4550-B96A-020302FCC623}"/>
               </a:ext>
             </a:extLst>
           </p:cNvPr>
@@ -10014,7 +11507,7 @@
     </p:spTree>
     <p:extLst>
       <p:ext uri="{BB962C8B-B14F-4D97-AF65-F5344CB8AC3E}">
-        <p14:creationId xmlns:p14="http://schemas.microsoft.com/office/powerpoint/2010/main" xmlns="" val="1787943067"/>
+        <p14:creationId xmlns:p14="http://schemas.microsoft.com/office/powerpoint/2010/main" val="1787943067"/>
       </p:ext>
     </p:extLst>
   </p:cSld>
@@ -10046,7 +11539,7 @@
           <p:cNvPr id="2" name="Vertical Title 1">
             <a:extLst>
               <a:ext uri="{FF2B5EF4-FFF2-40B4-BE49-F238E27FC236}">
-                <a16:creationId xmlns:a16="http://schemas.microsoft.com/office/drawing/2014/main" xmlns="" id="{0B4B9B4B-C068-45CD-861C-9D6C9963A052}"/>
+                <a16:creationId xmlns:a16="http://schemas.microsoft.com/office/drawing/2014/main" id="{0B4B9B4B-C068-45CD-861C-9D6C9963A052}"/>
               </a:ext>
             </a:extLst>
           </p:cNvPr>
@@ -10079,7 +11572,7 @@
           <p:cNvPr id="3" name="Vertical Text Placeholder 2">
             <a:extLst>
               <a:ext uri="{FF2B5EF4-FFF2-40B4-BE49-F238E27FC236}">
-                <a16:creationId xmlns:a16="http://schemas.microsoft.com/office/drawing/2014/main" xmlns="" id="{856B1DBE-5100-4271-AE18-99C3FC65BC91}"/>
+                <a16:creationId xmlns:a16="http://schemas.microsoft.com/office/drawing/2014/main" id="{856B1DBE-5100-4271-AE18-99C3FC65BC91}"/>
               </a:ext>
             </a:extLst>
           </p:cNvPr>
@@ -10141,7 +11634,7 @@
           <p:cNvPr id="4" name="Date Placeholder 3">
             <a:extLst>
               <a:ext uri="{FF2B5EF4-FFF2-40B4-BE49-F238E27FC236}">
-                <a16:creationId xmlns:a16="http://schemas.microsoft.com/office/drawing/2014/main" xmlns="" id="{543BBB15-4409-479A-B71F-7C25FF6A92BF}"/>
+                <a16:creationId xmlns:a16="http://schemas.microsoft.com/office/drawing/2014/main" id="{543BBB15-4409-479A-B71F-7C25FF6A92BF}"/>
               </a:ext>
             </a:extLst>
           </p:cNvPr>
@@ -10160,7 +11653,7 @@
             <a:fld id="{E6D4E603-4EE0-40E2-B7C9-83790A703516}" type="datetimeFigureOut">
               <a:rPr lang="en-US" smtClean="0"/>
               <a:pPr/>
-              <a:t>8/17/2017</a:t>
+              <a:t>8/18/2017</a:t>
             </a:fld>
             <a:endParaRPr lang="en-US"/>
           </a:p>
@@ -10171,7 +11664,7 @@
           <p:cNvPr id="5" name="Footer Placeholder 4">
             <a:extLst>
               <a:ext uri="{FF2B5EF4-FFF2-40B4-BE49-F238E27FC236}">
-                <a16:creationId xmlns:a16="http://schemas.microsoft.com/office/drawing/2014/main" xmlns="" id="{71F2B5C0-2751-438D-A1B9-3517F9091457}"/>
+                <a16:creationId xmlns:a16="http://schemas.microsoft.com/office/drawing/2014/main" id="{71F2B5C0-2751-438D-A1B9-3517F9091457}"/>
               </a:ext>
             </a:extLst>
           </p:cNvPr>
@@ -10196,7 +11689,7 @@
           <p:cNvPr id="6" name="Slide Number Placeholder 5">
             <a:extLst>
               <a:ext uri="{FF2B5EF4-FFF2-40B4-BE49-F238E27FC236}">
-                <a16:creationId xmlns:a16="http://schemas.microsoft.com/office/drawing/2014/main" xmlns="" id="{40E82060-787B-464B-BCED-894FB9C33DA6}"/>
+                <a16:creationId xmlns:a16="http://schemas.microsoft.com/office/drawing/2014/main" id="{40E82060-787B-464B-BCED-894FB9C33DA6}"/>
               </a:ext>
             </a:extLst>
           </p:cNvPr>
@@ -10224,7 +11717,7 @@
     </p:spTree>
     <p:extLst>
       <p:ext uri="{BB962C8B-B14F-4D97-AF65-F5344CB8AC3E}">
-        <p14:creationId xmlns:p14="http://schemas.microsoft.com/office/powerpoint/2010/main" xmlns="" val="2528138552"/>
+        <p14:creationId xmlns:p14="http://schemas.microsoft.com/office/powerpoint/2010/main" val="2528138552"/>
       </p:ext>
     </p:extLst>
   </p:cSld>
@@ -10256,7 +11749,7 @@
           <p:cNvPr id="2" name="Title 1">
             <a:extLst>
               <a:ext uri="{FF2B5EF4-FFF2-40B4-BE49-F238E27FC236}">
-                <a16:creationId xmlns:a16="http://schemas.microsoft.com/office/drawing/2014/main" xmlns="" id="{B8ECD63E-FA13-49ED-8885-85BC1F1772C0}"/>
+                <a16:creationId xmlns:a16="http://schemas.microsoft.com/office/drawing/2014/main" id="{B8ECD63E-FA13-49ED-8885-85BC1F1772C0}"/>
               </a:ext>
             </a:extLst>
           </p:cNvPr>
@@ -10284,7 +11777,7 @@
           <p:cNvPr id="3" name="Content Placeholder 2">
             <a:extLst>
               <a:ext uri="{FF2B5EF4-FFF2-40B4-BE49-F238E27FC236}">
-                <a16:creationId xmlns:a16="http://schemas.microsoft.com/office/drawing/2014/main" xmlns="" id="{3F420131-B8E3-4C48-875E-065636603980}"/>
+                <a16:creationId xmlns:a16="http://schemas.microsoft.com/office/drawing/2014/main" id="{3F420131-B8E3-4C48-875E-065636603980}"/>
               </a:ext>
             </a:extLst>
           </p:cNvPr>
@@ -10341,7 +11834,7 @@
           <p:cNvPr id="4" name="Date Placeholder 3">
             <a:extLst>
               <a:ext uri="{FF2B5EF4-FFF2-40B4-BE49-F238E27FC236}">
-                <a16:creationId xmlns:a16="http://schemas.microsoft.com/office/drawing/2014/main" xmlns="" id="{F15EE35F-FD23-4212-B583-F0DAD39FCCE7}"/>
+                <a16:creationId xmlns:a16="http://schemas.microsoft.com/office/drawing/2014/main" id="{F15EE35F-FD23-4212-B583-F0DAD39FCCE7}"/>
               </a:ext>
             </a:extLst>
           </p:cNvPr>
@@ -10360,7 +11853,7 @@
             <a:fld id="{E6D4E603-4EE0-40E2-B7C9-83790A703516}" type="datetimeFigureOut">
               <a:rPr lang="en-US" smtClean="0"/>
               <a:pPr/>
-              <a:t>8/17/2017</a:t>
+              <a:t>8/18/2017</a:t>
             </a:fld>
             <a:endParaRPr lang="en-US"/>
           </a:p>
@@ -10371,7 +11864,7 @@
           <p:cNvPr id="5" name="Footer Placeholder 4">
             <a:extLst>
               <a:ext uri="{FF2B5EF4-FFF2-40B4-BE49-F238E27FC236}">
-                <a16:creationId xmlns:a16="http://schemas.microsoft.com/office/drawing/2014/main" xmlns="" id="{D8C27DF3-20AB-4AE5-81EA-301E67FE04A1}"/>
+                <a16:creationId xmlns:a16="http://schemas.microsoft.com/office/drawing/2014/main" id="{D8C27DF3-20AB-4AE5-81EA-301E67FE04A1}"/>
               </a:ext>
             </a:extLst>
           </p:cNvPr>
@@ -10396,7 +11889,7 @@
           <p:cNvPr id="6" name="Slide Number Placeholder 5">
             <a:extLst>
               <a:ext uri="{FF2B5EF4-FFF2-40B4-BE49-F238E27FC236}">
-                <a16:creationId xmlns:a16="http://schemas.microsoft.com/office/drawing/2014/main" xmlns="" id="{6C8FE2E8-BC7F-46D3-8067-B07CA6273A05}"/>
+                <a16:creationId xmlns:a16="http://schemas.microsoft.com/office/drawing/2014/main" id="{6C8FE2E8-BC7F-46D3-8067-B07CA6273A05}"/>
               </a:ext>
             </a:extLst>
           </p:cNvPr>
@@ -10424,7 +11917,7 @@
     </p:spTree>
     <p:extLst>
       <p:ext uri="{BB962C8B-B14F-4D97-AF65-F5344CB8AC3E}">
-        <p14:creationId xmlns:p14="http://schemas.microsoft.com/office/powerpoint/2010/main" xmlns="" val="4115221501"/>
+        <p14:creationId xmlns:p14="http://schemas.microsoft.com/office/powerpoint/2010/main" val="4115221501"/>
       </p:ext>
     </p:extLst>
   </p:cSld>
@@ -10456,7 +11949,7 @@
           <p:cNvPr id="2" name="Title 1">
             <a:extLst>
               <a:ext uri="{FF2B5EF4-FFF2-40B4-BE49-F238E27FC236}">
-                <a16:creationId xmlns:a16="http://schemas.microsoft.com/office/drawing/2014/main" xmlns="" id="{501B7952-A436-4FEB-A848-4D4BDE516C45}"/>
+                <a16:creationId xmlns:a16="http://schemas.microsoft.com/office/drawing/2014/main" id="{501B7952-A436-4FEB-A848-4D4BDE516C45}"/>
               </a:ext>
             </a:extLst>
           </p:cNvPr>
@@ -10493,7 +11986,7 @@
           <p:cNvPr id="3" name="Text Placeholder 2">
             <a:extLst>
               <a:ext uri="{FF2B5EF4-FFF2-40B4-BE49-F238E27FC236}">
-                <a16:creationId xmlns:a16="http://schemas.microsoft.com/office/drawing/2014/main" xmlns="" id="{8F4B50D2-192E-4894-9B90-539DB0F45790}"/>
+                <a16:creationId xmlns:a16="http://schemas.microsoft.com/office/drawing/2014/main" id="{8F4B50D2-192E-4894-9B90-539DB0F45790}"/>
               </a:ext>
             </a:extLst>
           </p:cNvPr>
@@ -10618,7 +12111,7 @@
           <p:cNvPr id="4" name="Date Placeholder 3">
             <a:extLst>
               <a:ext uri="{FF2B5EF4-FFF2-40B4-BE49-F238E27FC236}">
-                <a16:creationId xmlns:a16="http://schemas.microsoft.com/office/drawing/2014/main" xmlns="" id="{FED050B8-70B0-49E3-BF09-D035D2C46CA7}"/>
+                <a16:creationId xmlns:a16="http://schemas.microsoft.com/office/drawing/2014/main" id="{FED050B8-70B0-49E3-BF09-D035D2C46CA7}"/>
               </a:ext>
             </a:extLst>
           </p:cNvPr>
@@ -10637,7 +12130,7 @@
             <a:fld id="{E6D4E603-4EE0-40E2-B7C9-83790A703516}" type="datetimeFigureOut">
               <a:rPr lang="en-US" smtClean="0"/>
               <a:pPr/>
-              <a:t>8/17/2017</a:t>
+              <a:t>8/18/2017</a:t>
             </a:fld>
             <a:endParaRPr lang="en-US"/>
           </a:p>
@@ -10648,7 +12141,7 @@
           <p:cNvPr id="5" name="Footer Placeholder 4">
             <a:extLst>
               <a:ext uri="{FF2B5EF4-FFF2-40B4-BE49-F238E27FC236}">
-                <a16:creationId xmlns:a16="http://schemas.microsoft.com/office/drawing/2014/main" xmlns="" id="{59B1503C-60FE-441D-9B99-C3FF0526BC0E}"/>
+                <a16:creationId xmlns:a16="http://schemas.microsoft.com/office/drawing/2014/main" id="{59B1503C-60FE-441D-9B99-C3FF0526BC0E}"/>
               </a:ext>
             </a:extLst>
           </p:cNvPr>
@@ -10673,7 +12166,7 @@
           <p:cNvPr id="6" name="Slide Number Placeholder 5">
             <a:extLst>
               <a:ext uri="{FF2B5EF4-FFF2-40B4-BE49-F238E27FC236}">
-                <a16:creationId xmlns:a16="http://schemas.microsoft.com/office/drawing/2014/main" xmlns="" id="{9B4F9AFF-6B11-469C-991C-CDD27D512299}"/>
+                <a16:creationId xmlns:a16="http://schemas.microsoft.com/office/drawing/2014/main" id="{9B4F9AFF-6B11-469C-991C-CDD27D512299}"/>
               </a:ext>
             </a:extLst>
           </p:cNvPr>
@@ -10701,7 +12194,7 @@
     </p:spTree>
     <p:extLst>
       <p:ext uri="{BB962C8B-B14F-4D97-AF65-F5344CB8AC3E}">
-        <p14:creationId xmlns:p14="http://schemas.microsoft.com/office/powerpoint/2010/main" xmlns="" val="2170116738"/>
+        <p14:creationId xmlns:p14="http://schemas.microsoft.com/office/powerpoint/2010/main" val="2170116738"/>
       </p:ext>
     </p:extLst>
   </p:cSld>
@@ -10733,7 +12226,7 @@
           <p:cNvPr id="2" name="Title 1">
             <a:extLst>
               <a:ext uri="{FF2B5EF4-FFF2-40B4-BE49-F238E27FC236}">
-                <a16:creationId xmlns:a16="http://schemas.microsoft.com/office/drawing/2014/main" xmlns="" id="{80F9AA80-8A1E-4580-91B5-D8D855C72E54}"/>
+                <a16:creationId xmlns:a16="http://schemas.microsoft.com/office/drawing/2014/main" id="{80F9AA80-8A1E-4580-91B5-D8D855C72E54}"/>
               </a:ext>
             </a:extLst>
           </p:cNvPr>
@@ -10761,7 +12254,7 @@
           <p:cNvPr id="3" name="Content Placeholder 2">
             <a:extLst>
               <a:ext uri="{FF2B5EF4-FFF2-40B4-BE49-F238E27FC236}">
-                <a16:creationId xmlns:a16="http://schemas.microsoft.com/office/drawing/2014/main" xmlns="" id="{4B4CD21D-35A4-42DE-864E-1C1949EDCA1C}"/>
+                <a16:creationId xmlns:a16="http://schemas.microsoft.com/office/drawing/2014/main" id="{4B4CD21D-35A4-42DE-864E-1C1949EDCA1C}"/>
               </a:ext>
             </a:extLst>
           </p:cNvPr>
@@ -10823,7 +12316,7 @@
           <p:cNvPr id="4" name="Content Placeholder 3">
             <a:extLst>
               <a:ext uri="{FF2B5EF4-FFF2-40B4-BE49-F238E27FC236}">
-                <a16:creationId xmlns:a16="http://schemas.microsoft.com/office/drawing/2014/main" xmlns="" id="{39C43AB0-0D14-4E21-9AAF-6DA573C5CCBE}"/>
+                <a16:creationId xmlns:a16="http://schemas.microsoft.com/office/drawing/2014/main" id="{39C43AB0-0D14-4E21-9AAF-6DA573C5CCBE}"/>
               </a:ext>
             </a:extLst>
           </p:cNvPr>
@@ -10885,7 +12378,7 @@
           <p:cNvPr id="5" name="Date Placeholder 4">
             <a:extLst>
               <a:ext uri="{FF2B5EF4-FFF2-40B4-BE49-F238E27FC236}">
-                <a16:creationId xmlns:a16="http://schemas.microsoft.com/office/drawing/2014/main" xmlns="" id="{1F026095-E31F-4F64-AC78-F8391A9E1415}"/>
+                <a16:creationId xmlns:a16="http://schemas.microsoft.com/office/drawing/2014/main" id="{1F026095-E31F-4F64-AC78-F8391A9E1415}"/>
               </a:ext>
             </a:extLst>
           </p:cNvPr>
@@ -10904,7 +12397,7 @@
             <a:fld id="{E6D4E603-4EE0-40E2-B7C9-83790A703516}" type="datetimeFigureOut">
               <a:rPr lang="en-US" smtClean="0"/>
               <a:pPr/>
-              <a:t>8/17/2017</a:t>
+              <a:t>8/18/2017</a:t>
             </a:fld>
             <a:endParaRPr lang="en-US"/>
           </a:p>
@@ -10915,7 +12408,7 @@
           <p:cNvPr id="6" name="Footer Placeholder 5">
             <a:extLst>
               <a:ext uri="{FF2B5EF4-FFF2-40B4-BE49-F238E27FC236}">
-                <a16:creationId xmlns:a16="http://schemas.microsoft.com/office/drawing/2014/main" xmlns="" id="{E28FCC4A-A5BC-400F-A6EB-01C202329F1E}"/>
+                <a16:creationId xmlns:a16="http://schemas.microsoft.com/office/drawing/2014/main" id="{E28FCC4A-A5BC-400F-A6EB-01C202329F1E}"/>
               </a:ext>
             </a:extLst>
           </p:cNvPr>
@@ -10940,7 +12433,7 @@
           <p:cNvPr id="7" name="Slide Number Placeholder 6">
             <a:extLst>
               <a:ext uri="{FF2B5EF4-FFF2-40B4-BE49-F238E27FC236}">
-                <a16:creationId xmlns:a16="http://schemas.microsoft.com/office/drawing/2014/main" xmlns="" id="{A256B9CC-FEF0-4472-8D2C-0E0108B3F72C}"/>
+                <a16:creationId xmlns:a16="http://schemas.microsoft.com/office/drawing/2014/main" id="{A256B9CC-FEF0-4472-8D2C-0E0108B3F72C}"/>
               </a:ext>
             </a:extLst>
           </p:cNvPr>
@@ -10968,7 +12461,7 @@
     </p:spTree>
     <p:extLst>
       <p:ext uri="{BB962C8B-B14F-4D97-AF65-F5344CB8AC3E}">
-        <p14:creationId xmlns:p14="http://schemas.microsoft.com/office/powerpoint/2010/main" xmlns="" val="2130001743"/>
+        <p14:creationId xmlns:p14="http://schemas.microsoft.com/office/powerpoint/2010/main" val="2130001743"/>
       </p:ext>
     </p:extLst>
   </p:cSld>
@@ -11000,7 +12493,7 @@
           <p:cNvPr id="2" name="Title 1">
             <a:extLst>
               <a:ext uri="{FF2B5EF4-FFF2-40B4-BE49-F238E27FC236}">
-                <a16:creationId xmlns:a16="http://schemas.microsoft.com/office/drawing/2014/main" xmlns="" id="{721601D2-8215-48A4-B3E9-00AE3C43FA10}"/>
+                <a16:creationId xmlns:a16="http://schemas.microsoft.com/office/drawing/2014/main" id="{721601D2-8215-48A4-B3E9-00AE3C43FA10}"/>
               </a:ext>
             </a:extLst>
           </p:cNvPr>
@@ -11033,7 +12526,7 @@
           <p:cNvPr id="3" name="Text Placeholder 2">
             <a:extLst>
               <a:ext uri="{FF2B5EF4-FFF2-40B4-BE49-F238E27FC236}">
-                <a16:creationId xmlns:a16="http://schemas.microsoft.com/office/drawing/2014/main" xmlns="" id="{9511D028-9781-441C-9E2D-C57FC40AFE9A}"/>
+                <a16:creationId xmlns:a16="http://schemas.microsoft.com/office/drawing/2014/main" id="{9511D028-9781-441C-9E2D-C57FC40AFE9A}"/>
               </a:ext>
             </a:extLst>
           </p:cNvPr>
@@ -11104,7 +12597,7 @@
           <p:cNvPr id="4" name="Content Placeholder 3">
             <a:extLst>
               <a:ext uri="{FF2B5EF4-FFF2-40B4-BE49-F238E27FC236}">
-                <a16:creationId xmlns:a16="http://schemas.microsoft.com/office/drawing/2014/main" xmlns="" id="{DEE7B035-1AAC-4511-9E2D-4B51CAF2FBDA}"/>
+                <a16:creationId xmlns:a16="http://schemas.microsoft.com/office/drawing/2014/main" id="{DEE7B035-1AAC-4511-9E2D-4B51CAF2FBDA}"/>
               </a:ext>
             </a:extLst>
           </p:cNvPr>
@@ -11166,7 +12659,7 @@
           <p:cNvPr id="5" name="Text Placeholder 4">
             <a:extLst>
               <a:ext uri="{FF2B5EF4-FFF2-40B4-BE49-F238E27FC236}">
-                <a16:creationId xmlns:a16="http://schemas.microsoft.com/office/drawing/2014/main" xmlns="" id="{7963271C-FF12-47C3-A87A-D3DA8289795C}"/>
+                <a16:creationId xmlns:a16="http://schemas.microsoft.com/office/drawing/2014/main" id="{7963271C-FF12-47C3-A87A-D3DA8289795C}"/>
               </a:ext>
             </a:extLst>
           </p:cNvPr>
@@ -11237,7 +12730,7 @@
           <p:cNvPr id="6" name="Content Placeholder 5">
             <a:extLst>
               <a:ext uri="{FF2B5EF4-FFF2-40B4-BE49-F238E27FC236}">
-                <a16:creationId xmlns:a16="http://schemas.microsoft.com/office/drawing/2014/main" xmlns="" id="{35BB6672-B062-4DBF-BABC-E5571CD8B735}"/>
+                <a16:creationId xmlns:a16="http://schemas.microsoft.com/office/drawing/2014/main" id="{35BB6672-B062-4DBF-BABC-E5571CD8B735}"/>
               </a:ext>
             </a:extLst>
           </p:cNvPr>
@@ -11299,7 +12792,7 @@
           <p:cNvPr id="7" name="Date Placeholder 6">
             <a:extLst>
               <a:ext uri="{FF2B5EF4-FFF2-40B4-BE49-F238E27FC236}">
-                <a16:creationId xmlns:a16="http://schemas.microsoft.com/office/drawing/2014/main" xmlns="" id="{8F3DF94E-F3F3-4483-96E0-6BE6C362438A}"/>
+                <a16:creationId xmlns:a16="http://schemas.microsoft.com/office/drawing/2014/main" id="{8F3DF94E-F3F3-4483-96E0-6BE6C362438A}"/>
               </a:ext>
             </a:extLst>
           </p:cNvPr>
@@ -11318,7 +12811,7 @@
             <a:fld id="{E6D4E603-4EE0-40E2-B7C9-83790A703516}" type="datetimeFigureOut">
               <a:rPr lang="en-US" smtClean="0"/>
               <a:pPr/>
-              <a:t>8/17/2017</a:t>
+              <a:t>8/18/2017</a:t>
             </a:fld>
             <a:endParaRPr lang="en-US"/>
           </a:p>
@@ -11329,7 +12822,7 @@
           <p:cNvPr id="8" name="Footer Placeholder 7">
             <a:extLst>
               <a:ext uri="{FF2B5EF4-FFF2-40B4-BE49-F238E27FC236}">
-                <a16:creationId xmlns:a16="http://schemas.microsoft.com/office/drawing/2014/main" xmlns="" id="{662518D2-B2B0-4B5B-BFEC-8792F13D4F27}"/>
+                <a16:creationId xmlns:a16="http://schemas.microsoft.com/office/drawing/2014/main" id="{662518D2-B2B0-4B5B-BFEC-8792F13D4F27}"/>
               </a:ext>
             </a:extLst>
           </p:cNvPr>
@@ -11354,7 +12847,7 @@
           <p:cNvPr id="9" name="Slide Number Placeholder 8">
             <a:extLst>
               <a:ext uri="{FF2B5EF4-FFF2-40B4-BE49-F238E27FC236}">
-                <a16:creationId xmlns:a16="http://schemas.microsoft.com/office/drawing/2014/main" xmlns="" id="{AFCBEA20-92DA-4BBD-84A0-1C5596A8F2E9}"/>
+                <a16:creationId xmlns:a16="http://schemas.microsoft.com/office/drawing/2014/main" id="{AFCBEA20-92DA-4BBD-84A0-1C5596A8F2E9}"/>
               </a:ext>
             </a:extLst>
           </p:cNvPr>
@@ -11382,7 +12875,7 @@
     </p:spTree>
     <p:extLst>
       <p:ext uri="{BB962C8B-B14F-4D97-AF65-F5344CB8AC3E}">
-        <p14:creationId xmlns:p14="http://schemas.microsoft.com/office/powerpoint/2010/main" xmlns="" val="1941267372"/>
+        <p14:creationId xmlns:p14="http://schemas.microsoft.com/office/powerpoint/2010/main" val="1941267372"/>
       </p:ext>
     </p:extLst>
   </p:cSld>
@@ -11414,7 +12907,7 @@
           <p:cNvPr id="2" name="Title 1">
             <a:extLst>
               <a:ext uri="{FF2B5EF4-FFF2-40B4-BE49-F238E27FC236}">
-                <a16:creationId xmlns:a16="http://schemas.microsoft.com/office/drawing/2014/main" xmlns="" id="{2AB5840C-FE44-40D5-A48B-CAA5A331BA6F}"/>
+                <a16:creationId xmlns:a16="http://schemas.microsoft.com/office/drawing/2014/main" id="{2AB5840C-FE44-40D5-A48B-CAA5A331BA6F}"/>
               </a:ext>
             </a:extLst>
           </p:cNvPr>
@@ -11442,7 +12935,7 @@
           <p:cNvPr id="3" name="Date Placeholder 2">
             <a:extLst>
               <a:ext uri="{FF2B5EF4-FFF2-40B4-BE49-F238E27FC236}">
-                <a16:creationId xmlns:a16="http://schemas.microsoft.com/office/drawing/2014/main" xmlns="" id="{521B81B3-27BA-46E9-9319-63253DBB8561}"/>
+                <a16:creationId xmlns:a16="http://schemas.microsoft.com/office/drawing/2014/main" id="{521B81B3-27BA-46E9-9319-63253DBB8561}"/>
               </a:ext>
             </a:extLst>
           </p:cNvPr>
@@ -11461,7 +12954,7 @@
             <a:fld id="{E6D4E603-4EE0-40E2-B7C9-83790A703516}" type="datetimeFigureOut">
               <a:rPr lang="en-US" smtClean="0"/>
               <a:pPr/>
-              <a:t>8/17/2017</a:t>
+              <a:t>8/18/2017</a:t>
             </a:fld>
             <a:endParaRPr lang="en-US"/>
           </a:p>
@@ -11472,7 +12965,7 @@
           <p:cNvPr id="4" name="Footer Placeholder 3">
             <a:extLst>
               <a:ext uri="{FF2B5EF4-FFF2-40B4-BE49-F238E27FC236}">
-                <a16:creationId xmlns:a16="http://schemas.microsoft.com/office/drawing/2014/main" xmlns="" id="{33FFE9C1-3141-4D73-891F-2EFF2B45CDD8}"/>
+                <a16:creationId xmlns:a16="http://schemas.microsoft.com/office/drawing/2014/main" id="{33FFE9C1-3141-4D73-891F-2EFF2B45CDD8}"/>
               </a:ext>
             </a:extLst>
           </p:cNvPr>
@@ -11497,7 +12990,7 @@
           <p:cNvPr id="5" name="Slide Number Placeholder 4">
             <a:extLst>
               <a:ext uri="{FF2B5EF4-FFF2-40B4-BE49-F238E27FC236}">
-                <a16:creationId xmlns:a16="http://schemas.microsoft.com/office/drawing/2014/main" xmlns="" id="{F2B89888-770C-4CC8-8E55-CE5A28D078E7}"/>
+                <a16:creationId xmlns:a16="http://schemas.microsoft.com/office/drawing/2014/main" id="{F2B89888-770C-4CC8-8E55-CE5A28D078E7}"/>
               </a:ext>
             </a:extLst>
           </p:cNvPr>
@@ -11525,7 +13018,7 @@
     </p:spTree>
     <p:extLst>
       <p:ext uri="{BB962C8B-B14F-4D97-AF65-F5344CB8AC3E}">
-        <p14:creationId xmlns:p14="http://schemas.microsoft.com/office/powerpoint/2010/main" xmlns="" val="80856006"/>
+        <p14:creationId xmlns:p14="http://schemas.microsoft.com/office/powerpoint/2010/main" val="80856006"/>
       </p:ext>
     </p:extLst>
   </p:cSld>
@@ -11557,7 +13050,7 @@
           <p:cNvPr id="2" name="Date Placeholder 1">
             <a:extLst>
               <a:ext uri="{FF2B5EF4-FFF2-40B4-BE49-F238E27FC236}">
-                <a16:creationId xmlns:a16="http://schemas.microsoft.com/office/drawing/2014/main" xmlns="" id="{E74E29F7-5E8B-47B4-B39F-6220F1A63FD3}"/>
+                <a16:creationId xmlns:a16="http://schemas.microsoft.com/office/drawing/2014/main" id="{E74E29F7-5E8B-47B4-B39F-6220F1A63FD3}"/>
               </a:ext>
             </a:extLst>
           </p:cNvPr>
@@ -11576,7 +13069,7 @@
             <a:fld id="{E6D4E603-4EE0-40E2-B7C9-83790A703516}" type="datetimeFigureOut">
               <a:rPr lang="en-US" smtClean="0"/>
               <a:pPr/>
-              <a:t>8/17/2017</a:t>
+              <a:t>8/18/2017</a:t>
             </a:fld>
             <a:endParaRPr lang="en-US"/>
           </a:p>
@@ -11587,7 +13080,7 @@
           <p:cNvPr id="3" name="Footer Placeholder 2">
             <a:extLst>
               <a:ext uri="{FF2B5EF4-FFF2-40B4-BE49-F238E27FC236}">
-                <a16:creationId xmlns:a16="http://schemas.microsoft.com/office/drawing/2014/main" xmlns="" id="{8080EAD4-2479-4100-B5F5-59BC3671820A}"/>
+                <a16:creationId xmlns:a16="http://schemas.microsoft.com/office/drawing/2014/main" id="{8080EAD4-2479-4100-B5F5-59BC3671820A}"/>
               </a:ext>
             </a:extLst>
           </p:cNvPr>
@@ -11612,7 +13105,7 @@
           <p:cNvPr id="4" name="Slide Number Placeholder 3">
             <a:extLst>
               <a:ext uri="{FF2B5EF4-FFF2-40B4-BE49-F238E27FC236}">
-                <a16:creationId xmlns:a16="http://schemas.microsoft.com/office/drawing/2014/main" xmlns="" id="{048D24CD-5CA6-4CEF-A8FB-EB373251ECD8}"/>
+                <a16:creationId xmlns:a16="http://schemas.microsoft.com/office/drawing/2014/main" id="{048D24CD-5CA6-4CEF-A8FB-EB373251ECD8}"/>
               </a:ext>
             </a:extLst>
           </p:cNvPr>
@@ -11640,7 +13133,7 @@
     </p:spTree>
     <p:extLst>
       <p:ext uri="{BB962C8B-B14F-4D97-AF65-F5344CB8AC3E}">
-        <p14:creationId xmlns:p14="http://schemas.microsoft.com/office/powerpoint/2010/main" xmlns="" val="2890194562"/>
+        <p14:creationId xmlns:p14="http://schemas.microsoft.com/office/powerpoint/2010/main" val="2890194562"/>
       </p:ext>
     </p:extLst>
   </p:cSld>
@@ -11672,7 +13165,7 @@
           <p:cNvPr id="2" name="Title 1">
             <a:extLst>
               <a:ext uri="{FF2B5EF4-FFF2-40B4-BE49-F238E27FC236}">
-                <a16:creationId xmlns:a16="http://schemas.microsoft.com/office/drawing/2014/main" xmlns="" id="{21A6967F-1377-418C-8AE3-07CF05C4D443}"/>
+                <a16:creationId xmlns:a16="http://schemas.microsoft.com/office/drawing/2014/main" id="{21A6967F-1377-418C-8AE3-07CF05C4D443}"/>
               </a:ext>
             </a:extLst>
           </p:cNvPr>
@@ -11709,7 +13202,7 @@
           <p:cNvPr id="3" name="Content Placeholder 2">
             <a:extLst>
               <a:ext uri="{FF2B5EF4-FFF2-40B4-BE49-F238E27FC236}">
-                <a16:creationId xmlns:a16="http://schemas.microsoft.com/office/drawing/2014/main" xmlns="" id="{99FE211C-7B95-4EA0-8731-D1415685B26E}"/>
+                <a16:creationId xmlns:a16="http://schemas.microsoft.com/office/drawing/2014/main" id="{99FE211C-7B95-4EA0-8731-D1415685B26E}"/>
               </a:ext>
             </a:extLst>
           </p:cNvPr>
@@ -11799,7 +13292,7 @@
           <p:cNvPr id="4" name="Text Placeholder 3">
             <a:extLst>
               <a:ext uri="{FF2B5EF4-FFF2-40B4-BE49-F238E27FC236}">
-                <a16:creationId xmlns:a16="http://schemas.microsoft.com/office/drawing/2014/main" xmlns="" id="{24EB20D1-FA19-4724-A6C7-205288A96983}"/>
+                <a16:creationId xmlns:a16="http://schemas.microsoft.com/office/drawing/2014/main" id="{24EB20D1-FA19-4724-A6C7-205288A96983}"/>
               </a:ext>
             </a:extLst>
           </p:cNvPr>
@@ -11870,7 +13363,7 @@
           <p:cNvPr id="5" name="Date Placeholder 4">
             <a:extLst>
               <a:ext uri="{FF2B5EF4-FFF2-40B4-BE49-F238E27FC236}">
-                <a16:creationId xmlns:a16="http://schemas.microsoft.com/office/drawing/2014/main" xmlns="" id="{621DF5A2-3875-4250-B9BF-6EA5C13C2963}"/>
+                <a16:creationId xmlns:a16="http://schemas.microsoft.com/office/drawing/2014/main" id="{621DF5A2-3875-4250-B9BF-6EA5C13C2963}"/>
               </a:ext>
             </a:extLst>
           </p:cNvPr>
@@ -11889,7 +13382,7 @@
             <a:fld id="{E6D4E603-4EE0-40E2-B7C9-83790A703516}" type="datetimeFigureOut">
               <a:rPr lang="en-US" smtClean="0"/>
               <a:pPr/>
-              <a:t>8/17/2017</a:t>
+              <a:t>8/18/2017</a:t>
             </a:fld>
             <a:endParaRPr lang="en-US"/>
           </a:p>
@@ -11900,7 +13393,7 @@
           <p:cNvPr id="6" name="Footer Placeholder 5">
             <a:extLst>
               <a:ext uri="{FF2B5EF4-FFF2-40B4-BE49-F238E27FC236}">
-                <a16:creationId xmlns:a16="http://schemas.microsoft.com/office/drawing/2014/main" xmlns="" id="{CE3F64E2-FEB8-42B0-AE34-D3FAFCE8A5ED}"/>
+                <a16:creationId xmlns:a16="http://schemas.microsoft.com/office/drawing/2014/main" id="{CE3F64E2-FEB8-42B0-AE34-D3FAFCE8A5ED}"/>
               </a:ext>
             </a:extLst>
           </p:cNvPr>
@@ -11925,7 +13418,7 @@
           <p:cNvPr id="7" name="Slide Number Placeholder 6">
             <a:extLst>
               <a:ext uri="{FF2B5EF4-FFF2-40B4-BE49-F238E27FC236}">
-                <a16:creationId xmlns:a16="http://schemas.microsoft.com/office/drawing/2014/main" xmlns="" id="{F381DE2E-7DEC-45E6-933F-546A03CE4F94}"/>
+                <a16:creationId xmlns:a16="http://schemas.microsoft.com/office/drawing/2014/main" id="{F381DE2E-7DEC-45E6-933F-546A03CE4F94}"/>
               </a:ext>
             </a:extLst>
           </p:cNvPr>
@@ -11953,7 +13446,7 @@
     </p:spTree>
     <p:extLst>
       <p:ext uri="{BB962C8B-B14F-4D97-AF65-F5344CB8AC3E}">
-        <p14:creationId xmlns:p14="http://schemas.microsoft.com/office/powerpoint/2010/main" xmlns="" val="3009697738"/>
+        <p14:creationId xmlns:p14="http://schemas.microsoft.com/office/powerpoint/2010/main" val="3009697738"/>
       </p:ext>
     </p:extLst>
   </p:cSld>
@@ -11985,7 +13478,7 @@
           <p:cNvPr id="2" name="Title 1">
             <a:extLst>
               <a:ext uri="{FF2B5EF4-FFF2-40B4-BE49-F238E27FC236}">
-                <a16:creationId xmlns:a16="http://schemas.microsoft.com/office/drawing/2014/main" xmlns="" id="{25BFDB70-DBF3-49F4-AA2D-F2AA055F33A8}"/>
+                <a16:creationId xmlns:a16="http://schemas.microsoft.com/office/drawing/2014/main" id="{25BFDB70-DBF3-49F4-AA2D-F2AA055F33A8}"/>
               </a:ext>
             </a:extLst>
           </p:cNvPr>
@@ -12022,7 +13515,7 @@
           <p:cNvPr id="3" name="Picture Placeholder 2">
             <a:extLst>
               <a:ext uri="{FF2B5EF4-FFF2-40B4-BE49-F238E27FC236}">
-                <a16:creationId xmlns:a16="http://schemas.microsoft.com/office/drawing/2014/main" xmlns="" id="{3BDD6D66-0F90-4494-BE35-305EDE648A95}"/>
+                <a16:creationId xmlns:a16="http://schemas.microsoft.com/office/drawing/2014/main" id="{3BDD6D66-0F90-4494-BE35-305EDE648A95}"/>
               </a:ext>
             </a:extLst>
           </p:cNvPr>
@@ -12089,7 +13582,7 @@
           <p:cNvPr id="4" name="Text Placeholder 3">
             <a:extLst>
               <a:ext uri="{FF2B5EF4-FFF2-40B4-BE49-F238E27FC236}">
-                <a16:creationId xmlns:a16="http://schemas.microsoft.com/office/drawing/2014/main" xmlns="" id="{22E7657D-AC02-4323-A624-A74B23FC967D}"/>
+                <a16:creationId xmlns:a16="http://schemas.microsoft.com/office/drawing/2014/main" id="{22E7657D-AC02-4323-A624-A74B23FC967D}"/>
               </a:ext>
             </a:extLst>
           </p:cNvPr>
@@ -12160,7 +13653,7 @@
           <p:cNvPr id="5" name="Date Placeholder 4">
             <a:extLst>
               <a:ext uri="{FF2B5EF4-FFF2-40B4-BE49-F238E27FC236}">
-                <a16:creationId xmlns:a16="http://schemas.microsoft.com/office/drawing/2014/main" xmlns="" id="{CC51BB29-212E-4D67-AAE6-08B991F05273}"/>
+                <a16:creationId xmlns:a16="http://schemas.microsoft.com/office/drawing/2014/main" id="{CC51BB29-212E-4D67-AAE6-08B991F05273}"/>
               </a:ext>
             </a:extLst>
           </p:cNvPr>
@@ -12179,7 +13672,7 @@
             <a:fld id="{E6D4E603-4EE0-40E2-B7C9-83790A703516}" type="datetimeFigureOut">
               <a:rPr lang="en-US" smtClean="0"/>
               <a:pPr/>
-              <a:t>8/17/2017</a:t>
+              <a:t>8/18/2017</a:t>
             </a:fld>
             <a:endParaRPr lang="en-US"/>
           </a:p>
@@ -12190,7 +13683,7 @@
           <p:cNvPr id="6" name="Footer Placeholder 5">
             <a:extLst>
               <a:ext uri="{FF2B5EF4-FFF2-40B4-BE49-F238E27FC236}">
-                <a16:creationId xmlns:a16="http://schemas.microsoft.com/office/drawing/2014/main" xmlns="" id="{FAB97702-80C6-4694-9BAD-334D1CD8CF07}"/>
+                <a16:creationId xmlns:a16="http://schemas.microsoft.com/office/drawing/2014/main" id="{FAB97702-80C6-4694-9BAD-334D1CD8CF07}"/>
               </a:ext>
             </a:extLst>
           </p:cNvPr>
@@ -12215,7 +13708,7 @@
           <p:cNvPr id="7" name="Slide Number Placeholder 6">
             <a:extLst>
               <a:ext uri="{FF2B5EF4-FFF2-40B4-BE49-F238E27FC236}">
-                <a16:creationId xmlns:a16="http://schemas.microsoft.com/office/drawing/2014/main" xmlns="" id="{A538BE35-13A3-439F-942C-DA1DDA383C03}"/>
+                <a16:creationId xmlns:a16="http://schemas.microsoft.com/office/drawing/2014/main" id="{A538BE35-13A3-439F-942C-DA1DDA383C03}"/>
               </a:ext>
             </a:extLst>
           </p:cNvPr>
@@ -12243,7 +13736,7 @@
     </p:spTree>
     <p:extLst>
       <p:ext uri="{BB962C8B-B14F-4D97-AF65-F5344CB8AC3E}">
-        <p14:creationId xmlns:p14="http://schemas.microsoft.com/office/powerpoint/2010/main" xmlns="" val="1166235767"/>
+        <p14:creationId xmlns:p14="http://schemas.microsoft.com/office/powerpoint/2010/main" val="1166235767"/>
       </p:ext>
     </p:extLst>
   </p:cSld>
@@ -12290,7 +13783,7 @@
           <p:cNvPr id="2" name="Title Placeholder 1">
             <a:extLst>
               <a:ext uri="{FF2B5EF4-FFF2-40B4-BE49-F238E27FC236}">
-                <a16:creationId xmlns:a16="http://schemas.microsoft.com/office/drawing/2014/main" xmlns="" id="{C82D69AA-BE7F-452A-B294-D61FC8DDE2D8}"/>
+                <a16:creationId xmlns:a16="http://schemas.microsoft.com/office/drawing/2014/main" id="{C82D69AA-BE7F-452A-B294-D61FC8DDE2D8}"/>
               </a:ext>
             </a:extLst>
           </p:cNvPr>
@@ -12328,7 +13821,7 @@
           <p:cNvPr id="3" name="Text Placeholder 2">
             <a:extLst>
               <a:ext uri="{FF2B5EF4-FFF2-40B4-BE49-F238E27FC236}">
-                <a16:creationId xmlns:a16="http://schemas.microsoft.com/office/drawing/2014/main" xmlns="" id="{FE257F75-7085-4148-862D-74C15679C79B}"/>
+                <a16:creationId xmlns:a16="http://schemas.microsoft.com/office/drawing/2014/main" id="{FE257F75-7085-4148-862D-74C15679C79B}"/>
               </a:ext>
             </a:extLst>
           </p:cNvPr>
@@ -12395,7 +13888,7 @@
           <p:cNvPr id="4" name="Date Placeholder 3">
             <a:extLst>
               <a:ext uri="{FF2B5EF4-FFF2-40B4-BE49-F238E27FC236}">
-                <a16:creationId xmlns:a16="http://schemas.microsoft.com/office/drawing/2014/main" xmlns="" id="{BB32868B-87D3-41AB-AC95-A737859BBA60}"/>
+                <a16:creationId xmlns:a16="http://schemas.microsoft.com/office/drawing/2014/main" id="{BB32868B-87D3-41AB-AC95-A737859BBA60}"/>
               </a:ext>
             </a:extLst>
           </p:cNvPr>
@@ -12432,7 +13925,7 @@
             <a:fld id="{E6D4E603-4EE0-40E2-B7C9-83790A703516}" type="datetimeFigureOut">
               <a:rPr lang="en-US" smtClean="0"/>
               <a:pPr/>
-              <a:t>8/17/2017</a:t>
+              <a:t>8/18/2017</a:t>
             </a:fld>
             <a:endParaRPr lang="en-US"/>
           </a:p>
@@ -12443,7 +13936,7 @@
           <p:cNvPr id="5" name="Footer Placeholder 4">
             <a:extLst>
               <a:ext uri="{FF2B5EF4-FFF2-40B4-BE49-F238E27FC236}">
-                <a16:creationId xmlns:a16="http://schemas.microsoft.com/office/drawing/2014/main" xmlns="" id="{F70AFC56-CCB4-4482-AEDE-2F181185B988}"/>
+                <a16:creationId xmlns:a16="http://schemas.microsoft.com/office/drawing/2014/main" id="{F70AFC56-CCB4-4482-AEDE-2F181185B988}"/>
               </a:ext>
             </a:extLst>
           </p:cNvPr>
@@ -12486,7 +13979,7 @@
           <p:cNvPr id="6" name="Slide Number Placeholder 5">
             <a:extLst>
               <a:ext uri="{FF2B5EF4-FFF2-40B4-BE49-F238E27FC236}">
-                <a16:creationId xmlns:a16="http://schemas.microsoft.com/office/drawing/2014/main" xmlns="" id="{CCF8B899-6023-4B58-9D99-3526809F1EF4}"/>
+                <a16:creationId xmlns:a16="http://schemas.microsoft.com/office/drawing/2014/main" id="{CCF8B899-6023-4B58-9D99-3526809F1EF4}"/>
               </a:ext>
             </a:extLst>
           </p:cNvPr>
@@ -12532,7 +14025,7 @@
     </p:spTree>
     <p:extLst>
       <p:ext uri="{BB962C8B-B14F-4D97-AF65-F5344CB8AC3E}">
-        <p14:creationId xmlns:p14="http://schemas.microsoft.com/office/powerpoint/2010/main" xmlns="" val="2529691060"/>
+        <p14:creationId xmlns:p14="http://schemas.microsoft.com/office/powerpoint/2010/main" val="2529691060"/>
       </p:ext>
     </p:extLst>
   </p:cSld>
@@ -12855,7 +14348,7 @@
           <p:cNvPr id="5" name="Picture 4">
             <a:extLst>
               <a:ext uri="{FF2B5EF4-FFF2-40B4-BE49-F238E27FC236}">
-                <a16:creationId xmlns:a16="http://schemas.microsoft.com/office/drawing/2014/main" xmlns="" id="{CBDB7070-A119-4AC9-9F18-85F3EFE9C465}"/>
+                <a16:creationId xmlns:a16="http://schemas.microsoft.com/office/drawing/2014/main" id="{CBDB7070-A119-4AC9-9F18-85F3EFE9C465}"/>
               </a:ext>
             </a:extLst>
           </p:cNvPr>
@@ -12868,7 +14361,7 @@
           <a:blip r:embed="rId2">
             <a:extLst>
               <a:ext uri="{28A0092B-C50C-407E-A947-70E740481C1C}">
-                <a14:useLocalDpi xmlns:a14="http://schemas.microsoft.com/office/drawing/2010/main" xmlns="" val="0"/>
+                <a14:useLocalDpi xmlns:a14="http://schemas.microsoft.com/office/drawing/2010/main" val="0"/>
               </a:ext>
             </a:extLst>
           </a:blip>
@@ -12891,7 +14384,7 @@
           <p:cNvPr id="2" name="Title 1">
             <a:extLst>
               <a:ext uri="{FF2B5EF4-FFF2-40B4-BE49-F238E27FC236}">
-                <a16:creationId xmlns:a16="http://schemas.microsoft.com/office/drawing/2014/main" xmlns="" id="{D8295AAC-1871-4C58-9FAB-A2582EB1BE4F}"/>
+                <a16:creationId xmlns:a16="http://schemas.microsoft.com/office/drawing/2014/main" id="{D8295AAC-1871-4C58-9FAB-A2582EB1BE4F}"/>
               </a:ext>
             </a:extLst>
           </p:cNvPr>
@@ -12946,7 +14439,7 @@
           <p:cNvPr id="3" name="Subtitle 2">
             <a:extLst>
               <a:ext uri="{FF2B5EF4-FFF2-40B4-BE49-F238E27FC236}">
-                <a16:creationId xmlns:a16="http://schemas.microsoft.com/office/drawing/2014/main" xmlns="" id="{79848AE3-6A69-4849-9758-6089035C229E}"/>
+                <a16:creationId xmlns:a16="http://schemas.microsoft.com/office/drawing/2014/main" id="{79848AE3-6A69-4849-9758-6089035C229E}"/>
               </a:ext>
             </a:extLst>
           </p:cNvPr>
@@ -13098,20 +14591,13 @@
     </p:spTree>
     <p:extLst>
       <p:ext uri="{BB962C8B-B14F-4D97-AF65-F5344CB8AC3E}">
-        <p14:creationId xmlns:p14="http://schemas.microsoft.com/office/powerpoint/2010/main" xmlns="" val="738401949"/>
+        <p14:creationId xmlns:p14="http://schemas.microsoft.com/office/powerpoint/2010/main" val="738401949"/>
       </p:ext>
     </p:extLst>
   </p:cSld>
   <p:clrMapOvr>
     <a:masterClrMapping/>
   </p:clrMapOvr>
-  <p:timing>
-    <p:tnLst>
-      <p:par>
-        <p:cTn id="1" dur="indefinite" restart="never" nodeType="tmRoot"/>
-      </p:par>
-    </p:tnLst>
-  </p:timing>
 </p:sld>
 </file>
 
@@ -13137,7 +14623,7 @@
           <p:cNvPr id="5" name="Picture 4">
             <a:extLst>
               <a:ext uri="{FF2B5EF4-FFF2-40B4-BE49-F238E27FC236}">
-                <a16:creationId xmlns:a16="http://schemas.microsoft.com/office/drawing/2014/main" xmlns="" id="{CBDB7070-A119-4AC9-9F18-85F3EFE9C465}"/>
+                <a16:creationId xmlns:a16="http://schemas.microsoft.com/office/drawing/2014/main" id="{CBDB7070-A119-4AC9-9F18-85F3EFE9C465}"/>
               </a:ext>
             </a:extLst>
           </p:cNvPr>
@@ -13150,7 +14636,7 @@
           <a:blip r:embed="rId2">
             <a:extLst>
               <a:ext uri="{28A0092B-C50C-407E-A947-70E740481C1C}">
-                <a14:useLocalDpi xmlns:a14="http://schemas.microsoft.com/office/drawing/2010/main" xmlns="" val="0"/>
+                <a14:useLocalDpi xmlns:a14="http://schemas.microsoft.com/office/drawing/2010/main" val="0"/>
               </a:ext>
             </a:extLst>
           </a:blip>
@@ -13173,7 +14659,7 @@
           <p:cNvPr id="9" name="Title 1">
             <a:extLst>
               <a:ext uri="{FF2B5EF4-FFF2-40B4-BE49-F238E27FC236}">
-                <a16:creationId xmlns:a16="http://schemas.microsoft.com/office/drawing/2014/main" xmlns="" id="{C22D3CD9-B6DF-4688-B616-7F37AEC6565E}"/>
+                <a16:creationId xmlns:a16="http://schemas.microsoft.com/office/drawing/2014/main" id="{C22D3CD9-B6DF-4688-B616-7F37AEC6565E}"/>
               </a:ext>
             </a:extLst>
           </p:cNvPr>
@@ -13215,7 +14701,7 @@
               <a:defRPr/>
             </a:pPr>
             <a:r>
-              <a:rPr kumimoji="0" lang="en-US" sz="6000" b="0" i="0" u="none" strike="noStrike" kern="1200" cap="none" spc="0" normalizeH="0" baseline="0" noProof="0" dirty="0" smtClean="0">
+              <a:rPr kumimoji="0" lang="en-US" sz="6000" b="0" i="0" u="none" strike="noStrike" kern="1200" cap="none" spc="0" normalizeH="0" baseline="0" noProof="0" dirty="0">
                 <a:ln>
                   <a:noFill/>
                 </a:ln>
@@ -13231,20 +14717,6 @@
               </a:rPr>
               <a:t>OVERVIEW</a:t>
             </a:r>
-            <a:endParaRPr kumimoji="0" lang="en-US" sz="6000" b="0" i="0" u="none" strike="noStrike" kern="1200" cap="none" spc="0" normalizeH="0" baseline="0" noProof="0" dirty="0">
-              <a:ln>
-                <a:noFill/>
-              </a:ln>
-              <a:solidFill>
-                <a:schemeClr val="bg1"/>
-              </a:solidFill>
-              <a:effectLst/>
-              <a:uLnTx/>
-              <a:uFillTx/>
-              <a:latin typeface="IRON MAN OF WAR 002 NCV" pitchFamily="2" charset="0"/>
-              <a:ea typeface="+mj-ea"/>
-              <a:cs typeface="+mj-cs"/>
-            </a:endParaRPr>
           </a:p>
         </p:txBody>
       </p:sp>
@@ -13267,20 +14739,13 @@
     </p:spTree>
     <p:extLst>
       <p:ext uri="{BB962C8B-B14F-4D97-AF65-F5344CB8AC3E}">
-        <p14:creationId xmlns:p14="http://schemas.microsoft.com/office/powerpoint/2010/main" xmlns="" val="738401949"/>
+        <p14:creationId xmlns:p14="http://schemas.microsoft.com/office/powerpoint/2010/main" val="738401949"/>
       </p:ext>
     </p:extLst>
   </p:cSld>
   <p:clrMapOvr>
     <a:masterClrMapping/>
   </p:clrMapOvr>
-  <p:timing>
-    <p:tnLst>
-      <p:par>
-        <p:cTn id="1" dur="indefinite" restart="never" nodeType="tmRoot"/>
-      </p:par>
-    </p:tnLst>
-  </p:timing>
 </p:sld>
 </file>
 
@@ -13306,7 +14771,7 @@
           <p:cNvPr id="5" name="Picture 4">
             <a:extLst>
               <a:ext uri="{FF2B5EF4-FFF2-40B4-BE49-F238E27FC236}">
-                <a16:creationId xmlns:a16="http://schemas.microsoft.com/office/drawing/2014/main" xmlns="" id="{CBDB7070-A119-4AC9-9F18-85F3EFE9C465}"/>
+                <a16:creationId xmlns:a16="http://schemas.microsoft.com/office/drawing/2014/main" id="{CBDB7070-A119-4AC9-9F18-85F3EFE9C465}"/>
               </a:ext>
             </a:extLst>
           </p:cNvPr>
@@ -13319,7 +14784,7 @@
           <a:blip r:embed="rId2">
             <a:extLst>
               <a:ext uri="{28A0092B-C50C-407E-A947-70E740481C1C}">
-                <a14:useLocalDpi xmlns:a14="http://schemas.microsoft.com/office/drawing/2010/main" xmlns="" val="0"/>
+                <a14:useLocalDpi xmlns:a14="http://schemas.microsoft.com/office/drawing/2010/main" val="0"/>
               </a:ext>
             </a:extLst>
           </a:blip>
@@ -13342,7 +14807,7 @@
           <p:cNvPr id="9" name="Title 1">
             <a:extLst>
               <a:ext uri="{FF2B5EF4-FFF2-40B4-BE49-F238E27FC236}">
-                <a16:creationId xmlns:a16="http://schemas.microsoft.com/office/drawing/2014/main" xmlns="" id="{C22D3CD9-B6DF-4688-B616-7F37AEC6565E}"/>
+                <a16:creationId xmlns:a16="http://schemas.microsoft.com/office/drawing/2014/main" id="{C22D3CD9-B6DF-4688-B616-7F37AEC6565E}"/>
               </a:ext>
             </a:extLst>
           </p:cNvPr>
@@ -13384,7 +14849,7 @@
               <a:defRPr/>
             </a:pPr>
             <a:r>
-              <a:rPr kumimoji="0" lang="en-US" sz="6000" b="0" i="0" u="none" strike="noStrike" kern="1200" cap="none" spc="0" normalizeH="0" baseline="0" noProof="0" dirty="0" smtClean="0">
+              <a:rPr kumimoji="0" lang="en-US" sz="6000" b="0" i="0" u="none" strike="noStrike" kern="1200" cap="none" spc="0" normalizeH="0" baseline="0" noProof="0" dirty="0">
                 <a:ln>
                   <a:noFill/>
                 </a:ln>
@@ -13400,20 +14865,6 @@
               </a:rPr>
               <a:t>Planning</a:t>
             </a:r>
-            <a:endParaRPr kumimoji="0" lang="en-US" sz="6000" b="0" i="0" u="none" strike="noStrike" kern="1200" cap="none" spc="0" normalizeH="0" baseline="0" noProof="0" dirty="0">
-              <a:ln>
-                <a:noFill/>
-              </a:ln>
-              <a:solidFill>
-                <a:schemeClr val="bg1"/>
-              </a:solidFill>
-              <a:effectLst/>
-              <a:uLnTx/>
-              <a:uFillTx/>
-              <a:latin typeface="IRON MAN OF WAR 002 NCV" pitchFamily="2" charset="0"/>
-              <a:ea typeface="+mj-ea"/>
-              <a:cs typeface="+mj-cs"/>
-            </a:endParaRPr>
           </a:p>
         </p:txBody>
       </p:sp>
@@ -13436,20 +14887,13 @@
     </p:spTree>
     <p:extLst>
       <p:ext uri="{BB962C8B-B14F-4D97-AF65-F5344CB8AC3E}">
-        <p14:creationId xmlns:p14="http://schemas.microsoft.com/office/powerpoint/2010/main" xmlns="" val="738401949"/>
+        <p14:creationId xmlns:p14="http://schemas.microsoft.com/office/powerpoint/2010/main" val="738401949"/>
       </p:ext>
     </p:extLst>
   </p:cSld>
   <p:clrMapOvr>
     <a:masterClrMapping/>
   </p:clrMapOvr>
-  <p:timing>
-    <p:tnLst>
-      <p:par>
-        <p:cTn id="1" dur="indefinite" restart="never" nodeType="tmRoot"/>
-      </p:par>
-    </p:tnLst>
-  </p:timing>
 </p:sld>
 </file>
 
@@ -13475,7 +14919,7 @@
           <p:cNvPr id="5" name="Picture 4">
             <a:extLst>
               <a:ext uri="{FF2B5EF4-FFF2-40B4-BE49-F238E27FC236}">
-                <a16:creationId xmlns:a16="http://schemas.microsoft.com/office/drawing/2014/main" xmlns="" id="{CBDB7070-A119-4AC9-9F18-85F3EFE9C465}"/>
+                <a16:creationId xmlns:a16="http://schemas.microsoft.com/office/drawing/2014/main" id="{CBDB7070-A119-4AC9-9F18-85F3EFE9C465}"/>
               </a:ext>
             </a:extLst>
           </p:cNvPr>
@@ -13488,7 +14932,7 @@
           <a:blip r:embed="rId2">
             <a:extLst>
               <a:ext uri="{28A0092B-C50C-407E-A947-70E740481C1C}">
-                <a14:useLocalDpi xmlns:a14="http://schemas.microsoft.com/office/drawing/2010/main" xmlns="" val="0"/>
+                <a14:useLocalDpi xmlns:a14="http://schemas.microsoft.com/office/drawing/2010/main" val="0"/>
               </a:ext>
             </a:extLst>
           </a:blip>
@@ -13508,26 +14952,28 @@
       </p:pic>
       <p:pic>
         <p:nvPicPr>
-          <p:cNvPr id="6" name="Picture 5"/>
-          <p:cNvPicPr/>
+          <p:cNvPr id="2" name="Picture 1">
+            <a:extLst>
+              <a:ext uri="{FF2B5EF4-FFF2-40B4-BE49-F238E27FC236}">
+                <a16:creationId xmlns:a16="http://schemas.microsoft.com/office/drawing/2014/main" id="{82B2FCBC-7177-4776-9697-F6ED498E83C9}"/>
+              </a:ext>
+            </a:extLst>
+          </p:cNvPr>
+          <p:cNvPicPr>
+            <a:picLocks noChangeAspect="1"/>
+          </p:cNvPicPr>
           <p:nvPr/>
         </p:nvPicPr>
         <p:blipFill>
-          <a:blip r:embed="rId3">
-            <a:extLst>
-              <a:ext uri="{28A0092B-C50C-407E-A947-70E740481C1C}">
-                <a14:useLocalDpi xmlns="" xmlns:wpc="http://schemas.microsoft.com/office/word/2010/wordprocessingCanvas" xmlns:cx="http://schemas.microsoft.com/office/drawing/2014/chartex" xmlns:cx1="http://schemas.microsoft.com/office/drawing/2015/9/8/chartex" xmlns:cx2="http://schemas.microsoft.com/office/drawing/2015/10/21/chartex" xmlns:cx3="http://schemas.microsoft.com/office/drawing/2016/5/9/chartex" xmlns:cx4="http://schemas.microsoft.com/office/drawing/2016/5/10/chartex" xmlns:cx5="http://schemas.microsoft.com/office/drawing/2016/5/11/chartex" xmlns:cx6="http://schemas.microsoft.com/office/drawing/2016/5/12/chartex" xmlns:cx7="http://schemas.microsoft.com/office/drawing/2016/5/13/chartex" xmlns:cx8="http://schemas.microsoft.com/office/drawing/2016/5/14/chartex" xmlns:mc="http://schemas.openxmlformats.org/markup-compatibility/2006" xmlns:aink="http://schemas.microsoft.com/office/drawing/2016/ink" xmlns:am3d="http://schemas.microsoft.com/office/drawing/2017/model3d" xmlns:o="urn:schemas-microsoft-com:office:office" xmlns:m="http://schemas.openxmlformats.org/officeDocument/2006/math" xmlns:v="urn:schemas-microsoft-com:vml" xmlns:wp14="http://schemas.microsoft.com/office/word/2010/wordprocessingDrawing" xmlns:wp="http://schemas.openxmlformats.org/drawingml/2006/wordprocessingDrawing" xmlns:w10="urn:schemas-microsoft-com:office:word" xmlns:w="http://schemas.openxmlformats.org/wordprocessingml/2006/main" xmlns:w14="http://schemas.microsoft.com/office/word/2010/wordml" xmlns:w15="http://schemas.microsoft.com/office/word/2012/wordml" xmlns:w16cid="http://schemas.microsoft.com/office/word/2016/wordml/cid" xmlns:w16se="http://schemas.microsoft.com/office/word/2015/wordml/symex" xmlns:wpg="http://schemas.microsoft.com/office/word/2010/wordprocessingGroup" xmlns:wpi="http://schemas.microsoft.com/office/word/2010/wordprocessingInk" xmlns:wne="http://schemas.microsoft.com/office/word/2006/wordml" xmlns:wps="http://schemas.microsoft.com/office/word/2010/wordprocessingShape" xmlns:a14="http://schemas.microsoft.com/office/drawing/2010/main" xmlns:pic="http://schemas.openxmlformats.org/drawingml/2006/picture" xmlns:lc="http://schemas.openxmlformats.org/drawingml/2006/lockedCanvas" val="0"/>
-              </a:ext>
-            </a:extLst>
-          </a:blip>
+          <a:blip r:embed="rId3"/>
           <a:stretch>
             <a:fillRect/>
           </a:stretch>
         </p:blipFill>
         <p:spPr>
           <a:xfrm>
-            <a:off x="430305" y="403412"/>
-            <a:ext cx="11161059" cy="6239435"/>
+            <a:off x="0" y="632471"/>
+            <a:ext cx="12192000" cy="5593058"/>
           </a:xfrm>
           <a:prstGeom prst="rect">
             <a:avLst/>
@@ -13537,20 +14983,13 @@
     </p:spTree>
     <p:extLst>
       <p:ext uri="{BB962C8B-B14F-4D97-AF65-F5344CB8AC3E}">
-        <p14:creationId xmlns:p14="http://schemas.microsoft.com/office/powerpoint/2010/main" xmlns="" val="738401949"/>
+        <p14:creationId xmlns:p14="http://schemas.microsoft.com/office/powerpoint/2010/main" val="738401949"/>
       </p:ext>
     </p:extLst>
   </p:cSld>
   <p:clrMapOvr>
     <a:masterClrMapping/>
   </p:clrMapOvr>
-  <p:timing>
-    <p:tnLst>
-      <p:par>
-        <p:cTn id="1" dur="indefinite" restart="never" nodeType="tmRoot"/>
-      </p:par>
-    </p:tnLst>
-  </p:timing>
 </p:sld>
 </file>
 
@@ -13576,7 +15015,7 @@
           <p:cNvPr id="5" name="Picture 4">
             <a:extLst>
               <a:ext uri="{FF2B5EF4-FFF2-40B4-BE49-F238E27FC236}">
-                <a16:creationId xmlns:a16="http://schemas.microsoft.com/office/drawing/2014/main" xmlns="" id="{CBDB7070-A119-4AC9-9F18-85F3EFE9C465}"/>
+                <a16:creationId xmlns:a16="http://schemas.microsoft.com/office/drawing/2014/main" id="{CBDB7070-A119-4AC9-9F18-85F3EFE9C465}"/>
               </a:ext>
             </a:extLst>
           </p:cNvPr>
@@ -13589,7 +15028,7 @@
           <a:blip r:embed="rId2">
             <a:extLst>
               <a:ext uri="{28A0092B-C50C-407E-A947-70E740481C1C}">
-                <a14:useLocalDpi xmlns:a14="http://schemas.microsoft.com/office/drawing/2010/main" xmlns="" val="0"/>
+                <a14:useLocalDpi xmlns:a14="http://schemas.microsoft.com/office/drawing/2010/main" val="0"/>
               </a:ext>
             </a:extLst>
           </a:blip>
@@ -13612,7 +15051,7 @@
           <p:cNvPr id="4" name="Title 1">
             <a:extLst>
               <a:ext uri="{FF2B5EF4-FFF2-40B4-BE49-F238E27FC236}">
-                <a16:creationId xmlns:a16="http://schemas.microsoft.com/office/drawing/2014/main" xmlns="" id="{C22D3CD9-B6DF-4688-B616-7F37AEC6565E}"/>
+                <a16:creationId xmlns:a16="http://schemas.microsoft.com/office/drawing/2014/main" id="{C22D3CD9-B6DF-4688-B616-7F37AEC6565E}"/>
               </a:ext>
             </a:extLst>
           </p:cNvPr>
@@ -13654,7 +15093,7 @@
               <a:defRPr/>
             </a:pPr>
             <a:r>
-              <a:rPr kumimoji="0" lang="en-US" sz="6000" b="0" i="0" u="none" strike="noStrike" kern="1200" cap="none" spc="0" normalizeH="0" baseline="0" noProof="0" dirty="0" smtClean="0">
+              <a:rPr kumimoji="0" lang="en-US" sz="6000" b="0" i="0" u="none" strike="noStrike" kern="1200" cap="none" spc="0" normalizeH="0" baseline="0" noProof="0" dirty="0">
                 <a:ln>
                   <a:noFill/>
                 </a:ln>
@@ -13670,20 +15109,6 @@
               </a:rPr>
               <a:t>instructions</a:t>
             </a:r>
-            <a:endParaRPr kumimoji="0" lang="en-US" sz="6000" b="0" i="0" u="none" strike="noStrike" kern="1200" cap="none" spc="0" normalizeH="0" baseline="0" noProof="0" dirty="0">
-              <a:ln>
-                <a:noFill/>
-              </a:ln>
-              <a:solidFill>
-                <a:schemeClr val="bg1"/>
-              </a:solidFill>
-              <a:effectLst/>
-              <a:uLnTx/>
-              <a:uFillTx/>
-              <a:latin typeface="IRON MAN OF WAR 002 NCV" pitchFamily="2" charset="0"/>
-              <a:ea typeface="+mj-ea"/>
-              <a:cs typeface="+mj-cs"/>
-            </a:endParaRPr>
           </a:p>
         </p:txBody>
       </p:sp>
@@ -13718,7 +15143,7 @@
           <p:cNvPr id="7" name="Picture 6">
             <a:extLst>
               <a:ext uri="{FF2B5EF4-FFF2-40B4-BE49-F238E27FC236}">
-                <a16:creationId xmlns:a16="http://schemas.microsoft.com/office/drawing/2014/main" xmlns="" id="{AF407492-C163-4CA4-BC69-9CC2BA196E14}"/>
+                <a16:creationId xmlns:a16="http://schemas.microsoft.com/office/drawing/2014/main" id="{AF407492-C163-4CA4-BC69-9CC2BA196E14}"/>
               </a:ext>
             </a:extLst>
           </p:cNvPr>
@@ -13731,7 +15156,7 @@
           <a:blip r:embed="rId4">
             <a:extLst>
               <a:ext uri="{28A0092B-C50C-407E-A947-70E740481C1C}">
-                <a14:useLocalDpi xmlns:a14="http://schemas.microsoft.com/office/drawing/2010/main" xmlns="" val="0"/>
+                <a14:useLocalDpi xmlns:a14="http://schemas.microsoft.com/office/drawing/2010/main" val="0"/>
               </a:ext>
             </a:extLst>
           </a:blip>
@@ -13752,20 +15177,13 @@
     </p:spTree>
     <p:extLst>
       <p:ext uri="{BB962C8B-B14F-4D97-AF65-F5344CB8AC3E}">
-        <p14:creationId xmlns:p14="http://schemas.microsoft.com/office/powerpoint/2010/main" xmlns="" val="738401949"/>
+        <p14:creationId xmlns:p14="http://schemas.microsoft.com/office/powerpoint/2010/main" val="738401949"/>
       </p:ext>
     </p:extLst>
   </p:cSld>
   <p:clrMapOvr>
     <a:masterClrMapping/>
   </p:clrMapOvr>
-  <p:timing>
-    <p:tnLst>
-      <p:par>
-        <p:cTn id="1" dur="indefinite" restart="never" nodeType="tmRoot"/>
-      </p:par>
-    </p:tnLst>
-  </p:timing>
 </p:sld>
 </file>
 
@@ -13791,7 +15209,7 @@
           <p:cNvPr id="5" name="Picture 4">
             <a:extLst>
               <a:ext uri="{FF2B5EF4-FFF2-40B4-BE49-F238E27FC236}">
-                <a16:creationId xmlns:a16="http://schemas.microsoft.com/office/drawing/2014/main" xmlns="" id="{CBDB7070-A119-4AC9-9F18-85F3EFE9C465}"/>
+                <a16:creationId xmlns:a16="http://schemas.microsoft.com/office/drawing/2014/main" id="{CBDB7070-A119-4AC9-9F18-85F3EFE9C465}"/>
               </a:ext>
             </a:extLst>
           </p:cNvPr>
@@ -13804,7 +15222,7 @@
           <a:blip r:embed="rId2">
             <a:extLst>
               <a:ext uri="{28A0092B-C50C-407E-A947-70E740481C1C}">
-                <a14:useLocalDpi xmlns:a14="http://schemas.microsoft.com/office/drawing/2010/main" xmlns="" val="0"/>
+                <a14:useLocalDpi xmlns:a14="http://schemas.microsoft.com/office/drawing/2010/main" val="0"/>
               </a:ext>
             </a:extLst>
           </a:blip>
@@ -13827,7 +15245,7 @@
           <p:cNvPr id="4" name="Title 1">
             <a:extLst>
               <a:ext uri="{FF2B5EF4-FFF2-40B4-BE49-F238E27FC236}">
-                <a16:creationId xmlns:a16="http://schemas.microsoft.com/office/drawing/2014/main" xmlns="" id="{C22D3CD9-B6DF-4688-B616-7F37AEC6565E}"/>
+                <a16:creationId xmlns:a16="http://schemas.microsoft.com/office/drawing/2014/main" id="{C22D3CD9-B6DF-4688-B616-7F37AEC6565E}"/>
               </a:ext>
             </a:extLst>
           </p:cNvPr>
@@ -13869,7 +15287,7 @@
               <a:defRPr/>
             </a:pPr>
             <a:r>
-              <a:rPr kumimoji="0" lang="en-US" sz="6000" b="0" i="0" u="none" strike="noStrike" kern="1200" cap="none" spc="0" normalizeH="0" baseline="0" noProof="0" dirty="0" smtClean="0">
+              <a:rPr kumimoji="0" lang="en-US" sz="6000" b="0" i="0" u="none" strike="noStrike" kern="1200" cap="none" spc="0" normalizeH="0" baseline="0" noProof="0" dirty="0">
                 <a:ln>
                   <a:noFill/>
                 </a:ln>
@@ -13885,40 +15303,19 @@
               </a:rPr>
               <a:t>DEMO!</a:t>
             </a:r>
-            <a:endParaRPr kumimoji="0" lang="en-US" sz="6000" b="0" i="0" u="none" strike="noStrike" kern="1200" cap="none" spc="0" normalizeH="0" baseline="0" noProof="0" dirty="0">
-              <a:ln>
-                <a:noFill/>
-              </a:ln>
-              <a:solidFill>
-                <a:schemeClr val="bg1"/>
-              </a:solidFill>
-              <a:effectLst/>
-              <a:uLnTx/>
-              <a:uFillTx/>
-              <a:latin typeface="IRON MAN OF WAR 002 NCV" pitchFamily="2" charset="0"/>
-              <a:ea typeface="+mj-ea"/>
-              <a:cs typeface="+mj-cs"/>
-            </a:endParaRPr>
           </a:p>
         </p:txBody>
       </p:sp>
     </p:spTree>
     <p:extLst>
       <p:ext uri="{BB962C8B-B14F-4D97-AF65-F5344CB8AC3E}">
-        <p14:creationId xmlns:p14="http://schemas.microsoft.com/office/powerpoint/2010/main" xmlns="" val="738401949"/>
+        <p14:creationId xmlns:p14="http://schemas.microsoft.com/office/powerpoint/2010/main" val="738401949"/>
       </p:ext>
     </p:extLst>
   </p:cSld>
   <p:clrMapOvr>
     <a:masterClrMapping/>
   </p:clrMapOvr>
-  <p:timing>
-    <p:tnLst>
-      <p:par>
-        <p:cTn id="1" dur="indefinite" restart="never" nodeType="tmRoot"/>
-      </p:par>
-    </p:tnLst>
-  </p:timing>
 </p:sld>
 </file>
 
@@ -13944,7 +15341,7 @@
           <p:cNvPr id="5" name="Picture 4">
             <a:extLst>
               <a:ext uri="{FF2B5EF4-FFF2-40B4-BE49-F238E27FC236}">
-                <a16:creationId xmlns:a16="http://schemas.microsoft.com/office/drawing/2014/main" xmlns="" id="{CBDB7070-A119-4AC9-9F18-85F3EFE9C465}"/>
+                <a16:creationId xmlns:a16="http://schemas.microsoft.com/office/drawing/2014/main" id="{CBDB7070-A119-4AC9-9F18-85F3EFE9C465}"/>
               </a:ext>
             </a:extLst>
           </p:cNvPr>
@@ -13957,7 +15354,7 @@
           <a:blip r:embed="rId2">
             <a:extLst>
               <a:ext uri="{28A0092B-C50C-407E-A947-70E740481C1C}">
-                <a14:useLocalDpi xmlns:a14="http://schemas.microsoft.com/office/drawing/2010/main" xmlns="" val="0"/>
+                <a14:useLocalDpi xmlns:a14="http://schemas.microsoft.com/office/drawing/2010/main" val="0"/>
               </a:ext>
             </a:extLst>
           </a:blip>
@@ -13980,7 +15377,7 @@
           <p:cNvPr id="6" name="Title 1">
             <a:extLst>
               <a:ext uri="{FF2B5EF4-FFF2-40B4-BE49-F238E27FC236}">
-                <a16:creationId xmlns:a16="http://schemas.microsoft.com/office/drawing/2014/main" xmlns="" id="{C22D3CD9-B6DF-4688-B616-7F37AEC6565E}"/>
+                <a16:creationId xmlns:a16="http://schemas.microsoft.com/office/drawing/2014/main" id="{C22D3CD9-B6DF-4688-B616-7F37AEC6565E}"/>
               </a:ext>
             </a:extLst>
           </p:cNvPr>
@@ -14022,7 +15419,7 @@
               <a:defRPr/>
             </a:pPr>
             <a:r>
-              <a:rPr kumimoji="0" lang="en-US" sz="6000" b="0" i="0" u="none" strike="noStrike" kern="1200" cap="none" spc="0" normalizeH="0" baseline="0" noProof="0" dirty="0" smtClean="0">
+              <a:rPr kumimoji="0" lang="en-US" sz="6000" b="0" i="0" u="none" strike="noStrike" kern="1200" cap="none" spc="0" normalizeH="0" baseline="0" noProof="0" dirty="0">
                 <a:ln>
                   <a:noFill/>
                 </a:ln>
@@ -14038,20 +15435,6 @@
               </a:rPr>
               <a:t>Lessons learned</a:t>
             </a:r>
-            <a:endParaRPr kumimoji="0" lang="en-US" sz="6000" b="0" i="0" u="none" strike="noStrike" kern="1200" cap="none" spc="0" normalizeH="0" baseline="0" noProof="0" dirty="0">
-              <a:ln>
-                <a:noFill/>
-              </a:ln>
-              <a:solidFill>
-                <a:schemeClr val="bg1"/>
-              </a:solidFill>
-              <a:effectLst/>
-              <a:uLnTx/>
-              <a:uFillTx/>
-              <a:latin typeface="IRON MAN OF WAR 002 NCV" pitchFamily="2" charset="0"/>
-              <a:ea typeface="+mj-ea"/>
-              <a:cs typeface="+mj-cs"/>
-            </a:endParaRPr>
           </a:p>
         </p:txBody>
       </p:sp>
@@ -14074,20 +15457,13 @@
     </p:spTree>
     <p:extLst>
       <p:ext uri="{BB962C8B-B14F-4D97-AF65-F5344CB8AC3E}">
-        <p14:creationId xmlns:p14="http://schemas.microsoft.com/office/powerpoint/2010/main" xmlns="" val="738401949"/>
+        <p14:creationId xmlns:p14="http://schemas.microsoft.com/office/powerpoint/2010/main" val="738401949"/>
       </p:ext>
     </p:extLst>
   </p:cSld>
   <p:clrMapOvr>
     <a:masterClrMapping/>
   </p:clrMapOvr>
-  <p:timing>
-    <p:tnLst>
-      <p:par>
-        <p:cTn id="1" dur="indefinite" restart="never" nodeType="tmRoot"/>
-      </p:par>
-    </p:tnLst>
-  </p:timing>
 </p:sld>
 </file>
 
@@ -14113,7 +15489,7 @@
           <p:cNvPr id="5" name="Picture 4">
             <a:extLst>
               <a:ext uri="{FF2B5EF4-FFF2-40B4-BE49-F238E27FC236}">
-                <a16:creationId xmlns:a16="http://schemas.microsoft.com/office/drawing/2014/main" xmlns="" id="{CBDB7070-A119-4AC9-9F18-85F3EFE9C465}"/>
+                <a16:creationId xmlns:a16="http://schemas.microsoft.com/office/drawing/2014/main" id="{CBDB7070-A119-4AC9-9F18-85F3EFE9C465}"/>
               </a:ext>
             </a:extLst>
           </p:cNvPr>
@@ -14126,7 +15502,7 @@
           <a:blip r:embed="rId2">
             <a:extLst>
               <a:ext uri="{28A0092B-C50C-407E-A947-70E740481C1C}">
-                <a14:useLocalDpi xmlns:a14="http://schemas.microsoft.com/office/drawing/2010/main" xmlns="" val="0"/>
+                <a14:useLocalDpi xmlns:a14="http://schemas.microsoft.com/office/drawing/2010/main" val="0"/>
               </a:ext>
             </a:extLst>
           </a:blip>
@@ -14149,7 +15525,7 @@
           <p:cNvPr id="6" name="Title 1">
             <a:extLst>
               <a:ext uri="{FF2B5EF4-FFF2-40B4-BE49-F238E27FC236}">
-                <a16:creationId xmlns:a16="http://schemas.microsoft.com/office/drawing/2014/main" xmlns="" id="{C22D3CD9-B6DF-4688-B616-7F37AEC6565E}"/>
+                <a16:creationId xmlns:a16="http://schemas.microsoft.com/office/drawing/2014/main" id="{C22D3CD9-B6DF-4688-B616-7F37AEC6565E}"/>
               </a:ext>
             </a:extLst>
           </p:cNvPr>
@@ -14191,7 +15567,7 @@
               <a:defRPr/>
             </a:pPr>
             <a:r>
-              <a:rPr kumimoji="0" lang="en-US" sz="6000" b="0" i="0" u="none" strike="noStrike" kern="1200" cap="none" spc="0" normalizeH="0" baseline="0" noProof="0" dirty="0" smtClean="0">
+              <a:rPr kumimoji="0" lang="en-US" sz="6000" b="0" i="0" u="none" strike="noStrike" kern="1200" cap="none" spc="0" normalizeH="0" baseline="0" noProof="0" dirty="0">
                 <a:ln>
                   <a:noFill/>
                 </a:ln>
@@ -14207,20 +15583,6 @@
               </a:rPr>
               <a:t>Future possibilities</a:t>
             </a:r>
-            <a:endParaRPr kumimoji="0" lang="en-US" sz="6000" b="0" i="0" u="none" strike="noStrike" kern="1200" cap="none" spc="0" normalizeH="0" baseline="0" noProof="0" dirty="0">
-              <a:ln>
-                <a:noFill/>
-              </a:ln>
-              <a:solidFill>
-                <a:schemeClr val="bg1"/>
-              </a:solidFill>
-              <a:effectLst/>
-              <a:uLnTx/>
-              <a:uFillTx/>
-              <a:latin typeface="IRON MAN OF WAR 002 NCV" pitchFamily="2" charset="0"/>
-              <a:ea typeface="+mj-ea"/>
-              <a:cs typeface="+mj-cs"/>
-            </a:endParaRPr>
           </a:p>
         </p:txBody>
       </p:sp>
@@ -14243,20 +15605,13 @@
     </p:spTree>
     <p:extLst>
       <p:ext uri="{BB962C8B-B14F-4D97-AF65-F5344CB8AC3E}">
-        <p14:creationId xmlns:p14="http://schemas.microsoft.com/office/powerpoint/2010/main" xmlns="" val="738401949"/>
+        <p14:creationId xmlns:p14="http://schemas.microsoft.com/office/powerpoint/2010/main" val="738401949"/>
       </p:ext>
     </p:extLst>
   </p:cSld>
   <p:clrMapOvr>
     <a:masterClrMapping/>
   </p:clrMapOvr>
-  <p:timing>
-    <p:tnLst>
-      <p:par>
-        <p:cTn id="1" dur="indefinite" restart="never" nodeType="tmRoot"/>
-      </p:par>
-    </p:tnLst>
-  </p:timing>
 </p:sld>
 </file>
 
@@ -14549,7 +15904,7 @@
   <a:extraClrSchemeLst/>
   <a:extLst>
     <a:ext uri="{05A4C25C-085E-4340-85A3-A5531E510DB2}">
-      <thm15:themeFamily xmlns:thm15="http://schemas.microsoft.com/office/thememl/2012/main" xmlns="" name="Office Theme" id="{62F939B6-93AF-4DB8-9C6B-D6C7DFDC589F}" vid="{4A3C46E8-61CC-4603-A589-7422A47A8E4A}"/>
+      <thm15:themeFamily xmlns:thm15="http://schemas.microsoft.com/office/thememl/2012/main" name="Office Theme" id="{62F939B6-93AF-4DB8-9C6B-D6C7DFDC589F}" vid="{4A3C46E8-61CC-4603-A589-7422A47A8E4A}"/>
     </a:ext>
   </a:extLst>
 </a:theme>

</xml_diff>

<commit_message>
Changes to the presentation
</commit_message>
<xml_diff>
--- a/extraFiles/Iron Man.pptx
+++ b/extraFiles/Iron Man.pptx
@@ -113,7 +113,7 @@
   </p:defaultTextStyle>
   <p:extLst>
     <p:ext uri="{EFAFB233-063F-42B5-8137-9DF3F51BA10A}">
-      <p15:sldGuideLst xmlns:p15="http://schemas.microsoft.com/office/powerpoint/2012/main">
+      <p15:sldGuideLst xmlns:p15="http://schemas.microsoft.com/office/powerpoint/2012/main" xmlns="">
         <p15:guide id="1" orient="horz" pos="2160">
           <p15:clr>
             <a:srgbClr val="A4A3A4"/>
@@ -1699,6 +1699,788 @@
 </file>
 
 <file path=ppt/diagrams/colors3.xml><?xml version="1.0" encoding="utf-8"?>
+<dgm:colorsDef xmlns:dgm="http://schemas.openxmlformats.org/drawingml/2006/diagram" xmlns:a="http://schemas.openxmlformats.org/drawingml/2006/main" uniqueId="urn:microsoft.com/office/officeart/2005/8/colors/colorful3">
+  <dgm:title val=""/>
+  <dgm:desc val=""/>
+  <dgm:catLst>
+    <dgm:cat type="colorful" pri="10300"/>
+  </dgm:catLst>
+  <dgm:styleLbl name="node0">
+    <dgm:fillClrLst meth="repeat">
+      <a:schemeClr val="accent2"/>
+    </dgm:fillClrLst>
+    <dgm:linClrLst meth="repeat">
+      <a:schemeClr val="lt1"/>
+    </dgm:linClrLst>
+    <dgm:effectClrLst/>
+    <dgm:txLinClrLst/>
+    <dgm:txFillClrLst/>
+    <dgm:txEffectClrLst/>
+  </dgm:styleLbl>
+  <dgm:styleLbl name="node1">
+    <dgm:fillClrLst>
+      <a:schemeClr val="accent3"/>
+      <a:schemeClr val="accent4"/>
+    </dgm:fillClrLst>
+    <dgm:linClrLst meth="repeat">
+      <a:schemeClr val="lt1"/>
+    </dgm:linClrLst>
+    <dgm:effectClrLst/>
+    <dgm:txLinClrLst/>
+    <dgm:txFillClrLst/>
+    <dgm:txEffectClrLst/>
+  </dgm:styleLbl>
+  <dgm:styleLbl name="alignNode1">
+    <dgm:fillClrLst>
+      <a:schemeClr val="accent3"/>
+      <a:schemeClr val="accent4"/>
+    </dgm:fillClrLst>
+    <dgm:linClrLst>
+      <a:schemeClr val="accent3"/>
+      <a:schemeClr val="accent4"/>
+    </dgm:linClrLst>
+    <dgm:effectClrLst/>
+    <dgm:txLinClrLst/>
+    <dgm:txFillClrLst/>
+    <dgm:txEffectClrLst/>
+  </dgm:styleLbl>
+  <dgm:styleLbl name="lnNode1">
+    <dgm:fillClrLst>
+      <a:schemeClr val="accent3"/>
+      <a:schemeClr val="accent4"/>
+    </dgm:fillClrLst>
+    <dgm:linClrLst meth="repeat">
+      <a:schemeClr val="lt1"/>
+    </dgm:linClrLst>
+    <dgm:effectClrLst/>
+    <dgm:txLinClrLst/>
+    <dgm:txFillClrLst/>
+    <dgm:txEffectClrLst/>
+  </dgm:styleLbl>
+  <dgm:styleLbl name="vennNode1">
+    <dgm:fillClrLst>
+      <a:schemeClr val="accent3">
+        <a:alpha val="50000"/>
+      </a:schemeClr>
+      <a:schemeClr val="accent4">
+        <a:alpha val="50000"/>
+      </a:schemeClr>
+    </dgm:fillClrLst>
+    <dgm:linClrLst meth="repeat">
+      <a:schemeClr val="lt1"/>
+    </dgm:linClrLst>
+    <dgm:effectClrLst/>
+    <dgm:txLinClrLst/>
+    <dgm:txFillClrLst/>
+    <dgm:txEffectClrLst/>
+  </dgm:styleLbl>
+  <dgm:styleLbl name="node2">
+    <dgm:fillClrLst>
+      <a:schemeClr val="accent4"/>
+    </dgm:fillClrLst>
+    <dgm:linClrLst meth="repeat">
+      <a:schemeClr val="lt1"/>
+    </dgm:linClrLst>
+    <dgm:effectClrLst/>
+    <dgm:txLinClrLst/>
+    <dgm:txFillClrLst/>
+    <dgm:txEffectClrLst/>
+  </dgm:styleLbl>
+  <dgm:styleLbl name="node3">
+    <dgm:fillClrLst>
+      <a:schemeClr val="accent5"/>
+    </dgm:fillClrLst>
+    <dgm:linClrLst meth="repeat">
+      <a:schemeClr val="lt1"/>
+    </dgm:linClrLst>
+    <dgm:effectClrLst/>
+    <dgm:txLinClrLst/>
+    <dgm:txFillClrLst/>
+    <dgm:txEffectClrLst/>
+  </dgm:styleLbl>
+  <dgm:styleLbl name="node4">
+    <dgm:fillClrLst>
+      <a:schemeClr val="accent6"/>
+    </dgm:fillClrLst>
+    <dgm:linClrLst meth="repeat">
+      <a:schemeClr val="lt1"/>
+    </dgm:linClrLst>
+    <dgm:effectClrLst/>
+    <dgm:txLinClrLst/>
+    <dgm:txFillClrLst/>
+    <dgm:txEffectClrLst/>
+  </dgm:styleLbl>
+  <dgm:styleLbl name="fgImgPlace1">
+    <dgm:fillClrLst>
+      <a:schemeClr val="accent3">
+        <a:tint val="50000"/>
+      </a:schemeClr>
+      <a:schemeClr val="accent4">
+        <a:tint val="50000"/>
+      </a:schemeClr>
+    </dgm:fillClrLst>
+    <dgm:linClrLst meth="repeat">
+      <a:schemeClr val="lt1"/>
+    </dgm:linClrLst>
+    <dgm:effectClrLst/>
+    <dgm:txLinClrLst/>
+    <dgm:txFillClrLst meth="repeat">
+      <a:schemeClr val="lt1"/>
+    </dgm:txFillClrLst>
+    <dgm:txEffectClrLst/>
+  </dgm:styleLbl>
+  <dgm:styleLbl name="alignImgPlace1">
+    <dgm:fillClrLst>
+      <a:schemeClr val="accent3">
+        <a:tint val="50000"/>
+      </a:schemeClr>
+      <a:schemeClr val="accent4">
+        <a:tint val="20000"/>
+      </a:schemeClr>
+    </dgm:fillClrLst>
+    <dgm:linClrLst meth="repeat">
+      <a:schemeClr val="lt1"/>
+    </dgm:linClrLst>
+    <dgm:effectClrLst/>
+    <dgm:txLinClrLst/>
+    <dgm:txFillClrLst meth="repeat">
+      <a:schemeClr val="lt1"/>
+    </dgm:txFillClrLst>
+    <dgm:txEffectClrLst/>
+  </dgm:styleLbl>
+  <dgm:styleLbl name="bgImgPlace1">
+    <dgm:fillClrLst>
+      <a:schemeClr val="accent3">
+        <a:tint val="50000"/>
+      </a:schemeClr>
+      <a:schemeClr val="accent4">
+        <a:tint val="20000"/>
+      </a:schemeClr>
+    </dgm:fillClrLst>
+    <dgm:linClrLst meth="repeat">
+      <a:schemeClr val="lt1"/>
+    </dgm:linClrLst>
+    <dgm:effectClrLst/>
+    <dgm:txLinClrLst/>
+    <dgm:txFillClrLst meth="repeat">
+      <a:schemeClr val="lt1"/>
+    </dgm:txFillClrLst>
+    <dgm:txEffectClrLst/>
+  </dgm:styleLbl>
+  <dgm:styleLbl name="sibTrans2D1">
+    <dgm:fillClrLst>
+      <a:schemeClr val="accent3"/>
+      <a:schemeClr val="accent4"/>
+    </dgm:fillClrLst>
+    <dgm:linClrLst meth="repeat">
+      <a:schemeClr val="lt1"/>
+    </dgm:linClrLst>
+    <dgm:effectClrLst/>
+    <dgm:txLinClrLst/>
+    <dgm:txFillClrLst/>
+    <dgm:txEffectClrLst/>
+  </dgm:styleLbl>
+  <dgm:styleLbl name="fgSibTrans2D1">
+    <dgm:fillClrLst>
+      <a:schemeClr val="accent3"/>
+      <a:schemeClr val="accent4"/>
+    </dgm:fillClrLst>
+    <dgm:linClrLst meth="repeat">
+      <a:schemeClr val="lt1"/>
+    </dgm:linClrLst>
+    <dgm:effectClrLst/>
+    <dgm:txLinClrLst/>
+    <dgm:txFillClrLst meth="repeat">
+      <a:schemeClr val="lt1"/>
+    </dgm:txFillClrLst>
+    <dgm:txEffectClrLst/>
+  </dgm:styleLbl>
+  <dgm:styleLbl name="bgSibTrans2D1">
+    <dgm:fillClrLst>
+      <a:schemeClr val="accent3"/>
+      <a:schemeClr val="accent4"/>
+    </dgm:fillClrLst>
+    <dgm:linClrLst meth="repeat">
+      <a:schemeClr val="lt1"/>
+    </dgm:linClrLst>
+    <dgm:effectClrLst/>
+    <dgm:txLinClrLst/>
+    <dgm:txFillClrLst meth="repeat">
+      <a:schemeClr val="lt1"/>
+    </dgm:txFillClrLst>
+    <dgm:txEffectClrLst/>
+  </dgm:styleLbl>
+  <dgm:styleLbl name="sibTrans1D1">
+    <dgm:fillClrLst/>
+    <dgm:linClrLst>
+      <a:schemeClr val="accent3"/>
+      <a:schemeClr val="accent4"/>
+    </dgm:linClrLst>
+    <dgm:effectClrLst/>
+    <dgm:txLinClrLst/>
+    <dgm:txFillClrLst meth="repeat">
+      <a:schemeClr val="tx1"/>
+    </dgm:txFillClrLst>
+    <dgm:txEffectClrLst/>
+  </dgm:styleLbl>
+  <dgm:styleLbl name="callout">
+    <dgm:fillClrLst meth="repeat">
+      <a:schemeClr val="accent3"/>
+    </dgm:fillClrLst>
+    <dgm:linClrLst meth="repeat">
+      <a:schemeClr val="accent3">
+        <a:tint val="50000"/>
+      </a:schemeClr>
+    </dgm:linClrLst>
+    <dgm:effectClrLst/>
+    <dgm:txLinClrLst/>
+    <dgm:txFillClrLst meth="repeat">
+      <a:schemeClr val="tx1"/>
+    </dgm:txFillClrLst>
+    <dgm:txEffectClrLst/>
+  </dgm:styleLbl>
+  <dgm:styleLbl name="asst0">
+    <dgm:fillClrLst meth="repeat">
+      <a:schemeClr val="accent3"/>
+    </dgm:fillClrLst>
+    <dgm:linClrLst meth="repeat">
+      <a:schemeClr val="lt1">
+        <a:shade val="80000"/>
+      </a:schemeClr>
+    </dgm:linClrLst>
+    <dgm:effectClrLst/>
+    <dgm:txLinClrLst/>
+    <dgm:txFillClrLst/>
+    <dgm:txEffectClrLst/>
+  </dgm:styleLbl>
+  <dgm:styleLbl name="asst1">
+    <dgm:fillClrLst meth="repeat">
+      <a:schemeClr val="accent4"/>
+    </dgm:fillClrLst>
+    <dgm:linClrLst meth="repeat">
+      <a:schemeClr val="lt1">
+        <a:shade val="80000"/>
+      </a:schemeClr>
+    </dgm:linClrLst>
+    <dgm:effectClrLst/>
+    <dgm:txLinClrLst/>
+    <dgm:txFillClrLst/>
+    <dgm:txEffectClrLst/>
+  </dgm:styleLbl>
+  <dgm:styleLbl name="asst2">
+    <dgm:fillClrLst>
+      <a:schemeClr val="accent5"/>
+    </dgm:fillClrLst>
+    <dgm:linClrLst meth="repeat">
+      <a:schemeClr val="lt1"/>
+    </dgm:linClrLst>
+    <dgm:effectClrLst/>
+    <dgm:txLinClrLst/>
+    <dgm:txFillClrLst/>
+    <dgm:txEffectClrLst/>
+  </dgm:styleLbl>
+  <dgm:styleLbl name="asst3">
+    <dgm:fillClrLst>
+      <a:schemeClr val="accent6"/>
+    </dgm:fillClrLst>
+    <dgm:linClrLst meth="repeat">
+      <a:schemeClr val="lt1"/>
+    </dgm:linClrLst>
+    <dgm:effectClrLst/>
+    <dgm:txLinClrLst/>
+    <dgm:txFillClrLst/>
+    <dgm:txEffectClrLst/>
+  </dgm:styleLbl>
+  <dgm:styleLbl name="asst4">
+    <dgm:fillClrLst>
+      <a:schemeClr val="accent1"/>
+    </dgm:fillClrLst>
+    <dgm:linClrLst meth="repeat">
+      <a:schemeClr val="lt1"/>
+    </dgm:linClrLst>
+    <dgm:effectClrLst/>
+    <dgm:txLinClrLst/>
+    <dgm:txFillClrLst/>
+    <dgm:txEffectClrLst/>
+  </dgm:styleLbl>
+  <dgm:styleLbl name="parChTrans2D1">
+    <dgm:fillClrLst meth="repeat">
+      <a:schemeClr val="accent2"/>
+    </dgm:fillClrLst>
+    <dgm:linClrLst meth="repeat">
+      <a:schemeClr val="lt1"/>
+    </dgm:linClrLst>
+    <dgm:effectClrLst/>
+    <dgm:txLinClrLst/>
+    <dgm:txFillClrLst meth="repeat">
+      <a:schemeClr val="lt1"/>
+    </dgm:txFillClrLst>
+    <dgm:txEffectClrLst/>
+  </dgm:styleLbl>
+  <dgm:styleLbl name="parChTrans2D2">
+    <dgm:fillClrLst meth="repeat">
+      <a:schemeClr val="accent3"/>
+    </dgm:fillClrLst>
+    <dgm:linClrLst meth="repeat">
+      <a:schemeClr val="lt1"/>
+    </dgm:linClrLst>
+    <dgm:effectClrLst/>
+    <dgm:txLinClrLst/>
+    <dgm:txFillClrLst/>
+    <dgm:txEffectClrLst/>
+  </dgm:styleLbl>
+  <dgm:styleLbl name="parChTrans2D3">
+    <dgm:fillClrLst meth="repeat">
+      <a:schemeClr val="accent4"/>
+    </dgm:fillClrLst>
+    <dgm:linClrLst meth="repeat">
+      <a:schemeClr val="lt1"/>
+    </dgm:linClrLst>
+    <dgm:effectClrLst/>
+    <dgm:txLinClrLst/>
+    <dgm:txFillClrLst/>
+    <dgm:txEffectClrLst/>
+  </dgm:styleLbl>
+  <dgm:styleLbl name="parChTrans2D4">
+    <dgm:fillClrLst meth="repeat">
+      <a:schemeClr val="accent5"/>
+    </dgm:fillClrLst>
+    <dgm:linClrLst meth="repeat">
+      <a:schemeClr val="lt1"/>
+    </dgm:linClrLst>
+    <dgm:effectClrLst/>
+    <dgm:txLinClrLst/>
+    <dgm:txFillClrLst meth="repeat">
+      <a:schemeClr val="lt1"/>
+    </dgm:txFillClrLst>
+    <dgm:txEffectClrLst/>
+  </dgm:styleLbl>
+  <dgm:styleLbl name="parChTrans1D1">
+    <dgm:fillClrLst meth="repeat">
+      <a:schemeClr val="accent3"/>
+    </dgm:fillClrLst>
+    <dgm:linClrLst meth="repeat">
+      <a:schemeClr val="accent3"/>
+    </dgm:linClrLst>
+    <dgm:effectClrLst/>
+    <dgm:txLinClrLst/>
+    <dgm:txFillClrLst meth="repeat">
+      <a:schemeClr val="tx1"/>
+    </dgm:txFillClrLst>
+    <dgm:txEffectClrLst/>
+  </dgm:styleLbl>
+  <dgm:styleLbl name="parChTrans1D2">
+    <dgm:fillClrLst meth="repeat">
+      <a:schemeClr val="accent2">
+        <a:tint val="90000"/>
+      </a:schemeClr>
+    </dgm:fillClrLst>
+    <dgm:linClrLst meth="repeat">
+      <a:schemeClr val="accent4"/>
+    </dgm:linClrLst>
+    <dgm:effectClrLst/>
+    <dgm:txLinClrLst/>
+    <dgm:txFillClrLst meth="repeat">
+      <a:schemeClr val="tx1"/>
+    </dgm:txFillClrLst>
+    <dgm:txEffectClrLst/>
+  </dgm:styleLbl>
+  <dgm:styleLbl name="parChTrans1D3">
+    <dgm:fillClrLst meth="repeat">
+      <a:schemeClr val="accent2">
+        <a:tint val="70000"/>
+      </a:schemeClr>
+    </dgm:fillClrLst>
+    <dgm:linClrLst meth="repeat">
+      <a:schemeClr val="accent5"/>
+    </dgm:linClrLst>
+    <dgm:effectClrLst/>
+    <dgm:txLinClrLst/>
+    <dgm:txFillClrLst meth="repeat">
+      <a:schemeClr val="tx1"/>
+    </dgm:txFillClrLst>
+    <dgm:txEffectClrLst/>
+  </dgm:styleLbl>
+  <dgm:styleLbl name="parChTrans1D4">
+    <dgm:fillClrLst meth="repeat">
+      <a:schemeClr val="accent6">
+        <a:tint val="50000"/>
+      </a:schemeClr>
+    </dgm:fillClrLst>
+    <dgm:linClrLst meth="repeat">
+      <a:schemeClr val="accent6"/>
+    </dgm:linClrLst>
+    <dgm:effectClrLst/>
+    <dgm:txLinClrLst/>
+    <dgm:txFillClrLst meth="repeat">
+      <a:schemeClr val="tx1"/>
+    </dgm:txFillClrLst>
+    <dgm:txEffectClrLst/>
+  </dgm:styleLbl>
+  <dgm:styleLbl name="fgAcc1">
+    <dgm:fillClrLst meth="repeat">
+      <a:schemeClr val="lt1">
+        <a:alpha val="90000"/>
+      </a:schemeClr>
+    </dgm:fillClrLst>
+    <dgm:linClrLst>
+      <a:schemeClr val="accent3"/>
+      <a:schemeClr val="accent4"/>
+    </dgm:linClrLst>
+    <dgm:effectClrLst/>
+    <dgm:txLinClrLst/>
+    <dgm:txFillClrLst meth="repeat">
+      <a:schemeClr val="dk1"/>
+    </dgm:txFillClrLst>
+    <dgm:txEffectClrLst/>
+  </dgm:styleLbl>
+  <dgm:styleLbl name="conFgAcc1">
+    <dgm:fillClrLst meth="repeat">
+      <a:schemeClr val="lt1">
+        <a:alpha val="90000"/>
+      </a:schemeClr>
+    </dgm:fillClrLst>
+    <dgm:linClrLst>
+      <a:schemeClr val="accent3"/>
+      <a:schemeClr val="accent4"/>
+    </dgm:linClrLst>
+    <dgm:effectClrLst/>
+    <dgm:txLinClrLst/>
+    <dgm:txFillClrLst meth="repeat">
+      <a:schemeClr val="dk1"/>
+    </dgm:txFillClrLst>
+    <dgm:txEffectClrLst/>
+  </dgm:styleLbl>
+  <dgm:styleLbl name="alignAcc1">
+    <dgm:fillClrLst meth="repeat">
+      <a:schemeClr val="lt1">
+        <a:alpha val="90000"/>
+      </a:schemeClr>
+    </dgm:fillClrLst>
+    <dgm:linClrLst>
+      <a:schemeClr val="accent3"/>
+      <a:schemeClr val="accent4"/>
+    </dgm:linClrLst>
+    <dgm:effectClrLst/>
+    <dgm:txLinClrLst/>
+    <dgm:txFillClrLst meth="repeat">
+      <a:schemeClr val="dk1"/>
+    </dgm:txFillClrLst>
+    <dgm:txEffectClrLst/>
+  </dgm:styleLbl>
+  <dgm:styleLbl name="trAlignAcc1">
+    <dgm:fillClrLst meth="repeat">
+      <a:schemeClr val="lt1">
+        <a:alpha val="40000"/>
+      </a:schemeClr>
+    </dgm:fillClrLst>
+    <dgm:linClrLst meth="repeat">
+      <a:schemeClr val="accent2"/>
+    </dgm:linClrLst>
+    <dgm:effectClrLst/>
+    <dgm:txLinClrLst/>
+    <dgm:txFillClrLst meth="repeat">
+      <a:schemeClr val="dk1"/>
+    </dgm:txFillClrLst>
+    <dgm:txEffectClrLst/>
+  </dgm:styleLbl>
+  <dgm:styleLbl name="bgAcc1">
+    <dgm:fillClrLst meth="repeat">
+      <a:schemeClr val="lt1">
+        <a:alpha val="90000"/>
+      </a:schemeClr>
+    </dgm:fillClrLst>
+    <dgm:linClrLst>
+      <a:schemeClr val="accent3"/>
+      <a:schemeClr val="accent4"/>
+    </dgm:linClrLst>
+    <dgm:effectClrLst/>
+    <dgm:txLinClrLst/>
+    <dgm:txFillClrLst meth="repeat">
+      <a:schemeClr val="dk1"/>
+    </dgm:txFillClrLst>
+    <dgm:txEffectClrLst/>
+  </dgm:styleLbl>
+  <dgm:styleLbl name="solidFgAcc1">
+    <dgm:fillClrLst meth="repeat">
+      <a:schemeClr val="lt1"/>
+    </dgm:fillClrLst>
+    <dgm:linClrLst>
+      <a:schemeClr val="accent3"/>
+      <a:schemeClr val="accent4"/>
+    </dgm:linClrLst>
+    <dgm:effectClrLst/>
+    <dgm:txLinClrLst/>
+    <dgm:txFillClrLst meth="repeat">
+      <a:schemeClr val="dk1"/>
+    </dgm:txFillClrLst>
+    <dgm:txEffectClrLst/>
+  </dgm:styleLbl>
+  <dgm:styleLbl name="solidAlignAcc1">
+    <dgm:fillClrLst meth="repeat">
+      <a:schemeClr val="lt1"/>
+    </dgm:fillClrLst>
+    <dgm:linClrLst>
+      <a:schemeClr val="accent3"/>
+      <a:schemeClr val="accent4"/>
+    </dgm:linClrLst>
+    <dgm:effectClrLst/>
+    <dgm:txLinClrLst/>
+    <dgm:txFillClrLst meth="repeat">
+      <a:schemeClr val="dk1"/>
+    </dgm:txFillClrLst>
+    <dgm:txEffectClrLst/>
+  </dgm:styleLbl>
+  <dgm:styleLbl name="solidBgAcc1">
+    <dgm:fillClrLst meth="repeat">
+      <a:schemeClr val="lt1"/>
+    </dgm:fillClrLst>
+    <dgm:linClrLst>
+      <a:schemeClr val="accent3"/>
+      <a:schemeClr val="accent4"/>
+    </dgm:linClrLst>
+    <dgm:effectClrLst/>
+    <dgm:txLinClrLst/>
+    <dgm:txFillClrLst meth="repeat">
+      <a:schemeClr val="dk1"/>
+    </dgm:txFillClrLst>
+    <dgm:txEffectClrLst/>
+  </dgm:styleLbl>
+  <dgm:styleLbl name="fgAccFollowNode1">
+    <dgm:fillClrLst>
+      <a:schemeClr val="accent3">
+        <a:tint val="40000"/>
+        <a:alpha val="90000"/>
+      </a:schemeClr>
+      <a:schemeClr val="accent4">
+        <a:tint val="40000"/>
+        <a:alpha val="90000"/>
+      </a:schemeClr>
+    </dgm:fillClrLst>
+    <dgm:linClrLst>
+      <a:schemeClr val="accent3">
+        <a:tint val="40000"/>
+        <a:alpha val="90000"/>
+      </a:schemeClr>
+      <a:schemeClr val="accent4">
+        <a:tint val="40000"/>
+        <a:alpha val="90000"/>
+      </a:schemeClr>
+    </dgm:linClrLst>
+    <dgm:effectClrLst/>
+    <dgm:txLinClrLst/>
+    <dgm:txFillClrLst meth="repeat">
+      <a:schemeClr val="dk1"/>
+    </dgm:txFillClrLst>
+    <dgm:txEffectClrLst/>
+  </dgm:styleLbl>
+  <dgm:styleLbl name="alignAccFollowNode1">
+    <dgm:fillClrLst>
+      <a:schemeClr val="accent3">
+        <a:tint val="40000"/>
+        <a:alpha val="90000"/>
+      </a:schemeClr>
+      <a:schemeClr val="accent4">
+        <a:tint val="40000"/>
+        <a:alpha val="90000"/>
+      </a:schemeClr>
+    </dgm:fillClrLst>
+    <dgm:linClrLst>
+      <a:schemeClr val="accent3">
+        <a:tint val="40000"/>
+        <a:alpha val="90000"/>
+      </a:schemeClr>
+      <a:schemeClr val="accent4">
+        <a:tint val="40000"/>
+        <a:alpha val="90000"/>
+      </a:schemeClr>
+    </dgm:linClrLst>
+    <dgm:effectClrLst/>
+    <dgm:txLinClrLst/>
+    <dgm:txFillClrLst meth="repeat">
+      <a:schemeClr val="dk1"/>
+    </dgm:txFillClrLst>
+    <dgm:txEffectClrLst/>
+  </dgm:styleLbl>
+  <dgm:styleLbl name="bgAccFollowNode1">
+    <dgm:fillClrLst>
+      <a:schemeClr val="accent3">
+        <a:tint val="40000"/>
+        <a:alpha val="90000"/>
+      </a:schemeClr>
+      <a:schemeClr val="accent4">
+        <a:tint val="40000"/>
+        <a:alpha val="90000"/>
+      </a:schemeClr>
+    </dgm:fillClrLst>
+    <dgm:linClrLst>
+      <a:schemeClr val="accent3">
+        <a:tint val="40000"/>
+        <a:alpha val="90000"/>
+      </a:schemeClr>
+      <a:schemeClr val="accent4">
+        <a:tint val="40000"/>
+        <a:alpha val="90000"/>
+      </a:schemeClr>
+    </dgm:linClrLst>
+    <dgm:effectClrLst/>
+    <dgm:txLinClrLst/>
+    <dgm:txFillClrLst meth="repeat">
+      <a:schemeClr val="dk1"/>
+    </dgm:txFillClrLst>
+    <dgm:txEffectClrLst/>
+  </dgm:styleLbl>
+  <dgm:styleLbl name="fgAcc0">
+    <dgm:fillClrLst meth="repeat">
+      <a:schemeClr val="lt1">
+        <a:alpha val="90000"/>
+      </a:schemeClr>
+    </dgm:fillClrLst>
+    <dgm:linClrLst>
+      <a:schemeClr val="accent2"/>
+    </dgm:linClrLst>
+    <dgm:effectClrLst/>
+    <dgm:txLinClrLst/>
+    <dgm:txFillClrLst meth="repeat">
+      <a:schemeClr val="dk1"/>
+    </dgm:txFillClrLst>
+    <dgm:txEffectClrLst/>
+  </dgm:styleLbl>
+  <dgm:styleLbl name="fgAcc2">
+    <dgm:fillClrLst meth="repeat">
+      <a:schemeClr val="lt1">
+        <a:alpha val="90000"/>
+      </a:schemeClr>
+    </dgm:fillClrLst>
+    <dgm:linClrLst>
+      <a:schemeClr val="accent4"/>
+    </dgm:linClrLst>
+    <dgm:effectClrLst/>
+    <dgm:txLinClrLst/>
+    <dgm:txFillClrLst meth="repeat">
+      <a:schemeClr val="dk1"/>
+    </dgm:txFillClrLst>
+    <dgm:txEffectClrLst/>
+  </dgm:styleLbl>
+  <dgm:styleLbl name="fgAcc3">
+    <dgm:fillClrLst meth="repeat">
+      <a:schemeClr val="lt1">
+        <a:alpha val="90000"/>
+      </a:schemeClr>
+    </dgm:fillClrLst>
+    <dgm:linClrLst>
+      <a:schemeClr val="accent5"/>
+    </dgm:linClrLst>
+    <dgm:effectClrLst/>
+    <dgm:txLinClrLst/>
+    <dgm:txFillClrLst meth="repeat">
+      <a:schemeClr val="dk1"/>
+    </dgm:txFillClrLst>
+    <dgm:txEffectClrLst/>
+  </dgm:styleLbl>
+  <dgm:styleLbl name="fgAcc4">
+    <dgm:fillClrLst meth="repeat">
+      <a:schemeClr val="lt1">
+        <a:alpha val="90000"/>
+      </a:schemeClr>
+    </dgm:fillClrLst>
+    <dgm:linClrLst>
+      <a:schemeClr val="accent6"/>
+    </dgm:linClrLst>
+    <dgm:effectClrLst/>
+    <dgm:txLinClrLst/>
+    <dgm:txFillClrLst meth="repeat">
+      <a:schemeClr val="dk1"/>
+    </dgm:txFillClrLst>
+    <dgm:txEffectClrLst/>
+  </dgm:styleLbl>
+  <dgm:styleLbl name="bgShp">
+    <dgm:fillClrLst meth="repeat">
+      <a:schemeClr val="accent3">
+        <a:tint val="40000"/>
+      </a:schemeClr>
+    </dgm:fillClrLst>
+    <dgm:linClrLst meth="repeat">
+      <a:schemeClr val="dk1"/>
+    </dgm:linClrLst>
+    <dgm:effectClrLst/>
+    <dgm:txLinClrLst/>
+    <dgm:txFillClrLst meth="repeat">
+      <a:schemeClr val="dk1"/>
+    </dgm:txFillClrLst>
+    <dgm:txEffectClrLst/>
+  </dgm:styleLbl>
+  <dgm:styleLbl name="dkBgShp">
+    <dgm:fillClrLst meth="repeat">
+      <a:schemeClr val="accent3">
+        <a:shade val="90000"/>
+      </a:schemeClr>
+    </dgm:fillClrLst>
+    <dgm:linClrLst meth="repeat">
+      <a:schemeClr val="dk1"/>
+    </dgm:linClrLst>
+    <dgm:effectClrLst/>
+    <dgm:txLinClrLst/>
+    <dgm:txFillClrLst meth="repeat">
+      <a:schemeClr val="lt1"/>
+    </dgm:txFillClrLst>
+    <dgm:txEffectClrLst/>
+  </dgm:styleLbl>
+  <dgm:styleLbl name="trBgShp">
+    <dgm:fillClrLst meth="repeat">
+      <a:schemeClr val="accent2">
+        <a:tint val="50000"/>
+        <a:alpha val="40000"/>
+      </a:schemeClr>
+    </dgm:fillClrLst>
+    <dgm:linClrLst meth="repeat">
+      <a:schemeClr val="accent3"/>
+    </dgm:linClrLst>
+    <dgm:effectClrLst/>
+    <dgm:txLinClrLst/>
+    <dgm:txFillClrLst meth="repeat">
+      <a:schemeClr val="lt1"/>
+    </dgm:txFillClrLst>
+    <dgm:txEffectClrLst/>
+  </dgm:styleLbl>
+  <dgm:styleLbl name="fgShp">
+    <dgm:fillClrLst meth="repeat">
+      <a:schemeClr val="accent3">
+        <a:tint val="40000"/>
+      </a:schemeClr>
+    </dgm:fillClrLst>
+    <dgm:linClrLst meth="repeat">
+      <a:schemeClr val="lt1"/>
+    </dgm:linClrLst>
+    <dgm:effectClrLst/>
+    <dgm:txLinClrLst/>
+    <dgm:txFillClrLst meth="repeat">
+      <a:schemeClr val="dk1"/>
+    </dgm:txFillClrLst>
+    <dgm:txEffectClrLst/>
+  </dgm:styleLbl>
+  <dgm:styleLbl name="revTx">
+    <dgm:fillClrLst meth="repeat">
+      <a:schemeClr val="lt1">
+        <a:alpha val="0"/>
+      </a:schemeClr>
+    </dgm:fillClrLst>
+    <dgm:linClrLst meth="repeat">
+      <a:schemeClr val="dk1">
+        <a:alpha val="0"/>
+      </a:schemeClr>
+    </dgm:linClrLst>
+    <dgm:effectClrLst/>
+    <dgm:txLinClrLst/>
+    <dgm:txFillClrLst meth="repeat">
+      <a:schemeClr val="tx1"/>
+    </dgm:txFillClrLst>
+    <dgm:txEffectClrLst/>
+  </dgm:styleLbl>
+</dgm:colorsDef>
+</file>
+
+<file path=ppt/diagrams/colors4.xml><?xml version="1.0" encoding="utf-8"?>
 <dgm:colorsDef xmlns:dgm="http://schemas.openxmlformats.org/drawingml/2006/diagram" xmlns:a="http://schemas.openxmlformats.org/drawingml/2006/main" uniqueId="urn:microsoft.com/office/officeart/2005/8/colors/colorful5">
   <dgm:title val=""/>
   <dgm:desc val=""/>
@@ -2480,7 +3262,7 @@
 </dgm:colorsDef>
 </file>
 
-<file path=ppt/diagrams/colors4.xml><?xml version="1.0" encoding="utf-8"?>
+<file path=ppt/diagrams/colors5.xml><?xml version="1.0" encoding="utf-8"?>
 <dgm:colorsDef xmlns:dgm="http://schemas.openxmlformats.org/drawingml/2006/diagram" xmlns:a="http://schemas.openxmlformats.org/drawingml/2006/main" uniqueId="urn:microsoft.com/office/officeart/2005/8/colors/colorful1#1">
   <dgm:title val=""/>
   <dgm:desc val=""/>
@@ -3403,7 +4185,7 @@
 <dgm:dataModel xmlns:dgm="http://schemas.openxmlformats.org/drawingml/2006/diagram" xmlns:a="http://schemas.openxmlformats.org/drawingml/2006/main">
   <dgm:ptLst>
     <dgm:pt modelId="{4838D118-DFA9-45A3-9AEF-E53336BAC455}" type="doc">
-      <dgm:prSet loTypeId="urn:microsoft.com/office/officeart/2005/8/layout/default" loCatId="list" qsTypeId="urn:microsoft.com/office/officeart/2005/8/quickstyle/simple1" qsCatId="simple" csTypeId="urn:microsoft.com/office/officeart/2005/8/colors/colorful3" csCatId="colorful" phldr="1"/>
+      <dgm:prSet loTypeId="urn:microsoft.com/office/officeart/2005/8/layout/default#1" loCatId="list" qsTypeId="urn:microsoft.com/office/officeart/2005/8/quickstyle/simple1" qsCatId="simple" csTypeId="urn:microsoft.com/office/officeart/2005/8/colors/colorful3" csCatId="colorful" phldr="1"/>
       <dgm:spPr/>
       <dgm:t>
         <a:bodyPr/>
@@ -3631,6 +4413,13 @@
         </dgm:presLayoutVars>
       </dgm:prSet>
       <dgm:spPr/>
+      <dgm:t>
+        <a:bodyPr/>
+        <a:lstStyle/>
+        <a:p>
+          <a:endParaRPr lang="en-US"/>
+        </a:p>
+      </dgm:t>
     </dgm:pt>
     <dgm:pt modelId="{4A22D9F1-06ED-45D2-B36F-D5663718682C}" type="pres">
       <dgm:prSet presAssocID="{4B95026E-0311-4DC9-88F2-CC3F00FF11EC}" presName="node" presStyleLbl="node1" presStyleIdx="0" presStyleCnt="5">
@@ -3639,6 +4428,13 @@
         </dgm:presLayoutVars>
       </dgm:prSet>
       <dgm:spPr/>
+      <dgm:t>
+        <a:bodyPr/>
+        <a:lstStyle/>
+        <a:p>
+          <a:endParaRPr lang="en-US"/>
+        </a:p>
+      </dgm:t>
     </dgm:pt>
     <dgm:pt modelId="{0F00868D-D668-4279-AD69-5682BBD60BFF}" type="pres">
       <dgm:prSet presAssocID="{C7BF6EFA-83E9-4DEB-B907-FF256A8F3FF5}" presName="sibTrans" presStyleCnt="0"/>
@@ -3651,6 +4447,13 @@
         </dgm:presLayoutVars>
       </dgm:prSet>
       <dgm:spPr/>
+      <dgm:t>
+        <a:bodyPr/>
+        <a:lstStyle/>
+        <a:p>
+          <a:endParaRPr lang="en-US"/>
+        </a:p>
+      </dgm:t>
     </dgm:pt>
     <dgm:pt modelId="{CFFEE9BD-53A2-43D5-AACB-8AC558DC2004}" type="pres">
       <dgm:prSet presAssocID="{2000C6E9-A9D0-45BA-A727-CC03C2B66273}" presName="sibTrans" presStyleCnt="0"/>
@@ -3663,6 +4466,13 @@
         </dgm:presLayoutVars>
       </dgm:prSet>
       <dgm:spPr/>
+      <dgm:t>
+        <a:bodyPr/>
+        <a:lstStyle/>
+        <a:p>
+          <a:endParaRPr lang="en-US"/>
+        </a:p>
+      </dgm:t>
     </dgm:pt>
     <dgm:pt modelId="{526DB286-E2AE-468A-964E-67C0057D808E}" type="pres">
       <dgm:prSet presAssocID="{AD11AB4C-BF7A-434D-A420-2B803B4FB242}" presName="sibTrans" presStyleCnt="0"/>
@@ -3675,6 +4485,13 @@
         </dgm:presLayoutVars>
       </dgm:prSet>
       <dgm:spPr/>
+      <dgm:t>
+        <a:bodyPr/>
+        <a:lstStyle/>
+        <a:p>
+          <a:endParaRPr lang="en-US"/>
+        </a:p>
+      </dgm:t>
     </dgm:pt>
     <dgm:pt modelId="{08299FBE-9BD9-4D71-92E9-677C8F68E125}" type="pres">
       <dgm:prSet presAssocID="{9643A849-CEEF-4D4B-A5E6-6807006DE0F4}" presName="sibTrans" presStyleCnt="0"/>
@@ -3687,35 +4504,42 @@
         </dgm:presLayoutVars>
       </dgm:prSet>
       <dgm:spPr/>
+      <dgm:t>
+        <a:bodyPr/>
+        <a:lstStyle/>
+        <a:p>
+          <a:endParaRPr lang="en-US"/>
+        </a:p>
+      </dgm:t>
     </dgm:pt>
   </dgm:ptLst>
   <dgm:cxnLst>
-    <dgm:cxn modelId="{55E84625-7FB2-4935-9D54-48008995CCBE}" type="presOf" srcId="{B94EC4D3-4F69-49FD-9AA7-7A24C1E59AA8}" destId="{2899E9D8-A345-4E63-BB25-81DFDD213FC6}" srcOrd="0" destOrd="0" presId="urn:microsoft.com/office/officeart/2005/8/layout/default"/>
+    <dgm:cxn modelId="{5D0A075D-AFC9-4FBE-B3C9-234CF761078B}" srcId="{4838D118-DFA9-45A3-9AEF-E53336BAC455}" destId="{1FEB91B5-E9C2-43F7-8726-0B790C17FA6C}" srcOrd="3" destOrd="0" parTransId="{CC0FBB4A-6BAB-4610-9016-632406458C3D}" sibTransId="{9643A849-CEEF-4D4B-A5E6-6807006DE0F4}"/>
+    <dgm:cxn modelId="{E66B16EE-4A31-48AB-8DE6-A2C9EBF5C9F4}" srcId="{4838D118-DFA9-45A3-9AEF-E53336BAC455}" destId="{A630582B-7959-4962-9E4F-1B6C930748D8}" srcOrd="1" destOrd="0" parTransId="{75505BEA-80B8-4297-B7D5-559DA03691F2}" sibTransId="{2000C6E9-A9D0-45BA-A727-CC03C2B66273}"/>
     <dgm:cxn modelId="{E9189D29-B5D1-485B-8E9A-F82CEF6B9B37}" srcId="{4838D118-DFA9-45A3-9AEF-E53336BAC455}" destId="{61089649-69E8-4E32-A642-8F049B40B91D}" srcOrd="2" destOrd="0" parTransId="{B51773A4-7752-46EC-9504-5878BBD79948}" sibTransId="{AD11AB4C-BF7A-434D-A420-2B803B4FB242}"/>
-    <dgm:cxn modelId="{49A3E22B-DCBC-4028-80C5-30AD8517F068}" type="presOf" srcId="{61089649-69E8-4E32-A642-8F049B40B91D}" destId="{E1D69571-F28C-4D88-BBD8-3BA067F78DAE}" srcOrd="0" destOrd="0" presId="urn:microsoft.com/office/officeart/2005/8/layout/default"/>
-    <dgm:cxn modelId="{829A3F31-15B5-4FCC-AD7A-16FB323501F7}" type="presOf" srcId="{1FEB91B5-E9C2-43F7-8726-0B790C17FA6C}" destId="{6FC73968-3102-4219-9158-81F292187B41}" srcOrd="0" destOrd="0" presId="urn:microsoft.com/office/officeart/2005/8/layout/default"/>
+    <dgm:cxn modelId="{829A3F31-15B5-4FCC-AD7A-16FB323501F7}" type="presOf" srcId="{1FEB91B5-E9C2-43F7-8726-0B790C17FA6C}" destId="{6FC73968-3102-4219-9158-81F292187B41}" srcOrd="0" destOrd="0" presId="urn:microsoft.com/office/officeart/2005/8/layout/default#1"/>
+    <dgm:cxn modelId="{55E84625-7FB2-4935-9D54-48008995CCBE}" type="presOf" srcId="{B94EC4D3-4F69-49FD-9AA7-7A24C1E59AA8}" destId="{2899E9D8-A345-4E63-BB25-81DFDD213FC6}" srcOrd="0" destOrd="0" presId="urn:microsoft.com/office/officeart/2005/8/layout/default#1"/>
+    <dgm:cxn modelId="{DCC719E4-3699-4A33-8F1A-010E8845C7D5}" srcId="{4838D118-DFA9-45A3-9AEF-E53336BAC455}" destId="{4B95026E-0311-4DC9-88F2-CC3F00FF11EC}" srcOrd="0" destOrd="0" parTransId="{D25C6AB9-FAE6-4DC7-89D2-C6890CB0A002}" sibTransId="{C7BF6EFA-83E9-4DEB-B907-FF256A8F3FF5}"/>
     <dgm:cxn modelId="{DB68003D-2FA3-4C96-A488-625B50BC217C}" srcId="{4838D118-DFA9-45A3-9AEF-E53336BAC455}" destId="{B94EC4D3-4F69-49FD-9AA7-7A24C1E59AA8}" srcOrd="4" destOrd="0" parTransId="{C5A4A8F5-533E-47DC-BB13-77A8C7560C39}" sibTransId="{30FD44A5-2541-4E68-B92B-BAFF86DBA7CF}"/>
-    <dgm:cxn modelId="{5D0A075D-AFC9-4FBE-B3C9-234CF761078B}" srcId="{4838D118-DFA9-45A3-9AEF-E53336BAC455}" destId="{1FEB91B5-E9C2-43F7-8726-0B790C17FA6C}" srcOrd="3" destOrd="0" parTransId="{CC0FBB4A-6BAB-4610-9016-632406458C3D}" sibTransId="{9643A849-CEEF-4D4B-A5E6-6807006DE0F4}"/>
-    <dgm:cxn modelId="{88C1BD47-599E-4CCD-A103-892ABD579663}" type="presOf" srcId="{4838D118-DFA9-45A3-9AEF-E53336BAC455}" destId="{510F1B5E-F128-4DA8-A091-EFFEEBB8130A}" srcOrd="0" destOrd="0" presId="urn:microsoft.com/office/officeart/2005/8/layout/default"/>
-    <dgm:cxn modelId="{8578D068-A00F-47F6-9E52-9DDC453D1C49}" type="presOf" srcId="{4B95026E-0311-4DC9-88F2-CC3F00FF11EC}" destId="{4A22D9F1-06ED-45D2-B36F-D5663718682C}" srcOrd="0" destOrd="0" presId="urn:microsoft.com/office/officeart/2005/8/layout/default"/>
-    <dgm:cxn modelId="{A4F5AC98-1492-4271-BB84-E4AEDE00CDE3}" type="presOf" srcId="{A630582B-7959-4962-9E4F-1B6C930748D8}" destId="{FB956AC2-C00B-410D-B5D5-36ACF71E2158}" srcOrd="0" destOrd="0" presId="urn:microsoft.com/office/officeart/2005/8/layout/default"/>
-    <dgm:cxn modelId="{DCC719E4-3699-4A33-8F1A-010E8845C7D5}" srcId="{4838D118-DFA9-45A3-9AEF-E53336BAC455}" destId="{4B95026E-0311-4DC9-88F2-CC3F00FF11EC}" srcOrd="0" destOrd="0" parTransId="{D25C6AB9-FAE6-4DC7-89D2-C6890CB0A002}" sibTransId="{C7BF6EFA-83E9-4DEB-B907-FF256A8F3FF5}"/>
-    <dgm:cxn modelId="{E66B16EE-4A31-48AB-8DE6-A2C9EBF5C9F4}" srcId="{4838D118-DFA9-45A3-9AEF-E53336BAC455}" destId="{A630582B-7959-4962-9E4F-1B6C930748D8}" srcOrd="1" destOrd="0" parTransId="{75505BEA-80B8-4297-B7D5-559DA03691F2}" sibTransId="{2000C6E9-A9D0-45BA-A727-CC03C2B66273}"/>
-    <dgm:cxn modelId="{E231626C-D873-4901-8C0C-C194D7D60627}" type="presParOf" srcId="{510F1B5E-F128-4DA8-A091-EFFEEBB8130A}" destId="{4A22D9F1-06ED-45D2-B36F-D5663718682C}" srcOrd="0" destOrd="0" presId="urn:microsoft.com/office/officeart/2005/8/layout/default"/>
-    <dgm:cxn modelId="{2B161967-FA29-465E-B2CB-98BD684252A9}" type="presParOf" srcId="{510F1B5E-F128-4DA8-A091-EFFEEBB8130A}" destId="{0F00868D-D668-4279-AD69-5682BBD60BFF}" srcOrd="1" destOrd="0" presId="urn:microsoft.com/office/officeart/2005/8/layout/default"/>
-    <dgm:cxn modelId="{D931CCE8-CB56-475D-AEE3-70D7DBB42883}" type="presParOf" srcId="{510F1B5E-F128-4DA8-A091-EFFEEBB8130A}" destId="{FB956AC2-C00B-410D-B5D5-36ACF71E2158}" srcOrd="2" destOrd="0" presId="urn:microsoft.com/office/officeart/2005/8/layout/default"/>
-    <dgm:cxn modelId="{D6B7DCB7-F030-44AE-9D4F-0BF6EB85BD81}" type="presParOf" srcId="{510F1B5E-F128-4DA8-A091-EFFEEBB8130A}" destId="{CFFEE9BD-53A2-43D5-AACB-8AC558DC2004}" srcOrd="3" destOrd="0" presId="urn:microsoft.com/office/officeart/2005/8/layout/default"/>
-    <dgm:cxn modelId="{86A8FC9E-B750-4F99-88D7-28B9B74D6799}" type="presParOf" srcId="{510F1B5E-F128-4DA8-A091-EFFEEBB8130A}" destId="{E1D69571-F28C-4D88-BBD8-3BA067F78DAE}" srcOrd="4" destOrd="0" presId="urn:microsoft.com/office/officeart/2005/8/layout/default"/>
-    <dgm:cxn modelId="{1BD0D14A-026A-4EFB-A49A-5808F447B351}" type="presParOf" srcId="{510F1B5E-F128-4DA8-A091-EFFEEBB8130A}" destId="{526DB286-E2AE-468A-964E-67C0057D808E}" srcOrd="5" destOrd="0" presId="urn:microsoft.com/office/officeart/2005/8/layout/default"/>
-    <dgm:cxn modelId="{6D673A59-FB17-4DFD-8F57-42FECD4FF89B}" type="presParOf" srcId="{510F1B5E-F128-4DA8-A091-EFFEEBB8130A}" destId="{6FC73968-3102-4219-9158-81F292187B41}" srcOrd="6" destOrd="0" presId="urn:microsoft.com/office/officeart/2005/8/layout/default"/>
-    <dgm:cxn modelId="{B6139BEF-B232-45A3-943D-7E92300B6DC3}" type="presParOf" srcId="{510F1B5E-F128-4DA8-A091-EFFEEBB8130A}" destId="{08299FBE-9BD9-4D71-92E9-677C8F68E125}" srcOrd="7" destOrd="0" presId="urn:microsoft.com/office/officeart/2005/8/layout/default"/>
-    <dgm:cxn modelId="{E3A28D4C-F8D0-4601-B55F-AE17AD5D7BDF}" type="presParOf" srcId="{510F1B5E-F128-4DA8-A091-EFFEEBB8130A}" destId="{2899E9D8-A345-4E63-BB25-81DFDD213FC6}" srcOrd="8" destOrd="0" presId="urn:microsoft.com/office/officeart/2005/8/layout/default"/>
+    <dgm:cxn modelId="{A4F5AC98-1492-4271-BB84-E4AEDE00CDE3}" type="presOf" srcId="{A630582B-7959-4962-9E4F-1B6C930748D8}" destId="{FB956AC2-C00B-410D-B5D5-36ACF71E2158}" srcOrd="0" destOrd="0" presId="urn:microsoft.com/office/officeart/2005/8/layout/default#1"/>
+    <dgm:cxn modelId="{8578D068-A00F-47F6-9E52-9DDC453D1C49}" type="presOf" srcId="{4B95026E-0311-4DC9-88F2-CC3F00FF11EC}" destId="{4A22D9F1-06ED-45D2-B36F-D5663718682C}" srcOrd="0" destOrd="0" presId="urn:microsoft.com/office/officeart/2005/8/layout/default#1"/>
+    <dgm:cxn modelId="{49A3E22B-DCBC-4028-80C5-30AD8517F068}" type="presOf" srcId="{61089649-69E8-4E32-A642-8F049B40B91D}" destId="{E1D69571-F28C-4D88-BBD8-3BA067F78DAE}" srcOrd="0" destOrd="0" presId="urn:microsoft.com/office/officeart/2005/8/layout/default#1"/>
+    <dgm:cxn modelId="{88C1BD47-599E-4CCD-A103-892ABD579663}" type="presOf" srcId="{4838D118-DFA9-45A3-9AEF-E53336BAC455}" destId="{510F1B5E-F128-4DA8-A091-EFFEEBB8130A}" srcOrd="0" destOrd="0" presId="urn:microsoft.com/office/officeart/2005/8/layout/default#1"/>
+    <dgm:cxn modelId="{E231626C-D873-4901-8C0C-C194D7D60627}" type="presParOf" srcId="{510F1B5E-F128-4DA8-A091-EFFEEBB8130A}" destId="{4A22D9F1-06ED-45D2-B36F-D5663718682C}" srcOrd="0" destOrd="0" presId="urn:microsoft.com/office/officeart/2005/8/layout/default#1"/>
+    <dgm:cxn modelId="{2B161967-FA29-465E-B2CB-98BD684252A9}" type="presParOf" srcId="{510F1B5E-F128-4DA8-A091-EFFEEBB8130A}" destId="{0F00868D-D668-4279-AD69-5682BBD60BFF}" srcOrd="1" destOrd="0" presId="urn:microsoft.com/office/officeart/2005/8/layout/default#1"/>
+    <dgm:cxn modelId="{D931CCE8-CB56-475D-AEE3-70D7DBB42883}" type="presParOf" srcId="{510F1B5E-F128-4DA8-A091-EFFEEBB8130A}" destId="{FB956AC2-C00B-410D-B5D5-36ACF71E2158}" srcOrd="2" destOrd="0" presId="urn:microsoft.com/office/officeart/2005/8/layout/default#1"/>
+    <dgm:cxn modelId="{D6B7DCB7-F030-44AE-9D4F-0BF6EB85BD81}" type="presParOf" srcId="{510F1B5E-F128-4DA8-A091-EFFEEBB8130A}" destId="{CFFEE9BD-53A2-43D5-AACB-8AC558DC2004}" srcOrd="3" destOrd="0" presId="urn:microsoft.com/office/officeart/2005/8/layout/default#1"/>
+    <dgm:cxn modelId="{86A8FC9E-B750-4F99-88D7-28B9B74D6799}" type="presParOf" srcId="{510F1B5E-F128-4DA8-A091-EFFEEBB8130A}" destId="{E1D69571-F28C-4D88-BBD8-3BA067F78DAE}" srcOrd="4" destOrd="0" presId="urn:microsoft.com/office/officeart/2005/8/layout/default#1"/>
+    <dgm:cxn modelId="{1BD0D14A-026A-4EFB-A49A-5808F447B351}" type="presParOf" srcId="{510F1B5E-F128-4DA8-A091-EFFEEBB8130A}" destId="{526DB286-E2AE-468A-964E-67C0057D808E}" srcOrd="5" destOrd="0" presId="urn:microsoft.com/office/officeart/2005/8/layout/default#1"/>
+    <dgm:cxn modelId="{6D673A59-FB17-4DFD-8F57-42FECD4FF89B}" type="presParOf" srcId="{510F1B5E-F128-4DA8-A091-EFFEEBB8130A}" destId="{6FC73968-3102-4219-9158-81F292187B41}" srcOrd="6" destOrd="0" presId="urn:microsoft.com/office/officeart/2005/8/layout/default#1"/>
+    <dgm:cxn modelId="{B6139BEF-B232-45A3-943D-7E92300B6DC3}" type="presParOf" srcId="{510F1B5E-F128-4DA8-A091-EFFEEBB8130A}" destId="{08299FBE-9BD9-4D71-92E9-677C8F68E125}" srcOrd="7" destOrd="0" presId="urn:microsoft.com/office/officeart/2005/8/layout/default#1"/>
+    <dgm:cxn modelId="{E3A28D4C-F8D0-4601-B55F-AE17AD5D7BDF}" type="presParOf" srcId="{510F1B5E-F128-4DA8-A091-EFFEEBB8130A}" destId="{2899E9D8-A345-4E63-BB25-81DFDD213FC6}" srcOrd="8" destOrd="0" presId="urn:microsoft.com/office/officeart/2005/8/layout/default#1"/>
   </dgm:cxnLst>
   <dgm:bg/>
   <dgm:whole/>
   <dgm:extLst>
     <a:ext uri="http://schemas.microsoft.com/office/drawing/2008/diagram">
-      <dsp:dataModelExt xmlns:dsp="http://schemas.microsoft.com/office/drawing/2008/diagram" relId="rId7" minVer="http://schemas.openxmlformats.org/drawingml/2006/diagram"/>
+      <dsp:dataModelExt xmlns:dsp="http://schemas.microsoft.com/office/drawing/2008/diagram" xmlns="" relId="rId7" minVer="http://schemas.openxmlformats.org/drawingml/2006/diagram"/>
     </a:ext>
   </dgm:extLst>
 </dgm:dataModel>
@@ -3725,7 +4549,7 @@
 <dgm:dataModel xmlns:dgm="http://schemas.openxmlformats.org/drawingml/2006/diagram" xmlns:a="http://schemas.openxmlformats.org/drawingml/2006/main">
   <dgm:ptLst>
     <dgm:pt modelId="{4838D118-DFA9-45A3-9AEF-E53336BAC455}" type="doc">
-      <dgm:prSet loTypeId="urn:microsoft.com/office/officeart/2005/8/layout/default" loCatId="list" qsTypeId="urn:microsoft.com/office/officeart/2005/8/quickstyle/simple1" qsCatId="simple" csTypeId="urn:microsoft.com/office/officeart/2005/8/colors/colorful3" csCatId="colorful" phldr="1"/>
+      <dgm:prSet loTypeId="urn:microsoft.com/office/officeart/2005/8/layout/default#2" loCatId="list" qsTypeId="urn:microsoft.com/office/officeart/2005/8/quickstyle/simple1" qsCatId="simple" csTypeId="urn:microsoft.com/office/officeart/2005/8/colors/colorful3" csCatId="colorful" phldr="1"/>
       <dgm:spPr/>
       <dgm:t>
         <a:bodyPr/>
@@ -3908,6 +4732,49 @@
         </a:p>
       </dgm:t>
     </dgm:pt>
+    <dgm:pt modelId="{0BF00A7F-B021-4177-BE3A-E10515C26457}">
+      <dgm:prSet/>
+      <dgm:spPr>
+        <a:ln>
+          <a:solidFill>
+            <a:schemeClr val="tx1"/>
+          </a:solidFill>
+        </a:ln>
+      </dgm:spPr>
+      <dgm:t>
+        <a:bodyPr/>
+        <a:lstStyle/>
+        <a:p>
+          <a:r>
+            <a:rPr lang="en-US" dirty="0" smtClean="0"/>
+            <a:t>Adventure game</a:t>
+          </a:r>
+          <a:endParaRPr lang="en-US" dirty="0"/>
+        </a:p>
+      </dgm:t>
+    </dgm:pt>
+    <dgm:pt modelId="{44B28A76-F95B-4F83-B3D1-E2EFD0CAD630}" type="parTrans" cxnId="{EB147EE1-F1AA-4191-8187-FE101763955C}">
+      <dgm:prSet/>
+      <dgm:spPr/>
+      <dgm:t>
+        <a:bodyPr/>
+        <a:lstStyle/>
+        <a:p>
+          <a:endParaRPr lang="en-US"/>
+        </a:p>
+      </dgm:t>
+    </dgm:pt>
+    <dgm:pt modelId="{B0471516-4B4B-4B2E-8F1F-3BA3CE998191}" type="sibTrans" cxnId="{EB147EE1-F1AA-4191-8187-FE101763955C}">
+      <dgm:prSet/>
+      <dgm:spPr/>
+      <dgm:t>
+        <a:bodyPr/>
+        <a:lstStyle/>
+        <a:p>
+          <a:endParaRPr lang="en-US"/>
+        </a:p>
+      </dgm:t>
+    </dgm:pt>
     <dgm:pt modelId="{510F1B5E-F128-4DA8-A091-EFFEEBB8130A}" type="pres">
       <dgm:prSet presAssocID="{4838D118-DFA9-45A3-9AEF-E53336BAC455}" presName="diagram" presStyleCnt="0">
         <dgm:presLayoutVars>
@@ -3916,81 +4783,383 @@
         </dgm:presLayoutVars>
       </dgm:prSet>
       <dgm:spPr/>
+      <dgm:t>
+        <a:bodyPr/>
+        <a:lstStyle/>
+        <a:p>
+          <a:endParaRPr lang="en-US"/>
+        </a:p>
+      </dgm:t>
     </dgm:pt>
     <dgm:pt modelId="{4A22D9F1-06ED-45D2-B36F-D5663718682C}" type="pres">
-      <dgm:prSet presAssocID="{4B95026E-0311-4DC9-88F2-CC3F00FF11EC}" presName="node" presStyleLbl="node1" presStyleIdx="0" presStyleCnt="4">
+      <dgm:prSet presAssocID="{4B95026E-0311-4DC9-88F2-CC3F00FF11EC}" presName="node" presStyleLbl="node1" presStyleIdx="0" presStyleCnt="5">
         <dgm:presLayoutVars>
           <dgm:bulletEnabled val="1"/>
         </dgm:presLayoutVars>
       </dgm:prSet>
       <dgm:spPr/>
+      <dgm:t>
+        <a:bodyPr/>
+        <a:lstStyle/>
+        <a:p>
+          <a:endParaRPr lang="en-US"/>
+        </a:p>
+      </dgm:t>
     </dgm:pt>
     <dgm:pt modelId="{0F00868D-D668-4279-AD69-5682BBD60BFF}" type="pres">
       <dgm:prSet presAssocID="{C7BF6EFA-83E9-4DEB-B907-FF256A8F3FF5}" presName="sibTrans" presStyleCnt="0"/>
       <dgm:spPr/>
     </dgm:pt>
     <dgm:pt modelId="{6FC73968-3102-4219-9158-81F292187B41}" type="pres">
-      <dgm:prSet presAssocID="{1FEB91B5-E9C2-43F7-8726-0B790C17FA6C}" presName="node" presStyleLbl="node1" presStyleIdx="1" presStyleCnt="4">
+      <dgm:prSet presAssocID="{1FEB91B5-E9C2-43F7-8726-0B790C17FA6C}" presName="node" presStyleLbl="node1" presStyleIdx="1" presStyleCnt="5">
         <dgm:presLayoutVars>
           <dgm:bulletEnabled val="1"/>
         </dgm:presLayoutVars>
       </dgm:prSet>
       <dgm:spPr/>
+      <dgm:t>
+        <a:bodyPr/>
+        <a:lstStyle/>
+        <a:p>
+          <a:endParaRPr lang="en-US"/>
+        </a:p>
+      </dgm:t>
     </dgm:pt>
     <dgm:pt modelId="{08299FBE-9BD9-4D71-92E9-677C8F68E125}" type="pres">
       <dgm:prSet presAssocID="{9643A849-CEEF-4D4B-A5E6-6807006DE0F4}" presName="sibTrans" presStyleCnt="0"/>
       <dgm:spPr/>
     </dgm:pt>
     <dgm:pt modelId="{2899E9D8-A345-4E63-BB25-81DFDD213FC6}" type="pres">
-      <dgm:prSet presAssocID="{B94EC4D3-4F69-49FD-9AA7-7A24C1E59AA8}" presName="node" presStyleLbl="node1" presStyleIdx="2" presStyleCnt="4">
+      <dgm:prSet presAssocID="{B94EC4D3-4F69-49FD-9AA7-7A24C1E59AA8}" presName="node" presStyleLbl="node1" presStyleIdx="2" presStyleCnt="5">
         <dgm:presLayoutVars>
           <dgm:bulletEnabled val="1"/>
         </dgm:presLayoutVars>
       </dgm:prSet>
       <dgm:spPr/>
+      <dgm:t>
+        <a:bodyPr/>
+        <a:lstStyle/>
+        <a:p>
+          <a:endParaRPr lang="en-US"/>
+        </a:p>
+      </dgm:t>
     </dgm:pt>
     <dgm:pt modelId="{969429E5-B34D-46EC-818C-E94889CB5707}" type="pres">
       <dgm:prSet presAssocID="{30FD44A5-2541-4E68-B92B-BAFF86DBA7CF}" presName="sibTrans" presStyleCnt="0"/>
       <dgm:spPr/>
     </dgm:pt>
     <dgm:pt modelId="{3BBD22DF-2AB1-40F3-AB6B-072706149C6F}" type="pres">
-      <dgm:prSet presAssocID="{4E12D5BF-A231-4360-B793-3200C653EA28}" presName="node" presStyleLbl="node1" presStyleIdx="3" presStyleCnt="4">
+      <dgm:prSet presAssocID="{4E12D5BF-A231-4360-B793-3200C653EA28}" presName="node" presStyleLbl="node1" presStyleIdx="3" presStyleCnt="5">
         <dgm:presLayoutVars>
           <dgm:bulletEnabled val="1"/>
         </dgm:presLayoutVars>
       </dgm:prSet>
       <dgm:spPr/>
+      <dgm:t>
+        <a:bodyPr/>
+        <a:lstStyle/>
+        <a:p>
+          <a:endParaRPr lang="en-US"/>
+        </a:p>
+      </dgm:t>
+    </dgm:pt>
+    <dgm:pt modelId="{97E75A50-F8B1-4382-B5EF-562699D1E22E}" type="pres">
+      <dgm:prSet presAssocID="{808D8B2D-0323-48EE-B796-3850ABE413FF}" presName="sibTrans" presStyleCnt="0"/>
+      <dgm:spPr/>
+    </dgm:pt>
+    <dgm:pt modelId="{6E5883CA-0A6B-4CBE-9858-04346D16402F}" type="pres">
+      <dgm:prSet presAssocID="{0BF00A7F-B021-4177-BE3A-E10515C26457}" presName="node" presStyleLbl="node1" presStyleIdx="4" presStyleCnt="5">
+        <dgm:presLayoutVars>
+          <dgm:bulletEnabled val="1"/>
+        </dgm:presLayoutVars>
+      </dgm:prSet>
+      <dgm:spPr/>
+      <dgm:t>
+        <a:bodyPr/>
+        <a:lstStyle/>
+        <a:p>
+          <a:endParaRPr lang="en-US"/>
+        </a:p>
+      </dgm:t>
     </dgm:pt>
   </dgm:ptLst>
   <dgm:cxnLst>
-    <dgm:cxn modelId="{2504F133-884D-42FE-B25D-E78BB97D3E76}" type="presOf" srcId="{B94EC4D3-4F69-49FD-9AA7-7A24C1E59AA8}" destId="{2899E9D8-A345-4E63-BB25-81DFDD213FC6}" srcOrd="0" destOrd="0" presId="urn:microsoft.com/office/officeart/2005/8/layout/default"/>
-    <dgm:cxn modelId="{760E3C34-FDE7-406A-ACFE-B5B2DF78EF43}" type="presOf" srcId="{1FEB91B5-E9C2-43F7-8726-0B790C17FA6C}" destId="{6FC73968-3102-4219-9158-81F292187B41}" srcOrd="0" destOrd="0" presId="urn:microsoft.com/office/officeart/2005/8/layout/default"/>
+    <dgm:cxn modelId="{5D0A075D-AFC9-4FBE-B3C9-234CF761078B}" srcId="{4838D118-DFA9-45A3-9AEF-E53336BAC455}" destId="{1FEB91B5-E9C2-43F7-8726-0B790C17FA6C}" srcOrd="1" destOrd="0" parTransId="{CC0FBB4A-6BAB-4610-9016-632406458C3D}" sibTransId="{9643A849-CEEF-4D4B-A5E6-6807006DE0F4}"/>
+    <dgm:cxn modelId="{760E3C34-FDE7-406A-ACFE-B5B2DF78EF43}" type="presOf" srcId="{1FEB91B5-E9C2-43F7-8726-0B790C17FA6C}" destId="{6FC73968-3102-4219-9158-81F292187B41}" srcOrd="0" destOrd="0" presId="urn:microsoft.com/office/officeart/2005/8/layout/default#2"/>
+    <dgm:cxn modelId="{DCC719E4-3699-4A33-8F1A-010E8845C7D5}" srcId="{4838D118-DFA9-45A3-9AEF-E53336BAC455}" destId="{4B95026E-0311-4DC9-88F2-CC3F00FF11EC}" srcOrd="0" destOrd="0" parTransId="{D25C6AB9-FAE6-4DC7-89D2-C6890CB0A002}" sibTransId="{C7BF6EFA-83E9-4DEB-B907-FF256A8F3FF5}"/>
     <dgm:cxn modelId="{DB68003D-2FA3-4C96-A488-625B50BC217C}" srcId="{4838D118-DFA9-45A3-9AEF-E53336BAC455}" destId="{B94EC4D3-4F69-49FD-9AA7-7A24C1E59AA8}" srcOrd="2" destOrd="0" parTransId="{C5A4A8F5-533E-47DC-BB13-77A8C7560C39}" sibTransId="{30FD44A5-2541-4E68-B92B-BAFF86DBA7CF}"/>
-    <dgm:cxn modelId="{5D0A075D-AFC9-4FBE-B3C9-234CF761078B}" srcId="{4838D118-DFA9-45A3-9AEF-E53336BAC455}" destId="{1FEB91B5-E9C2-43F7-8726-0B790C17FA6C}" srcOrd="1" destOrd="0" parTransId="{CC0FBB4A-6BAB-4610-9016-632406458C3D}" sibTransId="{9643A849-CEEF-4D4B-A5E6-6807006DE0F4}"/>
-    <dgm:cxn modelId="{22E7F04C-4845-4790-B994-EB1AA8868B22}" type="presOf" srcId="{4838D118-DFA9-45A3-9AEF-E53336BAC455}" destId="{510F1B5E-F128-4DA8-A091-EFFEEBB8130A}" srcOrd="0" destOrd="0" presId="urn:microsoft.com/office/officeart/2005/8/layout/default"/>
-    <dgm:cxn modelId="{AE3DF14C-C325-472A-95E1-910EEA19C6B2}" type="presOf" srcId="{4E12D5BF-A231-4360-B793-3200C653EA28}" destId="{3BBD22DF-2AB1-40F3-AB6B-072706149C6F}" srcOrd="0" destOrd="0" presId="urn:microsoft.com/office/officeart/2005/8/layout/default"/>
-    <dgm:cxn modelId="{80C5E3AC-F0D9-4345-BE20-18820852A6D5}" type="presOf" srcId="{4B95026E-0311-4DC9-88F2-CC3F00FF11EC}" destId="{4A22D9F1-06ED-45D2-B36F-D5663718682C}" srcOrd="0" destOrd="0" presId="urn:microsoft.com/office/officeart/2005/8/layout/default"/>
-    <dgm:cxn modelId="{DCC719E4-3699-4A33-8F1A-010E8845C7D5}" srcId="{4838D118-DFA9-45A3-9AEF-E53336BAC455}" destId="{4B95026E-0311-4DC9-88F2-CC3F00FF11EC}" srcOrd="0" destOrd="0" parTransId="{D25C6AB9-FAE6-4DC7-89D2-C6890CB0A002}" sibTransId="{C7BF6EFA-83E9-4DEB-B907-FF256A8F3FF5}"/>
     <dgm:cxn modelId="{E8C5C2F6-DE2E-47DE-BA0E-389485BBE514}" srcId="{4838D118-DFA9-45A3-9AEF-E53336BAC455}" destId="{4E12D5BF-A231-4360-B793-3200C653EA28}" srcOrd="3" destOrd="0" parTransId="{3B38D731-430F-4D03-A3B8-4A699D8388A1}" sibTransId="{808D8B2D-0323-48EE-B796-3850ABE413FF}"/>
-    <dgm:cxn modelId="{3D8377B9-27C1-4FC6-892E-B94BA4D2B19F}" type="presParOf" srcId="{510F1B5E-F128-4DA8-A091-EFFEEBB8130A}" destId="{4A22D9F1-06ED-45D2-B36F-D5663718682C}" srcOrd="0" destOrd="0" presId="urn:microsoft.com/office/officeart/2005/8/layout/default"/>
-    <dgm:cxn modelId="{290359FD-7C3B-4634-A90A-082FAE01E87B}" type="presParOf" srcId="{510F1B5E-F128-4DA8-A091-EFFEEBB8130A}" destId="{0F00868D-D668-4279-AD69-5682BBD60BFF}" srcOrd="1" destOrd="0" presId="urn:microsoft.com/office/officeart/2005/8/layout/default"/>
-    <dgm:cxn modelId="{00237755-0C44-427B-A49D-900F0221FA52}" type="presParOf" srcId="{510F1B5E-F128-4DA8-A091-EFFEEBB8130A}" destId="{6FC73968-3102-4219-9158-81F292187B41}" srcOrd="2" destOrd="0" presId="urn:microsoft.com/office/officeart/2005/8/layout/default"/>
-    <dgm:cxn modelId="{CFEDA68A-F10C-4029-86B4-91B1CF03C713}" type="presParOf" srcId="{510F1B5E-F128-4DA8-A091-EFFEEBB8130A}" destId="{08299FBE-9BD9-4D71-92E9-677C8F68E125}" srcOrd="3" destOrd="0" presId="urn:microsoft.com/office/officeart/2005/8/layout/default"/>
-    <dgm:cxn modelId="{1296DCCF-38C6-4381-BF07-7FDFF865DB99}" type="presParOf" srcId="{510F1B5E-F128-4DA8-A091-EFFEEBB8130A}" destId="{2899E9D8-A345-4E63-BB25-81DFDD213FC6}" srcOrd="4" destOrd="0" presId="urn:microsoft.com/office/officeart/2005/8/layout/default"/>
-    <dgm:cxn modelId="{AF51C1E0-40A8-4109-849C-BBACA7707120}" type="presParOf" srcId="{510F1B5E-F128-4DA8-A091-EFFEEBB8130A}" destId="{969429E5-B34D-46EC-818C-E94889CB5707}" srcOrd="5" destOrd="0" presId="urn:microsoft.com/office/officeart/2005/8/layout/default"/>
-    <dgm:cxn modelId="{6F864455-4235-41DE-A5D2-E8D0E65AEBA9}" type="presParOf" srcId="{510F1B5E-F128-4DA8-A091-EFFEEBB8130A}" destId="{3BBD22DF-2AB1-40F3-AB6B-072706149C6F}" srcOrd="6" destOrd="0" presId="urn:microsoft.com/office/officeart/2005/8/layout/default"/>
+    <dgm:cxn modelId="{80C5E3AC-F0D9-4345-BE20-18820852A6D5}" type="presOf" srcId="{4B95026E-0311-4DC9-88F2-CC3F00FF11EC}" destId="{4A22D9F1-06ED-45D2-B36F-D5663718682C}" srcOrd="0" destOrd="0" presId="urn:microsoft.com/office/officeart/2005/8/layout/default#2"/>
+    <dgm:cxn modelId="{E8DCC286-DDF1-44F5-97CB-A992AB07E6D0}" type="presOf" srcId="{0BF00A7F-B021-4177-BE3A-E10515C26457}" destId="{6E5883CA-0A6B-4CBE-9858-04346D16402F}" srcOrd="0" destOrd="0" presId="urn:microsoft.com/office/officeart/2005/8/layout/default#2"/>
+    <dgm:cxn modelId="{2504F133-884D-42FE-B25D-E78BB97D3E76}" type="presOf" srcId="{B94EC4D3-4F69-49FD-9AA7-7A24C1E59AA8}" destId="{2899E9D8-A345-4E63-BB25-81DFDD213FC6}" srcOrd="0" destOrd="0" presId="urn:microsoft.com/office/officeart/2005/8/layout/default#2"/>
+    <dgm:cxn modelId="{AE3DF14C-C325-472A-95E1-910EEA19C6B2}" type="presOf" srcId="{4E12D5BF-A231-4360-B793-3200C653EA28}" destId="{3BBD22DF-2AB1-40F3-AB6B-072706149C6F}" srcOrd="0" destOrd="0" presId="urn:microsoft.com/office/officeart/2005/8/layout/default#2"/>
+    <dgm:cxn modelId="{22E7F04C-4845-4790-B994-EB1AA8868B22}" type="presOf" srcId="{4838D118-DFA9-45A3-9AEF-E53336BAC455}" destId="{510F1B5E-F128-4DA8-A091-EFFEEBB8130A}" srcOrd="0" destOrd="0" presId="urn:microsoft.com/office/officeart/2005/8/layout/default#2"/>
+    <dgm:cxn modelId="{EB147EE1-F1AA-4191-8187-FE101763955C}" srcId="{4838D118-DFA9-45A3-9AEF-E53336BAC455}" destId="{0BF00A7F-B021-4177-BE3A-E10515C26457}" srcOrd="4" destOrd="0" parTransId="{44B28A76-F95B-4F83-B3D1-E2EFD0CAD630}" sibTransId="{B0471516-4B4B-4B2E-8F1F-3BA3CE998191}"/>
+    <dgm:cxn modelId="{3D8377B9-27C1-4FC6-892E-B94BA4D2B19F}" type="presParOf" srcId="{510F1B5E-F128-4DA8-A091-EFFEEBB8130A}" destId="{4A22D9F1-06ED-45D2-B36F-D5663718682C}" srcOrd="0" destOrd="0" presId="urn:microsoft.com/office/officeart/2005/8/layout/default#2"/>
+    <dgm:cxn modelId="{290359FD-7C3B-4634-A90A-082FAE01E87B}" type="presParOf" srcId="{510F1B5E-F128-4DA8-A091-EFFEEBB8130A}" destId="{0F00868D-D668-4279-AD69-5682BBD60BFF}" srcOrd="1" destOrd="0" presId="urn:microsoft.com/office/officeart/2005/8/layout/default#2"/>
+    <dgm:cxn modelId="{00237755-0C44-427B-A49D-900F0221FA52}" type="presParOf" srcId="{510F1B5E-F128-4DA8-A091-EFFEEBB8130A}" destId="{6FC73968-3102-4219-9158-81F292187B41}" srcOrd="2" destOrd="0" presId="urn:microsoft.com/office/officeart/2005/8/layout/default#2"/>
+    <dgm:cxn modelId="{CFEDA68A-F10C-4029-86B4-91B1CF03C713}" type="presParOf" srcId="{510F1B5E-F128-4DA8-A091-EFFEEBB8130A}" destId="{08299FBE-9BD9-4D71-92E9-677C8F68E125}" srcOrd="3" destOrd="0" presId="urn:microsoft.com/office/officeart/2005/8/layout/default#2"/>
+    <dgm:cxn modelId="{1296DCCF-38C6-4381-BF07-7FDFF865DB99}" type="presParOf" srcId="{510F1B5E-F128-4DA8-A091-EFFEEBB8130A}" destId="{2899E9D8-A345-4E63-BB25-81DFDD213FC6}" srcOrd="4" destOrd="0" presId="urn:microsoft.com/office/officeart/2005/8/layout/default#2"/>
+    <dgm:cxn modelId="{AF51C1E0-40A8-4109-849C-BBACA7707120}" type="presParOf" srcId="{510F1B5E-F128-4DA8-A091-EFFEEBB8130A}" destId="{969429E5-B34D-46EC-818C-E94889CB5707}" srcOrd="5" destOrd="0" presId="urn:microsoft.com/office/officeart/2005/8/layout/default#2"/>
+    <dgm:cxn modelId="{6F864455-4235-41DE-A5D2-E8D0E65AEBA9}" type="presParOf" srcId="{510F1B5E-F128-4DA8-A091-EFFEEBB8130A}" destId="{3BBD22DF-2AB1-40F3-AB6B-072706149C6F}" srcOrd="6" destOrd="0" presId="urn:microsoft.com/office/officeart/2005/8/layout/default#2"/>
+    <dgm:cxn modelId="{7EE8940A-9793-47E5-BD15-8D9B2E13A00D}" type="presParOf" srcId="{510F1B5E-F128-4DA8-A091-EFFEEBB8130A}" destId="{97E75A50-F8B1-4382-B5EF-562699D1E22E}" srcOrd="7" destOrd="0" presId="urn:microsoft.com/office/officeart/2005/8/layout/default#2"/>
+    <dgm:cxn modelId="{9683D336-FEB3-4E07-AA3D-4A594C831B32}" type="presParOf" srcId="{510F1B5E-F128-4DA8-A091-EFFEEBB8130A}" destId="{6E5883CA-0A6B-4CBE-9858-04346D16402F}" srcOrd="8" destOrd="0" presId="urn:microsoft.com/office/officeart/2005/8/layout/default#2"/>
   </dgm:cxnLst>
   <dgm:bg/>
   <dgm:whole/>
   <dgm:extLst>
     <a:ext uri="http://schemas.microsoft.com/office/drawing/2008/diagram">
-      <dsp:dataModelExt xmlns:dsp="http://schemas.microsoft.com/office/drawing/2008/diagram" relId="rId7" minVer="http://schemas.openxmlformats.org/drawingml/2006/diagram"/>
+      <dsp:dataModelExt xmlns:dsp="http://schemas.microsoft.com/office/drawing/2008/diagram" xmlns="" relId="rId7" minVer="http://schemas.openxmlformats.org/drawingml/2006/diagram"/>
     </a:ext>
   </dgm:extLst>
 </dgm:dataModel>
 </file>
 
 <file path=ppt/diagrams/data3.xml><?xml version="1.0" encoding="utf-8"?>
+<dgm:dataModel xmlns:dgm="http://schemas.openxmlformats.org/drawingml/2006/diagram" xmlns:a="http://schemas.openxmlformats.org/drawingml/2006/main">
+  <dgm:ptLst>
+    <dgm:pt modelId="{9EA7352A-8767-469D-83F9-9AF5D96C7B48}" type="doc">
+      <dgm:prSet loTypeId="urn:microsoft.com/office/officeart/2005/8/layout/process1" loCatId="process" qsTypeId="urn:microsoft.com/office/officeart/2005/8/quickstyle/simple1" qsCatId="simple" csTypeId="urn:microsoft.com/office/officeart/2005/8/colors/colorful3" csCatId="colorful" phldr="1"/>
+      <dgm:spPr/>
+    </dgm:pt>
+    <dgm:pt modelId="{FEC1E40E-1A81-4BF9-9336-94C6EEBBC4D6}">
+      <dgm:prSet phldrT="[Text]"/>
+      <dgm:spPr>
+        <a:ln>
+          <a:solidFill>
+            <a:schemeClr val="tx1"/>
+          </a:solidFill>
+        </a:ln>
+      </dgm:spPr>
+      <dgm:t>
+        <a:bodyPr/>
+        <a:lstStyle/>
+        <a:p>
+          <a:r>
+            <a:rPr lang="en-US" dirty="0" smtClean="0"/>
+            <a:t>Kill enemies</a:t>
+          </a:r>
+          <a:endParaRPr lang="en-US" dirty="0"/>
+        </a:p>
+      </dgm:t>
+    </dgm:pt>
+    <dgm:pt modelId="{9EE29BE5-C465-44DE-A8C8-BF5F43FE5F0C}" type="parTrans" cxnId="{3C4AFB92-2774-4B5E-A8D7-A1AE7AE51E80}">
+      <dgm:prSet/>
+      <dgm:spPr/>
+      <dgm:t>
+        <a:bodyPr/>
+        <a:lstStyle/>
+        <a:p>
+          <a:endParaRPr lang="en-US"/>
+        </a:p>
+      </dgm:t>
+    </dgm:pt>
+    <dgm:pt modelId="{827154F7-A042-4752-BFB4-D0A302213B0F}" type="sibTrans" cxnId="{3C4AFB92-2774-4B5E-A8D7-A1AE7AE51E80}">
+      <dgm:prSet/>
+      <dgm:spPr>
+        <a:ln>
+          <a:solidFill>
+            <a:schemeClr val="tx1"/>
+          </a:solidFill>
+        </a:ln>
+      </dgm:spPr>
+      <dgm:t>
+        <a:bodyPr/>
+        <a:lstStyle/>
+        <a:p>
+          <a:endParaRPr lang="en-US"/>
+        </a:p>
+      </dgm:t>
+    </dgm:pt>
+    <dgm:pt modelId="{01D63C4B-A12B-47F9-ABF1-C37FD81BB8E4}">
+      <dgm:prSet phldrT="[Text]"/>
+      <dgm:spPr>
+        <a:ln>
+          <a:solidFill>
+            <a:schemeClr val="tx1"/>
+          </a:solidFill>
+        </a:ln>
+      </dgm:spPr>
+      <dgm:t>
+        <a:bodyPr/>
+        <a:lstStyle/>
+        <a:p>
+          <a:r>
+            <a:rPr lang="en-US" dirty="0" smtClean="0"/>
+            <a:t>Collect coins</a:t>
+          </a:r>
+          <a:endParaRPr lang="en-US" dirty="0"/>
+        </a:p>
+      </dgm:t>
+    </dgm:pt>
+    <dgm:pt modelId="{8F4DDB60-D2AA-4A3A-BBDE-0B97B958C10F}" type="parTrans" cxnId="{34F864FD-FEE6-4583-99B8-08705F3FA869}">
+      <dgm:prSet/>
+      <dgm:spPr/>
+      <dgm:t>
+        <a:bodyPr/>
+        <a:lstStyle/>
+        <a:p>
+          <a:endParaRPr lang="en-US"/>
+        </a:p>
+      </dgm:t>
+    </dgm:pt>
+    <dgm:pt modelId="{C3BC09D0-467A-4482-80DB-85B1AA93813D}" type="sibTrans" cxnId="{34F864FD-FEE6-4583-99B8-08705F3FA869}">
+      <dgm:prSet/>
+      <dgm:spPr>
+        <a:ln>
+          <a:solidFill>
+            <a:schemeClr val="tx1"/>
+          </a:solidFill>
+        </a:ln>
+      </dgm:spPr>
+      <dgm:t>
+        <a:bodyPr/>
+        <a:lstStyle/>
+        <a:p>
+          <a:endParaRPr lang="en-US"/>
+        </a:p>
+      </dgm:t>
+    </dgm:pt>
+    <dgm:pt modelId="{FE687EB6-541D-4715-AFB5-10C2196AD4B9}">
+      <dgm:prSet phldrT="[Text]"/>
+      <dgm:spPr>
+        <a:ln>
+          <a:solidFill>
+            <a:schemeClr val="tx1"/>
+          </a:solidFill>
+        </a:ln>
+      </dgm:spPr>
+      <dgm:t>
+        <a:bodyPr/>
+        <a:lstStyle/>
+        <a:p>
+          <a:r>
+            <a:rPr lang="en-US" dirty="0" smtClean="0"/>
+            <a:t>Find the door/No hulks</a:t>
+          </a:r>
+          <a:endParaRPr lang="en-US" dirty="0"/>
+        </a:p>
+      </dgm:t>
+    </dgm:pt>
+    <dgm:pt modelId="{496F0B61-434F-413E-957B-2CABFF841018}" type="parTrans" cxnId="{AE4FFCC2-FEFD-4692-B26B-262ADBF39ADB}">
+      <dgm:prSet/>
+      <dgm:spPr/>
+      <dgm:t>
+        <a:bodyPr/>
+        <a:lstStyle/>
+        <a:p>
+          <a:endParaRPr lang="en-US"/>
+        </a:p>
+      </dgm:t>
+    </dgm:pt>
+    <dgm:pt modelId="{775CAC6E-7679-41CE-A370-AFE69E2BA57F}" type="sibTrans" cxnId="{AE4FFCC2-FEFD-4692-B26B-262ADBF39ADB}">
+      <dgm:prSet/>
+      <dgm:spPr/>
+      <dgm:t>
+        <a:bodyPr/>
+        <a:lstStyle/>
+        <a:p>
+          <a:endParaRPr lang="en-US"/>
+        </a:p>
+      </dgm:t>
+    </dgm:pt>
+    <dgm:pt modelId="{D804FDE6-9C6E-460B-8D1D-559A5B7FBAE9}" type="pres">
+      <dgm:prSet presAssocID="{9EA7352A-8767-469D-83F9-9AF5D96C7B48}" presName="Name0" presStyleCnt="0">
+        <dgm:presLayoutVars>
+          <dgm:dir/>
+          <dgm:resizeHandles val="exact"/>
+        </dgm:presLayoutVars>
+      </dgm:prSet>
+      <dgm:spPr/>
+    </dgm:pt>
+    <dgm:pt modelId="{F3296D33-2045-4BD5-BC1A-BF0878718B9C}" type="pres">
+      <dgm:prSet presAssocID="{FEC1E40E-1A81-4BF9-9336-94C6EEBBC4D6}" presName="node" presStyleLbl="node1" presStyleIdx="0" presStyleCnt="3">
+        <dgm:presLayoutVars>
+          <dgm:bulletEnabled val="1"/>
+        </dgm:presLayoutVars>
+      </dgm:prSet>
+      <dgm:spPr/>
+      <dgm:t>
+        <a:bodyPr/>
+        <a:lstStyle/>
+        <a:p>
+          <a:endParaRPr lang="en-US"/>
+        </a:p>
+      </dgm:t>
+    </dgm:pt>
+    <dgm:pt modelId="{9683371C-DC61-4C42-AC03-03BB30E08CED}" type="pres">
+      <dgm:prSet presAssocID="{827154F7-A042-4752-BFB4-D0A302213B0F}" presName="sibTrans" presStyleLbl="sibTrans2D1" presStyleIdx="0" presStyleCnt="2"/>
+      <dgm:spPr/>
+    </dgm:pt>
+    <dgm:pt modelId="{A6F20367-69F8-4077-A6F5-475660297A10}" type="pres">
+      <dgm:prSet presAssocID="{827154F7-A042-4752-BFB4-D0A302213B0F}" presName="connectorText" presStyleLbl="sibTrans2D1" presStyleIdx="0" presStyleCnt="2"/>
+      <dgm:spPr/>
+    </dgm:pt>
+    <dgm:pt modelId="{F6A57F46-D84F-4A59-8D29-248DAE9812F2}" type="pres">
+      <dgm:prSet presAssocID="{01D63C4B-A12B-47F9-ABF1-C37FD81BB8E4}" presName="node" presStyleLbl="node1" presStyleIdx="1" presStyleCnt="3">
+        <dgm:presLayoutVars>
+          <dgm:bulletEnabled val="1"/>
+        </dgm:presLayoutVars>
+      </dgm:prSet>
+      <dgm:spPr/>
+      <dgm:t>
+        <a:bodyPr/>
+        <a:lstStyle/>
+        <a:p>
+          <a:endParaRPr lang="en-US"/>
+        </a:p>
+      </dgm:t>
+    </dgm:pt>
+    <dgm:pt modelId="{EA605B9A-6827-4B95-AE6A-8E0DAB440302}" type="pres">
+      <dgm:prSet presAssocID="{C3BC09D0-467A-4482-80DB-85B1AA93813D}" presName="sibTrans" presStyleLbl="sibTrans2D1" presStyleIdx="1" presStyleCnt="2"/>
+      <dgm:spPr/>
+    </dgm:pt>
+    <dgm:pt modelId="{DFB7DFA6-99D3-47D4-8830-CEFB3228254C}" type="pres">
+      <dgm:prSet presAssocID="{C3BC09D0-467A-4482-80DB-85B1AA93813D}" presName="connectorText" presStyleLbl="sibTrans2D1" presStyleIdx="1" presStyleCnt="2"/>
+      <dgm:spPr/>
+    </dgm:pt>
+    <dgm:pt modelId="{B7665FD0-9B86-479B-9950-56DBDB933E12}" type="pres">
+      <dgm:prSet presAssocID="{FE687EB6-541D-4715-AFB5-10C2196AD4B9}" presName="node" presStyleLbl="node1" presStyleIdx="2" presStyleCnt="3">
+        <dgm:presLayoutVars>
+          <dgm:bulletEnabled val="1"/>
+        </dgm:presLayoutVars>
+      </dgm:prSet>
+      <dgm:spPr/>
+      <dgm:t>
+        <a:bodyPr/>
+        <a:lstStyle/>
+        <a:p>
+          <a:endParaRPr lang="en-US"/>
+        </a:p>
+      </dgm:t>
+    </dgm:pt>
+  </dgm:ptLst>
+  <dgm:cxnLst>
+    <dgm:cxn modelId="{34F864FD-FEE6-4583-99B8-08705F3FA869}" srcId="{9EA7352A-8767-469D-83F9-9AF5D96C7B48}" destId="{01D63C4B-A12B-47F9-ABF1-C37FD81BB8E4}" srcOrd="1" destOrd="0" parTransId="{8F4DDB60-D2AA-4A3A-BBDE-0B97B958C10F}" sibTransId="{C3BC09D0-467A-4482-80DB-85B1AA93813D}"/>
+    <dgm:cxn modelId="{D2E41B8C-DD2F-4642-81D0-27E0BC8AA8E6}" type="presOf" srcId="{C3BC09D0-467A-4482-80DB-85B1AA93813D}" destId="{EA605B9A-6827-4B95-AE6A-8E0DAB440302}" srcOrd="0" destOrd="0" presId="urn:microsoft.com/office/officeart/2005/8/layout/process1"/>
+    <dgm:cxn modelId="{1F4300B3-0D2B-4D63-B47E-C727765195B7}" type="presOf" srcId="{01D63C4B-A12B-47F9-ABF1-C37FD81BB8E4}" destId="{F6A57F46-D84F-4A59-8D29-248DAE9812F2}" srcOrd="0" destOrd="0" presId="urn:microsoft.com/office/officeart/2005/8/layout/process1"/>
+    <dgm:cxn modelId="{3C4AFB92-2774-4B5E-A8D7-A1AE7AE51E80}" srcId="{9EA7352A-8767-469D-83F9-9AF5D96C7B48}" destId="{FEC1E40E-1A81-4BF9-9336-94C6EEBBC4D6}" srcOrd="0" destOrd="0" parTransId="{9EE29BE5-C465-44DE-A8C8-BF5F43FE5F0C}" sibTransId="{827154F7-A042-4752-BFB4-D0A302213B0F}"/>
+    <dgm:cxn modelId="{937C9419-91ED-4530-8A29-75FCD8DA3200}" type="presOf" srcId="{827154F7-A042-4752-BFB4-D0A302213B0F}" destId="{9683371C-DC61-4C42-AC03-03BB30E08CED}" srcOrd="0" destOrd="0" presId="urn:microsoft.com/office/officeart/2005/8/layout/process1"/>
+    <dgm:cxn modelId="{AE4FFCC2-FEFD-4692-B26B-262ADBF39ADB}" srcId="{9EA7352A-8767-469D-83F9-9AF5D96C7B48}" destId="{FE687EB6-541D-4715-AFB5-10C2196AD4B9}" srcOrd="2" destOrd="0" parTransId="{496F0B61-434F-413E-957B-2CABFF841018}" sibTransId="{775CAC6E-7679-41CE-A370-AFE69E2BA57F}"/>
+    <dgm:cxn modelId="{124E459E-1550-4301-99B5-5E062741EE59}" type="presOf" srcId="{FEC1E40E-1A81-4BF9-9336-94C6EEBBC4D6}" destId="{F3296D33-2045-4BD5-BC1A-BF0878718B9C}" srcOrd="0" destOrd="0" presId="urn:microsoft.com/office/officeart/2005/8/layout/process1"/>
+    <dgm:cxn modelId="{81D8E5B2-F6C0-43D0-A1A4-875E5C51777F}" type="presOf" srcId="{9EA7352A-8767-469D-83F9-9AF5D96C7B48}" destId="{D804FDE6-9C6E-460B-8D1D-559A5B7FBAE9}" srcOrd="0" destOrd="0" presId="urn:microsoft.com/office/officeart/2005/8/layout/process1"/>
+    <dgm:cxn modelId="{FCD2B9DB-1BE3-47DC-BA75-1D8F37691F2D}" type="presOf" srcId="{827154F7-A042-4752-BFB4-D0A302213B0F}" destId="{A6F20367-69F8-4077-A6F5-475660297A10}" srcOrd="1" destOrd="0" presId="urn:microsoft.com/office/officeart/2005/8/layout/process1"/>
+    <dgm:cxn modelId="{D0386AE0-430F-49E3-A959-D8E3A2BC9F9A}" type="presOf" srcId="{FE687EB6-541D-4715-AFB5-10C2196AD4B9}" destId="{B7665FD0-9B86-479B-9950-56DBDB933E12}" srcOrd="0" destOrd="0" presId="urn:microsoft.com/office/officeart/2005/8/layout/process1"/>
+    <dgm:cxn modelId="{DD6DDABC-695A-4DC0-A334-CFE3C788F30F}" type="presOf" srcId="{C3BC09D0-467A-4482-80DB-85B1AA93813D}" destId="{DFB7DFA6-99D3-47D4-8830-CEFB3228254C}" srcOrd="1" destOrd="0" presId="urn:microsoft.com/office/officeart/2005/8/layout/process1"/>
+    <dgm:cxn modelId="{9C8EF45C-4659-4284-8E6B-D0DF22E4D596}" type="presParOf" srcId="{D804FDE6-9C6E-460B-8D1D-559A5B7FBAE9}" destId="{F3296D33-2045-4BD5-BC1A-BF0878718B9C}" srcOrd="0" destOrd="0" presId="urn:microsoft.com/office/officeart/2005/8/layout/process1"/>
+    <dgm:cxn modelId="{504B4CF7-18C7-4473-A59D-D1E1361C58DD}" type="presParOf" srcId="{D804FDE6-9C6E-460B-8D1D-559A5B7FBAE9}" destId="{9683371C-DC61-4C42-AC03-03BB30E08CED}" srcOrd="1" destOrd="0" presId="urn:microsoft.com/office/officeart/2005/8/layout/process1"/>
+    <dgm:cxn modelId="{70A03A4C-05FE-49C4-A510-E5064069EC3A}" type="presParOf" srcId="{9683371C-DC61-4C42-AC03-03BB30E08CED}" destId="{A6F20367-69F8-4077-A6F5-475660297A10}" srcOrd="0" destOrd="0" presId="urn:microsoft.com/office/officeart/2005/8/layout/process1"/>
+    <dgm:cxn modelId="{8C41CB0B-5726-48B6-84F7-485B62BD85EC}" type="presParOf" srcId="{D804FDE6-9C6E-460B-8D1D-559A5B7FBAE9}" destId="{F6A57F46-D84F-4A59-8D29-248DAE9812F2}" srcOrd="2" destOrd="0" presId="urn:microsoft.com/office/officeart/2005/8/layout/process1"/>
+    <dgm:cxn modelId="{ADDD7AE6-1E97-4CFC-8506-5334E875D8F3}" type="presParOf" srcId="{D804FDE6-9C6E-460B-8D1D-559A5B7FBAE9}" destId="{EA605B9A-6827-4B95-AE6A-8E0DAB440302}" srcOrd="3" destOrd="0" presId="urn:microsoft.com/office/officeart/2005/8/layout/process1"/>
+    <dgm:cxn modelId="{9E3ED842-9544-4618-9695-309AAA940383}" type="presParOf" srcId="{EA605B9A-6827-4B95-AE6A-8E0DAB440302}" destId="{DFB7DFA6-99D3-47D4-8830-CEFB3228254C}" srcOrd="0" destOrd="0" presId="urn:microsoft.com/office/officeart/2005/8/layout/process1"/>
+    <dgm:cxn modelId="{6992603C-9C9B-46C7-B719-A2A99D0A9673}" type="presParOf" srcId="{D804FDE6-9C6E-460B-8D1D-559A5B7FBAE9}" destId="{B7665FD0-9B86-479B-9950-56DBDB933E12}" srcOrd="4" destOrd="0" presId="urn:microsoft.com/office/officeart/2005/8/layout/process1"/>
+  </dgm:cxnLst>
+  <dgm:bg/>
+  <dgm:whole/>
+</dgm:dataModel>
+</file>
+
+<file path=ppt/diagrams/data4.xml><?xml version="1.0" encoding="utf-8"?>
 <dgm:dataModel xmlns:dgm="http://schemas.openxmlformats.org/drawingml/2006/diagram" xmlns:a="http://schemas.openxmlformats.org/drawingml/2006/main">
   <dgm:ptLst>
     <dgm:pt modelId="{4EA03A46-243F-4F79-93CB-057737295B21}" type="doc">
@@ -4139,6 +5308,13 @@
         </dgm:presLayoutVars>
       </dgm:prSet>
       <dgm:spPr/>
+      <dgm:t>
+        <a:bodyPr/>
+        <a:lstStyle/>
+        <a:p>
+          <a:endParaRPr lang="en-US"/>
+        </a:p>
+      </dgm:t>
     </dgm:pt>
     <dgm:pt modelId="{927C4992-BC71-4F98-A062-35DDC25FE135}" type="pres">
       <dgm:prSet presAssocID="{9580F775-5243-4138-8696-9BC2C93A5E3A}" presName="parentLin" presStyleCnt="0"/>
@@ -4147,6 +5323,13 @@
     <dgm:pt modelId="{A39C335C-0C0A-4796-9D9D-EDD97330DF75}" type="pres">
       <dgm:prSet presAssocID="{9580F775-5243-4138-8696-9BC2C93A5E3A}" presName="parentLeftMargin" presStyleLbl="node1" presStyleIdx="0" presStyleCnt="3"/>
       <dgm:spPr/>
+      <dgm:t>
+        <a:bodyPr/>
+        <a:lstStyle/>
+        <a:p>
+          <a:endParaRPr lang="en-US"/>
+        </a:p>
+      </dgm:t>
     </dgm:pt>
     <dgm:pt modelId="{ECBE56C2-BDA7-44FA-963A-81F985FC3C1C}" type="pres">
       <dgm:prSet presAssocID="{9580F775-5243-4138-8696-9BC2C93A5E3A}" presName="parentText" presStyleLbl="node1" presStyleIdx="0" presStyleCnt="3">
@@ -4156,6 +5339,13 @@
         </dgm:presLayoutVars>
       </dgm:prSet>
       <dgm:spPr/>
+      <dgm:t>
+        <a:bodyPr/>
+        <a:lstStyle/>
+        <a:p>
+          <a:endParaRPr lang="en-US"/>
+        </a:p>
+      </dgm:t>
     </dgm:pt>
     <dgm:pt modelId="{A70888BB-DF4E-458B-B287-A5DD3E54029E}" type="pres">
       <dgm:prSet presAssocID="{9580F775-5243-4138-8696-9BC2C93A5E3A}" presName="negativeSpace" presStyleCnt="0"/>
@@ -4186,6 +5376,13 @@
     <dgm:pt modelId="{029EFD16-BA97-4E89-9F83-D5ED5DF06B1F}" type="pres">
       <dgm:prSet presAssocID="{C33C15F0-45A3-441C-B2F4-B7ACE3AFF5F0}" presName="parentLeftMargin" presStyleLbl="node1" presStyleIdx="0" presStyleCnt="3"/>
       <dgm:spPr/>
+      <dgm:t>
+        <a:bodyPr/>
+        <a:lstStyle/>
+        <a:p>
+          <a:endParaRPr lang="en-US"/>
+        </a:p>
+      </dgm:t>
     </dgm:pt>
     <dgm:pt modelId="{AAC5A5F6-59EF-46F8-985F-599DC653C187}" type="pres">
       <dgm:prSet presAssocID="{C33C15F0-45A3-441C-B2F4-B7ACE3AFF5F0}" presName="parentText" presStyleLbl="node1" presStyleIdx="1" presStyleCnt="3">
@@ -4195,6 +5392,13 @@
         </dgm:presLayoutVars>
       </dgm:prSet>
       <dgm:spPr/>
+      <dgm:t>
+        <a:bodyPr/>
+        <a:lstStyle/>
+        <a:p>
+          <a:endParaRPr lang="en-US"/>
+        </a:p>
+      </dgm:t>
     </dgm:pt>
     <dgm:pt modelId="{81E7D675-41CD-4243-A287-08749FC0A81B}" type="pres">
       <dgm:prSet presAssocID="{C33C15F0-45A3-441C-B2F4-B7ACE3AFF5F0}" presName="negativeSpace" presStyleCnt="0"/>
@@ -4225,6 +5429,13 @@
     <dgm:pt modelId="{F16FFF1C-279A-4A07-B10A-8D6DEDAC2E1A}" type="pres">
       <dgm:prSet presAssocID="{3D0ABD15-6189-4749-BCC3-B22262EB8BD7}" presName="parentLeftMargin" presStyleLbl="node1" presStyleIdx="1" presStyleCnt="3"/>
       <dgm:spPr/>
+      <dgm:t>
+        <a:bodyPr/>
+        <a:lstStyle/>
+        <a:p>
+          <a:endParaRPr lang="en-US"/>
+        </a:p>
+      </dgm:t>
     </dgm:pt>
     <dgm:pt modelId="{FF34CD1C-866B-4233-B300-71F7E7E1F1E0}" type="pres">
       <dgm:prSet presAssocID="{3D0ABD15-6189-4749-BCC3-B22262EB8BD7}" presName="parentText" presStyleLbl="node1" presStyleIdx="2" presStyleCnt="3">
@@ -4234,6 +5445,13 @@
         </dgm:presLayoutVars>
       </dgm:prSet>
       <dgm:spPr/>
+      <dgm:t>
+        <a:bodyPr/>
+        <a:lstStyle/>
+        <a:p>
+          <a:endParaRPr lang="en-US"/>
+        </a:p>
+      </dgm:t>
     </dgm:pt>
     <dgm:pt modelId="{11A9D96D-9780-4C44-96C4-7B4180CE3B35}" type="pres">
       <dgm:prSet presAssocID="{3D0ABD15-6189-4749-BCC3-B22262EB8BD7}" presName="negativeSpace" presStyleCnt="0"/>
@@ -4255,16 +5473,16 @@
     </dgm:pt>
   </dgm:ptLst>
   <dgm:cxnLst>
-    <dgm:cxn modelId="{B9E75911-6449-41EB-8DCC-8CE76AF46FD2}" srcId="{4EA03A46-243F-4F79-93CB-057737295B21}" destId="{C33C15F0-45A3-441C-B2F4-B7ACE3AFF5F0}" srcOrd="1" destOrd="0" parTransId="{38A943B5-ED3B-4418-8F8E-CA207FAC45B8}" sibTransId="{2B7564EB-AE3C-4E38-92D6-F1EECCDE0C5C}"/>
     <dgm:cxn modelId="{5BC9DF22-AD9D-4EE3-8136-D22870BF255D}" type="presOf" srcId="{C33C15F0-45A3-441C-B2F4-B7ACE3AFF5F0}" destId="{029EFD16-BA97-4E89-9F83-D5ED5DF06B1F}" srcOrd="0" destOrd="0" presId="urn:microsoft.com/office/officeart/2005/8/layout/list1"/>
-    <dgm:cxn modelId="{3FBA3162-3874-481D-A556-072359CE1E3D}" type="presOf" srcId="{9580F775-5243-4138-8696-9BC2C93A5E3A}" destId="{A39C335C-0C0A-4796-9D9D-EDD97330DF75}" srcOrd="0" destOrd="0" presId="urn:microsoft.com/office/officeart/2005/8/layout/list1"/>
+    <dgm:cxn modelId="{C0E22ED5-0AEB-468E-938E-7E09380A4AD2}" type="presOf" srcId="{3D0ABD15-6189-4749-BCC3-B22262EB8BD7}" destId="{FF34CD1C-866B-4233-B300-71F7E7E1F1E0}" srcOrd="1" destOrd="0" presId="urn:microsoft.com/office/officeart/2005/8/layout/list1"/>
     <dgm:cxn modelId="{5A377C6E-69AF-40A3-8843-B732DF3F9D39}" type="presOf" srcId="{3D0ABD15-6189-4749-BCC3-B22262EB8BD7}" destId="{F16FFF1C-279A-4A07-B10A-8D6DEDAC2E1A}" srcOrd="0" destOrd="0" presId="urn:microsoft.com/office/officeart/2005/8/layout/list1"/>
     <dgm:cxn modelId="{BF25A94F-47D1-4919-92A1-FC6D83A0A5F0}" srcId="{4EA03A46-243F-4F79-93CB-057737295B21}" destId="{3D0ABD15-6189-4749-BCC3-B22262EB8BD7}" srcOrd="2" destOrd="0" parTransId="{868DC92F-E8CB-4DB1-AF42-4BB28AE99A17}" sibTransId="{F73077B2-34FA-470D-8051-C4996254B32B}"/>
+    <dgm:cxn modelId="{80994EE6-8893-4A1E-9642-F837408CEEA9}" type="presOf" srcId="{C33C15F0-45A3-441C-B2F4-B7ACE3AFF5F0}" destId="{AAC5A5F6-59EF-46F8-985F-599DC653C187}" srcOrd="1" destOrd="0" presId="urn:microsoft.com/office/officeart/2005/8/layout/list1"/>
     <dgm:cxn modelId="{EC9BA5A4-EB40-4048-A6F4-3A485B377FA9}" srcId="{4EA03A46-243F-4F79-93CB-057737295B21}" destId="{9580F775-5243-4138-8696-9BC2C93A5E3A}" srcOrd="0" destOrd="0" parTransId="{7B336BB4-3915-4F03-902E-AD72EAE96684}" sibTransId="{6E7ED894-35D9-4424-8D77-3F319650C719}"/>
+    <dgm:cxn modelId="{3FBA3162-3874-481D-A556-072359CE1E3D}" type="presOf" srcId="{9580F775-5243-4138-8696-9BC2C93A5E3A}" destId="{A39C335C-0C0A-4796-9D9D-EDD97330DF75}" srcOrd="0" destOrd="0" presId="urn:microsoft.com/office/officeart/2005/8/layout/list1"/>
     <dgm:cxn modelId="{BA53F6AE-40FF-4E43-B723-1A9D92C38FB7}" type="presOf" srcId="{4EA03A46-243F-4F79-93CB-057737295B21}" destId="{AA44D900-B1D6-44C2-8261-D53F730E0038}" srcOrd="0" destOrd="0" presId="urn:microsoft.com/office/officeart/2005/8/layout/list1"/>
     <dgm:cxn modelId="{876822CF-FC11-4E8B-8B93-4D9A4066D599}" type="presOf" srcId="{9580F775-5243-4138-8696-9BC2C93A5E3A}" destId="{ECBE56C2-BDA7-44FA-963A-81F985FC3C1C}" srcOrd="1" destOrd="0" presId="urn:microsoft.com/office/officeart/2005/8/layout/list1"/>
-    <dgm:cxn modelId="{C0E22ED5-0AEB-468E-938E-7E09380A4AD2}" type="presOf" srcId="{3D0ABD15-6189-4749-BCC3-B22262EB8BD7}" destId="{FF34CD1C-866B-4233-B300-71F7E7E1F1E0}" srcOrd="1" destOrd="0" presId="urn:microsoft.com/office/officeart/2005/8/layout/list1"/>
-    <dgm:cxn modelId="{80994EE6-8893-4A1E-9642-F837408CEEA9}" type="presOf" srcId="{C33C15F0-45A3-441C-B2F4-B7ACE3AFF5F0}" destId="{AAC5A5F6-59EF-46F8-985F-599DC653C187}" srcOrd="1" destOrd="0" presId="urn:microsoft.com/office/officeart/2005/8/layout/list1"/>
+    <dgm:cxn modelId="{B9E75911-6449-41EB-8DCC-8CE76AF46FD2}" srcId="{4EA03A46-243F-4F79-93CB-057737295B21}" destId="{C33C15F0-45A3-441C-B2F4-B7ACE3AFF5F0}" srcOrd="1" destOrd="0" parTransId="{38A943B5-ED3B-4418-8F8E-CA207FAC45B8}" sibTransId="{2B7564EB-AE3C-4E38-92D6-F1EECCDE0C5C}"/>
     <dgm:cxn modelId="{95EFB18F-996E-48BC-B7B9-163DE669D862}" type="presParOf" srcId="{AA44D900-B1D6-44C2-8261-D53F730E0038}" destId="{927C4992-BC71-4F98-A062-35DDC25FE135}" srcOrd="0" destOrd="0" presId="urn:microsoft.com/office/officeart/2005/8/layout/list1"/>
     <dgm:cxn modelId="{8B3D616F-DEC2-4F1D-A793-842331B6FDCE}" type="presParOf" srcId="{927C4992-BC71-4F98-A062-35DDC25FE135}" destId="{A39C335C-0C0A-4796-9D9D-EDD97330DF75}" srcOrd="0" destOrd="0" presId="urn:microsoft.com/office/officeart/2005/8/layout/list1"/>
     <dgm:cxn modelId="{B022911D-93B1-46BD-9ACD-71FD1FBA5604}" type="presParOf" srcId="{927C4992-BC71-4F98-A062-35DDC25FE135}" destId="{ECBE56C2-BDA7-44FA-963A-81F985FC3C1C}" srcOrd="1" destOrd="0" presId="urn:microsoft.com/office/officeart/2005/8/layout/list1"/>
@@ -4287,13 +5505,13 @@
   <dgm:whole/>
   <dgm:extLst>
     <a:ext uri="http://schemas.microsoft.com/office/drawing/2008/diagram">
-      <dsp:dataModelExt xmlns:dsp="http://schemas.microsoft.com/office/drawing/2008/diagram" relId="rId7" minVer="http://schemas.openxmlformats.org/drawingml/2006/diagram"/>
+      <dsp:dataModelExt xmlns:dsp="http://schemas.microsoft.com/office/drawing/2008/diagram" xmlns="" relId="rId7" minVer="http://schemas.openxmlformats.org/drawingml/2006/diagram"/>
     </a:ext>
   </dgm:extLst>
 </dgm:dataModel>
 </file>
 
-<file path=ppt/diagrams/data4.xml><?xml version="1.0" encoding="utf-8"?>
+<file path=ppt/diagrams/data5.xml><?xml version="1.0" encoding="utf-8"?>
 <dgm:dataModel xmlns:dgm="http://schemas.openxmlformats.org/drawingml/2006/diagram" xmlns:a="http://schemas.openxmlformats.org/drawingml/2006/main">
   <dgm:ptLst>
     <dgm:pt modelId="{8317B98D-9ADF-4C4D-AF44-7281E09E2C9F}" type="doc">
@@ -4484,6 +5702,13 @@
         </dgm:presLayoutVars>
       </dgm:prSet>
       <dgm:spPr/>
+      <dgm:t>
+        <a:bodyPr/>
+        <a:lstStyle/>
+        <a:p>
+          <a:endParaRPr lang="en-US"/>
+        </a:p>
+      </dgm:t>
     </dgm:pt>
     <dgm:pt modelId="{2193EE82-C4BA-4C72-90B3-6D639EE8B8C4}" type="pres">
       <dgm:prSet presAssocID="{07096CD6-1BFB-437A-BE2A-232DAD74803A}" presName="parentLin" presStyleCnt="0"/>
@@ -4492,6 +5717,13 @@
     <dgm:pt modelId="{0728AE48-7EA0-482A-8589-C535826A2550}" type="pres">
       <dgm:prSet presAssocID="{07096CD6-1BFB-437A-BE2A-232DAD74803A}" presName="parentLeftMargin" presStyleLbl="node1" presStyleIdx="0" presStyleCnt="4"/>
       <dgm:spPr/>
+      <dgm:t>
+        <a:bodyPr/>
+        <a:lstStyle/>
+        <a:p>
+          <a:endParaRPr lang="en-US"/>
+        </a:p>
+      </dgm:t>
     </dgm:pt>
     <dgm:pt modelId="{F6D1E2F6-C80C-490E-94BE-59C60EDBED25}" type="pres">
       <dgm:prSet presAssocID="{07096CD6-1BFB-437A-BE2A-232DAD74803A}" presName="parentText" presStyleLbl="node1" presStyleIdx="0" presStyleCnt="4">
@@ -4501,6 +5733,13 @@
         </dgm:presLayoutVars>
       </dgm:prSet>
       <dgm:spPr/>
+      <dgm:t>
+        <a:bodyPr/>
+        <a:lstStyle/>
+        <a:p>
+          <a:endParaRPr lang="en-US"/>
+        </a:p>
+      </dgm:t>
     </dgm:pt>
     <dgm:pt modelId="{0DDE4CD1-537B-49FB-9251-919D01A025BC}" type="pres">
       <dgm:prSet presAssocID="{07096CD6-1BFB-437A-BE2A-232DAD74803A}" presName="negativeSpace" presStyleCnt="0"/>
@@ -4531,6 +5770,13 @@
     <dgm:pt modelId="{9050D716-67FA-437E-A12D-C5A947FF2EDA}" type="pres">
       <dgm:prSet presAssocID="{3CC81DFF-6D29-42C2-904F-EBD975D34615}" presName="parentLeftMargin" presStyleLbl="node1" presStyleIdx="0" presStyleCnt="4"/>
       <dgm:spPr/>
+      <dgm:t>
+        <a:bodyPr/>
+        <a:lstStyle/>
+        <a:p>
+          <a:endParaRPr lang="en-US"/>
+        </a:p>
+      </dgm:t>
     </dgm:pt>
     <dgm:pt modelId="{686D5D2F-E5A0-48C9-A654-6D7D39ADBBC4}" type="pres">
       <dgm:prSet presAssocID="{3CC81DFF-6D29-42C2-904F-EBD975D34615}" presName="parentText" presStyleLbl="node1" presStyleIdx="1" presStyleCnt="4">
@@ -4540,6 +5786,13 @@
         </dgm:presLayoutVars>
       </dgm:prSet>
       <dgm:spPr/>
+      <dgm:t>
+        <a:bodyPr/>
+        <a:lstStyle/>
+        <a:p>
+          <a:endParaRPr lang="en-US"/>
+        </a:p>
+      </dgm:t>
     </dgm:pt>
     <dgm:pt modelId="{CE1D0FF5-EA26-4137-B74A-7606D32609AE}" type="pres">
       <dgm:prSet presAssocID="{3CC81DFF-6D29-42C2-904F-EBD975D34615}" presName="negativeSpace" presStyleCnt="0"/>
@@ -4570,6 +5823,13 @@
     <dgm:pt modelId="{500F7BD0-43C1-4E6E-ADBA-7658D064982E}" type="pres">
       <dgm:prSet presAssocID="{F61A2CC2-2B9D-4AD6-BC4F-EF692198D6AF}" presName="parentLeftMargin" presStyleLbl="node1" presStyleIdx="1" presStyleCnt="4"/>
       <dgm:spPr/>
+      <dgm:t>
+        <a:bodyPr/>
+        <a:lstStyle/>
+        <a:p>
+          <a:endParaRPr lang="en-US"/>
+        </a:p>
+      </dgm:t>
     </dgm:pt>
     <dgm:pt modelId="{76C80044-CD79-482F-AA6D-45C7237915B0}" type="pres">
       <dgm:prSet presAssocID="{F61A2CC2-2B9D-4AD6-BC4F-EF692198D6AF}" presName="parentText" presStyleLbl="node1" presStyleIdx="2" presStyleCnt="4">
@@ -4579,6 +5839,13 @@
         </dgm:presLayoutVars>
       </dgm:prSet>
       <dgm:spPr/>
+      <dgm:t>
+        <a:bodyPr/>
+        <a:lstStyle/>
+        <a:p>
+          <a:endParaRPr lang="en-US"/>
+        </a:p>
+      </dgm:t>
     </dgm:pt>
     <dgm:pt modelId="{048F884E-3C56-4220-947C-5DDEB889350B}" type="pres">
       <dgm:prSet presAssocID="{F61A2CC2-2B9D-4AD6-BC4F-EF692198D6AF}" presName="negativeSpace" presStyleCnt="0"/>
@@ -4609,6 +5876,13 @@
     <dgm:pt modelId="{E644D76F-8C8D-4EBD-A532-67A84E42C0B7}" type="pres">
       <dgm:prSet presAssocID="{904E8351-EA07-4250-984E-0D5EF85F4CA6}" presName="parentLeftMargin" presStyleLbl="node1" presStyleIdx="2" presStyleCnt="4"/>
       <dgm:spPr/>
+      <dgm:t>
+        <a:bodyPr/>
+        <a:lstStyle/>
+        <a:p>
+          <a:endParaRPr lang="en-US"/>
+        </a:p>
+      </dgm:t>
     </dgm:pt>
     <dgm:pt modelId="{190D72B2-AE0C-4D19-B44B-DD343338AF45}" type="pres">
       <dgm:prSet presAssocID="{904E8351-EA07-4250-984E-0D5EF85F4CA6}" presName="parentText" presStyleLbl="node1" presStyleIdx="3" presStyleCnt="4">
@@ -4618,6 +5892,13 @@
         </dgm:presLayoutVars>
       </dgm:prSet>
       <dgm:spPr/>
+      <dgm:t>
+        <a:bodyPr/>
+        <a:lstStyle/>
+        <a:p>
+          <a:endParaRPr lang="en-US"/>
+        </a:p>
+      </dgm:t>
     </dgm:pt>
     <dgm:pt modelId="{61E03FB3-6000-4B23-AFDC-1D7C174DAC7F}" type="pres">
       <dgm:prSet presAssocID="{904E8351-EA07-4250-984E-0D5EF85F4CA6}" presName="negativeSpace" presStyleCnt="0"/>
@@ -4639,19 +5920,19 @@
     </dgm:pt>
   </dgm:ptLst>
   <dgm:cxnLst>
+    <dgm:cxn modelId="{25FAC921-062F-42AB-A487-5E92849E51D9}" type="presOf" srcId="{904E8351-EA07-4250-984E-0D5EF85F4CA6}" destId="{190D72B2-AE0C-4D19-B44B-DD343338AF45}" srcOrd="1" destOrd="0" presId="urn:microsoft.com/office/officeart/2005/8/layout/list1"/>
+    <dgm:cxn modelId="{FA2901AE-9878-440F-8BBA-FD0FFA67AEBC}" type="presOf" srcId="{F61A2CC2-2B9D-4AD6-BC4F-EF692198D6AF}" destId="{500F7BD0-43C1-4E6E-ADBA-7658D064982E}" srcOrd="0" destOrd="0" presId="urn:microsoft.com/office/officeart/2005/8/layout/list1"/>
+    <dgm:cxn modelId="{C1464226-BE52-4DE7-A5C6-CF4975D1F2A4}" srcId="{8317B98D-9ADF-4C4D-AF44-7281E09E2C9F}" destId="{07096CD6-1BFB-437A-BE2A-232DAD74803A}" srcOrd="0" destOrd="0" parTransId="{A85086A2-BA37-4626-AB1C-1EE3062A2FE6}" sibTransId="{C9D5AD7A-80C5-4FA2-AD8C-159032D37801}"/>
+    <dgm:cxn modelId="{C9D35560-3E2F-4CBD-A50F-CFE7C2DF1C98}" type="presOf" srcId="{F61A2CC2-2B9D-4AD6-BC4F-EF692198D6AF}" destId="{76C80044-CD79-482F-AA6D-45C7237915B0}" srcOrd="1" destOrd="0" presId="urn:microsoft.com/office/officeart/2005/8/layout/list1"/>
     <dgm:cxn modelId="{D0FBBF0C-FBAB-475D-ACDB-898C3FE86EB7}" type="presOf" srcId="{07096CD6-1BFB-437A-BE2A-232DAD74803A}" destId="{0728AE48-7EA0-482A-8589-C535826A2550}" srcOrd="0" destOrd="0" presId="urn:microsoft.com/office/officeart/2005/8/layout/list1"/>
-    <dgm:cxn modelId="{25FAC921-062F-42AB-A487-5E92849E51D9}" type="presOf" srcId="{904E8351-EA07-4250-984E-0D5EF85F4CA6}" destId="{190D72B2-AE0C-4D19-B44B-DD343338AF45}" srcOrd="1" destOrd="0" presId="urn:microsoft.com/office/officeart/2005/8/layout/list1"/>
-    <dgm:cxn modelId="{C1464226-BE52-4DE7-A5C6-CF4975D1F2A4}" srcId="{8317B98D-9ADF-4C4D-AF44-7281E09E2C9F}" destId="{07096CD6-1BFB-437A-BE2A-232DAD74803A}" srcOrd="0" destOrd="0" parTransId="{A85086A2-BA37-4626-AB1C-1EE3062A2FE6}" sibTransId="{C9D5AD7A-80C5-4FA2-AD8C-159032D37801}"/>
+    <dgm:cxn modelId="{301F9073-02F4-48AC-9899-A84003E7002D}" type="presOf" srcId="{8317B98D-9ADF-4C4D-AF44-7281E09E2C9F}" destId="{D8229B00-BE2B-4C99-AEA0-1472ECBF087B}" srcOrd="0" destOrd="0" presId="urn:microsoft.com/office/officeart/2005/8/layout/list1"/>
+    <dgm:cxn modelId="{37C984B6-DB2E-43E3-81AD-F832498D642D}" srcId="{8317B98D-9ADF-4C4D-AF44-7281E09E2C9F}" destId="{3CC81DFF-6D29-42C2-904F-EBD975D34615}" srcOrd="1" destOrd="0" parTransId="{ADE4A5EC-93D2-4063-B447-03B189AC39FE}" sibTransId="{87781EC4-5610-41DF-B893-5259831890EC}"/>
+    <dgm:cxn modelId="{D1C060AA-DBA6-46A9-A4FA-670055625E8A}" srcId="{8317B98D-9ADF-4C4D-AF44-7281E09E2C9F}" destId="{F61A2CC2-2B9D-4AD6-BC4F-EF692198D6AF}" srcOrd="2" destOrd="0" parTransId="{AC98E7B4-027A-49AD-96FC-0E5C2C1C9618}" sibTransId="{4CCABB5D-7E11-4B20-9ED4-A29DCAED232A}"/>
+    <dgm:cxn modelId="{2C773277-1805-4633-9C3C-DC1DD25E4469}" type="presOf" srcId="{3CC81DFF-6D29-42C2-904F-EBD975D34615}" destId="{686D5D2F-E5A0-48C9-A654-6D7D39ADBBC4}" srcOrd="1" destOrd="0" presId="urn:microsoft.com/office/officeart/2005/8/layout/list1"/>
+    <dgm:cxn modelId="{C4DF00AC-FB74-40CB-B276-7176C1823773}" type="presOf" srcId="{904E8351-EA07-4250-984E-0D5EF85F4CA6}" destId="{E644D76F-8C8D-4EBD-A532-67A84E42C0B7}" srcOrd="0" destOrd="0" presId="urn:microsoft.com/office/officeart/2005/8/layout/list1"/>
     <dgm:cxn modelId="{D9FFE533-94FE-47D1-A908-1CFA24831E7E}" type="presOf" srcId="{3CC81DFF-6D29-42C2-904F-EBD975D34615}" destId="{9050D716-67FA-437E-A12D-C5A947FF2EDA}" srcOrd="0" destOrd="0" presId="urn:microsoft.com/office/officeart/2005/8/layout/list1"/>
-    <dgm:cxn modelId="{C9D35560-3E2F-4CBD-A50F-CFE7C2DF1C98}" type="presOf" srcId="{F61A2CC2-2B9D-4AD6-BC4F-EF692198D6AF}" destId="{76C80044-CD79-482F-AA6D-45C7237915B0}" srcOrd="1" destOrd="0" presId="urn:microsoft.com/office/officeart/2005/8/layout/list1"/>
     <dgm:cxn modelId="{2A792C66-891A-489E-A7CA-C9EBD105899D}" type="presOf" srcId="{07096CD6-1BFB-437A-BE2A-232DAD74803A}" destId="{F6D1E2F6-C80C-490E-94BE-59C60EDBED25}" srcOrd="1" destOrd="0" presId="urn:microsoft.com/office/officeart/2005/8/layout/list1"/>
-    <dgm:cxn modelId="{301F9073-02F4-48AC-9899-A84003E7002D}" type="presOf" srcId="{8317B98D-9ADF-4C4D-AF44-7281E09E2C9F}" destId="{D8229B00-BE2B-4C99-AEA0-1472ECBF087B}" srcOrd="0" destOrd="0" presId="urn:microsoft.com/office/officeart/2005/8/layout/list1"/>
-    <dgm:cxn modelId="{2C773277-1805-4633-9C3C-DC1DD25E4469}" type="presOf" srcId="{3CC81DFF-6D29-42C2-904F-EBD975D34615}" destId="{686D5D2F-E5A0-48C9-A654-6D7D39ADBBC4}" srcOrd="1" destOrd="0" presId="urn:microsoft.com/office/officeart/2005/8/layout/list1"/>
     <dgm:cxn modelId="{70172084-874F-45FA-86CE-2EC6BC301C92}" srcId="{8317B98D-9ADF-4C4D-AF44-7281E09E2C9F}" destId="{904E8351-EA07-4250-984E-0D5EF85F4CA6}" srcOrd="3" destOrd="0" parTransId="{C5472050-BE89-4315-A388-B5C15D1937B8}" sibTransId="{BC31E4C2-B03F-4E73-BC9D-9B4F0EE89DB5}"/>
-    <dgm:cxn modelId="{D1C060AA-DBA6-46A9-A4FA-670055625E8A}" srcId="{8317B98D-9ADF-4C4D-AF44-7281E09E2C9F}" destId="{F61A2CC2-2B9D-4AD6-BC4F-EF692198D6AF}" srcOrd="2" destOrd="0" parTransId="{AC98E7B4-027A-49AD-96FC-0E5C2C1C9618}" sibTransId="{4CCABB5D-7E11-4B20-9ED4-A29DCAED232A}"/>
-    <dgm:cxn modelId="{C4DF00AC-FB74-40CB-B276-7176C1823773}" type="presOf" srcId="{904E8351-EA07-4250-984E-0D5EF85F4CA6}" destId="{E644D76F-8C8D-4EBD-A532-67A84E42C0B7}" srcOrd="0" destOrd="0" presId="urn:microsoft.com/office/officeart/2005/8/layout/list1"/>
-    <dgm:cxn modelId="{FA2901AE-9878-440F-8BBA-FD0FFA67AEBC}" type="presOf" srcId="{F61A2CC2-2B9D-4AD6-BC4F-EF692198D6AF}" destId="{500F7BD0-43C1-4E6E-ADBA-7658D064982E}" srcOrd="0" destOrd="0" presId="urn:microsoft.com/office/officeart/2005/8/layout/list1"/>
-    <dgm:cxn modelId="{37C984B6-DB2E-43E3-81AD-F832498D642D}" srcId="{8317B98D-9ADF-4C4D-AF44-7281E09E2C9F}" destId="{3CC81DFF-6D29-42C2-904F-EBD975D34615}" srcOrd="1" destOrd="0" parTransId="{ADE4A5EC-93D2-4063-B447-03B189AC39FE}" sibTransId="{87781EC4-5610-41DF-B893-5259831890EC}"/>
     <dgm:cxn modelId="{678C8471-67D9-4530-976B-63CED688D665}" type="presParOf" srcId="{D8229B00-BE2B-4C99-AEA0-1472ECBF087B}" destId="{2193EE82-C4BA-4C72-90B3-6D639EE8B8C4}" srcOrd="0" destOrd="0" presId="urn:microsoft.com/office/officeart/2005/8/layout/list1"/>
     <dgm:cxn modelId="{E51F6279-1A7B-4E36-BB02-B633A02F35F0}" type="presParOf" srcId="{2193EE82-C4BA-4C72-90B3-6D639EE8B8C4}" destId="{0728AE48-7EA0-482A-8589-C535826A2550}" srcOrd="0" destOrd="0" presId="urn:microsoft.com/office/officeart/2005/8/layout/list1"/>
     <dgm:cxn modelId="{EE6EEF42-DBBF-4FCB-8AE2-3448C1FE2F7F}" type="presParOf" srcId="{2193EE82-C4BA-4C72-90B3-6D639EE8B8C4}" destId="{F6D1E2F6-C80C-490E-94BE-59C60EDBED25}" srcOrd="1" destOrd="0" presId="urn:microsoft.com/office/officeart/2005/8/layout/list1"/>
@@ -4680,7 +5961,7 @@
   <dgm:whole/>
   <dgm:extLst>
     <a:ext uri="http://schemas.microsoft.com/office/drawing/2008/diagram">
-      <dsp:dataModelExt xmlns:dsp="http://schemas.microsoft.com/office/drawing/2008/diagram" relId="rId7" minVer="http://schemas.openxmlformats.org/drawingml/2006/diagram"/>
+      <dsp:dataModelExt xmlns:dsp="http://schemas.microsoft.com/office/drawing/2008/diagram" xmlns="" relId="rId7" minVer="http://schemas.openxmlformats.org/drawingml/2006/diagram"/>
     </a:ext>
   </dgm:extLst>
 </dgm:dataModel>
@@ -6216,7 +7497,7 @@
 </file>
 
 <file path=ppt/diagrams/layout1.xml><?xml version="1.0" encoding="utf-8"?>
-<dgm:layoutDef xmlns:dgm="http://schemas.openxmlformats.org/drawingml/2006/diagram" xmlns:a="http://schemas.openxmlformats.org/drawingml/2006/main" uniqueId="urn:microsoft.com/office/officeart/2005/8/layout/default">
+<dgm:layoutDef xmlns:dgm="http://schemas.openxmlformats.org/drawingml/2006/diagram" xmlns:a="http://schemas.openxmlformats.org/drawingml/2006/main" uniqueId="urn:microsoft.com/office/officeart/2005/8/layout/default#1">
   <dgm:title val=""/>
   <dgm:desc val=""/>
   <dgm:catLst>
@@ -6363,7 +7644,7 @@
 </file>
 
 <file path=ppt/diagrams/layout2.xml><?xml version="1.0" encoding="utf-8"?>
-<dgm:layoutDef xmlns:dgm="http://schemas.openxmlformats.org/drawingml/2006/diagram" xmlns:a="http://schemas.openxmlformats.org/drawingml/2006/main" uniqueId="urn:microsoft.com/office/officeart/2005/8/layout/default">
+<dgm:layoutDef xmlns:dgm="http://schemas.openxmlformats.org/drawingml/2006/diagram" xmlns:a="http://schemas.openxmlformats.org/drawingml/2006/main" uniqueId="urn:microsoft.com/office/officeart/2005/8/layout/default#2">
   <dgm:title val=""/>
   <dgm:desc val=""/>
   <dgm:catLst>
@@ -6510,6 +7791,152 @@
 </file>
 
 <file path=ppt/diagrams/layout3.xml><?xml version="1.0" encoding="utf-8"?>
+<dgm:layoutDef xmlns:dgm="http://schemas.openxmlformats.org/drawingml/2006/diagram" xmlns:a="http://schemas.openxmlformats.org/drawingml/2006/main" uniqueId="urn:microsoft.com/office/officeart/2005/8/layout/process1">
+  <dgm:title val=""/>
+  <dgm:desc val=""/>
+  <dgm:catLst>
+    <dgm:cat type="process" pri="1000"/>
+    <dgm:cat type="convert" pri="15000"/>
+  </dgm:catLst>
+  <dgm:sampData useDef="1">
+    <dgm:dataModel>
+      <dgm:ptLst/>
+      <dgm:bg/>
+      <dgm:whole/>
+    </dgm:dataModel>
+  </dgm:sampData>
+  <dgm:styleData>
+    <dgm:dataModel>
+      <dgm:ptLst>
+        <dgm:pt modelId="0" type="doc"/>
+        <dgm:pt modelId="1"/>
+        <dgm:pt modelId="2"/>
+      </dgm:ptLst>
+      <dgm:cxnLst>
+        <dgm:cxn modelId="3" srcId="0" destId="1" srcOrd="0" destOrd="0"/>
+        <dgm:cxn modelId="4" srcId="0" destId="2" srcOrd="1" destOrd="0"/>
+      </dgm:cxnLst>
+      <dgm:bg/>
+      <dgm:whole/>
+    </dgm:dataModel>
+  </dgm:styleData>
+  <dgm:clrData>
+    <dgm:dataModel>
+      <dgm:ptLst>
+        <dgm:pt modelId="0" type="doc"/>
+        <dgm:pt modelId="1"/>
+        <dgm:pt modelId="2"/>
+        <dgm:pt modelId="3"/>
+        <dgm:pt modelId="4"/>
+      </dgm:ptLst>
+      <dgm:cxnLst>
+        <dgm:cxn modelId="5" srcId="0" destId="1" srcOrd="0" destOrd="0"/>
+        <dgm:cxn modelId="6" srcId="0" destId="2" srcOrd="1" destOrd="0"/>
+        <dgm:cxn modelId="7" srcId="0" destId="3" srcOrd="2" destOrd="0"/>
+        <dgm:cxn modelId="8" srcId="0" destId="4" srcOrd="3" destOrd="0"/>
+      </dgm:cxnLst>
+      <dgm:bg/>
+      <dgm:whole/>
+    </dgm:dataModel>
+  </dgm:clrData>
+  <dgm:layoutNode name="Name0">
+    <dgm:varLst>
+      <dgm:dir/>
+      <dgm:resizeHandles val="exact"/>
+    </dgm:varLst>
+    <dgm:choose name="Name1">
+      <dgm:if name="Name2" func="var" arg="dir" op="equ" val="norm">
+        <dgm:alg type="lin"/>
+      </dgm:if>
+      <dgm:else name="Name3">
+        <dgm:alg type="lin">
+          <dgm:param type="linDir" val="fromR"/>
+        </dgm:alg>
+      </dgm:else>
+    </dgm:choose>
+    <dgm:shape xmlns:r="http://schemas.openxmlformats.org/officeDocument/2006/relationships" r:blip="">
+      <dgm:adjLst/>
+    </dgm:shape>
+    <dgm:presOf/>
+    <dgm:constrLst>
+      <dgm:constr type="w" for="ch" ptType="node" refType="w"/>
+      <dgm:constr type="h" for="ch" ptType="node" op="equ"/>
+      <dgm:constr type="primFontSz" for="ch" ptType="node" op="equ" val="65"/>
+      <dgm:constr type="w" for="ch" ptType="sibTrans" refType="w" refFor="ch" refPtType="node" op="equ" fact="0.4"/>
+      <dgm:constr type="h" for="ch" ptType="sibTrans" op="equ"/>
+      <dgm:constr type="primFontSz" for="des" forName="connectorText" op="equ" val="55"/>
+      <dgm:constr type="primFontSz" for="des" forName="connectorText" refType="primFontSz" refFor="ch" refPtType="node" op="lte" fact="0.8"/>
+    </dgm:constrLst>
+    <dgm:ruleLst/>
+    <dgm:forEach name="nodesForEach" axis="ch" ptType="node">
+      <dgm:layoutNode name="node">
+        <dgm:varLst>
+          <dgm:bulletEnabled val="1"/>
+        </dgm:varLst>
+        <dgm:alg type="tx"/>
+        <dgm:shape xmlns:r="http://schemas.openxmlformats.org/officeDocument/2006/relationships" type="roundRect" r:blip="">
+          <dgm:adjLst>
+            <dgm:adj idx="1" val="0.1"/>
+          </dgm:adjLst>
+        </dgm:shape>
+        <dgm:presOf axis="desOrSelf" ptType="node"/>
+        <dgm:constrLst>
+          <dgm:constr type="h" refType="w" fact="0.6"/>
+          <dgm:constr type="tMarg" refType="primFontSz" fact="0.3"/>
+          <dgm:constr type="bMarg" refType="primFontSz" fact="0.3"/>
+          <dgm:constr type="lMarg" refType="primFontSz" fact="0.3"/>
+          <dgm:constr type="rMarg" refType="primFontSz" fact="0.3"/>
+        </dgm:constrLst>
+        <dgm:ruleLst>
+          <dgm:rule type="primFontSz" val="18" fact="NaN" max="NaN"/>
+          <dgm:rule type="h" val="NaN" fact="1.5" max="NaN"/>
+          <dgm:rule type="primFontSz" val="5" fact="NaN" max="NaN"/>
+          <dgm:rule type="h" val="INF" fact="NaN" max="NaN"/>
+        </dgm:ruleLst>
+      </dgm:layoutNode>
+      <dgm:forEach name="sibTransForEach" axis="followSib" ptType="sibTrans" cnt="1">
+        <dgm:layoutNode name="sibTrans">
+          <dgm:alg type="conn">
+            <dgm:param type="begPts" val="auto"/>
+            <dgm:param type="endPts" val="auto"/>
+          </dgm:alg>
+          <dgm:shape xmlns:r="http://schemas.openxmlformats.org/officeDocument/2006/relationships" type="conn" r:blip="">
+            <dgm:adjLst/>
+          </dgm:shape>
+          <dgm:presOf axis="self"/>
+          <dgm:constrLst>
+            <dgm:constr type="h" refType="w" fact="0.62"/>
+            <dgm:constr type="connDist"/>
+            <dgm:constr type="begPad" refType="connDist" fact="0.25"/>
+            <dgm:constr type="endPad" refType="connDist" fact="0.22"/>
+          </dgm:constrLst>
+          <dgm:ruleLst/>
+          <dgm:layoutNode name="connectorText">
+            <dgm:alg type="tx">
+              <dgm:param type="autoTxRot" val="grav"/>
+            </dgm:alg>
+            <dgm:shape xmlns:r="http://schemas.openxmlformats.org/officeDocument/2006/relationships" type="conn" r:blip="" hideGeom="1">
+              <dgm:adjLst/>
+            </dgm:shape>
+            <dgm:presOf axis="self"/>
+            <dgm:constrLst>
+              <dgm:constr type="lMarg"/>
+              <dgm:constr type="rMarg"/>
+              <dgm:constr type="tMarg"/>
+              <dgm:constr type="bMarg"/>
+            </dgm:constrLst>
+            <dgm:ruleLst>
+              <dgm:rule type="primFontSz" val="5" fact="NaN" max="NaN"/>
+            </dgm:ruleLst>
+          </dgm:layoutNode>
+        </dgm:layoutNode>
+      </dgm:forEach>
+    </dgm:forEach>
+  </dgm:layoutNode>
+</dgm:layoutDef>
+</file>
+
+<file path=ppt/diagrams/layout4.xml><?xml version="1.0" encoding="utf-8"?>
 <dgm:layoutDef xmlns:dgm="http://schemas.openxmlformats.org/drawingml/2006/diagram" xmlns:a="http://schemas.openxmlformats.org/drawingml/2006/main" uniqueId="urn:microsoft.com/office/officeart/2005/8/layout/list1">
   <dgm:title val=""/>
   <dgm:desc val=""/>
@@ -6734,7 +8161,7 @@
 </dgm:layoutDef>
 </file>
 
-<file path=ppt/diagrams/layout4.xml><?xml version="1.0" encoding="utf-8"?>
+<file path=ppt/diagrams/layout5.xml><?xml version="1.0" encoding="utf-8"?>
 <dgm:layoutDef xmlns:dgm="http://schemas.openxmlformats.org/drawingml/2006/diagram" xmlns:a="http://schemas.openxmlformats.org/drawingml/2006/main" uniqueId="urn:microsoft.com/office/officeart/2005/8/layout/list1">
   <dgm:title val=""/>
   <dgm:desc val=""/>
@@ -11095,6 +12522,1040 @@
 </dgm:styleDef>
 </file>
 
+<file path=ppt/diagrams/quickStyle5.xml><?xml version="1.0" encoding="utf-8"?>
+<dgm:styleDef xmlns:dgm="http://schemas.openxmlformats.org/drawingml/2006/diagram" xmlns:a="http://schemas.openxmlformats.org/drawingml/2006/main" uniqueId="urn:microsoft.com/office/officeart/2005/8/quickstyle/simple1">
+  <dgm:title val=""/>
+  <dgm:desc val=""/>
+  <dgm:catLst>
+    <dgm:cat type="simple" pri="10100"/>
+  </dgm:catLst>
+  <dgm:scene3d>
+    <a:camera prst="orthographicFront"/>
+    <a:lightRig rig="threePt" dir="t"/>
+  </dgm:scene3d>
+  <dgm:styleLbl name="node0">
+    <dgm:scene3d>
+      <a:camera prst="orthographicFront"/>
+      <a:lightRig rig="threePt" dir="t"/>
+    </dgm:scene3d>
+    <dgm:sp3d/>
+    <dgm:txPr/>
+    <dgm:style>
+      <a:lnRef idx="2">
+        <a:scrgbClr r="0" g="0" b="0"/>
+      </a:lnRef>
+      <a:fillRef idx="1">
+        <a:scrgbClr r="0" g="0" b="0"/>
+      </a:fillRef>
+      <a:effectRef idx="0">
+        <a:scrgbClr r="0" g="0" b="0"/>
+      </a:effectRef>
+      <a:fontRef idx="minor">
+        <a:schemeClr val="lt1"/>
+      </a:fontRef>
+    </dgm:style>
+  </dgm:styleLbl>
+  <dgm:styleLbl name="lnNode1">
+    <dgm:scene3d>
+      <a:camera prst="orthographicFront"/>
+      <a:lightRig rig="threePt" dir="t"/>
+    </dgm:scene3d>
+    <dgm:sp3d/>
+    <dgm:txPr/>
+    <dgm:style>
+      <a:lnRef idx="2">
+        <a:scrgbClr r="0" g="0" b="0"/>
+      </a:lnRef>
+      <a:fillRef idx="1">
+        <a:scrgbClr r="0" g="0" b="0"/>
+      </a:fillRef>
+      <a:effectRef idx="0">
+        <a:scrgbClr r="0" g="0" b="0"/>
+      </a:effectRef>
+      <a:fontRef idx="minor">
+        <a:schemeClr val="lt1"/>
+      </a:fontRef>
+    </dgm:style>
+  </dgm:styleLbl>
+  <dgm:styleLbl name="vennNode1">
+    <dgm:scene3d>
+      <a:camera prst="orthographicFront"/>
+      <a:lightRig rig="threePt" dir="t"/>
+    </dgm:scene3d>
+    <dgm:sp3d/>
+    <dgm:txPr/>
+    <dgm:style>
+      <a:lnRef idx="2">
+        <a:scrgbClr r="0" g="0" b="0"/>
+      </a:lnRef>
+      <a:fillRef idx="1">
+        <a:scrgbClr r="0" g="0" b="0"/>
+      </a:fillRef>
+      <a:effectRef idx="0">
+        <a:scrgbClr r="0" g="0" b="0"/>
+      </a:effectRef>
+      <a:fontRef idx="minor">
+        <a:schemeClr val="tx1"/>
+      </a:fontRef>
+    </dgm:style>
+  </dgm:styleLbl>
+  <dgm:styleLbl name="alignNode1">
+    <dgm:scene3d>
+      <a:camera prst="orthographicFront"/>
+      <a:lightRig rig="threePt" dir="t"/>
+    </dgm:scene3d>
+    <dgm:sp3d/>
+    <dgm:txPr/>
+    <dgm:style>
+      <a:lnRef idx="2">
+        <a:scrgbClr r="0" g="0" b="0"/>
+      </a:lnRef>
+      <a:fillRef idx="1">
+        <a:scrgbClr r="0" g="0" b="0"/>
+      </a:fillRef>
+      <a:effectRef idx="0">
+        <a:scrgbClr r="0" g="0" b="0"/>
+      </a:effectRef>
+      <a:fontRef idx="minor">
+        <a:schemeClr val="lt1"/>
+      </a:fontRef>
+    </dgm:style>
+  </dgm:styleLbl>
+  <dgm:styleLbl name="node1">
+    <dgm:scene3d>
+      <a:camera prst="orthographicFront"/>
+      <a:lightRig rig="threePt" dir="t"/>
+    </dgm:scene3d>
+    <dgm:sp3d/>
+    <dgm:txPr/>
+    <dgm:style>
+      <a:lnRef idx="2">
+        <a:scrgbClr r="0" g="0" b="0"/>
+      </a:lnRef>
+      <a:fillRef idx="1">
+        <a:scrgbClr r="0" g="0" b="0"/>
+      </a:fillRef>
+      <a:effectRef idx="0">
+        <a:scrgbClr r="0" g="0" b="0"/>
+      </a:effectRef>
+      <a:fontRef idx="minor">
+        <a:schemeClr val="lt1"/>
+      </a:fontRef>
+    </dgm:style>
+  </dgm:styleLbl>
+  <dgm:styleLbl name="node2">
+    <dgm:scene3d>
+      <a:camera prst="orthographicFront"/>
+      <a:lightRig rig="threePt" dir="t"/>
+    </dgm:scene3d>
+    <dgm:sp3d/>
+    <dgm:txPr/>
+    <dgm:style>
+      <a:lnRef idx="2">
+        <a:scrgbClr r="0" g="0" b="0"/>
+      </a:lnRef>
+      <a:fillRef idx="1">
+        <a:scrgbClr r="0" g="0" b="0"/>
+      </a:fillRef>
+      <a:effectRef idx="0">
+        <a:scrgbClr r="0" g="0" b="0"/>
+      </a:effectRef>
+      <a:fontRef idx="minor">
+        <a:schemeClr val="lt1"/>
+      </a:fontRef>
+    </dgm:style>
+  </dgm:styleLbl>
+  <dgm:styleLbl name="node3">
+    <dgm:scene3d>
+      <a:camera prst="orthographicFront"/>
+      <a:lightRig rig="threePt" dir="t"/>
+    </dgm:scene3d>
+    <dgm:sp3d/>
+    <dgm:txPr/>
+    <dgm:style>
+      <a:lnRef idx="2">
+        <a:scrgbClr r="0" g="0" b="0"/>
+      </a:lnRef>
+      <a:fillRef idx="1">
+        <a:scrgbClr r="0" g="0" b="0"/>
+      </a:fillRef>
+      <a:effectRef idx="0">
+        <a:scrgbClr r="0" g="0" b="0"/>
+      </a:effectRef>
+      <a:fontRef idx="minor">
+        <a:schemeClr val="lt1"/>
+      </a:fontRef>
+    </dgm:style>
+  </dgm:styleLbl>
+  <dgm:styleLbl name="node4">
+    <dgm:scene3d>
+      <a:camera prst="orthographicFront"/>
+      <a:lightRig rig="threePt" dir="t"/>
+    </dgm:scene3d>
+    <dgm:sp3d/>
+    <dgm:txPr/>
+    <dgm:style>
+      <a:lnRef idx="2">
+        <a:scrgbClr r="0" g="0" b="0"/>
+      </a:lnRef>
+      <a:fillRef idx="1">
+        <a:scrgbClr r="0" g="0" b="0"/>
+      </a:fillRef>
+      <a:effectRef idx="0">
+        <a:scrgbClr r="0" g="0" b="0"/>
+      </a:effectRef>
+      <a:fontRef idx="minor">
+        <a:schemeClr val="lt1"/>
+      </a:fontRef>
+    </dgm:style>
+  </dgm:styleLbl>
+  <dgm:styleLbl name="fgImgPlace1">
+    <dgm:scene3d>
+      <a:camera prst="orthographicFront"/>
+      <a:lightRig rig="threePt" dir="t"/>
+    </dgm:scene3d>
+    <dgm:sp3d/>
+    <dgm:txPr/>
+    <dgm:style>
+      <a:lnRef idx="2">
+        <a:scrgbClr r="0" g="0" b="0"/>
+      </a:lnRef>
+      <a:fillRef idx="1">
+        <a:scrgbClr r="0" g="0" b="0"/>
+      </a:fillRef>
+      <a:effectRef idx="0">
+        <a:scrgbClr r="0" g="0" b="0"/>
+      </a:effectRef>
+      <a:fontRef idx="minor"/>
+    </dgm:style>
+  </dgm:styleLbl>
+  <dgm:styleLbl name="alignImgPlace1">
+    <dgm:scene3d>
+      <a:camera prst="orthographicFront"/>
+      <a:lightRig rig="threePt" dir="t"/>
+    </dgm:scene3d>
+    <dgm:sp3d/>
+    <dgm:txPr/>
+    <dgm:style>
+      <a:lnRef idx="2">
+        <a:scrgbClr r="0" g="0" b="0"/>
+      </a:lnRef>
+      <a:fillRef idx="1">
+        <a:scrgbClr r="0" g="0" b="0"/>
+      </a:fillRef>
+      <a:effectRef idx="0">
+        <a:scrgbClr r="0" g="0" b="0"/>
+      </a:effectRef>
+      <a:fontRef idx="minor"/>
+    </dgm:style>
+  </dgm:styleLbl>
+  <dgm:styleLbl name="bgImgPlace1">
+    <dgm:scene3d>
+      <a:camera prst="orthographicFront"/>
+      <a:lightRig rig="threePt" dir="t"/>
+    </dgm:scene3d>
+    <dgm:sp3d/>
+    <dgm:txPr/>
+    <dgm:style>
+      <a:lnRef idx="2">
+        <a:scrgbClr r="0" g="0" b="0"/>
+      </a:lnRef>
+      <a:fillRef idx="1">
+        <a:scrgbClr r="0" g="0" b="0"/>
+      </a:fillRef>
+      <a:effectRef idx="0">
+        <a:scrgbClr r="0" g="0" b="0"/>
+      </a:effectRef>
+      <a:fontRef idx="minor"/>
+    </dgm:style>
+  </dgm:styleLbl>
+  <dgm:styleLbl name="sibTrans2D1">
+    <dgm:scene3d>
+      <a:camera prst="orthographicFront"/>
+      <a:lightRig rig="threePt" dir="t"/>
+    </dgm:scene3d>
+    <dgm:sp3d/>
+    <dgm:txPr/>
+    <dgm:style>
+      <a:lnRef idx="0">
+        <a:scrgbClr r="0" g="0" b="0"/>
+      </a:lnRef>
+      <a:fillRef idx="1">
+        <a:scrgbClr r="0" g="0" b="0"/>
+      </a:fillRef>
+      <a:effectRef idx="0">
+        <a:scrgbClr r="0" g="0" b="0"/>
+      </a:effectRef>
+      <a:fontRef idx="minor">
+        <a:schemeClr val="lt1"/>
+      </a:fontRef>
+    </dgm:style>
+  </dgm:styleLbl>
+  <dgm:styleLbl name="fgSibTrans2D1">
+    <dgm:scene3d>
+      <a:camera prst="orthographicFront"/>
+      <a:lightRig rig="threePt" dir="t"/>
+    </dgm:scene3d>
+    <dgm:sp3d/>
+    <dgm:txPr/>
+    <dgm:style>
+      <a:lnRef idx="0">
+        <a:scrgbClr r="0" g="0" b="0"/>
+      </a:lnRef>
+      <a:fillRef idx="1">
+        <a:scrgbClr r="0" g="0" b="0"/>
+      </a:fillRef>
+      <a:effectRef idx="0">
+        <a:scrgbClr r="0" g="0" b="0"/>
+      </a:effectRef>
+      <a:fontRef idx="minor">
+        <a:schemeClr val="lt1"/>
+      </a:fontRef>
+    </dgm:style>
+  </dgm:styleLbl>
+  <dgm:styleLbl name="bgSibTrans2D1">
+    <dgm:scene3d>
+      <a:camera prst="orthographicFront"/>
+      <a:lightRig rig="threePt" dir="t"/>
+    </dgm:scene3d>
+    <dgm:sp3d/>
+    <dgm:txPr/>
+    <dgm:style>
+      <a:lnRef idx="0">
+        <a:scrgbClr r="0" g="0" b="0"/>
+      </a:lnRef>
+      <a:fillRef idx="1">
+        <a:scrgbClr r="0" g="0" b="0"/>
+      </a:fillRef>
+      <a:effectRef idx="0">
+        <a:scrgbClr r="0" g="0" b="0"/>
+      </a:effectRef>
+      <a:fontRef idx="minor">
+        <a:schemeClr val="lt1"/>
+      </a:fontRef>
+    </dgm:style>
+  </dgm:styleLbl>
+  <dgm:styleLbl name="sibTrans1D1">
+    <dgm:scene3d>
+      <a:camera prst="orthographicFront"/>
+      <a:lightRig rig="threePt" dir="t"/>
+    </dgm:scene3d>
+    <dgm:sp3d/>
+    <dgm:txPr/>
+    <dgm:style>
+      <a:lnRef idx="1">
+        <a:scrgbClr r="0" g="0" b="0"/>
+      </a:lnRef>
+      <a:fillRef idx="0">
+        <a:scrgbClr r="0" g="0" b="0"/>
+      </a:fillRef>
+      <a:effectRef idx="0">
+        <a:scrgbClr r="0" g="0" b="0"/>
+      </a:effectRef>
+      <a:fontRef idx="minor"/>
+    </dgm:style>
+  </dgm:styleLbl>
+  <dgm:styleLbl name="callout">
+    <dgm:scene3d>
+      <a:camera prst="orthographicFront"/>
+      <a:lightRig rig="threePt" dir="t"/>
+    </dgm:scene3d>
+    <dgm:sp3d/>
+    <dgm:txPr/>
+    <dgm:style>
+      <a:lnRef idx="2">
+        <a:scrgbClr r="0" g="0" b="0"/>
+      </a:lnRef>
+      <a:fillRef idx="1">
+        <a:scrgbClr r="0" g="0" b="0"/>
+      </a:fillRef>
+      <a:effectRef idx="0">
+        <a:scrgbClr r="0" g="0" b="0"/>
+      </a:effectRef>
+      <a:fontRef idx="minor"/>
+    </dgm:style>
+  </dgm:styleLbl>
+  <dgm:styleLbl name="asst0">
+    <dgm:scene3d>
+      <a:camera prst="orthographicFront"/>
+      <a:lightRig rig="threePt" dir="t"/>
+    </dgm:scene3d>
+    <dgm:sp3d/>
+    <dgm:txPr/>
+    <dgm:style>
+      <a:lnRef idx="2">
+        <a:scrgbClr r="0" g="0" b="0"/>
+      </a:lnRef>
+      <a:fillRef idx="1">
+        <a:scrgbClr r="0" g="0" b="0"/>
+      </a:fillRef>
+      <a:effectRef idx="0">
+        <a:scrgbClr r="0" g="0" b="0"/>
+      </a:effectRef>
+      <a:fontRef idx="minor">
+        <a:schemeClr val="lt1"/>
+      </a:fontRef>
+    </dgm:style>
+  </dgm:styleLbl>
+  <dgm:styleLbl name="asst1">
+    <dgm:scene3d>
+      <a:camera prst="orthographicFront"/>
+      <a:lightRig rig="threePt" dir="t"/>
+    </dgm:scene3d>
+    <dgm:sp3d/>
+    <dgm:txPr/>
+    <dgm:style>
+      <a:lnRef idx="2">
+        <a:scrgbClr r="0" g="0" b="0"/>
+      </a:lnRef>
+      <a:fillRef idx="1">
+        <a:scrgbClr r="0" g="0" b="0"/>
+      </a:fillRef>
+      <a:effectRef idx="0">
+        <a:scrgbClr r="0" g="0" b="0"/>
+      </a:effectRef>
+      <a:fontRef idx="minor">
+        <a:schemeClr val="lt1"/>
+      </a:fontRef>
+    </dgm:style>
+  </dgm:styleLbl>
+  <dgm:styleLbl name="asst2">
+    <dgm:scene3d>
+      <a:camera prst="orthographicFront"/>
+      <a:lightRig rig="threePt" dir="t"/>
+    </dgm:scene3d>
+    <dgm:sp3d/>
+    <dgm:txPr/>
+    <dgm:style>
+      <a:lnRef idx="2">
+        <a:scrgbClr r="0" g="0" b="0"/>
+      </a:lnRef>
+      <a:fillRef idx="1">
+        <a:scrgbClr r="0" g="0" b="0"/>
+      </a:fillRef>
+      <a:effectRef idx="0">
+        <a:scrgbClr r="0" g="0" b="0"/>
+      </a:effectRef>
+      <a:fontRef idx="minor">
+        <a:schemeClr val="lt1"/>
+      </a:fontRef>
+    </dgm:style>
+  </dgm:styleLbl>
+  <dgm:styleLbl name="asst3">
+    <dgm:scene3d>
+      <a:camera prst="orthographicFront"/>
+      <a:lightRig rig="threePt" dir="t"/>
+    </dgm:scene3d>
+    <dgm:sp3d/>
+    <dgm:txPr/>
+    <dgm:style>
+      <a:lnRef idx="2">
+        <a:scrgbClr r="0" g="0" b="0"/>
+      </a:lnRef>
+      <a:fillRef idx="1">
+        <a:scrgbClr r="0" g="0" b="0"/>
+      </a:fillRef>
+      <a:effectRef idx="0">
+        <a:scrgbClr r="0" g="0" b="0"/>
+      </a:effectRef>
+      <a:fontRef idx="minor">
+        <a:schemeClr val="lt1"/>
+      </a:fontRef>
+    </dgm:style>
+  </dgm:styleLbl>
+  <dgm:styleLbl name="asst4">
+    <dgm:scene3d>
+      <a:camera prst="orthographicFront"/>
+      <a:lightRig rig="threePt" dir="t"/>
+    </dgm:scene3d>
+    <dgm:sp3d/>
+    <dgm:txPr/>
+    <dgm:style>
+      <a:lnRef idx="2">
+        <a:scrgbClr r="0" g="0" b="0"/>
+      </a:lnRef>
+      <a:fillRef idx="1">
+        <a:scrgbClr r="0" g="0" b="0"/>
+      </a:fillRef>
+      <a:effectRef idx="0">
+        <a:scrgbClr r="0" g="0" b="0"/>
+      </a:effectRef>
+      <a:fontRef idx="minor">
+        <a:schemeClr val="lt1"/>
+      </a:fontRef>
+    </dgm:style>
+  </dgm:styleLbl>
+  <dgm:styleLbl name="parChTrans2D1">
+    <dgm:scene3d>
+      <a:camera prst="orthographicFront"/>
+      <a:lightRig rig="threePt" dir="t"/>
+    </dgm:scene3d>
+    <dgm:sp3d/>
+    <dgm:txPr/>
+    <dgm:style>
+      <a:lnRef idx="2">
+        <a:scrgbClr r="0" g="0" b="0"/>
+      </a:lnRef>
+      <a:fillRef idx="1">
+        <a:scrgbClr r="0" g="0" b="0"/>
+      </a:fillRef>
+      <a:effectRef idx="0">
+        <a:scrgbClr r="0" g="0" b="0"/>
+      </a:effectRef>
+      <a:fontRef idx="minor">
+        <a:schemeClr val="lt1"/>
+      </a:fontRef>
+    </dgm:style>
+  </dgm:styleLbl>
+  <dgm:styleLbl name="parChTrans2D2">
+    <dgm:scene3d>
+      <a:camera prst="orthographicFront"/>
+      <a:lightRig rig="threePt" dir="t"/>
+    </dgm:scene3d>
+    <dgm:sp3d/>
+    <dgm:txPr/>
+    <dgm:style>
+      <a:lnRef idx="2">
+        <a:scrgbClr r="0" g="0" b="0"/>
+      </a:lnRef>
+      <a:fillRef idx="1">
+        <a:scrgbClr r="0" g="0" b="0"/>
+      </a:fillRef>
+      <a:effectRef idx="0">
+        <a:scrgbClr r="0" g="0" b="0"/>
+      </a:effectRef>
+      <a:fontRef idx="minor">
+        <a:schemeClr val="lt1"/>
+      </a:fontRef>
+    </dgm:style>
+  </dgm:styleLbl>
+  <dgm:styleLbl name="parChTrans2D3">
+    <dgm:scene3d>
+      <a:camera prst="orthographicFront"/>
+      <a:lightRig rig="threePt" dir="t"/>
+    </dgm:scene3d>
+    <dgm:sp3d/>
+    <dgm:txPr/>
+    <dgm:style>
+      <a:lnRef idx="2">
+        <a:scrgbClr r="0" g="0" b="0"/>
+      </a:lnRef>
+      <a:fillRef idx="1">
+        <a:scrgbClr r="0" g="0" b="0"/>
+      </a:fillRef>
+      <a:effectRef idx="0">
+        <a:scrgbClr r="0" g="0" b="0"/>
+      </a:effectRef>
+      <a:fontRef idx="minor">
+        <a:schemeClr val="lt1"/>
+      </a:fontRef>
+    </dgm:style>
+  </dgm:styleLbl>
+  <dgm:styleLbl name="parChTrans2D4">
+    <dgm:scene3d>
+      <a:camera prst="orthographicFront"/>
+      <a:lightRig rig="threePt" dir="t"/>
+    </dgm:scene3d>
+    <dgm:sp3d/>
+    <dgm:txPr/>
+    <dgm:style>
+      <a:lnRef idx="2">
+        <a:scrgbClr r="0" g="0" b="0"/>
+      </a:lnRef>
+      <a:fillRef idx="1">
+        <a:scrgbClr r="0" g="0" b="0"/>
+      </a:fillRef>
+      <a:effectRef idx="0">
+        <a:scrgbClr r="0" g="0" b="0"/>
+      </a:effectRef>
+      <a:fontRef idx="minor">
+        <a:schemeClr val="lt1"/>
+      </a:fontRef>
+    </dgm:style>
+  </dgm:styleLbl>
+  <dgm:styleLbl name="parChTrans1D1">
+    <dgm:scene3d>
+      <a:camera prst="orthographicFront"/>
+      <a:lightRig rig="threePt" dir="t"/>
+    </dgm:scene3d>
+    <dgm:sp3d/>
+    <dgm:txPr/>
+    <dgm:style>
+      <a:lnRef idx="2">
+        <a:scrgbClr r="0" g="0" b="0"/>
+      </a:lnRef>
+      <a:fillRef idx="0">
+        <a:scrgbClr r="0" g="0" b="0"/>
+      </a:fillRef>
+      <a:effectRef idx="0">
+        <a:scrgbClr r="0" g="0" b="0"/>
+      </a:effectRef>
+      <a:fontRef idx="minor"/>
+    </dgm:style>
+  </dgm:styleLbl>
+  <dgm:styleLbl name="parChTrans1D2">
+    <dgm:scene3d>
+      <a:camera prst="orthographicFront"/>
+      <a:lightRig rig="threePt" dir="t"/>
+    </dgm:scene3d>
+    <dgm:sp3d/>
+    <dgm:txPr/>
+    <dgm:style>
+      <a:lnRef idx="2">
+        <a:scrgbClr r="0" g="0" b="0"/>
+      </a:lnRef>
+      <a:fillRef idx="0">
+        <a:scrgbClr r="0" g="0" b="0"/>
+      </a:fillRef>
+      <a:effectRef idx="0">
+        <a:scrgbClr r="0" g="0" b="0"/>
+      </a:effectRef>
+      <a:fontRef idx="minor"/>
+    </dgm:style>
+  </dgm:styleLbl>
+  <dgm:styleLbl name="parChTrans1D3">
+    <dgm:scene3d>
+      <a:camera prst="orthographicFront"/>
+      <a:lightRig rig="threePt" dir="t"/>
+    </dgm:scene3d>
+    <dgm:sp3d/>
+    <dgm:txPr/>
+    <dgm:style>
+      <a:lnRef idx="2">
+        <a:scrgbClr r="0" g="0" b="0"/>
+      </a:lnRef>
+      <a:fillRef idx="0">
+        <a:scrgbClr r="0" g="0" b="0"/>
+      </a:fillRef>
+      <a:effectRef idx="0">
+        <a:scrgbClr r="0" g="0" b="0"/>
+      </a:effectRef>
+      <a:fontRef idx="minor"/>
+    </dgm:style>
+  </dgm:styleLbl>
+  <dgm:styleLbl name="parChTrans1D4">
+    <dgm:scene3d>
+      <a:camera prst="orthographicFront"/>
+      <a:lightRig rig="threePt" dir="t"/>
+    </dgm:scene3d>
+    <dgm:sp3d/>
+    <dgm:txPr/>
+    <dgm:style>
+      <a:lnRef idx="2">
+        <a:scrgbClr r="0" g="0" b="0"/>
+      </a:lnRef>
+      <a:fillRef idx="0">
+        <a:scrgbClr r="0" g="0" b="0"/>
+      </a:fillRef>
+      <a:effectRef idx="0">
+        <a:scrgbClr r="0" g="0" b="0"/>
+      </a:effectRef>
+      <a:fontRef idx="minor"/>
+    </dgm:style>
+  </dgm:styleLbl>
+  <dgm:styleLbl name="fgAcc1">
+    <dgm:scene3d>
+      <a:camera prst="orthographicFront"/>
+      <a:lightRig rig="threePt" dir="t"/>
+    </dgm:scene3d>
+    <dgm:sp3d/>
+    <dgm:txPr/>
+    <dgm:style>
+      <a:lnRef idx="2">
+        <a:scrgbClr r="0" g="0" b="0"/>
+      </a:lnRef>
+      <a:fillRef idx="1">
+        <a:scrgbClr r="0" g="0" b="0"/>
+      </a:fillRef>
+      <a:effectRef idx="0">
+        <a:scrgbClr r="0" g="0" b="0"/>
+      </a:effectRef>
+      <a:fontRef idx="minor"/>
+    </dgm:style>
+  </dgm:styleLbl>
+  <dgm:styleLbl name="conFgAcc1">
+    <dgm:scene3d>
+      <a:camera prst="orthographicFront"/>
+      <a:lightRig rig="threePt" dir="t"/>
+    </dgm:scene3d>
+    <dgm:sp3d/>
+    <dgm:txPr/>
+    <dgm:style>
+      <a:lnRef idx="2">
+        <a:scrgbClr r="0" g="0" b="0"/>
+      </a:lnRef>
+      <a:fillRef idx="1">
+        <a:scrgbClr r="0" g="0" b="0"/>
+      </a:fillRef>
+      <a:effectRef idx="0">
+        <a:scrgbClr r="0" g="0" b="0"/>
+      </a:effectRef>
+      <a:fontRef idx="minor"/>
+    </dgm:style>
+  </dgm:styleLbl>
+  <dgm:styleLbl name="alignAcc1">
+    <dgm:scene3d>
+      <a:camera prst="orthographicFront"/>
+      <a:lightRig rig="threePt" dir="t"/>
+    </dgm:scene3d>
+    <dgm:sp3d/>
+    <dgm:txPr/>
+    <dgm:style>
+      <a:lnRef idx="2">
+        <a:scrgbClr r="0" g="0" b="0"/>
+      </a:lnRef>
+      <a:fillRef idx="1">
+        <a:scrgbClr r="0" g="0" b="0"/>
+      </a:fillRef>
+      <a:effectRef idx="0">
+        <a:scrgbClr r="0" g="0" b="0"/>
+      </a:effectRef>
+      <a:fontRef idx="minor"/>
+    </dgm:style>
+  </dgm:styleLbl>
+  <dgm:styleLbl name="trAlignAcc1">
+    <dgm:scene3d>
+      <a:camera prst="orthographicFront"/>
+      <a:lightRig rig="threePt" dir="t"/>
+    </dgm:scene3d>
+    <dgm:sp3d/>
+    <dgm:txPr/>
+    <dgm:style>
+      <a:lnRef idx="1">
+        <a:scrgbClr r="0" g="0" b="0"/>
+      </a:lnRef>
+      <a:fillRef idx="1">
+        <a:scrgbClr r="0" g="0" b="0"/>
+      </a:fillRef>
+      <a:effectRef idx="0">
+        <a:scrgbClr r="0" g="0" b="0"/>
+      </a:effectRef>
+      <a:fontRef idx="minor"/>
+    </dgm:style>
+  </dgm:styleLbl>
+  <dgm:styleLbl name="bgAcc1">
+    <dgm:scene3d>
+      <a:camera prst="orthographicFront"/>
+      <a:lightRig rig="threePt" dir="t"/>
+    </dgm:scene3d>
+    <dgm:sp3d/>
+    <dgm:txPr/>
+    <dgm:style>
+      <a:lnRef idx="2">
+        <a:scrgbClr r="0" g="0" b="0"/>
+      </a:lnRef>
+      <a:fillRef idx="1">
+        <a:scrgbClr r="0" g="0" b="0"/>
+      </a:fillRef>
+      <a:effectRef idx="0">
+        <a:scrgbClr r="0" g="0" b="0"/>
+      </a:effectRef>
+      <a:fontRef idx="minor"/>
+    </dgm:style>
+  </dgm:styleLbl>
+  <dgm:styleLbl name="solidFgAcc1">
+    <dgm:scene3d>
+      <a:camera prst="orthographicFront"/>
+      <a:lightRig rig="threePt" dir="t"/>
+    </dgm:scene3d>
+    <dgm:sp3d/>
+    <dgm:txPr/>
+    <dgm:style>
+      <a:lnRef idx="2">
+        <a:scrgbClr r="0" g="0" b="0"/>
+      </a:lnRef>
+      <a:fillRef idx="1">
+        <a:scrgbClr r="0" g="0" b="0"/>
+      </a:fillRef>
+      <a:effectRef idx="0">
+        <a:scrgbClr r="0" g="0" b="0"/>
+      </a:effectRef>
+      <a:fontRef idx="minor"/>
+    </dgm:style>
+  </dgm:styleLbl>
+  <dgm:styleLbl name="solidAlignAcc1">
+    <dgm:scene3d>
+      <a:camera prst="orthographicFront"/>
+      <a:lightRig rig="threePt" dir="t"/>
+    </dgm:scene3d>
+    <dgm:sp3d/>
+    <dgm:txPr/>
+    <dgm:style>
+      <a:lnRef idx="2">
+        <a:scrgbClr r="0" g="0" b="0"/>
+      </a:lnRef>
+      <a:fillRef idx="1">
+        <a:scrgbClr r="0" g="0" b="0"/>
+      </a:fillRef>
+      <a:effectRef idx="0">
+        <a:scrgbClr r="0" g="0" b="0"/>
+      </a:effectRef>
+      <a:fontRef idx="minor"/>
+    </dgm:style>
+  </dgm:styleLbl>
+  <dgm:styleLbl name="solidBgAcc1">
+    <dgm:scene3d>
+      <a:camera prst="orthographicFront"/>
+      <a:lightRig rig="threePt" dir="t"/>
+    </dgm:scene3d>
+    <dgm:sp3d/>
+    <dgm:txPr/>
+    <dgm:style>
+      <a:lnRef idx="2">
+        <a:scrgbClr r="0" g="0" b="0"/>
+      </a:lnRef>
+      <a:fillRef idx="1">
+        <a:scrgbClr r="0" g="0" b="0"/>
+      </a:fillRef>
+      <a:effectRef idx="0">
+        <a:scrgbClr r="0" g="0" b="0"/>
+      </a:effectRef>
+      <a:fontRef idx="minor"/>
+    </dgm:style>
+  </dgm:styleLbl>
+  <dgm:styleLbl name="fgAccFollowNode1">
+    <dgm:scene3d>
+      <a:camera prst="orthographicFront"/>
+      <a:lightRig rig="threePt" dir="t"/>
+    </dgm:scene3d>
+    <dgm:sp3d/>
+    <dgm:txPr/>
+    <dgm:style>
+      <a:lnRef idx="2">
+        <a:scrgbClr r="0" g="0" b="0"/>
+      </a:lnRef>
+      <a:fillRef idx="1">
+        <a:scrgbClr r="0" g="0" b="0"/>
+      </a:fillRef>
+      <a:effectRef idx="0">
+        <a:scrgbClr r="0" g="0" b="0"/>
+      </a:effectRef>
+      <a:fontRef idx="minor"/>
+    </dgm:style>
+  </dgm:styleLbl>
+  <dgm:styleLbl name="alignAccFollowNode1">
+    <dgm:scene3d>
+      <a:camera prst="orthographicFront"/>
+      <a:lightRig rig="threePt" dir="t"/>
+    </dgm:scene3d>
+    <dgm:sp3d/>
+    <dgm:txPr/>
+    <dgm:style>
+      <a:lnRef idx="2">
+        <a:scrgbClr r="0" g="0" b="0"/>
+      </a:lnRef>
+      <a:fillRef idx="1">
+        <a:scrgbClr r="0" g="0" b="0"/>
+      </a:fillRef>
+      <a:effectRef idx="0">
+        <a:scrgbClr r="0" g="0" b="0"/>
+      </a:effectRef>
+      <a:fontRef idx="minor"/>
+    </dgm:style>
+  </dgm:styleLbl>
+  <dgm:styleLbl name="bgAccFollowNode1">
+    <dgm:scene3d>
+      <a:camera prst="orthographicFront"/>
+      <a:lightRig rig="threePt" dir="t"/>
+    </dgm:scene3d>
+    <dgm:sp3d/>
+    <dgm:txPr/>
+    <dgm:style>
+      <a:lnRef idx="2">
+        <a:scrgbClr r="0" g="0" b="0"/>
+      </a:lnRef>
+      <a:fillRef idx="1">
+        <a:scrgbClr r="0" g="0" b="0"/>
+      </a:fillRef>
+      <a:effectRef idx="0">
+        <a:scrgbClr r="0" g="0" b="0"/>
+      </a:effectRef>
+      <a:fontRef idx="minor"/>
+    </dgm:style>
+  </dgm:styleLbl>
+  <dgm:styleLbl name="fgAcc0">
+    <dgm:scene3d>
+      <a:camera prst="orthographicFront"/>
+      <a:lightRig rig="threePt" dir="t"/>
+    </dgm:scene3d>
+    <dgm:sp3d/>
+    <dgm:txPr/>
+    <dgm:style>
+      <a:lnRef idx="2">
+        <a:scrgbClr r="0" g="0" b="0"/>
+      </a:lnRef>
+      <a:fillRef idx="1">
+        <a:scrgbClr r="0" g="0" b="0"/>
+      </a:fillRef>
+      <a:effectRef idx="0">
+        <a:scrgbClr r="0" g="0" b="0"/>
+      </a:effectRef>
+      <a:fontRef idx="minor"/>
+    </dgm:style>
+  </dgm:styleLbl>
+  <dgm:styleLbl name="fgAcc2">
+    <dgm:scene3d>
+      <a:camera prst="orthographicFront"/>
+      <a:lightRig rig="threePt" dir="t"/>
+    </dgm:scene3d>
+    <dgm:sp3d/>
+    <dgm:txPr/>
+    <dgm:style>
+      <a:lnRef idx="2">
+        <a:scrgbClr r="0" g="0" b="0"/>
+      </a:lnRef>
+      <a:fillRef idx="1">
+        <a:scrgbClr r="0" g="0" b="0"/>
+      </a:fillRef>
+      <a:effectRef idx="0">
+        <a:scrgbClr r="0" g="0" b="0"/>
+      </a:effectRef>
+      <a:fontRef idx="minor"/>
+    </dgm:style>
+  </dgm:styleLbl>
+  <dgm:styleLbl name="fgAcc3">
+    <dgm:scene3d>
+      <a:camera prst="orthographicFront"/>
+      <a:lightRig rig="threePt" dir="t"/>
+    </dgm:scene3d>
+    <dgm:sp3d/>
+    <dgm:txPr/>
+    <dgm:style>
+      <a:lnRef idx="2">
+        <a:scrgbClr r="0" g="0" b="0"/>
+      </a:lnRef>
+      <a:fillRef idx="1">
+        <a:scrgbClr r="0" g="0" b="0"/>
+      </a:fillRef>
+      <a:effectRef idx="0">
+        <a:scrgbClr r="0" g="0" b="0"/>
+      </a:effectRef>
+      <a:fontRef idx="minor"/>
+    </dgm:style>
+  </dgm:styleLbl>
+  <dgm:styleLbl name="fgAcc4">
+    <dgm:scene3d>
+      <a:camera prst="orthographicFront"/>
+      <a:lightRig rig="threePt" dir="t"/>
+    </dgm:scene3d>
+    <dgm:sp3d/>
+    <dgm:txPr/>
+    <dgm:style>
+      <a:lnRef idx="2">
+        <a:scrgbClr r="0" g="0" b="0"/>
+      </a:lnRef>
+      <a:fillRef idx="1">
+        <a:scrgbClr r="0" g="0" b="0"/>
+      </a:fillRef>
+      <a:effectRef idx="0">
+        <a:scrgbClr r="0" g="0" b="0"/>
+      </a:effectRef>
+      <a:fontRef idx="minor"/>
+    </dgm:style>
+  </dgm:styleLbl>
+  <dgm:styleLbl name="bgShp">
+    <dgm:scene3d>
+      <a:camera prst="orthographicFront"/>
+      <a:lightRig rig="threePt" dir="t"/>
+    </dgm:scene3d>
+    <dgm:sp3d/>
+    <dgm:txPr/>
+    <dgm:style>
+      <a:lnRef idx="0">
+        <a:scrgbClr r="0" g="0" b="0"/>
+      </a:lnRef>
+      <a:fillRef idx="1">
+        <a:scrgbClr r="0" g="0" b="0"/>
+      </a:fillRef>
+      <a:effectRef idx="0">
+        <a:scrgbClr r="0" g="0" b="0"/>
+      </a:effectRef>
+      <a:fontRef idx="minor"/>
+    </dgm:style>
+  </dgm:styleLbl>
+  <dgm:styleLbl name="dkBgShp">
+    <dgm:scene3d>
+      <a:camera prst="orthographicFront"/>
+      <a:lightRig rig="threePt" dir="t"/>
+    </dgm:scene3d>
+    <dgm:sp3d/>
+    <dgm:txPr/>
+    <dgm:style>
+      <a:lnRef idx="0">
+        <a:scrgbClr r="0" g="0" b="0"/>
+      </a:lnRef>
+      <a:fillRef idx="1">
+        <a:scrgbClr r="0" g="0" b="0"/>
+      </a:fillRef>
+      <a:effectRef idx="0">
+        <a:scrgbClr r="0" g="0" b="0"/>
+      </a:effectRef>
+      <a:fontRef idx="minor"/>
+    </dgm:style>
+  </dgm:styleLbl>
+  <dgm:styleLbl name="trBgShp">
+    <dgm:scene3d>
+      <a:camera prst="orthographicFront"/>
+      <a:lightRig rig="threePt" dir="t"/>
+    </dgm:scene3d>
+    <dgm:sp3d/>
+    <dgm:txPr/>
+    <dgm:style>
+      <a:lnRef idx="0">
+        <a:scrgbClr r="0" g="0" b="0"/>
+      </a:lnRef>
+      <a:fillRef idx="1">
+        <a:scrgbClr r="0" g="0" b="0"/>
+      </a:fillRef>
+      <a:effectRef idx="0">
+        <a:scrgbClr r="0" g="0" b="0"/>
+      </a:effectRef>
+      <a:fontRef idx="minor"/>
+    </dgm:style>
+  </dgm:styleLbl>
+  <dgm:styleLbl name="fgShp">
+    <dgm:scene3d>
+      <a:camera prst="orthographicFront"/>
+      <a:lightRig rig="threePt" dir="t"/>
+    </dgm:scene3d>
+    <dgm:sp3d/>
+    <dgm:txPr/>
+    <dgm:style>
+      <a:lnRef idx="2">
+        <a:scrgbClr r="0" g="0" b="0"/>
+      </a:lnRef>
+      <a:fillRef idx="1">
+        <a:scrgbClr r="0" g="0" b="0"/>
+      </a:fillRef>
+      <a:effectRef idx="0">
+        <a:scrgbClr r="0" g="0" b="0"/>
+      </a:effectRef>
+      <a:fontRef idx="minor"/>
+    </dgm:style>
+  </dgm:styleLbl>
+  <dgm:styleLbl name="revTx">
+    <dgm:scene3d>
+      <a:camera prst="orthographicFront"/>
+      <a:lightRig rig="threePt" dir="t"/>
+    </dgm:scene3d>
+    <dgm:sp3d/>
+    <dgm:txPr/>
+    <dgm:style>
+      <a:lnRef idx="0">
+        <a:scrgbClr r="0" g="0" b="0"/>
+      </a:lnRef>
+      <a:fillRef idx="0">
+        <a:scrgbClr r="0" g="0" b="0"/>
+      </a:fillRef>
+      <a:effectRef idx="0">
+        <a:scrgbClr r="0" g="0" b="0"/>
+      </a:effectRef>
+      <a:fontRef idx="minor"/>
+    </dgm:style>
+  </dgm:styleLbl>
+</dgm:styleDef>
+</file>
+
 <file path=ppt/slideLayouts/slideLayout1.xml><?xml version="1.0" encoding="utf-8"?>
 <p:sldLayout xmlns:a="http://schemas.openxmlformats.org/drawingml/2006/main" xmlns:r="http://schemas.openxmlformats.org/officeDocument/2006/relationships" xmlns:p="http://schemas.openxmlformats.org/presentationml/2006/main" type="title" preserve="1">
   <p:cSld name="Title Slide">
@@ -11117,7 +13578,7 @@
           <p:cNvPr id="2" name="Title 1">
             <a:extLst>
               <a:ext uri="{FF2B5EF4-FFF2-40B4-BE49-F238E27FC236}">
-                <a16:creationId xmlns:a16="http://schemas.microsoft.com/office/drawing/2014/main" id="{16BF7AE4-C0B3-4010-BFC1-CEF34BAE0428}"/>
+                <a16:creationId xmlns:a16="http://schemas.microsoft.com/office/drawing/2014/main" xmlns="" id="{16BF7AE4-C0B3-4010-BFC1-CEF34BAE0428}"/>
               </a:ext>
             </a:extLst>
           </p:cNvPr>
@@ -11154,7 +13615,7 @@
           <p:cNvPr id="3" name="Subtitle 2">
             <a:extLst>
               <a:ext uri="{FF2B5EF4-FFF2-40B4-BE49-F238E27FC236}">
-                <a16:creationId xmlns:a16="http://schemas.microsoft.com/office/drawing/2014/main" id="{B9209BB6-DD6F-4588-A372-B994E11D23FE}"/>
+                <a16:creationId xmlns:a16="http://schemas.microsoft.com/office/drawing/2014/main" xmlns="" id="{B9209BB6-DD6F-4588-A372-B994E11D23FE}"/>
               </a:ext>
             </a:extLst>
           </p:cNvPr>
@@ -11224,7 +13685,7 @@
           <p:cNvPr id="4" name="Date Placeholder 3">
             <a:extLst>
               <a:ext uri="{FF2B5EF4-FFF2-40B4-BE49-F238E27FC236}">
-                <a16:creationId xmlns:a16="http://schemas.microsoft.com/office/drawing/2014/main" id="{6B9759D3-2AF2-4EC6-921A-D1F5F79F9299}"/>
+                <a16:creationId xmlns:a16="http://schemas.microsoft.com/office/drawing/2014/main" xmlns="" id="{6B9759D3-2AF2-4EC6-921A-D1F5F79F9299}"/>
               </a:ext>
             </a:extLst>
           </p:cNvPr>
@@ -11254,7 +13715,7 @@
           <p:cNvPr id="5" name="Footer Placeholder 4">
             <a:extLst>
               <a:ext uri="{FF2B5EF4-FFF2-40B4-BE49-F238E27FC236}">
-                <a16:creationId xmlns:a16="http://schemas.microsoft.com/office/drawing/2014/main" id="{ECDD070B-BC2D-49AC-B3E7-53C722813DE5}"/>
+                <a16:creationId xmlns:a16="http://schemas.microsoft.com/office/drawing/2014/main" xmlns="" id="{ECDD070B-BC2D-49AC-B3E7-53C722813DE5}"/>
               </a:ext>
             </a:extLst>
           </p:cNvPr>
@@ -11279,7 +13740,7 @@
           <p:cNvPr id="6" name="Slide Number Placeholder 5">
             <a:extLst>
               <a:ext uri="{FF2B5EF4-FFF2-40B4-BE49-F238E27FC236}">
-                <a16:creationId xmlns:a16="http://schemas.microsoft.com/office/drawing/2014/main" id="{1064CA4E-1442-483B-851C-CA672F0A3398}"/>
+                <a16:creationId xmlns:a16="http://schemas.microsoft.com/office/drawing/2014/main" xmlns="" id="{1064CA4E-1442-483B-851C-CA672F0A3398}"/>
               </a:ext>
             </a:extLst>
           </p:cNvPr>
@@ -11307,7 +13768,7 @@
     </p:spTree>
     <p:extLst>
       <p:ext uri="{BB962C8B-B14F-4D97-AF65-F5344CB8AC3E}">
-        <p14:creationId xmlns:p14="http://schemas.microsoft.com/office/powerpoint/2010/main" val="2690942046"/>
+        <p14:creationId xmlns:p14="http://schemas.microsoft.com/office/powerpoint/2010/main" xmlns="" val="2690942046"/>
       </p:ext>
     </p:extLst>
   </p:cSld>
@@ -11339,7 +13800,7 @@
           <p:cNvPr id="2" name="Title 1">
             <a:extLst>
               <a:ext uri="{FF2B5EF4-FFF2-40B4-BE49-F238E27FC236}">
-                <a16:creationId xmlns:a16="http://schemas.microsoft.com/office/drawing/2014/main" id="{AD3F4A32-5115-40C6-AF9B-700C28DFC92B}"/>
+                <a16:creationId xmlns:a16="http://schemas.microsoft.com/office/drawing/2014/main" xmlns="" id="{AD3F4A32-5115-40C6-AF9B-700C28DFC92B}"/>
               </a:ext>
             </a:extLst>
           </p:cNvPr>
@@ -11367,7 +13828,7 @@
           <p:cNvPr id="3" name="Vertical Text Placeholder 2">
             <a:extLst>
               <a:ext uri="{FF2B5EF4-FFF2-40B4-BE49-F238E27FC236}">
-                <a16:creationId xmlns:a16="http://schemas.microsoft.com/office/drawing/2014/main" id="{E9F790D3-3AD6-4079-9C79-8D042919F458}"/>
+                <a16:creationId xmlns:a16="http://schemas.microsoft.com/office/drawing/2014/main" xmlns="" id="{E9F790D3-3AD6-4079-9C79-8D042919F458}"/>
               </a:ext>
             </a:extLst>
           </p:cNvPr>
@@ -11424,7 +13885,7 @@
           <p:cNvPr id="4" name="Date Placeholder 3">
             <a:extLst>
               <a:ext uri="{FF2B5EF4-FFF2-40B4-BE49-F238E27FC236}">
-                <a16:creationId xmlns:a16="http://schemas.microsoft.com/office/drawing/2014/main" id="{E5026EDD-70D0-44B8-A1BA-6ED9FD111E70}"/>
+                <a16:creationId xmlns:a16="http://schemas.microsoft.com/office/drawing/2014/main" xmlns="" id="{E5026EDD-70D0-44B8-A1BA-6ED9FD111E70}"/>
               </a:ext>
             </a:extLst>
           </p:cNvPr>
@@ -11454,7 +13915,7 @@
           <p:cNvPr id="5" name="Footer Placeholder 4">
             <a:extLst>
               <a:ext uri="{FF2B5EF4-FFF2-40B4-BE49-F238E27FC236}">
-                <a16:creationId xmlns:a16="http://schemas.microsoft.com/office/drawing/2014/main" id="{A37DDB79-51FF-42D2-98B7-8C92F16664B0}"/>
+                <a16:creationId xmlns:a16="http://schemas.microsoft.com/office/drawing/2014/main" xmlns="" id="{A37DDB79-51FF-42D2-98B7-8C92F16664B0}"/>
               </a:ext>
             </a:extLst>
           </p:cNvPr>
@@ -11479,7 +13940,7 @@
           <p:cNvPr id="6" name="Slide Number Placeholder 5">
             <a:extLst>
               <a:ext uri="{FF2B5EF4-FFF2-40B4-BE49-F238E27FC236}">
-                <a16:creationId xmlns:a16="http://schemas.microsoft.com/office/drawing/2014/main" id="{0A86D4A6-3E61-4550-B96A-020302FCC623}"/>
+                <a16:creationId xmlns:a16="http://schemas.microsoft.com/office/drawing/2014/main" xmlns="" id="{0A86D4A6-3E61-4550-B96A-020302FCC623}"/>
               </a:ext>
             </a:extLst>
           </p:cNvPr>
@@ -11507,7 +13968,7 @@
     </p:spTree>
     <p:extLst>
       <p:ext uri="{BB962C8B-B14F-4D97-AF65-F5344CB8AC3E}">
-        <p14:creationId xmlns:p14="http://schemas.microsoft.com/office/powerpoint/2010/main" val="1787943067"/>
+        <p14:creationId xmlns:p14="http://schemas.microsoft.com/office/powerpoint/2010/main" xmlns="" val="1787943067"/>
       </p:ext>
     </p:extLst>
   </p:cSld>
@@ -11539,7 +14000,7 @@
           <p:cNvPr id="2" name="Vertical Title 1">
             <a:extLst>
               <a:ext uri="{FF2B5EF4-FFF2-40B4-BE49-F238E27FC236}">
-                <a16:creationId xmlns:a16="http://schemas.microsoft.com/office/drawing/2014/main" id="{0B4B9B4B-C068-45CD-861C-9D6C9963A052}"/>
+                <a16:creationId xmlns:a16="http://schemas.microsoft.com/office/drawing/2014/main" xmlns="" id="{0B4B9B4B-C068-45CD-861C-9D6C9963A052}"/>
               </a:ext>
             </a:extLst>
           </p:cNvPr>
@@ -11572,7 +14033,7 @@
           <p:cNvPr id="3" name="Vertical Text Placeholder 2">
             <a:extLst>
               <a:ext uri="{FF2B5EF4-FFF2-40B4-BE49-F238E27FC236}">
-                <a16:creationId xmlns:a16="http://schemas.microsoft.com/office/drawing/2014/main" id="{856B1DBE-5100-4271-AE18-99C3FC65BC91}"/>
+                <a16:creationId xmlns:a16="http://schemas.microsoft.com/office/drawing/2014/main" xmlns="" id="{856B1DBE-5100-4271-AE18-99C3FC65BC91}"/>
               </a:ext>
             </a:extLst>
           </p:cNvPr>
@@ -11634,7 +14095,7 @@
           <p:cNvPr id="4" name="Date Placeholder 3">
             <a:extLst>
               <a:ext uri="{FF2B5EF4-FFF2-40B4-BE49-F238E27FC236}">
-                <a16:creationId xmlns:a16="http://schemas.microsoft.com/office/drawing/2014/main" id="{543BBB15-4409-479A-B71F-7C25FF6A92BF}"/>
+                <a16:creationId xmlns:a16="http://schemas.microsoft.com/office/drawing/2014/main" xmlns="" id="{543BBB15-4409-479A-B71F-7C25FF6A92BF}"/>
               </a:ext>
             </a:extLst>
           </p:cNvPr>
@@ -11664,7 +14125,7 @@
           <p:cNvPr id="5" name="Footer Placeholder 4">
             <a:extLst>
               <a:ext uri="{FF2B5EF4-FFF2-40B4-BE49-F238E27FC236}">
-                <a16:creationId xmlns:a16="http://schemas.microsoft.com/office/drawing/2014/main" id="{71F2B5C0-2751-438D-A1B9-3517F9091457}"/>
+                <a16:creationId xmlns:a16="http://schemas.microsoft.com/office/drawing/2014/main" xmlns="" id="{71F2B5C0-2751-438D-A1B9-3517F9091457}"/>
               </a:ext>
             </a:extLst>
           </p:cNvPr>
@@ -11689,7 +14150,7 @@
           <p:cNvPr id="6" name="Slide Number Placeholder 5">
             <a:extLst>
               <a:ext uri="{FF2B5EF4-FFF2-40B4-BE49-F238E27FC236}">
-                <a16:creationId xmlns:a16="http://schemas.microsoft.com/office/drawing/2014/main" id="{40E82060-787B-464B-BCED-894FB9C33DA6}"/>
+                <a16:creationId xmlns:a16="http://schemas.microsoft.com/office/drawing/2014/main" xmlns="" id="{40E82060-787B-464B-BCED-894FB9C33DA6}"/>
               </a:ext>
             </a:extLst>
           </p:cNvPr>
@@ -11717,7 +14178,7 @@
     </p:spTree>
     <p:extLst>
       <p:ext uri="{BB962C8B-B14F-4D97-AF65-F5344CB8AC3E}">
-        <p14:creationId xmlns:p14="http://schemas.microsoft.com/office/powerpoint/2010/main" val="2528138552"/>
+        <p14:creationId xmlns:p14="http://schemas.microsoft.com/office/powerpoint/2010/main" xmlns="" val="2528138552"/>
       </p:ext>
     </p:extLst>
   </p:cSld>
@@ -11749,7 +14210,7 @@
           <p:cNvPr id="2" name="Title 1">
             <a:extLst>
               <a:ext uri="{FF2B5EF4-FFF2-40B4-BE49-F238E27FC236}">
-                <a16:creationId xmlns:a16="http://schemas.microsoft.com/office/drawing/2014/main" id="{B8ECD63E-FA13-49ED-8885-85BC1F1772C0}"/>
+                <a16:creationId xmlns:a16="http://schemas.microsoft.com/office/drawing/2014/main" xmlns="" id="{B8ECD63E-FA13-49ED-8885-85BC1F1772C0}"/>
               </a:ext>
             </a:extLst>
           </p:cNvPr>
@@ -11777,7 +14238,7 @@
           <p:cNvPr id="3" name="Content Placeholder 2">
             <a:extLst>
               <a:ext uri="{FF2B5EF4-FFF2-40B4-BE49-F238E27FC236}">
-                <a16:creationId xmlns:a16="http://schemas.microsoft.com/office/drawing/2014/main" id="{3F420131-B8E3-4C48-875E-065636603980}"/>
+                <a16:creationId xmlns:a16="http://schemas.microsoft.com/office/drawing/2014/main" xmlns="" id="{3F420131-B8E3-4C48-875E-065636603980}"/>
               </a:ext>
             </a:extLst>
           </p:cNvPr>
@@ -11834,7 +14295,7 @@
           <p:cNvPr id="4" name="Date Placeholder 3">
             <a:extLst>
               <a:ext uri="{FF2B5EF4-FFF2-40B4-BE49-F238E27FC236}">
-                <a16:creationId xmlns:a16="http://schemas.microsoft.com/office/drawing/2014/main" id="{F15EE35F-FD23-4212-B583-F0DAD39FCCE7}"/>
+                <a16:creationId xmlns:a16="http://schemas.microsoft.com/office/drawing/2014/main" xmlns="" id="{F15EE35F-FD23-4212-B583-F0DAD39FCCE7}"/>
               </a:ext>
             </a:extLst>
           </p:cNvPr>
@@ -11864,7 +14325,7 @@
           <p:cNvPr id="5" name="Footer Placeholder 4">
             <a:extLst>
               <a:ext uri="{FF2B5EF4-FFF2-40B4-BE49-F238E27FC236}">
-                <a16:creationId xmlns:a16="http://schemas.microsoft.com/office/drawing/2014/main" id="{D8C27DF3-20AB-4AE5-81EA-301E67FE04A1}"/>
+                <a16:creationId xmlns:a16="http://schemas.microsoft.com/office/drawing/2014/main" xmlns="" id="{D8C27DF3-20AB-4AE5-81EA-301E67FE04A1}"/>
               </a:ext>
             </a:extLst>
           </p:cNvPr>
@@ -11889,7 +14350,7 @@
           <p:cNvPr id="6" name="Slide Number Placeholder 5">
             <a:extLst>
               <a:ext uri="{FF2B5EF4-FFF2-40B4-BE49-F238E27FC236}">
-                <a16:creationId xmlns:a16="http://schemas.microsoft.com/office/drawing/2014/main" id="{6C8FE2E8-BC7F-46D3-8067-B07CA6273A05}"/>
+                <a16:creationId xmlns:a16="http://schemas.microsoft.com/office/drawing/2014/main" xmlns="" id="{6C8FE2E8-BC7F-46D3-8067-B07CA6273A05}"/>
               </a:ext>
             </a:extLst>
           </p:cNvPr>
@@ -11917,7 +14378,7 @@
     </p:spTree>
     <p:extLst>
       <p:ext uri="{BB962C8B-B14F-4D97-AF65-F5344CB8AC3E}">
-        <p14:creationId xmlns:p14="http://schemas.microsoft.com/office/powerpoint/2010/main" val="4115221501"/>
+        <p14:creationId xmlns:p14="http://schemas.microsoft.com/office/powerpoint/2010/main" xmlns="" val="4115221501"/>
       </p:ext>
     </p:extLst>
   </p:cSld>
@@ -11949,7 +14410,7 @@
           <p:cNvPr id="2" name="Title 1">
             <a:extLst>
               <a:ext uri="{FF2B5EF4-FFF2-40B4-BE49-F238E27FC236}">
-                <a16:creationId xmlns:a16="http://schemas.microsoft.com/office/drawing/2014/main" id="{501B7952-A436-4FEB-A848-4D4BDE516C45}"/>
+                <a16:creationId xmlns:a16="http://schemas.microsoft.com/office/drawing/2014/main" xmlns="" id="{501B7952-A436-4FEB-A848-4D4BDE516C45}"/>
               </a:ext>
             </a:extLst>
           </p:cNvPr>
@@ -11986,7 +14447,7 @@
           <p:cNvPr id="3" name="Text Placeholder 2">
             <a:extLst>
               <a:ext uri="{FF2B5EF4-FFF2-40B4-BE49-F238E27FC236}">
-                <a16:creationId xmlns:a16="http://schemas.microsoft.com/office/drawing/2014/main" id="{8F4B50D2-192E-4894-9B90-539DB0F45790}"/>
+                <a16:creationId xmlns:a16="http://schemas.microsoft.com/office/drawing/2014/main" xmlns="" id="{8F4B50D2-192E-4894-9B90-539DB0F45790}"/>
               </a:ext>
             </a:extLst>
           </p:cNvPr>
@@ -12111,7 +14572,7 @@
           <p:cNvPr id="4" name="Date Placeholder 3">
             <a:extLst>
               <a:ext uri="{FF2B5EF4-FFF2-40B4-BE49-F238E27FC236}">
-                <a16:creationId xmlns:a16="http://schemas.microsoft.com/office/drawing/2014/main" id="{FED050B8-70B0-49E3-BF09-D035D2C46CA7}"/>
+                <a16:creationId xmlns:a16="http://schemas.microsoft.com/office/drawing/2014/main" xmlns="" id="{FED050B8-70B0-49E3-BF09-D035D2C46CA7}"/>
               </a:ext>
             </a:extLst>
           </p:cNvPr>
@@ -12141,7 +14602,7 @@
           <p:cNvPr id="5" name="Footer Placeholder 4">
             <a:extLst>
               <a:ext uri="{FF2B5EF4-FFF2-40B4-BE49-F238E27FC236}">
-                <a16:creationId xmlns:a16="http://schemas.microsoft.com/office/drawing/2014/main" id="{59B1503C-60FE-441D-9B99-C3FF0526BC0E}"/>
+                <a16:creationId xmlns:a16="http://schemas.microsoft.com/office/drawing/2014/main" xmlns="" id="{59B1503C-60FE-441D-9B99-C3FF0526BC0E}"/>
               </a:ext>
             </a:extLst>
           </p:cNvPr>
@@ -12166,7 +14627,7 @@
           <p:cNvPr id="6" name="Slide Number Placeholder 5">
             <a:extLst>
               <a:ext uri="{FF2B5EF4-FFF2-40B4-BE49-F238E27FC236}">
-                <a16:creationId xmlns:a16="http://schemas.microsoft.com/office/drawing/2014/main" id="{9B4F9AFF-6B11-469C-991C-CDD27D512299}"/>
+                <a16:creationId xmlns:a16="http://schemas.microsoft.com/office/drawing/2014/main" xmlns="" id="{9B4F9AFF-6B11-469C-991C-CDD27D512299}"/>
               </a:ext>
             </a:extLst>
           </p:cNvPr>
@@ -12194,7 +14655,7 @@
     </p:spTree>
     <p:extLst>
       <p:ext uri="{BB962C8B-B14F-4D97-AF65-F5344CB8AC3E}">
-        <p14:creationId xmlns:p14="http://schemas.microsoft.com/office/powerpoint/2010/main" val="2170116738"/>
+        <p14:creationId xmlns:p14="http://schemas.microsoft.com/office/powerpoint/2010/main" xmlns="" val="2170116738"/>
       </p:ext>
     </p:extLst>
   </p:cSld>
@@ -12226,7 +14687,7 @@
           <p:cNvPr id="2" name="Title 1">
             <a:extLst>
               <a:ext uri="{FF2B5EF4-FFF2-40B4-BE49-F238E27FC236}">
-                <a16:creationId xmlns:a16="http://schemas.microsoft.com/office/drawing/2014/main" id="{80F9AA80-8A1E-4580-91B5-D8D855C72E54}"/>
+                <a16:creationId xmlns:a16="http://schemas.microsoft.com/office/drawing/2014/main" xmlns="" id="{80F9AA80-8A1E-4580-91B5-D8D855C72E54}"/>
               </a:ext>
             </a:extLst>
           </p:cNvPr>
@@ -12254,7 +14715,7 @@
           <p:cNvPr id="3" name="Content Placeholder 2">
             <a:extLst>
               <a:ext uri="{FF2B5EF4-FFF2-40B4-BE49-F238E27FC236}">
-                <a16:creationId xmlns:a16="http://schemas.microsoft.com/office/drawing/2014/main" id="{4B4CD21D-35A4-42DE-864E-1C1949EDCA1C}"/>
+                <a16:creationId xmlns:a16="http://schemas.microsoft.com/office/drawing/2014/main" xmlns="" id="{4B4CD21D-35A4-42DE-864E-1C1949EDCA1C}"/>
               </a:ext>
             </a:extLst>
           </p:cNvPr>
@@ -12316,7 +14777,7 @@
           <p:cNvPr id="4" name="Content Placeholder 3">
             <a:extLst>
               <a:ext uri="{FF2B5EF4-FFF2-40B4-BE49-F238E27FC236}">
-                <a16:creationId xmlns:a16="http://schemas.microsoft.com/office/drawing/2014/main" id="{39C43AB0-0D14-4E21-9AAF-6DA573C5CCBE}"/>
+                <a16:creationId xmlns:a16="http://schemas.microsoft.com/office/drawing/2014/main" xmlns="" id="{39C43AB0-0D14-4E21-9AAF-6DA573C5CCBE}"/>
               </a:ext>
             </a:extLst>
           </p:cNvPr>
@@ -12378,7 +14839,7 @@
           <p:cNvPr id="5" name="Date Placeholder 4">
             <a:extLst>
               <a:ext uri="{FF2B5EF4-FFF2-40B4-BE49-F238E27FC236}">
-                <a16:creationId xmlns:a16="http://schemas.microsoft.com/office/drawing/2014/main" id="{1F026095-E31F-4F64-AC78-F8391A9E1415}"/>
+                <a16:creationId xmlns:a16="http://schemas.microsoft.com/office/drawing/2014/main" xmlns="" id="{1F026095-E31F-4F64-AC78-F8391A9E1415}"/>
               </a:ext>
             </a:extLst>
           </p:cNvPr>
@@ -12408,7 +14869,7 @@
           <p:cNvPr id="6" name="Footer Placeholder 5">
             <a:extLst>
               <a:ext uri="{FF2B5EF4-FFF2-40B4-BE49-F238E27FC236}">
-                <a16:creationId xmlns:a16="http://schemas.microsoft.com/office/drawing/2014/main" id="{E28FCC4A-A5BC-400F-A6EB-01C202329F1E}"/>
+                <a16:creationId xmlns:a16="http://schemas.microsoft.com/office/drawing/2014/main" xmlns="" id="{E28FCC4A-A5BC-400F-A6EB-01C202329F1E}"/>
               </a:ext>
             </a:extLst>
           </p:cNvPr>
@@ -12433,7 +14894,7 @@
           <p:cNvPr id="7" name="Slide Number Placeholder 6">
             <a:extLst>
               <a:ext uri="{FF2B5EF4-FFF2-40B4-BE49-F238E27FC236}">
-                <a16:creationId xmlns:a16="http://schemas.microsoft.com/office/drawing/2014/main" id="{A256B9CC-FEF0-4472-8D2C-0E0108B3F72C}"/>
+                <a16:creationId xmlns:a16="http://schemas.microsoft.com/office/drawing/2014/main" xmlns="" id="{A256B9CC-FEF0-4472-8D2C-0E0108B3F72C}"/>
               </a:ext>
             </a:extLst>
           </p:cNvPr>
@@ -12461,7 +14922,7 @@
     </p:spTree>
     <p:extLst>
       <p:ext uri="{BB962C8B-B14F-4D97-AF65-F5344CB8AC3E}">
-        <p14:creationId xmlns:p14="http://schemas.microsoft.com/office/powerpoint/2010/main" val="2130001743"/>
+        <p14:creationId xmlns:p14="http://schemas.microsoft.com/office/powerpoint/2010/main" xmlns="" val="2130001743"/>
       </p:ext>
     </p:extLst>
   </p:cSld>
@@ -12493,7 +14954,7 @@
           <p:cNvPr id="2" name="Title 1">
             <a:extLst>
               <a:ext uri="{FF2B5EF4-FFF2-40B4-BE49-F238E27FC236}">
-                <a16:creationId xmlns:a16="http://schemas.microsoft.com/office/drawing/2014/main" id="{721601D2-8215-48A4-B3E9-00AE3C43FA10}"/>
+                <a16:creationId xmlns:a16="http://schemas.microsoft.com/office/drawing/2014/main" xmlns="" id="{721601D2-8215-48A4-B3E9-00AE3C43FA10}"/>
               </a:ext>
             </a:extLst>
           </p:cNvPr>
@@ -12526,7 +14987,7 @@
           <p:cNvPr id="3" name="Text Placeholder 2">
             <a:extLst>
               <a:ext uri="{FF2B5EF4-FFF2-40B4-BE49-F238E27FC236}">
-                <a16:creationId xmlns:a16="http://schemas.microsoft.com/office/drawing/2014/main" id="{9511D028-9781-441C-9E2D-C57FC40AFE9A}"/>
+                <a16:creationId xmlns:a16="http://schemas.microsoft.com/office/drawing/2014/main" xmlns="" id="{9511D028-9781-441C-9E2D-C57FC40AFE9A}"/>
               </a:ext>
             </a:extLst>
           </p:cNvPr>
@@ -12597,7 +15058,7 @@
           <p:cNvPr id="4" name="Content Placeholder 3">
             <a:extLst>
               <a:ext uri="{FF2B5EF4-FFF2-40B4-BE49-F238E27FC236}">
-                <a16:creationId xmlns:a16="http://schemas.microsoft.com/office/drawing/2014/main" id="{DEE7B035-1AAC-4511-9E2D-4B51CAF2FBDA}"/>
+                <a16:creationId xmlns:a16="http://schemas.microsoft.com/office/drawing/2014/main" xmlns="" id="{DEE7B035-1AAC-4511-9E2D-4B51CAF2FBDA}"/>
               </a:ext>
             </a:extLst>
           </p:cNvPr>
@@ -12659,7 +15120,7 @@
           <p:cNvPr id="5" name="Text Placeholder 4">
             <a:extLst>
               <a:ext uri="{FF2B5EF4-FFF2-40B4-BE49-F238E27FC236}">
-                <a16:creationId xmlns:a16="http://schemas.microsoft.com/office/drawing/2014/main" id="{7963271C-FF12-47C3-A87A-D3DA8289795C}"/>
+                <a16:creationId xmlns:a16="http://schemas.microsoft.com/office/drawing/2014/main" xmlns="" id="{7963271C-FF12-47C3-A87A-D3DA8289795C}"/>
               </a:ext>
             </a:extLst>
           </p:cNvPr>
@@ -12730,7 +15191,7 @@
           <p:cNvPr id="6" name="Content Placeholder 5">
             <a:extLst>
               <a:ext uri="{FF2B5EF4-FFF2-40B4-BE49-F238E27FC236}">
-                <a16:creationId xmlns:a16="http://schemas.microsoft.com/office/drawing/2014/main" id="{35BB6672-B062-4DBF-BABC-E5571CD8B735}"/>
+                <a16:creationId xmlns:a16="http://schemas.microsoft.com/office/drawing/2014/main" xmlns="" id="{35BB6672-B062-4DBF-BABC-E5571CD8B735}"/>
               </a:ext>
             </a:extLst>
           </p:cNvPr>
@@ -12792,7 +15253,7 @@
           <p:cNvPr id="7" name="Date Placeholder 6">
             <a:extLst>
               <a:ext uri="{FF2B5EF4-FFF2-40B4-BE49-F238E27FC236}">
-                <a16:creationId xmlns:a16="http://schemas.microsoft.com/office/drawing/2014/main" id="{8F3DF94E-F3F3-4483-96E0-6BE6C362438A}"/>
+                <a16:creationId xmlns:a16="http://schemas.microsoft.com/office/drawing/2014/main" xmlns="" id="{8F3DF94E-F3F3-4483-96E0-6BE6C362438A}"/>
               </a:ext>
             </a:extLst>
           </p:cNvPr>
@@ -12822,7 +15283,7 @@
           <p:cNvPr id="8" name="Footer Placeholder 7">
             <a:extLst>
               <a:ext uri="{FF2B5EF4-FFF2-40B4-BE49-F238E27FC236}">
-                <a16:creationId xmlns:a16="http://schemas.microsoft.com/office/drawing/2014/main" id="{662518D2-B2B0-4B5B-BFEC-8792F13D4F27}"/>
+                <a16:creationId xmlns:a16="http://schemas.microsoft.com/office/drawing/2014/main" xmlns="" id="{662518D2-B2B0-4B5B-BFEC-8792F13D4F27}"/>
               </a:ext>
             </a:extLst>
           </p:cNvPr>
@@ -12847,7 +15308,7 @@
           <p:cNvPr id="9" name="Slide Number Placeholder 8">
             <a:extLst>
               <a:ext uri="{FF2B5EF4-FFF2-40B4-BE49-F238E27FC236}">
-                <a16:creationId xmlns:a16="http://schemas.microsoft.com/office/drawing/2014/main" id="{AFCBEA20-92DA-4BBD-84A0-1C5596A8F2E9}"/>
+                <a16:creationId xmlns:a16="http://schemas.microsoft.com/office/drawing/2014/main" xmlns="" id="{AFCBEA20-92DA-4BBD-84A0-1C5596A8F2E9}"/>
               </a:ext>
             </a:extLst>
           </p:cNvPr>
@@ -12875,7 +15336,7 @@
     </p:spTree>
     <p:extLst>
       <p:ext uri="{BB962C8B-B14F-4D97-AF65-F5344CB8AC3E}">
-        <p14:creationId xmlns:p14="http://schemas.microsoft.com/office/powerpoint/2010/main" val="1941267372"/>
+        <p14:creationId xmlns:p14="http://schemas.microsoft.com/office/powerpoint/2010/main" xmlns="" val="1941267372"/>
       </p:ext>
     </p:extLst>
   </p:cSld>
@@ -12907,7 +15368,7 @@
           <p:cNvPr id="2" name="Title 1">
             <a:extLst>
               <a:ext uri="{FF2B5EF4-FFF2-40B4-BE49-F238E27FC236}">
-                <a16:creationId xmlns:a16="http://schemas.microsoft.com/office/drawing/2014/main" id="{2AB5840C-FE44-40D5-A48B-CAA5A331BA6F}"/>
+                <a16:creationId xmlns:a16="http://schemas.microsoft.com/office/drawing/2014/main" xmlns="" id="{2AB5840C-FE44-40D5-A48B-CAA5A331BA6F}"/>
               </a:ext>
             </a:extLst>
           </p:cNvPr>
@@ -12935,7 +15396,7 @@
           <p:cNvPr id="3" name="Date Placeholder 2">
             <a:extLst>
               <a:ext uri="{FF2B5EF4-FFF2-40B4-BE49-F238E27FC236}">
-                <a16:creationId xmlns:a16="http://schemas.microsoft.com/office/drawing/2014/main" id="{521B81B3-27BA-46E9-9319-63253DBB8561}"/>
+                <a16:creationId xmlns:a16="http://schemas.microsoft.com/office/drawing/2014/main" xmlns="" id="{521B81B3-27BA-46E9-9319-63253DBB8561}"/>
               </a:ext>
             </a:extLst>
           </p:cNvPr>
@@ -12965,7 +15426,7 @@
           <p:cNvPr id="4" name="Footer Placeholder 3">
             <a:extLst>
               <a:ext uri="{FF2B5EF4-FFF2-40B4-BE49-F238E27FC236}">
-                <a16:creationId xmlns:a16="http://schemas.microsoft.com/office/drawing/2014/main" id="{33FFE9C1-3141-4D73-891F-2EFF2B45CDD8}"/>
+                <a16:creationId xmlns:a16="http://schemas.microsoft.com/office/drawing/2014/main" xmlns="" id="{33FFE9C1-3141-4D73-891F-2EFF2B45CDD8}"/>
               </a:ext>
             </a:extLst>
           </p:cNvPr>
@@ -12990,7 +15451,7 @@
           <p:cNvPr id="5" name="Slide Number Placeholder 4">
             <a:extLst>
               <a:ext uri="{FF2B5EF4-FFF2-40B4-BE49-F238E27FC236}">
-                <a16:creationId xmlns:a16="http://schemas.microsoft.com/office/drawing/2014/main" id="{F2B89888-770C-4CC8-8E55-CE5A28D078E7}"/>
+                <a16:creationId xmlns:a16="http://schemas.microsoft.com/office/drawing/2014/main" xmlns="" id="{F2B89888-770C-4CC8-8E55-CE5A28D078E7}"/>
               </a:ext>
             </a:extLst>
           </p:cNvPr>
@@ -13018,7 +15479,7 @@
     </p:spTree>
     <p:extLst>
       <p:ext uri="{BB962C8B-B14F-4D97-AF65-F5344CB8AC3E}">
-        <p14:creationId xmlns:p14="http://schemas.microsoft.com/office/powerpoint/2010/main" val="80856006"/>
+        <p14:creationId xmlns:p14="http://schemas.microsoft.com/office/powerpoint/2010/main" xmlns="" val="80856006"/>
       </p:ext>
     </p:extLst>
   </p:cSld>
@@ -13050,7 +15511,7 @@
           <p:cNvPr id="2" name="Date Placeholder 1">
             <a:extLst>
               <a:ext uri="{FF2B5EF4-FFF2-40B4-BE49-F238E27FC236}">
-                <a16:creationId xmlns:a16="http://schemas.microsoft.com/office/drawing/2014/main" id="{E74E29F7-5E8B-47B4-B39F-6220F1A63FD3}"/>
+                <a16:creationId xmlns:a16="http://schemas.microsoft.com/office/drawing/2014/main" xmlns="" id="{E74E29F7-5E8B-47B4-B39F-6220F1A63FD3}"/>
               </a:ext>
             </a:extLst>
           </p:cNvPr>
@@ -13080,7 +15541,7 @@
           <p:cNvPr id="3" name="Footer Placeholder 2">
             <a:extLst>
               <a:ext uri="{FF2B5EF4-FFF2-40B4-BE49-F238E27FC236}">
-                <a16:creationId xmlns:a16="http://schemas.microsoft.com/office/drawing/2014/main" id="{8080EAD4-2479-4100-B5F5-59BC3671820A}"/>
+                <a16:creationId xmlns:a16="http://schemas.microsoft.com/office/drawing/2014/main" xmlns="" id="{8080EAD4-2479-4100-B5F5-59BC3671820A}"/>
               </a:ext>
             </a:extLst>
           </p:cNvPr>
@@ -13105,7 +15566,7 @@
           <p:cNvPr id="4" name="Slide Number Placeholder 3">
             <a:extLst>
               <a:ext uri="{FF2B5EF4-FFF2-40B4-BE49-F238E27FC236}">
-                <a16:creationId xmlns:a16="http://schemas.microsoft.com/office/drawing/2014/main" id="{048D24CD-5CA6-4CEF-A8FB-EB373251ECD8}"/>
+                <a16:creationId xmlns:a16="http://schemas.microsoft.com/office/drawing/2014/main" xmlns="" id="{048D24CD-5CA6-4CEF-A8FB-EB373251ECD8}"/>
               </a:ext>
             </a:extLst>
           </p:cNvPr>
@@ -13133,7 +15594,7 @@
     </p:spTree>
     <p:extLst>
       <p:ext uri="{BB962C8B-B14F-4D97-AF65-F5344CB8AC3E}">
-        <p14:creationId xmlns:p14="http://schemas.microsoft.com/office/powerpoint/2010/main" val="2890194562"/>
+        <p14:creationId xmlns:p14="http://schemas.microsoft.com/office/powerpoint/2010/main" xmlns="" val="2890194562"/>
       </p:ext>
     </p:extLst>
   </p:cSld>
@@ -13165,7 +15626,7 @@
           <p:cNvPr id="2" name="Title 1">
             <a:extLst>
               <a:ext uri="{FF2B5EF4-FFF2-40B4-BE49-F238E27FC236}">
-                <a16:creationId xmlns:a16="http://schemas.microsoft.com/office/drawing/2014/main" id="{21A6967F-1377-418C-8AE3-07CF05C4D443}"/>
+                <a16:creationId xmlns:a16="http://schemas.microsoft.com/office/drawing/2014/main" xmlns="" id="{21A6967F-1377-418C-8AE3-07CF05C4D443}"/>
               </a:ext>
             </a:extLst>
           </p:cNvPr>
@@ -13202,7 +15663,7 @@
           <p:cNvPr id="3" name="Content Placeholder 2">
             <a:extLst>
               <a:ext uri="{FF2B5EF4-FFF2-40B4-BE49-F238E27FC236}">
-                <a16:creationId xmlns:a16="http://schemas.microsoft.com/office/drawing/2014/main" id="{99FE211C-7B95-4EA0-8731-D1415685B26E}"/>
+                <a16:creationId xmlns:a16="http://schemas.microsoft.com/office/drawing/2014/main" xmlns="" id="{99FE211C-7B95-4EA0-8731-D1415685B26E}"/>
               </a:ext>
             </a:extLst>
           </p:cNvPr>
@@ -13292,7 +15753,7 @@
           <p:cNvPr id="4" name="Text Placeholder 3">
             <a:extLst>
               <a:ext uri="{FF2B5EF4-FFF2-40B4-BE49-F238E27FC236}">
-                <a16:creationId xmlns:a16="http://schemas.microsoft.com/office/drawing/2014/main" id="{24EB20D1-FA19-4724-A6C7-205288A96983}"/>
+                <a16:creationId xmlns:a16="http://schemas.microsoft.com/office/drawing/2014/main" xmlns="" id="{24EB20D1-FA19-4724-A6C7-205288A96983}"/>
               </a:ext>
             </a:extLst>
           </p:cNvPr>
@@ -13363,7 +15824,7 @@
           <p:cNvPr id="5" name="Date Placeholder 4">
             <a:extLst>
               <a:ext uri="{FF2B5EF4-FFF2-40B4-BE49-F238E27FC236}">
-                <a16:creationId xmlns:a16="http://schemas.microsoft.com/office/drawing/2014/main" id="{621DF5A2-3875-4250-B9BF-6EA5C13C2963}"/>
+                <a16:creationId xmlns:a16="http://schemas.microsoft.com/office/drawing/2014/main" xmlns="" id="{621DF5A2-3875-4250-B9BF-6EA5C13C2963}"/>
               </a:ext>
             </a:extLst>
           </p:cNvPr>
@@ -13393,7 +15854,7 @@
           <p:cNvPr id="6" name="Footer Placeholder 5">
             <a:extLst>
               <a:ext uri="{FF2B5EF4-FFF2-40B4-BE49-F238E27FC236}">
-                <a16:creationId xmlns:a16="http://schemas.microsoft.com/office/drawing/2014/main" id="{CE3F64E2-FEB8-42B0-AE34-D3FAFCE8A5ED}"/>
+                <a16:creationId xmlns:a16="http://schemas.microsoft.com/office/drawing/2014/main" xmlns="" id="{CE3F64E2-FEB8-42B0-AE34-D3FAFCE8A5ED}"/>
               </a:ext>
             </a:extLst>
           </p:cNvPr>
@@ -13418,7 +15879,7 @@
           <p:cNvPr id="7" name="Slide Number Placeholder 6">
             <a:extLst>
               <a:ext uri="{FF2B5EF4-FFF2-40B4-BE49-F238E27FC236}">
-                <a16:creationId xmlns:a16="http://schemas.microsoft.com/office/drawing/2014/main" id="{F381DE2E-7DEC-45E6-933F-546A03CE4F94}"/>
+                <a16:creationId xmlns:a16="http://schemas.microsoft.com/office/drawing/2014/main" xmlns="" id="{F381DE2E-7DEC-45E6-933F-546A03CE4F94}"/>
               </a:ext>
             </a:extLst>
           </p:cNvPr>
@@ -13446,7 +15907,7 @@
     </p:spTree>
     <p:extLst>
       <p:ext uri="{BB962C8B-B14F-4D97-AF65-F5344CB8AC3E}">
-        <p14:creationId xmlns:p14="http://schemas.microsoft.com/office/powerpoint/2010/main" val="3009697738"/>
+        <p14:creationId xmlns:p14="http://schemas.microsoft.com/office/powerpoint/2010/main" xmlns="" val="3009697738"/>
       </p:ext>
     </p:extLst>
   </p:cSld>
@@ -13478,7 +15939,7 @@
           <p:cNvPr id="2" name="Title 1">
             <a:extLst>
               <a:ext uri="{FF2B5EF4-FFF2-40B4-BE49-F238E27FC236}">
-                <a16:creationId xmlns:a16="http://schemas.microsoft.com/office/drawing/2014/main" id="{25BFDB70-DBF3-49F4-AA2D-F2AA055F33A8}"/>
+                <a16:creationId xmlns:a16="http://schemas.microsoft.com/office/drawing/2014/main" xmlns="" id="{25BFDB70-DBF3-49F4-AA2D-F2AA055F33A8}"/>
               </a:ext>
             </a:extLst>
           </p:cNvPr>
@@ -13515,7 +15976,7 @@
           <p:cNvPr id="3" name="Picture Placeholder 2">
             <a:extLst>
               <a:ext uri="{FF2B5EF4-FFF2-40B4-BE49-F238E27FC236}">
-                <a16:creationId xmlns:a16="http://schemas.microsoft.com/office/drawing/2014/main" id="{3BDD6D66-0F90-4494-BE35-305EDE648A95}"/>
+                <a16:creationId xmlns:a16="http://schemas.microsoft.com/office/drawing/2014/main" xmlns="" id="{3BDD6D66-0F90-4494-BE35-305EDE648A95}"/>
               </a:ext>
             </a:extLst>
           </p:cNvPr>
@@ -13582,7 +16043,7 @@
           <p:cNvPr id="4" name="Text Placeholder 3">
             <a:extLst>
               <a:ext uri="{FF2B5EF4-FFF2-40B4-BE49-F238E27FC236}">
-                <a16:creationId xmlns:a16="http://schemas.microsoft.com/office/drawing/2014/main" id="{22E7657D-AC02-4323-A624-A74B23FC967D}"/>
+                <a16:creationId xmlns:a16="http://schemas.microsoft.com/office/drawing/2014/main" xmlns="" id="{22E7657D-AC02-4323-A624-A74B23FC967D}"/>
               </a:ext>
             </a:extLst>
           </p:cNvPr>
@@ -13653,7 +16114,7 @@
           <p:cNvPr id="5" name="Date Placeholder 4">
             <a:extLst>
               <a:ext uri="{FF2B5EF4-FFF2-40B4-BE49-F238E27FC236}">
-                <a16:creationId xmlns:a16="http://schemas.microsoft.com/office/drawing/2014/main" id="{CC51BB29-212E-4D67-AAE6-08B991F05273}"/>
+                <a16:creationId xmlns:a16="http://schemas.microsoft.com/office/drawing/2014/main" xmlns="" id="{CC51BB29-212E-4D67-AAE6-08B991F05273}"/>
               </a:ext>
             </a:extLst>
           </p:cNvPr>
@@ -13683,7 +16144,7 @@
           <p:cNvPr id="6" name="Footer Placeholder 5">
             <a:extLst>
               <a:ext uri="{FF2B5EF4-FFF2-40B4-BE49-F238E27FC236}">
-                <a16:creationId xmlns:a16="http://schemas.microsoft.com/office/drawing/2014/main" id="{FAB97702-80C6-4694-9BAD-334D1CD8CF07}"/>
+                <a16:creationId xmlns:a16="http://schemas.microsoft.com/office/drawing/2014/main" xmlns="" id="{FAB97702-80C6-4694-9BAD-334D1CD8CF07}"/>
               </a:ext>
             </a:extLst>
           </p:cNvPr>
@@ -13708,7 +16169,7 @@
           <p:cNvPr id="7" name="Slide Number Placeholder 6">
             <a:extLst>
               <a:ext uri="{FF2B5EF4-FFF2-40B4-BE49-F238E27FC236}">
-                <a16:creationId xmlns:a16="http://schemas.microsoft.com/office/drawing/2014/main" id="{A538BE35-13A3-439F-942C-DA1DDA383C03}"/>
+                <a16:creationId xmlns:a16="http://schemas.microsoft.com/office/drawing/2014/main" xmlns="" id="{A538BE35-13A3-439F-942C-DA1DDA383C03}"/>
               </a:ext>
             </a:extLst>
           </p:cNvPr>
@@ -13736,7 +16197,7 @@
     </p:spTree>
     <p:extLst>
       <p:ext uri="{BB962C8B-B14F-4D97-AF65-F5344CB8AC3E}">
-        <p14:creationId xmlns:p14="http://schemas.microsoft.com/office/powerpoint/2010/main" val="1166235767"/>
+        <p14:creationId xmlns:p14="http://schemas.microsoft.com/office/powerpoint/2010/main" xmlns="" val="1166235767"/>
       </p:ext>
     </p:extLst>
   </p:cSld>
@@ -13783,7 +16244,7 @@
           <p:cNvPr id="2" name="Title Placeholder 1">
             <a:extLst>
               <a:ext uri="{FF2B5EF4-FFF2-40B4-BE49-F238E27FC236}">
-                <a16:creationId xmlns:a16="http://schemas.microsoft.com/office/drawing/2014/main" id="{C82D69AA-BE7F-452A-B294-D61FC8DDE2D8}"/>
+                <a16:creationId xmlns:a16="http://schemas.microsoft.com/office/drawing/2014/main" xmlns="" id="{C82D69AA-BE7F-452A-B294-D61FC8DDE2D8}"/>
               </a:ext>
             </a:extLst>
           </p:cNvPr>
@@ -13821,7 +16282,7 @@
           <p:cNvPr id="3" name="Text Placeholder 2">
             <a:extLst>
               <a:ext uri="{FF2B5EF4-FFF2-40B4-BE49-F238E27FC236}">
-                <a16:creationId xmlns:a16="http://schemas.microsoft.com/office/drawing/2014/main" id="{FE257F75-7085-4148-862D-74C15679C79B}"/>
+                <a16:creationId xmlns:a16="http://schemas.microsoft.com/office/drawing/2014/main" xmlns="" id="{FE257F75-7085-4148-862D-74C15679C79B}"/>
               </a:ext>
             </a:extLst>
           </p:cNvPr>
@@ -13888,7 +16349,7 @@
           <p:cNvPr id="4" name="Date Placeholder 3">
             <a:extLst>
               <a:ext uri="{FF2B5EF4-FFF2-40B4-BE49-F238E27FC236}">
-                <a16:creationId xmlns:a16="http://schemas.microsoft.com/office/drawing/2014/main" id="{BB32868B-87D3-41AB-AC95-A737859BBA60}"/>
+                <a16:creationId xmlns:a16="http://schemas.microsoft.com/office/drawing/2014/main" xmlns="" id="{BB32868B-87D3-41AB-AC95-A737859BBA60}"/>
               </a:ext>
             </a:extLst>
           </p:cNvPr>
@@ -13936,7 +16397,7 @@
           <p:cNvPr id="5" name="Footer Placeholder 4">
             <a:extLst>
               <a:ext uri="{FF2B5EF4-FFF2-40B4-BE49-F238E27FC236}">
-                <a16:creationId xmlns:a16="http://schemas.microsoft.com/office/drawing/2014/main" id="{F70AFC56-CCB4-4482-AEDE-2F181185B988}"/>
+                <a16:creationId xmlns:a16="http://schemas.microsoft.com/office/drawing/2014/main" xmlns="" id="{F70AFC56-CCB4-4482-AEDE-2F181185B988}"/>
               </a:ext>
             </a:extLst>
           </p:cNvPr>
@@ -13979,7 +16440,7 @@
           <p:cNvPr id="6" name="Slide Number Placeholder 5">
             <a:extLst>
               <a:ext uri="{FF2B5EF4-FFF2-40B4-BE49-F238E27FC236}">
-                <a16:creationId xmlns:a16="http://schemas.microsoft.com/office/drawing/2014/main" id="{CCF8B899-6023-4B58-9D99-3526809F1EF4}"/>
+                <a16:creationId xmlns:a16="http://schemas.microsoft.com/office/drawing/2014/main" xmlns="" id="{CCF8B899-6023-4B58-9D99-3526809F1EF4}"/>
               </a:ext>
             </a:extLst>
           </p:cNvPr>
@@ -14025,7 +16486,7 @@
     </p:spTree>
     <p:extLst>
       <p:ext uri="{BB962C8B-B14F-4D97-AF65-F5344CB8AC3E}">
-        <p14:creationId xmlns:p14="http://schemas.microsoft.com/office/powerpoint/2010/main" val="2529691060"/>
+        <p14:creationId xmlns:p14="http://schemas.microsoft.com/office/powerpoint/2010/main" xmlns="" val="2529691060"/>
       </p:ext>
     </p:extLst>
   </p:cSld>
@@ -14348,7 +16809,7 @@
           <p:cNvPr id="5" name="Picture 4">
             <a:extLst>
               <a:ext uri="{FF2B5EF4-FFF2-40B4-BE49-F238E27FC236}">
-                <a16:creationId xmlns:a16="http://schemas.microsoft.com/office/drawing/2014/main" id="{CBDB7070-A119-4AC9-9F18-85F3EFE9C465}"/>
+                <a16:creationId xmlns:a16="http://schemas.microsoft.com/office/drawing/2014/main" xmlns="" id="{CBDB7070-A119-4AC9-9F18-85F3EFE9C465}"/>
               </a:ext>
             </a:extLst>
           </p:cNvPr>
@@ -14361,7 +16822,7 @@
           <a:blip r:embed="rId2">
             <a:extLst>
               <a:ext uri="{28A0092B-C50C-407E-A947-70E740481C1C}">
-                <a14:useLocalDpi xmlns:a14="http://schemas.microsoft.com/office/drawing/2010/main" val="0"/>
+                <a14:useLocalDpi xmlns:a14="http://schemas.microsoft.com/office/drawing/2010/main" xmlns="" val="0"/>
               </a:ext>
             </a:extLst>
           </a:blip>
@@ -14384,7 +16845,7 @@
           <p:cNvPr id="2" name="Title 1">
             <a:extLst>
               <a:ext uri="{FF2B5EF4-FFF2-40B4-BE49-F238E27FC236}">
-                <a16:creationId xmlns:a16="http://schemas.microsoft.com/office/drawing/2014/main" id="{D8295AAC-1871-4C58-9FAB-A2582EB1BE4F}"/>
+                <a16:creationId xmlns:a16="http://schemas.microsoft.com/office/drawing/2014/main" xmlns="" id="{D8295AAC-1871-4C58-9FAB-A2582EB1BE4F}"/>
               </a:ext>
             </a:extLst>
           </p:cNvPr>
@@ -14439,7 +16900,7 @@
           <p:cNvPr id="3" name="Subtitle 2">
             <a:extLst>
               <a:ext uri="{FF2B5EF4-FFF2-40B4-BE49-F238E27FC236}">
-                <a16:creationId xmlns:a16="http://schemas.microsoft.com/office/drawing/2014/main" id="{79848AE3-6A69-4849-9758-6089035C229E}"/>
+                <a16:creationId xmlns:a16="http://schemas.microsoft.com/office/drawing/2014/main" xmlns="" id="{79848AE3-6A69-4849-9758-6089035C229E}"/>
               </a:ext>
             </a:extLst>
           </p:cNvPr>
@@ -14591,7 +17052,7 @@
     </p:spTree>
     <p:extLst>
       <p:ext uri="{BB962C8B-B14F-4D97-AF65-F5344CB8AC3E}">
-        <p14:creationId xmlns:p14="http://schemas.microsoft.com/office/powerpoint/2010/main" val="738401949"/>
+        <p14:creationId xmlns:p14="http://schemas.microsoft.com/office/powerpoint/2010/main" xmlns="" val="738401949"/>
       </p:ext>
     </p:extLst>
   </p:cSld>
@@ -14623,7 +17084,7 @@
           <p:cNvPr id="5" name="Picture 4">
             <a:extLst>
               <a:ext uri="{FF2B5EF4-FFF2-40B4-BE49-F238E27FC236}">
-                <a16:creationId xmlns:a16="http://schemas.microsoft.com/office/drawing/2014/main" id="{CBDB7070-A119-4AC9-9F18-85F3EFE9C465}"/>
+                <a16:creationId xmlns:a16="http://schemas.microsoft.com/office/drawing/2014/main" xmlns="" id="{CBDB7070-A119-4AC9-9F18-85F3EFE9C465}"/>
               </a:ext>
             </a:extLst>
           </p:cNvPr>
@@ -14636,7 +17097,7 @@
           <a:blip r:embed="rId2">
             <a:extLst>
               <a:ext uri="{28A0092B-C50C-407E-A947-70E740481C1C}">
-                <a14:useLocalDpi xmlns:a14="http://schemas.microsoft.com/office/drawing/2010/main" val="0"/>
+                <a14:useLocalDpi xmlns:a14="http://schemas.microsoft.com/office/drawing/2010/main" xmlns="" val="0"/>
               </a:ext>
             </a:extLst>
           </a:blip>
@@ -14659,7 +17120,7 @@
           <p:cNvPr id="9" name="Title 1">
             <a:extLst>
               <a:ext uri="{FF2B5EF4-FFF2-40B4-BE49-F238E27FC236}">
-                <a16:creationId xmlns:a16="http://schemas.microsoft.com/office/drawing/2014/main" id="{C22D3CD9-B6DF-4688-B616-7F37AEC6565E}"/>
+                <a16:creationId xmlns:a16="http://schemas.microsoft.com/office/drawing/2014/main" xmlns="" id="{C22D3CD9-B6DF-4688-B616-7F37AEC6565E}"/>
               </a:ext>
             </a:extLst>
           </p:cNvPr>
@@ -14739,7 +17200,7 @@
     </p:spTree>
     <p:extLst>
       <p:ext uri="{BB962C8B-B14F-4D97-AF65-F5344CB8AC3E}">
-        <p14:creationId xmlns:p14="http://schemas.microsoft.com/office/powerpoint/2010/main" val="738401949"/>
+        <p14:creationId xmlns:p14="http://schemas.microsoft.com/office/powerpoint/2010/main" xmlns="" val="738401949"/>
       </p:ext>
     </p:extLst>
   </p:cSld>
@@ -14771,7 +17232,7 @@
           <p:cNvPr id="5" name="Picture 4">
             <a:extLst>
               <a:ext uri="{FF2B5EF4-FFF2-40B4-BE49-F238E27FC236}">
-                <a16:creationId xmlns:a16="http://schemas.microsoft.com/office/drawing/2014/main" id="{CBDB7070-A119-4AC9-9F18-85F3EFE9C465}"/>
+                <a16:creationId xmlns:a16="http://schemas.microsoft.com/office/drawing/2014/main" xmlns="" id="{CBDB7070-A119-4AC9-9F18-85F3EFE9C465}"/>
               </a:ext>
             </a:extLst>
           </p:cNvPr>
@@ -14784,7 +17245,7 @@
           <a:blip r:embed="rId2">
             <a:extLst>
               <a:ext uri="{28A0092B-C50C-407E-A947-70E740481C1C}">
-                <a14:useLocalDpi xmlns:a14="http://schemas.microsoft.com/office/drawing/2010/main" val="0"/>
+                <a14:useLocalDpi xmlns:a14="http://schemas.microsoft.com/office/drawing/2010/main" xmlns="" val="0"/>
               </a:ext>
             </a:extLst>
           </a:blip>
@@ -14807,7 +17268,7 @@
           <p:cNvPr id="9" name="Title 1">
             <a:extLst>
               <a:ext uri="{FF2B5EF4-FFF2-40B4-BE49-F238E27FC236}">
-                <a16:creationId xmlns:a16="http://schemas.microsoft.com/office/drawing/2014/main" id="{C22D3CD9-B6DF-4688-B616-7F37AEC6565E}"/>
+                <a16:creationId xmlns:a16="http://schemas.microsoft.com/office/drawing/2014/main" xmlns="" id="{C22D3CD9-B6DF-4688-B616-7F37AEC6565E}"/>
               </a:ext>
             </a:extLst>
           </p:cNvPr>
@@ -14887,7 +17348,7 @@
     </p:spTree>
     <p:extLst>
       <p:ext uri="{BB962C8B-B14F-4D97-AF65-F5344CB8AC3E}">
-        <p14:creationId xmlns:p14="http://schemas.microsoft.com/office/powerpoint/2010/main" val="738401949"/>
+        <p14:creationId xmlns:p14="http://schemas.microsoft.com/office/powerpoint/2010/main" xmlns="" val="738401949"/>
       </p:ext>
     </p:extLst>
   </p:cSld>
@@ -14919,7 +17380,7 @@
           <p:cNvPr id="5" name="Picture 4">
             <a:extLst>
               <a:ext uri="{FF2B5EF4-FFF2-40B4-BE49-F238E27FC236}">
-                <a16:creationId xmlns:a16="http://schemas.microsoft.com/office/drawing/2014/main" id="{CBDB7070-A119-4AC9-9F18-85F3EFE9C465}"/>
+                <a16:creationId xmlns:a16="http://schemas.microsoft.com/office/drawing/2014/main" xmlns="" id="{CBDB7070-A119-4AC9-9F18-85F3EFE9C465}"/>
               </a:ext>
             </a:extLst>
           </p:cNvPr>
@@ -14932,7 +17393,7 @@
           <a:blip r:embed="rId2">
             <a:extLst>
               <a:ext uri="{28A0092B-C50C-407E-A947-70E740481C1C}">
-                <a14:useLocalDpi xmlns:a14="http://schemas.microsoft.com/office/drawing/2010/main" val="0"/>
+                <a14:useLocalDpi xmlns:a14="http://schemas.microsoft.com/office/drawing/2010/main" xmlns="" val="0"/>
               </a:ext>
             </a:extLst>
           </a:blip>
@@ -14955,7 +17416,7 @@
           <p:cNvPr id="2" name="Picture 1">
             <a:extLst>
               <a:ext uri="{FF2B5EF4-FFF2-40B4-BE49-F238E27FC236}">
-                <a16:creationId xmlns:a16="http://schemas.microsoft.com/office/drawing/2014/main" id="{82B2FCBC-7177-4776-9697-F6ED498E83C9}"/>
+                <a16:creationId xmlns:a16="http://schemas.microsoft.com/office/drawing/2014/main" xmlns="" id="{82B2FCBC-7177-4776-9697-F6ED498E83C9}"/>
               </a:ext>
             </a:extLst>
           </p:cNvPr>
@@ -14983,7 +17444,7 @@
     </p:spTree>
     <p:extLst>
       <p:ext uri="{BB962C8B-B14F-4D97-AF65-F5344CB8AC3E}">
-        <p14:creationId xmlns:p14="http://schemas.microsoft.com/office/powerpoint/2010/main" val="738401949"/>
+        <p14:creationId xmlns:p14="http://schemas.microsoft.com/office/powerpoint/2010/main" xmlns="" val="738401949"/>
       </p:ext>
     </p:extLst>
   </p:cSld>
@@ -15015,7 +17476,7 @@
           <p:cNvPr id="5" name="Picture 4">
             <a:extLst>
               <a:ext uri="{FF2B5EF4-FFF2-40B4-BE49-F238E27FC236}">
-                <a16:creationId xmlns:a16="http://schemas.microsoft.com/office/drawing/2014/main" id="{CBDB7070-A119-4AC9-9F18-85F3EFE9C465}"/>
+                <a16:creationId xmlns:a16="http://schemas.microsoft.com/office/drawing/2014/main" xmlns="" id="{CBDB7070-A119-4AC9-9F18-85F3EFE9C465}"/>
               </a:ext>
             </a:extLst>
           </p:cNvPr>
@@ -15028,7 +17489,7 @@
           <a:blip r:embed="rId2">
             <a:extLst>
               <a:ext uri="{28A0092B-C50C-407E-A947-70E740481C1C}">
-                <a14:useLocalDpi xmlns:a14="http://schemas.microsoft.com/office/drawing/2010/main" val="0"/>
+                <a14:useLocalDpi xmlns:a14="http://schemas.microsoft.com/office/drawing/2010/main" xmlns="" val="0"/>
               </a:ext>
             </a:extLst>
           </a:blip>
@@ -15051,7 +17512,7 @@
           <p:cNvPr id="4" name="Title 1">
             <a:extLst>
               <a:ext uri="{FF2B5EF4-FFF2-40B4-BE49-F238E27FC236}">
-                <a16:creationId xmlns:a16="http://schemas.microsoft.com/office/drawing/2014/main" id="{C22D3CD9-B6DF-4688-B616-7F37AEC6565E}"/>
+                <a16:creationId xmlns:a16="http://schemas.microsoft.com/office/drawing/2014/main" xmlns="" id="{C22D3CD9-B6DF-4688-B616-7F37AEC6565E}"/>
               </a:ext>
             </a:extLst>
           </p:cNvPr>
@@ -15114,7 +17575,7 @@
       </p:sp>
       <p:pic>
         <p:nvPicPr>
-          <p:cNvPr id="2050" name="Picture 2" descr="C:\dev\masters\beg-html5-games-w-createjs-master\9781430263401_source_code\Ironman--The-Clone-Attack\extraFiles\keyboard-layout (2).jpg"/>
+          <p:cNvPr id="1026" name="Picture 2" descr="C:\dev\masters\beg-html5-games-w-createjs-master\9781430263401_source_code\Ironman--The-Clone-Attack\assets\img\keyboard.png"/>
           <p:cNvPicPr>
             <a:picLocks noChangeAspect="1" noChangeArrowheads="1"/>
           </p:cNvPicPr>
@@ -15129,8 +17590,8 @@
         </p:blipFill>
         <p:spPr bwMode="auto">
           <a:xfrm>
-            <a:off x="2927125" y="2819400"/>
-            <a:ext cx="8839451" cy="1842752"/>
+            <a:off x="2146074" y="4676921"/>
+            <a:ext cx="7796826" cy="1625397"/>
           </a:xfrm>
           <a:prstGeom prst="rect">
             <a:avLst/>
@@ -15138,46 +17599,106 @@
           <a:noFill/>
         </p:spPr>
       </p:pic>
-      <p:pic>
-        <p:nvPicPr>
-          <p:cNvPr id="7" name="Picture 6">
+      <p:graphicFrame>
+        <p:nvGraphicFramePr>
+          <p:cNvPr id="8" name="Diagram 7"/>
+          <p:cNvGraphicFramePr/>
+          <p:nvPr/>
+        </p:nvGraphicFramePr>
+        <p:xfrm>
+          <a:off x="2032000" y="953033"/>
+          <a:ext cx="8128000" cy="3760637"/>
+        </p:xfrm>
+        <a:graphic>
+          <a:graphicData uri="http://schemas.openxmlformats.org/drawingml/2006/diagram">
+            <dgm:relIds xmlns:dgm="http://schemas.openxmlformats.org/drawingml/2006/diagram" xmlns:r="http://schemas.openxmlformats.org/officeDocument/2006/relationships" r:dm="rId4" r:lo="rId5" r:qs="rId6" r:cs="rId7"/>
+          </a:graphicData>
+        </a:graphic>
+      </p:graphicFrame>
+      <p:sp>
+        <p:nvSpPr>
+          <p:cNvPr id="9" name="Title 1">
             <a:extLst>
               <a:ext uri="{FF2B5EF4-FFF2-40B4-BE49-F238E27FC236}">
-                <a16:creationId xmlns:a16="http://schemas.microsoft.com/office/drawing/2014/main" id="{AF407492-C163-4CA4-BC69-9CC2BA196E14}"/>
+                <a16:creationId xmlns:a16="http://schemas.microsoft.com/office/drawing/2014/main" xmlns="" id="{C22D3CD9-B6DF-4688-B616-7F37AEC6565E}"/>
               </a:ext>
             </a:extLst>
           </p:cNvPr>
-          <p:cNvPicPr>
-            <a:picLocks noChangeAspect="1"/>
-          </p:cNvPicPr>
+          <p:cNvSpPr txBox="1">
+            <a:spLocks/>
+          </p:cNvSpPr>
           <p:nvPr/>
-        </p:nvPicPr>
-        <p:blipFill>
-          <a:blip r:embed="rId4">
-            <a:extLst>
-              <a:ext uri="{28A0092B-C50C-407E-A947-70E740481C1C}">
-                <a14:useLocalDpi xmlns:a14="http://schemas.microsoft.com/office/drawing/2010/main" val="0"/>
-              </a:ext>
-            </a:extLst>
-          </a:blip>
-          <a:stretch>
-            <a:fillRect/>
-          </a:stretch>
-        </p:blipFill>
+        </p:nvSpPr>
         <p:spPr>
           <a:xfrm>
-            <a:off x="860337" y="1162654"/>
-            <a:ext cx="1916534" cy="4751408"/>
+            <a:off x="836055" y="3866031"/>
+            <a:ext cx="10515600" cy="1325563"/>
           </a:xfrm>
           <a:prstGeom prst="rect">
             <a:avLst/>
           </a:prstGeom>
         </p:spPr>
-      </p:pic>
+        <p:txBody>
+          <a:bodyPr vert="horz" lIns="91440" tIns="45720" rIns="91440" bIns="45720" rtlCol="0" anchor="b">
+            <a:normAutofit/>
+          </a:bodyPr>
+          <a:lstStyle/>
+          <a:p>
+            <a:pPr marL="0" marR="0" lvl="0" indent="0" algn="ctr" defTabSz="914400" rtl="0" eaLnBrk="1" fontAlgn="auto" latinLnBrk="0" hangingPunct="1">
+              <a:lnSpc>
+                <a:spcPct val="90000"/>
+              </a:lnSpc>
+              <a:spcBef>
+                <a:spcPct val="0"/>
+              </a:spcBef>
+              <a:spcAft>
+                <a:spcPts val="0"/>
+              </a:spcAft>
+              <a:buClrTx/>
+              <a:buSzTx/>
+              <a:buFontTx/>
+              <a:buNone/>
+              <a:tabLst/>
+              <a:defRPr/>
+            </a:pPr>
+            <a:r>
+              <a:rPr kumimoji="0" lang="en-US" sz="6000" b="0" i="0" u="none" strike="noStrike" kern="1200" cap="none" spc="0" normalizeH="0" baseline="0" noProof="0" dirty="0" smtClean="0">
+                <a:ln>
+                  <a:noFill/>
+                </a:ln>
+                <a:solidFill>
+                  <a:schemeClr val="bg1"/>
+                </a:solidFill>
+                <a:effectLst/>
+                <a:uLnTx/>
+                <a:uFillTx/>
+                <a:latin typeface="IRON MAN OF WAR 002 NCV" pitchFamily="2" charset="0"/>
+                <a:ea typeface="+mj-ea"/>
+                <a:cs typeface="+mj-cs"/>
+              </a:rPr>
+              <a:t>Controls</a:t>
+            </a:r>
+            <a:endParaRPr kumimoji="0" lang="en-US" sz="6000" b="0" i="0" u="none" strike="noStrike" kern="1200" cap="none" spc="0" normalizeH="0" baseline="0" noProof="0" dirty="0">
+              <a:ln>
+                <a:noFill/>
+              </a:ln>
+              <a:solidFill>
+                <a:schemeClr val="bg1"/>
+              </a:solidFill>
+              <a:effectLst/>
+              <a:uLnTx/>
+              <a:uFillTx/>
+              <a:latin typeface="IRON MAN OF WAR 002 NCV" pitchFamily="2" charset="0"/>
+              <a:ea typeface="+mj-ea"/>
+              <a:cs typeface="+mj-cs"/>
+            </a:endParaRPr>
+          </a:p>
+        </p:txBody>
+      </p:sp>
     </p:spTree>
     <p:extLst>
       <p:ext uri="{BB962C8B-B14F-4D97-AF65-F5344CB8AC3E}">
-        <p14:creationId xmlns:p14="http://schemas.microsoft.com/office/powerpoint/2010/main" val="738401949"/>
+        <p14:creationId xmlns:p14="http://schemas.microsoft.com/office/powerpoint/2010/main" xmlns="" val="738401949"/>
       </p:ext>
     </p:extLst>
   </p:cSld>
@@ -15209,7 +17730,7 @@
           <p:cNvPr id="5" name="Picture 4">
             <a:extLst>
               <a:ext uri="{FF2B5EF4-FFF2-40B4-BE49-F238E27FC236}">
-                <a16:creationId xmlns:a16="http://schemas.microsoft.com/office/drawing/2014/main" id="{CBDB7070-A119-4AC9-9F18-85F3EFE9C465}"/>
+                <a16:creationId xmlns:a16="http://schemas.microsoft.com/office/drawing/2014/main" xmlns="" id="{CBDB7070-A119-4AC9-9F18-85F3EFE9C465}"/>
               </a:ext>
             </a:extLst>
           </p:cNvPr>
@@ -15222,7 +17743,7 @@
           <a:blip r:embed="rId2">
             <a:extLst>
               <a:ext uri="{28A0092B-C50C-407E-A947-70E740481C1C}">
-                <a14:useLocalDpi xmlns:a14="http://schemas.microsoft.com/office/drawing/2010/main" val="0"/>
+                <a14:useLocalDpi xmlns:a14="http://schemas.microsoft.com/office/drawing/2010/main" xmlns="" val="0"/>
               </a:ext>
             </a:extLst>
           </a:blip>
@@ -15245,7 +17766,7 @@
           <p:cNvPr id="4" name="Title 1">
             <a:extLst>
               <a:ext uri="{FF2B5EF4-FFF2-40B4-BE49-F238E27FC236}">
-                <a16:creationId xmlns:a16="http://schemas.microsoft.com/office/drawing/2014/main" id="{C22D3CD9-B6DF-4688-B616-7F37AEC6565E}"/>
+                <a16:creationId xmlns:a16="http://schemas.microsoft.com/office/drawing/2014/main" xmlns="" id="{C22D3CD9-B6DF-4688-B616-7F37AEC6565E}"/>
               </a:ext>
             </a:extLst>
           </p:cNvPr>
@@ -15309,7 +17830,7 @@
     </p:spTree>
     <p:extLst>
       <p:ext uri="{BB962C8B-B14F-4D97-AF65-F5344CB8AC3E}">
-        <p14:creationId xmlns:p14="http://schemas.microsoft.com/office/powerpoint/2010/main" val="738401949"/>
+        <p14:creationId xmlns:p14="http://schemas.microsoft.com/office/powerpoint/2010/main" xmlns="" val="738401949"/>
       </p:ext>
     </p:extLst>
   </p:cSld>
@@ -15341,7 +17862,7 @@
           <p:cNvPr id="5" name="Picture 4">
             <a:extLst>
               <a:ext uri="{FF2B5EF4-FFF2-40B4-BE49-F238E27FC236}">
-                <a16:creationId xmlns:a16="http://schemas.microsoft.com/office/drawing/2014/main" id="{CBDB7070-A119-4AC9-9F18-85F3EFE9C465}"/>
+                <a16:creationId xmlns:a16="http://schemas.microsoft.com/office/drawing/2014/main" xmlns="" id="{CBDB7070-A119-4AC9-9F18-85F3EFE9C465}"/>
               </a:ext>
             </a:extLst>
           </p:cNvPr>
@@ -15354,7 +17875,7 @@
           <a:blip r:embed="rId2">
             <a:extLst>
               <a:ext uri="{28A0092B-C50C-407E-A947-70E740481C1C}">
-                <a14:useLocalDpi xmlns:a14="http://schemas.microsoft.com/office/drawing/2010/main" val="0"/>
+                <a14:useLocalDpi xmlns:a14="http://schemas.microsoft.com/office/drawing/2010/main" xmlns="" val="0"/>
               </a:ext>
             </a:extLst>
           </a:blip>
@@ -15377,7 +17898,7 @@
           <p:cNvPr id="6" name="Title 1">
             <a:extLst>
               <a:ext uri="{FF2B5EF4-FFF2-40B4-BE49-F238E27FC236}">
-                <a16:creationId xmlns:a16="http://schemas.microsoft.com/office/drawing/2014/main" id="{C22D3CD9-B6DF-4688-B616-7F37AEC6565E}"/>
+                <a16:creationId xmlns:a16="http://schemas.microsoft.com/office/drawing/2014/main" xmlns="" id="{C22D3CD9-B6DF-4688-B616-7F37AEC6565E}"/>
               </a:ext>
             </a:extLst>
           </p:cNvPr>
@@ -15457,7 +17978,7 @@
     </p:spTree>
     <p:extLst>
       <p:ext uri="{BB962C8B-B14F-4D97-AF65-F5344CB8AC3E}">
-        <p14:creationId xmlns:p14="http://schemas.microsoft.com/office/powerpoint/2010/main" val="738401949"/>
+        <p14:creationId xmlns:p14="http://schemas.microsoft.com/office/powerpoint/2010/main" xmlns="" val="738401949"/>
       </p:ext>
     </p:extLst>
   </p:cSld>
@@ -15489,7 +18010,7 @@
           <p:cNvPr id="5" name="Picture 4">
             <a:extLst>
               <a:ext uri="{FF2B5EF4-FFF2-40B4-BE49-F238E27FC236}">
-                <a16:creationId xmlns:a16="http://schemas.microsoft.com/office/drawing/2014/main" id="{CBDB7070-A119-4AC9-9F18-85F3EFE9C465}"/>
+                <a16:creationId xmlns:a16="http://schemas.microsoft.com/office/drawing/2014/main" xmlns="" id="{CBDB7070-A119-4AC9-9F18-85F3EFE9C465}"/>
               </a:ext>
             </a:extLst>
           </p:cNvPr>
@@ -15502,7 +18023,7 @@
           <a:blip r:embed="rId2">
             <a:extLst>
               <a:ext uri="{28A0092B-C50C-407E-A947-70E740481C1C}">
-                <a14:useLocalDpi xmlns:a14="http://schemas.microsoft.com/office/drawing/2010/main" val="0"/>
+                <a14:useLocalDpi xmlns:a14="http://schemas.microsoft.com/office/drawing/2010/main" xmlns="" val="0"/>
               </a:ext>
             </a:extLst>
           </a:blip>
@@ -15525,7 +18046,7 @@
           <p:cNvPr id="6" name="Title 1">
             <a:extLst>
               <a:ext uri="{FF2B5EF4-FFF2-40B4-BE49-F238E27FC236}">
-                <a16:creationId xmlns:a16="http://schemas.microsoft.com/office/drawing/2014/main" id="{C22D3CD9-B6DF-4688-B616-7F37AEC6565E}"/>
+                <a16:creationId xmlns:a16="http://schemas.microsoft.com/office/drawing/2014/main" xmlns="" id="{C22D3CD9-B6DF-4688-B616-7F37AEC6565E}"/>
               </a:ext>
             </a:extLst>
           </p:cNvPr>
@@ -15605,7 +18126,7 @@
     </p:spTree>
     <p:extLst>
       <p:ext uri="{BB962C8B-B14F-4D97-AF65-F5344CB8AC3E}">
-        <p14:creationId xmlns:p14="http://schemas.microsoft.com/office/powerpoint/2010/main" val="738401949"/>
+        <p14:creationId xmlns:p14="http://schemas.microsoft.com/office/powerpoint/2010/main" xmlns="" val="738401949"/>
       </p:ext>
     </p:extLst>
   </p:cSld>
@@ -15904,7 +18425,7 @@
   <a:extraClrSchemeLst/>
   <a:extLst>
     <a:ext uri="{05A4C25C-085E-4340-85A3-A5531E510DB2}">
-      <thm15:themeFamily xmlns:thm15="http://schemas.microsoft.com/office/thememl/2012/main" name="Office Theme" id="{62F939B6-93AF-4DB8-9C6B-D6C7DFDC589F}" vid="{4A3C46E8-61CC-4603-A589-7422A47A8E4A}"/>
+      <thm15:themeFamily xmlns:thm15="http://schemas.microsoft.com/office/thememl/2012/main" xmlns="" name="Office Theme" id="{62F939B6-93AF-4DB8-9C6B-D6C7DFDC589F}" vid="{4A3C46E8-61CC-4603-A589-7422A47A8E4A}"/>
     </a:ext>
   </a:extLst>
 </a:theme>

</xml_diff>